<commit_message>
Diagrama de Arquitetura de Alto Nivel
</commit_message>
<xml_diff>
--- a/Ilustracoes Dissertacao.pptx
+++ b/Ilustracoes Dissertacao.pptx
@@ -6,7 +6,8 @@
   </p:sldMasterIdLst>
   <p:sldIdLst>
     <p:sldId id="256" r:id="rId2"/>
-    <p:sldId id="257" r:id="rId3"/>
+    <p:sldId id="258" r:id="rId3"/>
+    <p:sldId id="257" r:id="rId4"/>
   </p:sldIdLst>
   <p:sldSz cx="9144000" cy="6858000" type="screen4x3"/>
   <p:notesSz cx="6858000" cy="9144000"/>
@@ -1027,6 +1028,925 @@
 </dgm:colorsDef>
 </file>
 
+<file path=ppt/diagrams/colors2.xml><?xml version="1.0" encoding="utf-8"?>
+<dgm:colorsDef xmlns:dgm="http://schemas.openxmlformats.org/drawingml/2006/diagram" xmlns:a="http://schemas.openxmlformats.org/drawingml/2006/main" uniqueId="urn:microsoft.com/office/officeart/2005/8/colors/colorful1">
+  <dgm:title val=""/>
+  <dgm:desc val=""/>
+  <dgm:catLst>
+    <dgm:cat type="colorful" pri="10100"/>
+  </dgm:catLst>
+  <dgm:styleLbl name="node0">
+    <dgm:fillClrLst meth="repeat">
+      <a:schemeClr val="accent1"/>
+    </dgm:fillClrLst>
+    <dgm:linClrLst meth="repeat">
+      <a:schemeClr val="lt1"/>
+    </dgm:linClrLst>
+    <dgm:effectClrLst/>
+    <dgm:txLinClrLst/>
+    <dgm:txFillClrLst/>
+    <dgm:txEffectClrLst/>
+  </dgm:styleLbl>
+  <dgm:styleLbl name="node1">
+    <dgm:fillClrLst meth="repeat">
+      <a:schemeClr val="accent2"/>
+      <a:schemeClr val="accent3"/>
+      <a:schemeClr val="accent4"/>
+      <a:schemeClr val="accent5"/>
+      <a:schemeClr val="accent6"/>
+    </dgm:fillClrLst>
+    <dgm:linClrLst meth="repeat">
+      <a:schemeClr val="lt1"/>
+    </dgm:linClrLst>
+    <dgm:effectClrLst/>
+    <dgm:txLinClrLst/>
+    <dgm:txFillClrLst/>
+    <dgm:txEffectClrLst/>
+  </dgm:styleLbl>
+  <dgm:styleLbl name="alignNode1">
+    <dgm:fillClrLst meth="repeat">
+      <a:schemeClr val="accent2"/>
+      <a:schemeClr val="accent3"/>
+      <a:schemeClr val="accent4"/>
+      <a:schemeClr val="accent5"/>
+      <a:schemeClr val="accent6"/>
+    </dgm:fillClrLst>
+    <dgm:linClrLst meth="repeat">
+      <a:schemeClr val="accent2"/>
+      <a:schemeClr val="accent3"/>
+      <a:schemeClr val="accent4"/>
+      <a:schemeClr val="accent5"/>
+      <a:schemeClr val="accent6"/>
+    </dgm:linClrLst>
+    <dgm:effectClrLst/>
+    <dgm:txLinClrLst/>
+    <dgm:txFillClrLst/>
+    <dgm:txEffectClrLst/>
+  </dgm:styleLbl>
+  <dgm:styleLbl name="lnNode1">
+    <dgm:fillClrLst meth="repeat">
+      <a:schemeClr val="accent2"/>
+      <a:schemeClr val="accent3"/>
+      <a:schemeClr val="accent4"/>
+      <a:schemeClr val="accent5"/>
+      <a:schemeClr val="accent6"/>
+    </dgm:fillClrLst>
+    <dgm:linClrLst meth="repeat">
+      <a:schemeClr val="lt1"/>
+    </dgm:linClrLst>
+    <dgm:effectClrLst/>
+    <dgm:txLinClrLst/>
+    <dgm:txFillClrLst/>
+    <dgm:txEffectClrLst/>
+  </dgm:styleLbl>
+  <dgm:styleLbl name="vennNode1">
+    <dgm:fillClrLst meth="repeat">
+      <a:schemeClr val="accent2">
+        <a:alpha val="50000"/>
+      </a:schemeClr>
+      <a:schemeClr val="accent3">
+        <a:alpha val="50000"/>
+      </a:schemeClr>
+      <a:schemeClr val="accent4">
+        <a:alpha val="50000"/>
+      </a:schemeClr>
+      <a:schemeClr val="accent5">
+        <a:alpha val="50000"/>
+      </a:schemeClr>
+      <a:schemeClr val="accent6">
+        <a:alpha val="50000"/>
+      </a:schemeClr>
+    </dgm:fillClrLst>
+    <dgm:linClrLst meth="repeat">
+      <a:schemeClr val="lt1"/>
+    </dgm:linClrLst>
+    <dgm:effectClrLst/>
+    <dgm:txLinClrLst/>
+    <dgm:txFillClrLst/>
+    <dgm:txEffectClrLst/>
+  </dgm:styleLbl>
+  <dgm:styleLbl name="node2">
+    <dgm:fillClrLst>
+      <a:schemeClr val="accent2"/>
+    </dgm:fillClrLst>
+    <dgm:linClrLst meth="repeat">
+      <a:schemeClr val="lt1"/>
+    </dgm:linClrLst>
+    <dgm:effectClrLst/>
+    <dgm:txLinClrLst/>
+    <dgm:txFillClrLst/>
+    <dgm:txEffectClrLst/>
+  </dgm:styleLbl>
+  <dgm:styleLbl name="node3">
+    <dgm:fillClrLst>
+      <a:schemeClr val="accent3"/>
+    </dgm:fillClrLst>
+    <dgm:linClrLst meth="repeat">
+      <a:schemeClr val="lt1"/>
+    </dgm:linClrLst>
+    <dgm:effectClrLst/>
+    <dgm:txLinClrLst/>
+    <dgm:txFillClrLst/>
+    <dgm:txEffectClrLst/>
+  </dgm:styleLbl>
+  <dgm:styleLbl name="node4">
+    <dgm:fillClrLst>
+      <a:schemeClr val="accent4"/>
+    </dgm:fillClrLst>
+    <dgm:linClrLst meth="repeat">
+      <a:schemeClr val="lt1"/>
+    </dgm:linClrLst>
+    <dgm:effectClrLst/>
+    <dgm:txLinClrLst/>
+    <dgm:txFillClrLst/>
+    <dgm:txEffectClrLst/>
+  </dgm:styleLbl>
+  <dgm:styleLbl name="fgImgPlace1">
+    <dgm:fillClrLst meth="repeat">
+      <a:schemeClr val="accent2">
+        <a:tint val="50000"/>
+      </a:schemeClr>
+      <a:schemeClr val="accent3">
+        <a:tint val="50000"/>
+      </a:schemeClr>
+      <a:schemeClr val="accent4">
+        <a:tint val="50000"/>
+      </a:schemeClr>
+      <a:schemeClr val="accent5">
+        <a:tint val="50000"/>
+      </a:schemeClr>
+      <a:schemeClr val="accent6">
+        <a:tint val="50000"/>
+      </a:schemeClr>
+    </dgm:fillClrLst>
+    <dgm:linClrLst meth="repeat">
+      <a:schemeClr val="lt1"/>
+    </dgm:linClrLst>
+    <dgm:effectClrLst/>
+    <dgm:txLinClrLst/>
+    <dgm:txFillClrLst meth="repeat">
+      <a:schemeClr val="lt1"/>
+    </dgm:txFillClrLst>
+    <dgm:txEffectClrLst/>
+  </dgm:styleLbl>
+  <dgm:styleLbl name="alignImgPlace1">
+    <dgm:fillClrLst>
+      <a:schemeClr val="accent1">
+        <a:tint val="50000"/>
+      </a:schemeClr>
+      <a:schemeClr val="accent2">
+        <a:tint val="20000"/>
+      </a:schemeClr>
+    </dgm:fillClrLst>
+    <dgm:linClrLst meth="repeat">
+      <a:schemeClr val="lt1"/>
+    </dgm:linClrLst>
+    <dgm:effectClrLst/>
+    <dgm:txLinClrLst/>
+    <dgm:txFillClrLst meth="repeat">
+      <a:schemeClr val="lt1"/>
+    </dgm:txFillClrLst>
+    <dgm:txEffectClrLst/>
+  </dgm:styleLbl>
+  <dgm:styleLbl name="bgImgPlace1">
+    <dgm:fillClrLst>
+      <a:schemeClr val="accent1">
+        <a:tint val="50000"/>
+      </a:schemeClr>
+      <a:schemeClr val="accent2">
+        <a:tint val="20000"/>
+      </a:schemeClr>
+    </dgm:fillClrLst>
+    <dgm:linClrLst meth="repeat">
+      <a:schemeClr val="lt1"/>
+    </dgm:linClrLst>
+    <dgm:effectClrLst/>
+    <dgm:txLinClrLst/>
+    <dgm:txFillClrLst meth="repeat">
+      <a:schemeClr val="lt1"/>
+    </dgm:txFillClrLst>
+    <dgm:txEffectClrLst/>
+  </dgm:styleLbl>
+  <dgm:styleLbl name="sibTrans2D1">
+    <dgm:fillClrLst meth="repeat">
+      <a:schemeClr val="accent2"/>
+      <a:schemeClr val="accent3"/>
+      <a:schemeClr val="accent4"/>
+      <a:schemeClr val="accent5"/>
+      <a:schemeClr val="accent6"/>
+    </dgm:fillClrLst>
+    <dgm:linClrLst meth="cycle">
+      <a:schemeClr val="lt1"/>
+    </dgm:linClrLst>
+    <dgm:effectClrLst/>
+    <dgm:txLinClrLst/>
+    <dgm:txFillClrLst/>
+    <dgm:txEffectClrLst/>
+  </dgm:styleLbl>
+  <dgm:styleLbl name="fgSibTrans2D1">
+    <dgm:fillClrLst meth="repeat">
+      <a:schemeClr val="accent2"/>
+      <a:schemeClr val="accent3"/>
+      <a:schemeClr val="accent4"/>
+      <a:schemeClr val="accent5"/>
+      <a:schemeClr val="accent6"/>
+    </dgm:fillClrLst>
+    <dgm:linClrLst meth="cycle">
+      <a:schemeClr val="lt1"/>
+    </dgm:linClrLst>
+    <dgm:effectClrLst/>
+    <dgm:txLinClrLst/>
+    <dgm:txFillClrLst meth="repeat">
+      <a:schemeClr val="lt1"/>
+    </dgm:txFillClrLst>
+    <dgm:txEffectClrLst/>
+  </dgm:styleLbl>
+  <dgm:styleLbl name="bgSibTrans2D1">
+    <dgm:fillClrLst meth="repeat">
+      <a:schemeClr val="accent2"/>
+      <a:schemeClr val="accent3"/>
+      <a:schemeClr val="accent4"/>
+      <a:schemeClr val="accent5"/>
+      <a:schemeClr val="accent6"/>
+    </dgm:fillClrLst>
+    <dgm:linClrLst meth="cycle">
+      <a:schemeClr val="lt1"/>
+    </dgm:linClrLst>
+    <dgm:effectClrLst/>
+    <dgm:txLinClrLst/>
+    <dgm:txFillClrLst meth="repeat">
+      <a:schemeClr val="lt1"/>
+    </dgm:txFillClrLst>
+    <dgm:txEffectClrLst/>
+  </dgm:styleLbl>
+  <dgm:styleLbl name="sibTrans1D1">
+    <dgm:fillClrLst meth="repeat">
+      <a:schemeClr val="accent2"/>
+      <a:schemeClr val="accent3"/>
+      <a:schemeClr val="accent4"/>
+      <a:schemeClr val="accent5"/>
+      <a:schemeClr val="accent6"/>
+    </dgm:fillClrLst>
+    <dgm:linClrLst meth="repeat">
+      <a:schemeClr val="accent2"/>
+      <a:schemeClr val="accent3"/>
+      <a:schemeClr val="accent4"/>
+      <a:schemeClr val="accent5"/>
+      <a:schemeClr val="accent6"/>
+    </dgm:linClrLst>
+    <dgm:effectClrLst/>
+    <dgm:txLinClrLst/>
+    <dgm:txFillClrLst meth="repeat">
+      <a:schemeClr val="tx1"/>
+    </dgm:txFillClrLst>
+    <dgm:txEffectClrLst/>
+  </dgm:styleLbl>
+  <dgm:styleLbl name="callout">
+    <dgm:fillClrLst meth="repeat">
+      <a:schemeClr val="accent2"/>
+    </dgm:fillClrLst>
+    <dgm:linClrLst meth="repeat">
+      <a:schemeClr val="accent2">
+        <a:tint val="50000"/>
+      </a:schemeClr>
+    </dgm:linClrLst>
+    <dgm:effectClrLst/>
+    <dgm:txLinClrLst/>
+    <dgm:txFillClrLst meth="repeat">
+      <a:schemeClr val="tx1"/>
+    </dgm:txFillClrLst>
+    <dgm:txEffectClrLst/>
+  </dgm:styleLbl>
+  <dgm:styleLbl name="asst0">
+    <dgm:fillClrLst meth="repeat">
+      <a:schemeClr val="accent1"/>
+    </dgm:fillClrLst>
+    <dgm:linClrLst meth="repeat">
+      <a:schemeClr val="lt1"/>
+    </dgm:linClrLst>
+    <dgm:effectClrLst/>
+    <dgm:txLinClrLst/>
+    <dgm:txFillClrLst/>
+    <dgm:txEffectClrLst/>
+  </dgm:styleLbl>
+  <dgm:styleLbl name="asst1">
+    <dgm:fillClrLst meth="repeat">
+      <a:schemeClr val="accent2"/>
+    </dgm:fillClrLst>
+    <dgm:linClrLst meth="repeat">
+      <a:schemeClr val="lt1"/>
+    </dgm:linClrLst>
+    <dgm:effectClrLst/>
+    <dgm:txLinClrLst/>
+    <dgm:txFillClrLst/>
+    <dgm:txEffectClrLst/>
+  </dgm:styleLbl>
+  <dgm:styleLbl name="asst2">
+    <dgm:fillClrLst>
+      <a:schemeClr val="accent3"/>
+    </dgm:fillClrLst>
+    <dgm:linClrLst meth="repeat">
+      <a:schemeClr val="lt1"/>
+    </dgm:linClrLst>
+    <dgm:effectClrLst/>
+    <dgm:txLinClrLst/>
+    <dgm:txFillClrLst/>
+    <dgm:txEffectClrLst/>
+  </dgm:styleLbl>
+  <dgm:styleLbl name="asst3">
+    <dgm:fillClrLst>
+      <a:schemeClr val="accent4"/>
+    </dgm:fillClrLst>
+    <dgm:linClrLst meth="repeat">
+      <a:schemeClr val="lt1"/>
+    </dgm:linClrLst>
+    <dgm:effectClrLst/>
+    <dgm:txLinClrLst/>
+    <dgm:txFillClrLst/>
+    <dgm:txEffectClrLst/>
+  </dgm:styleLbl>
+  <dgm:styleLbl name="asst4">
+    <dgm:fillClrLst>
+      <a:schemeClr val="accent5"/>
+    </dgm:fillClrLst>
+    <dgm:linClrLst meth="repeat">
+      <a:schemeClr val="lt1"/>
+    </dgm:linClrLst>
+    <dgm:effectClrLst/>
+    <dgm:txLinClrLst/>
+    <dgm:txFillClrLst/>
+    <dgm:txEffectClrLst/>
+  </dgm:styleLbl>
+  <dgm:styleLbl name="parChTrans2D1">
+    <dgm:fillClrLst meth="repeat">
+      <a:schemeClr val="accent2"/>
+    </dgm:fillClrLst>
+    <dgm:linClrLst meth="repeat">
+      <a:schemeClr val="lt1"/>
+    </dgm:linClrLst>
+    <dgm:effectClrLst/>
+    <dgm:txLinClrLst/>
+    <dgm:txFillClrLst meth="repeat">
+      <a:schemeClr val="lt1"/>
+    </dgm:txFillClrLst>
+    <dgm:txEffectClrLst/>
+  </dgm:styleLbl>
+  <dgm:styleLbl name="parChTrans2D2">
+    <dgm:fillClrLst meth="repeat">
+      <a:schemeClr val="accent3"/>
+    </dgm:fillClrLst>
+    <dgm:linClrLst meth="repeat">
+      <a:schemeClr val="lt1"/>
+    </dgm:linClrLst>
+    <dgm:effectClrLst/>
+    <dgm:txLinClrLst/>
+    <dgm:txFillClrLst/>
+    <dgm:txEffectClrLst/>
+  </dgm:styleLbl>
+  <dgm:styleLbl name="parChTrans2D3">
+    <dgm:fillClrLst meth="repeat">
+      <a:schemeClr val="accent4"/>
+    </dgm:fillClrLst>
+    <dgm:linClrLst meth="repeat">
+      <a:schemeClr val="lt1"/>
+    </dgm:linClrLst>
+    <dgm:effectClrLst/>
+    <dgm:txLinClrLst/>
+    <dgm:txFillClrLst/>
+    <dgm:txEffectClrLst/>
+  </dgm:styleLbl>
+  <dgm:styleLbl name="parChTrans2D4">
+    <dgm:fillClrLst meth="repeat">
+      <a:schemeClr val="accent5"/>
+    </dgm:fillClrLst>
+    <dgm:linClrLst meth="repeat">
+      <a:schemeClr val="lt1"/>
+    </dgm:linClrLst>
+    <dgm:effectClrLst/>
+    <dgm:txLinClrLst/>
+    <dgm:txFillClrLst meth="repeat">
+      <a:schemeClr val="lt1"/>
+    </dgm:txFillClrLst>
+    <dgm:txEffectClrLst/>
+  </dgm:styleLbl>
+  <dgm:styleLbl name="parChTrans1D1">
+    <dgm:fillClrLst meth="repeat">
+      <a:schemeClr val="accent2"/>
+    </dgm:fillClrLst>
+    <dgm:linClrLst meth="repeat">
+      <a:schemeClr val="accent1"/>
+    </dgm:linClrLst>
+    <dgm:effectClrLst/>
+    <dgm:txLinClrLst/>
+    <dgm:txFillClrLst meth="repeat">
+      <a:schemeClr val="tx1"/>
+    </dgm:txFillClrLst>
+    <dgm:txEffectClrLst/>
+  </dgm:styleLbl>
+  <dgm:styleLbl name="parChTrans1D2">
+    <dgm:fillClrLst meth="repeat">
+      <a:schemeClr val="accent3">
+        <a:tint val="90000"/>
+      </a:schemeClr>
+    </dgm:fillClrLst>
+    <dgm:linClrLst meth="repeat">
+      <a:schemeClr val="accent2"/>
+    </dgm:linClrLst>
+    <dgm:effectClrLst/>
+    <dgm:txLinClrLst/>
+    <dgm:txFillClrLst meth="repeat">
+      <a:schemeClr val="tx1"/>
+    </dgm:txFillClrLst>
+    <dgm:txEffectClrLst/>
+  </dgm:styleLbl>
+  <dgm:styleLbl name="parChTrans1D3">
+    <dgm:fillClrLst meth="repeat">
+      <a:schemeClr val="accent4">
+        <a:tint val="70000"/>
+      </a:schemeClr>
+    </dgm:fillClrLst>
+    <dgm:linClrLst meth="repeat">
+      <a:schemeClr val="accent3"/>
+    </dgm:linClrLst>
+    <dgm:effectClrLst/>
+    <dgm:txLinClrLst/>
+    <dgm:txFillClrLst meth="repeat">
+      <a:schemeClr val="tx1"/>
+    </dgm:txFillClrLst>
+    <dgm:txEffectClrLst/>
+  </dgm:styleLbl>
+  <dgm:styleLbl name="parChTrans1D4">
+    <dgm:fillClrLst meth="repeat">
+      <a:schemeClr val="accent5">
+        <a:tint val="50000"/>
+      </a:schemeClr>
+    </dgm:fillClrLst>
+    <dgm:linClrLst meth="repeat">
+      <a:schemeClr val="accent4"/>
+    </dgm:linClrLst>
+    <dgm:effectClrLst/>
+    <dgm:txLinClrLst/>
+    <dgm:txFillClrLst meth="repeat">
+      <a:schemeClr val="tx1"/>
+    </dgm:txFillClrLst>
+    <dgm:txEffectClrLst/>
+  </dgm:styleLbl>
+  <dgm:styleLbl name="fgAcc1">
+    <dgm:fillClrLst meth="repeat">
+      <a:schemeClr val="lt1">
+        <a:alpha val="90000"/>
+      </a:schemeClr>
+    </dgm:fillClrLst>
+    <dgm:linClrLst meth="repeat">
+      <a:schemeClr val="accent2"/>
+      <a:schemeClr val="accent3"/>
+      <a:schemeClr val="accent4"/>
+      <a:schemeClr val="accent5"/>
+      <a:schemeClr val="accent6"/>
+    </dgm:linClrLst>
+    <dgm:effectClrLst/>
+    <dgm:txLinClrLst/>
+    <dgm:txFillClrLst meth="repeat">
+      <a:schemeClr val="dk1"/>
+    </dgm:txFillClrLst>
+    <dgm:txEffectClrLst/>
+  </dgm:styleLbl>
+  <dgm:styleLbl name="conFgAcc1">
+    <dgm:fillClrLst meth="repeat">
+      <a:schemeClr val="lt1">
+        <a:alpha val="90000"/>
+      </a:schemeClr>
+    </dgm:fillClrLst>
+    <dgm:linClrLst meth="repeat">
+      <a:schemeClr val="accent2"/>
+      <a:schemeClr val="accent3"/>
+      <a:schemeClr val="accent4"/>
+      <a:schemeClr val="accent5"/>
+      <a:schemeClr val="accent6"/>
+    </dgm:linClrLst>
+    <dgm:effectClrLst/>
+    <dgm:txLinClrLst/>
+    <dgm:txFillClrLst meth="repeat">
+      <a:schemeClr val="dk1"/>
+    </dgm:txFillClrLst>
+    <dgm:txEffectClrLst/>
+  </dgm:styleLbl>
+  <dgm:styleLbl name="alignAcc1">
+    <dgm:fillClrLst meth="repeat">
+      <a:schemeClr val="lt1">
+        <a:alpha val="90000"/>
+      </a:schemeClr>
+    </dgm:fillClrLst>
+    <dgm:linClrLst meth="repeat">
+      <a:schemeClr val="accent2"/>
+      <a:schemeClr val="accent3"/>
+      <a:schemeClr val="accent4"/>
+      <a:schemeClr val="accent5"/>
+      <a:schemeClr val="accent6"/>
+    </dgm:linClrLst>
+    <dgm:effectClrLst/>
+    <dgm:txLinClrLst/>
+    <dgm:txFillClrLst meth="repeat">
+      <a:schemeClr val="dk1"/>
+    </dgm:txFillClrLst>
+    <dgm:txEffectClrLst/>
+  </dgm:styleLbl>
+  <dgm:styleLbl name="trAlignAcc1">
+    <dgm:fillClrLst meth="repeat">
+      <a:schemeClr val="lt1">
+        <a:alpha val="40000"/>
+      </a:schemeClr>
+    </dgm:fillClrLst>
+    <dgm:linClrLst meth="repeat">
+      <a:schemeClr val="accent1"/>
+    </dgm:linClrLst>
+    <dgm:effectClrLst/>
+    <dgm:txLinClrLst/>
+    <dgm:txFillClrLst meth="repeat">
+      <a:schemeClr val="dk1"/>
+    </dgm:txFillClrLst>
+    <dgm:txEffectClrLst/>
+  </dgm:styleLbl>
+  <dgm:styleLbl name="bgAcc1">
+    <dgm:fillClrLst meth="repeat">
+      <a:schemeClr val="lt1">
+        <a:alpha val="90000"/>
+      </a:schemeClr>
+    </dgm:fillClrLst>
+    <dgm:linClrLst meth="repeat">
+      <a:schemeClr val="accent2"/>
+      <a:schemeClr val="accent3"/>
+      <a:schemeClr val="accent4"/>
+      <a:schemeClr val="accent5"/>
+      <a:schemeClr val="accent6"/>
+    </dgm:linClrLst>
+    <dgm:effectClrLst/>
+    <dgm:txLinClrLst/>
+    <dgm:txFillClrLst meth="repeat">
+      <a:schemeClr val="dk1"/>
+    </dgm:txFillClrLst>
+    <dgm:txEffectClrLst/>
+  </dgm:styleLbl>
+  <dgm:styleLbl name="solidFgAcc1">
+    <dgm:fillClrLst meth="repeat">
+      <a:schemeClr val="lt1"/>
+    </dgm:fillClrLst>
+    <dgm:linClrLst meth="repeat">
+      <a:schemeClr val="accent2"/>
+      <a:schemeClr val="accent3"/>
+      <a:schemeClr val="accent4"/>
+      <a:schemeClr val="accent5"/>
+      <a:schemeClr val="accent6"/>
+    </dgm:linClrLst>
+    <dgm:effectClrLst/>
+    <dgm:txLinClrLst/>
+    <dgm:txFillClrLst meth="repeat">
+      <a:schemeClr val="dk1"/>
+    </dgm:txFillClrLst>
+    <dgm:txEffectClrLst/>
+  </dgm:styleLbl>
+  <dgm:styleLbl name="solidAlignAcc1">
+    <dgm:fillClrLst meth="repeat">
+      <a:schemeClr val="lt1"/>
+    </dgm:fillClrLst>
+    <dgm:linClrLst meth="repeat">
+      <a:schemeClr val="accent2"/>
+      <a:schemeClr val="accent3"/>
+      <a:schemeClr val="accent4"/>
+      <a:schemeClr val="accent5"/>
+      <a:schemeClr val="accent6"/>
+    </dgm:linClrLst>
+    <dgm:effectClrLst/>
+    <dgm:txLinClrLst/>
+    <dgm:txFillClrLst meth="repeat">
+      <a:schemeClr val="dk1"/>
+    </dgm:txFillClrLst>
+    <dgm:txEffectClrLst/>
+  </dgm:styleLbl>
+  <dgm:styleLbl name="solidBgAcc1">
+    <dgm:fillClrLst meth="repeat">
+      <a:schemeClr val="lt1"/>
+    </dgm:fillClrLst>
+    <dgm:linClrLst meth="repeat">
+      <a:schemeClr val="accent2"/>
+      <a:schemeClr val="accent3"/>
+      <a:schemeClr val="accent4"/>
+      <a:schemeClr val="accent5"/>
+      <a:schemeClr val="accent6"/>
+    </dgm:linClrLst>
+    <dgm:effectClrLst/>
+    <dgm:txLinClrLst/>
+    <dgm:txFillClrLst meth="repeat">
+      <a:schemeClr val="dk1"/>
+    </dgm:txFillClrLst>
+    <dgm:txEffectClrLst/>
+  </dgm:styleLbl>
+  <dgm:styleLbl name="fgAccFollowNode1">
+    <dgm:fillClrLst meth="repeat">
+      <a:schemeClr val="accent2">
+        <a:tint val="40000"/>
+        <a:alpha val="90000"/>
+      </a:schemeClr>
+      <a:schemeClr val="accent3">
+        <a:tint val="40000"/>
+        <a:alpha val="90000"/>
+      </a:schemeClr>
+      <a:schemeClr val="accent4">
+        <a:tint val="40000"/>
+        <a:alpha val="90000"/>
+      </a:schemeClr>
+      <a:schemeClr val="accent5">
+        <a:tint val="40000"/>
+        <a:alpha val="90000"/>
+      </a:schemeClr>
+      <a:schemeClr val="accent6">
+        <a:tint val="40000"/>
+        <a:alpha val="90000"/>
+      </a:schemeClr>
+    </dgm:fillClrLst>
+    <dgm:linClrLst meth="repeat">
+      <a:schemeClr val="accent2">
+        <a:tint val="40000"/>
+        <a:alpha val="90000"/>
+      </a:schemeClr>
+      <a:schemeClr val="accent3">
+        <a:tint val="40000"/>
+        <a:alpha val="90000"/>
+      </a:schemeClr>
+      <a:schemeClr val="accent4">
+        <a:tint val="40000"/>
+        <a:alpha val="90000"/>
+      </a:schemeClr>
+      <a:schemeClr val="accent5">
+        <a:tint val="40000"/>
+        <a:alpha val="90000"/>
+      </a:schemeClr>
+      <a:schemeClr val="accent6">
+        <a:tint val="40000"/>
+        <a:alpha val="90000"/>
+      </a:schemeClr>
+    </dgm:linClrLst>
+    <dgm:effectClrLst/>
+    <dgm:txLinClrLst/>
+    <dgm:txFillClrLst meth="repeat">
+      <a:schemeClr val="dk1"/>
+    </dgm:txFillClrLst>
+    <dgm:txEffectClrLst/>
+  </dgm:styleLbl>
+  <dgm:styleLbl name="alignAccFollowNode1">
+    <dgm:fillClrLst meth="repeat">
+      <a:schemeClr val="accent2">
+        <a:tint val="40000"/>
+        <a:alpha val="90000"/>
+      </a:schemeClr>
+      <a:schemeClr val="accent3">
+        <a:tint val="40000"/>
+        <a:alpha val="90000"/>
+      </a:schemeClr>
+      <a:schemeClr val="accent4">
+        <a:tint val="40000"/>
+        <a:alpha val="90000"/>
+      </a:schemeClr>
+      <a:schemeClr val="accent5">
+        <a:tint val="40000"/>
+        <a:alpha val="90000"/>
+      </a:schemeClr>
+      <a:schemeClr val="accent6">
+        <a:tint val="40000"/>
+        <a:alpha val="90000"/>
+      </a:schemeClr>
+    </dgm:fillClrLst>
+    <dgm:linClrLst meth="repeat">
+      <a:schemeClr val="accent2">
+        <a:tint val="40000"/>
+        <a:alpha val="90000"/>
+      </a:schemeClr>
+      <a:schemeClr val="accent3">
+        <a:tint val="40000"/>
+        <a:alpha val="90000"/>
+      </a:schemeClr>
+      <a:schemeClr val="accent4">
+        <a:tint val="40000"/>
+        <a:alpha val="90000"/>
+      </a:schemeClr>
+      <a:schemeClr val="accent5">
+        <a:tint val="40000"/>
+        <a:alpha val="90000"/>
+      </a:schemeClr>
+      <a:schemeClr val="accent6">
+        <a:tint val="40000"/>
+        <a:alpha val="90000"/>
+      </a:schemeClr>
+    </dgm:linClrLst>
+    <dgm:effectClrLst/>
+    <dgm:txLinClrLst/>
+    <dgm:txFillClrLst meth="repeat">
+      <a:schemeClr val="dk1"/>
+    </dgm:txFillClrLst>
+    <dgm:txEffectClrLst/>
+  </dgm:styleLbl>
+  <dgm:styleLbl name="bgAccFollowNode1">
+    <dgm:fillClrLst meth="repeat">
+      <a:schemeClr val="accent2">
+        <a:tint val="40000"/>
+        <a:alpha val="90000"/>
+      </a:schemeClr>
+      <a:schemeClr val="accent3">
+        <a:tint val="40000"/>
+        <a:alpha val="90000"/>
+      </a:schemeClr>
+      <a:schemeClr val="accent4">
+        <a:tint val="40000"/>
+        <a:alpha val="90000"/>
+      </a:schemeClr>
+      <a:schemeClr val="accent5">
+        <a:tint val="40000"/>
+        <a:alpha val="90000"/>
+      </a:schemeClr>
+      <a:schemeClr val="accent6">
+        <a:tint val="40000"/>
+        <a:alpha val="90000"/>
+      </a:schemeClr>
+    </dgm:fillClrLst>
+    <dgm:linClrLst meth="repeat">
+      <a:schemeClr val="accent2">
+        <a:tint val="40000"/>
+        <a:alpha val="90000"/>
+      </a:schemeClr>
+      <a:schemeClr val="accent3">
+        <a:tint val="40000"/>
+        <a:alpha val="90000"/>
+      </a:schemeClr>
+      <a:schemeClr val="accent4">
+        <a:tint val="40000"/>
+        <a:alpha val="90000"/>
+      </a:schemeClr>
+      <a:schemeClr val="accent5">
+        <a:tint val="40000"/>
+        <a:alpha val="90000"/>
+      </a:schemeClr>
+      <a:schemeClr val="accent6">
+        <a:tint val="40000"/>
+        <a:alpha val="90000"/>
+      </a:schemeClr>
+    </dgm:linClrLst>
+    <dgm:effectClrLst/>
+    <dgm:txLinClrLst/>
+    <dgm:txFillClrLst meth="repeat">
+      <a:schemeClr val="dk1"/>
+    </dgm:txFillClrLst>
+    <dgm:txEffectClrLst/>
+  </dgm:styleLbl>
+  <dgm:styleLbl name="fgAcc0">
+    <dgm:fillClrLst meth="repeat">
+      <a:schemeClr val="lt1">
+        <a:alpha val="90000"/>
+      </a:schemeClr>
+    </dgm:fillClrLst>
+    <dgm:linClrLst>
+      <a:schemeClr val="accent1"/>
+    </dgm:linClrLst>
+    <dgm:effectClrLst/>
+    <dgm:txLinClrLst/>
+    <dgm:txFillClrLst meth="repeat">
+      <a:schemeClr val="dk1"/>
+    </dgm:txFillClrLst>
+    <dgm:txEffectClrLst/>
+  </dgm:styleLbl>
+  <dgm:styleLbl name="fgAcc2">
+    <dgm:fillClrLst meth="repeat">
+      <a:schemeClr val="lt1">
+        <a:alpha val="90000"/>
+      </a:schemeClr>
+    </dgm:fillClrLst>
+    <dgm:linClrLst>
+      <a:schemeClr val="accent2"/>
+    </dgm:linClrLst>
+    <dgm:effectClrLst/>
+    <dgm:txLinClrLst/>
+    <dgm:txFillClrLst meth="repeat">
+      <a:schemeClr val="dk1"/>
+    </dgm:txFillClrLst>
+    <dgm:txEffectClrLst/>
+  </dgm:styleLbl>
+  <dgm:styleLbl name="fgAcc3">
+    <dgm:fillClrLst meth="repeat">
+      <a:schemeClr val="lt1">
+        <a:alpha val="90000"/>
+      </a:schemeClr>
+    </dgm:fillClrLst>
+    <dgm:linClrLst>
+      <a:schemeClr val="accent3"/>
+    </dgm:linClrLst>
+    <dgm:effectClrLst/>
+    <dgm:txLinClrLst/>
+    <dgm:txFillClrLst meth="repeat">
+      <a:schemeClr val="dk1"/>
+    </dgm:txFillClrLst>
+    <dgm:txEffectClrLst/>
+  </dgm:styleLbl>
+  <dgm:styleLbl name="fgAcc4">
+    <dgm:fillClrLst meth="repeat">
+      <a:schemeClr val="lt1">
+        <a:alpha val="90000"/>
+      </a:schemeClr>
+    </dgm:fillClrLst>
+    <dgm:linClrLst>
+      <a:schemeClr val="accent4"/>
+    </dgm:linClrLst>
+    <dgm:effectClrLst/>
+    <dgm:txLinClrLst/>
+    <dgm:txFillClrLst meth="repeat">
+      <a:schemeClr val="dk1"/>
+    </dgm:txFillClrLst>
+    <dgm:txEffectClrLst/>
+  </dgm:styleLbl>
+  <dgm:styleLbl name="bgShp">
+    <dgm:fillClrLst meth="repeat">
+      <a:schemeClr val="accent2">
+        <a:tint val="40000"/>
+      </a:schemeClr>
+    </dgm:fillClrLst>
+    <dgm:linClrLst meth="repeat">
+      <a:schemeClr val="dk1"/>
+    </dgm:linClrLst>
+    <dgm:effectClrLst/>
+    <dgm:txLinClrLst/>
+    <dgm:txFillClrLst meth="repeat">
+      <a:schemeClr val="dk1"/>
+    </dgm:txFillClrLst>
+    <dgm:txEffectClrLst/>
+  </dgm:styleLbl>
+  <dgm:styleLbl name="dkBgShp">
+    <dgm:fillClrLst meth="repeat">
+      <a:schemeClr val="accent2">
+        <a:shade val="90000"/>
+      </a:schemeClr>
+    </dgm:fillClrLst>
+    <dgm:linClrLst meth="repeat">
+      <a:schemeClr val="dk1"/>
+    </dgm:linClrLst>
+    <dgm:effectClrLst/>
+    <dgm:txLinClrLst/>
+    <dgm:txFillClrLst meth="repeat">
+      <a:schemeClr val="lt1"/>
+    </dgm:txFillClrLst>
+    <dgm:txEffectClrLst/>
+  </dgm:styleLbl>
+  <dgm:styleLbl name="trBgShp">
+    <dgm:fillClrLst meth="repeat">
+      <a:schemeClr val="accent1">
+        <a:tint val="50000"/>
+        <a:alpha val="40000"/>
+      </a:schemeClr>
+    </dgm:fillClrLst>
+    <dgm:linClrLst meth="repeat">
+      <a:schemeClr val="accent2"/>
+    </dgm:linClrLst>
+    <dgm:effectClrLst/>
+    <dgm:txLinClrLst/>
+    <dgm:txFillClrLst meth="repeat">
+      <a:schemeClr val="lt1"/>
+    </dgm:txFillClrLst>
+    <dgm:txEffectClrLst/>
+  </dgm:styleLbl>
+  <dgm:styleLbl name="fgShp">
+    <dgm:fillClrLst meth="repeat">
+      <a:schemeClr val="accent2">
+        <a:tint val="40000"/>
+      </a:schemeClr>
+    </dgm:fillClrLst>
+    <dgm:linClrLst meth="repeat">
+      <a:schemeClr val="lt1"/>
+    </dgm:linClrLst>
+    <dgm:effectClrLst/>
+    <dgm:txLinClrLst/>
+    <dgm:txFillClrLst meth="repeat">
+      <a:schemeClr val="dk1"/>
+    </dgm:txFillClrLst>
+    <dgm:txEffectClrLst/>
+  </dgm:styleLbl>
+  <dgm:styleLbl name="revTx">
+    <dgm:fillClrLst meth="repeat">
+      <a:schemeClr val="lt1">
+        <a:alpha val="0"/>
+      </a:schemeClr>
+    </dgm:fillClrLst>
+    <dgm:linClrLst meth="repeat">
+      <a:schemeClr val="dk1">
+        <a:alpha val="0"/>
+      </a:schemeClr>
+    </dgm:linClrLst>
+    <dgm:effectClrLst/>
+    <dgm:txLinClrLst/>
+    <dgm:txFillClrLst meth="repeat">
+      <a:schemeClr val="tx1"/>
+    </dgm:txFillClrLst>
+    <dgm:txEffectClrLst/>
+  </dgm:styleLbl>
+</dgm:colorsDef>
+</file>
+
 <file path=ppt/diagrams/data1.xml><?xml version="1.0" encoding="utf-8"?>
 <dgm:dataModel xmlns:dgm="http://schemas.openxmlformats.org/drawingml/2006/diagram" xmlns:a="http://schemas.openxmlformats.org/drawingml/2006/main">
   <dgm:ptLst>
@@ -1050,7 +1970,15 @@
         <a:p>
           <a:r>
             <a:rPr lang="pt-BR" sz="2400" dirty="0" smtClean="0"/>
-            <a:t>Motor de Heurísticas</a:t>
+            <a:t>Motor </a:t>
+          </a:r>
+          <a:r>
+            <a:rPr lang="pt-BR" sz="2400" smtClean="0"/>
+            <a:t>de </a:t>
+          </a:r>
+          <a:r>
+            <a:rPr lang="pt-BR" sz="2400" smtClean="0"/>
+            <a:t>Heurísticas</a:t>
           </a:r>
           <a:endParaRPr lang="pt-BR" sz="2400" dirty="0"/>
         </a:p>
@@ -1419,6 +2347,402 @@
 </dgm:dataModel>
 </file>
 
+<file path=ppt/diagrams/data2.xml><?xml version="1.0" encoding="utf-8"?>
+<dgm:dataModel xmlns:dgm="http://schemas.openxmlformats.org/drawingml/2006/diagram" xmlns:a="http://schemas.openxmlformats.org/drawingml/2006/main">
+  <dgm:ptLst>
+    <dgm:pt modelId="{4B7AFAA9-C2C4-4511-9A77-486BA7AE86A9}" type="doc">
+      <dgm:prSet loTypeId="urn:microsoft.com/office/officeart/2005/8/layout/hierarchy4" loCatId="relationship" qsTypeId="urn:microsoft.com/office/officeart/2005/8/quickstyle/simple1" qsCatId="simple" csTypeId="urn:microsoft.com/office/officeart/2005/8/colors/colorful1" csCatId="colorful" phldr="1"/>
+      <dgm:spPr/>
+      <dgm:t>
+        <a:bodyPr/>
+        <a:lstStyle/>
+        <a:p>
+          <a:endParaRPr lang="pt-BR"/>
+        </a:p>
+      </dgm:t>
+    </dgm:pt>
+    <dgm:pt modelId="{E68BCF31-7D5B-4B36-8C51-76BFE4A67ECA}">
+      <dgm:prSet phldrT="[Texto]" custT="1"/>
+      <dgm:spPr/>
+      <dgm:t>
+        <a:bodyPr/>
+        <a:lstStyle/>
+        <a:p>
+          <a:r>
+            <a:rPr lang="pt-BR" sz="2400" dirty="0" smtClean="0"/>
+            <a:t>Motor de </a:t>
+          </a:r>
+          <a:r>
+            <a:rPr lang="pt-BR" sz="2400" dirty="0" smtClean="0"/>
+            <a:t>Estratégias</a:t>
+          </a:r>
+          <a:endParaRPr lang="pt-BR" sz="2400" dirty="0"/>
+        </a:p>
+      </dgm:t>
+    </dgm:pt>
+    <dgm:pt modelId="{7C734590-2885-4B87-B303-596DD11CC32B}" type="parTrans" cxnId="{54C7459B-5F3F-4C26-9535-249BAEFCD66D}">
+      <dgm:prSet/>
+      <dgm:spPr/>
+      <dgm:t>
+        <a:bodyPr/>
+        <a:lstStyle/>
+        <a:p>
+          <a:endParaRPr lang="pt-BR"/>
+        </a:p>
+      </dgm:t>
+    </dgm:pt>
+    <dgm:pt modelId="{C45F70BB-C99B-4B24-AE07-CACAAE6D36B1}" type="sibTrans" cxnId="{54C7459B-5F3F-4C26-9535-249BAEFCD66D}">
+      <dgm:prSet/>
+      <dgm:spPr/>
+      <dgm:t>
+        <a:bodyPr/>
+        <a:lstStyle/>
+        <a:p>
+          <a:endParaRPr lang="pt-BR"/>
+        </a:p>
+      </dgm:t>
+    </dgm:pt>
+    <dgm:pt modelId="{7A50C5DA-9A91-41CC-83B8-B56E21944801}">
+      <dgm:prSet phldrT="[Texto]" custT="1"/>
+      <dgm:spPr/>
+      <dgm:t>
+        <a:bodyPr/>
+        <a:lstStyle/>
+        <a:p>
+          <a:r>
+            <a:rPr lang="pt-BR" sz="1800" dirty="0" smtClean="0"/>
+            <a:t>Heurística 01</a:t>
+          </a:r>
+          <a:endParaRPr lang="pt-BR" sz="1800" dirty="0"/>
+        </a:p>
+      </dgm:t>
+    </dgm:pt>
+    <dgm:pt modelId="{4BEAE208-7211-4741-B146-0E3BE15D4B68}" type="parTrans" cxnId="{6FAC9056-B82F-4A03-828A-D778CFB6FAE2}">
+      <dgm:prSet/>
+      <dgm:spPr/>
+      <dgm:t>
+        <a:bodyPr/>
+        <a:lstStyle/>
+        <a:p>
+          <a:endParaRPr lang="pt-BR"/>
+        </a:p>
+      </dgm:t>
+    </dgm:pt>
+    <dgm:pt modelId="{3C07B390-A25B-4D5B-8E43-8676D56E82E2}" type="sibTrans" cxnId="{6FAC9056-B82F-4A03-828A-D778CFB6FAE2}">
+      <dgm:prSet/>
+      <dgm:spPr/>
+      <dgm:t>
+        <a:bodyPr/>
+        <a:lstStyle/>
+        <a:p>
+          <a:endParaRPr lang="pt-BR"/>
+        </a:p>
+      </dgm:t>
+    </dgm:pt>
+    <dgm:pt modelId="{186224DA-22E0-4D29-A48B-D9A8E9BC7D95}">
+      <dgm:prSet phldrT="[Texto]" custT="1"/>
+      <dgm:spPr/>
+      <dgm:t>
+        <a:bodyPr/>
+        <a:lstStyle/>
+        <a:p>
+          <a:r>
+            <a:rPr lang="pt-BR" sz="1800" dirty="0" smtClean="0"/>
+            <a:t>Heurística N</a:t>
+          </a:r>
+          <a:endParaRPr lang="pt-BR" sz="1800" dirty="0"/>
+        </a:p>
+      </dgm:t>
+    </dgm:pt>
+    <dgm:pt modelId="{A04E93D0-F690-4A3F-8EA5-6FFEAA73930B}" type="parTrans" cxnId="{8124C1E4-C69B-45AF-B77E-EE6BBC1011B1}">
+      <dgm:prSet/>
+      <dgm:spPr/>
+      <dgm:t>
+        <a:bodyPr/>
+        <a:lstStyle/>
+        <a:p>
+          <a:endParaRPr lang="pt-BR"/>
+        </a:p>
+      </dgm:t>
+    </dgm:pt>
+    <dgm:pt modelId="{8C14D75D-DABC-40A2-8409-E75D49CA2882}" type="sibTrans" cxnId="{8124C1E4-C69B-45AF-B77E-EE6BBC1011B1}">
+      <dgm:prSet/>
+      <dgm:spPr/>
+      <dgm:t>
+        <a:bodyPr/>
+        <a:lstStyle/>
+        <a:p>
+          <a:endParaRPr lang="pt-BR"/>
+        </a:p>
+      </dgm:t>
+    </dgm:pt>
+    <dgm:pt modelId="{58693C97-7C3B-45B1-AC6A-78758FDB932C}">
+      <dgm:prSet phldrT="[Texto]" custT="1"/>
+      <dgm:spPr/>
+      <dgm:t>
+        <a:bodyPr/>
+        <a:lstStyle/>
+        <a:p>
+          <a:r>
+            <a:rPr lang="pt-BR" sz="2800" dirty="0" smtClean="0"/>
+            <a:t>Framework</a:t>
+          </a:r>
+          <a:endParaRPr lang="pt-BR" sz="2800" dirty="0"/>
+        </a:p>
+      </dgm:t>
+    </dgm:pt>
+    <dgm:pt modelId="{23590AF2-C2D2-4B9C-ACF4-CAD1ADD64544}" type="parTrans" cxnId="{51279364-84F3-4CF1-B0F3-3B87C041016E}">
+      <dgm:prSet/>
+      <dgm:spPr/>
+      <dgm:t>
+        <a:bodyPr/>
+        <a:lstStyle/>
+        <a:p>
+          <a:endParaRPr lang="pt-BR"/>
+        </a:p>
+      </dgm:t>
+    </dgm:pt>
+    <dgm:pt modelId="{A825D5E7-BCF9-4BBD-953C-7BD335D2FDD1}" type="sibTrans" cxnId="{51279364-84F3-4CF1-B0F3-3B87C041016E}">
+      <dgm:prSet/>
+      <dgm:spPr/>
+      <dgm:t>
+        <a:bodyPr/>
+        <a:lstStyle/>
+        <a:p>
+          <a:endParaRPr lang="pt-BR"/>
+        </a:p>
+      </dgm:t>
+    </dgm:pt>
+    <dgm:pt modelId="{8D8C4983-307D-45CC-80AE-C51642E9DEF8}">
+      <dgm:prSet phldrT="[Texto]" custT="1"/>
+      <dgm:spPr/>
+      <dgm:t>
+        <a:bodyPr/>
+        <a:lstStyle/>
+        <a:p>
+          <a:r>
+            <a:rPr lang="pt-BR" sz="2000" dirty="0" smtClean="0"/>
+            <a:t>...</a:t>
+          </a:r>
+          <a:endParaRPr lang="pt-BR" sz="2000" dirty="0"/>
+        </a:p>
+      </dgm:t>
+    </dgm:pt>
+    <dgm:pt modelId="{8268F7B3-37CC-48F9-9969-6C1E993D3915}" type="parTrans" cxnId="{FE37B63C-73EE-495C-94A3-02460135E8D3}">
+      <dgm:prSet/>
+      <dgm:spPr/>
+      <dgm:t>
+        <a:bodyPr/>
+        <a:lstStyle/>
+        <a:p>
+          <a:endParaRPr lang="pt-BR"/>
+        </a:p>
+      </dgm:t>
+    </dgm:pt>
+    <dgm:pt modelId="{781EB0EF-259D-433B-AF88-D6CA99BBDC50}" type="sibTrans" cxnId="{FE37B63C-73EE-495C-94A3-02460135E8D3}">
+      <dgm:prSet/>
+      <dgm:spPr/>
+      <dgm:t>
+        <a:bodyPr/>
+        <a:lstStyle/>
+        <a:p>
+          <a:endParaRPr lang="pt-BR"/>
+        </a:p>
+      </dgm:t>
+    </dgm:pt>
+    <dgm:pt modelId="{F2C5C55E-AAD5-46C7-B490-9EDB0EC9665F}" type="pres">
+      <dgm:prSet presAssocID="{4B7AFAA9-C2C4-4511-9A77-486BA7AE86A9}" presName="Name0" presStyleCnt="0">
+        <dgm:presLayoutVars>
+          <dgm:chPref val="1"/>
+          <dgm:dir/>
+          <dgm:animOne val="branch"/>
+          <dgm:animLvl val="lvl"/>
+          <dgm:resizeHandles/>
+        </dgm:presLayoutVars>
+      </dgm:prSet>
+      <dgm:spPr/>
+      <dgm:t>
+        <a:bodyPr/>
+        <a:lstStyle/>
+        <a:p>
+          <a:endParaRPr lang="pt-BR"/>
+        </a:p>
+      </dgm:t>
+    </dgm:pt>
+    <dgm:pt modelId="{05BAE430-0C74-4AEB-80BE-49230D249B63}" type="pres">
+      <dgm:prSet presAssocID="{E68BCF31-7D5B-4B36-8C51-76BFE4A67ECA}" presName="vertOne" presStyleCnt="0"/>
+      <dgm:spPr/>
+    </dgm:pt>
+    <dgm:pt modelId="{9445868C-F4A0-4876-B5D7-03CBA1E73487}" type="pres">
+      <dgm:prSet presAssocID="{E68BCF31-7D5B-4B36-8C51-76BFE4A67ECA}" presName="txOne" presStyleLbl="node0" presStyleIdx="0" presStyleCnt="1" custLinFactNeighborX="0" custLinFactNeighborY="-8216">
+        <dgm:presLayoutVars>
+          <dgm:chPref val="3"/>
+        </dgm:presLayoutVars>
+      </dgm:prSet>
+      <dgm:spPr/>
+      <dgm:t>
+        <a:bodyPr/>
+        <a:lstStyle/>
+        <a:p>
+          <a:endParaRPr lang="pt-BR"/>
+        </a:p>
+      </dgm:t>
+    </dgm:pt>
+    <dgm:pt modelId="{D9F7CDC9-D59E-4939-A732-71302C1CB80D}" type="pres">
+      <dgm:prSet presAssocID="{E68BCF31-7D5B-4B36-8C51-76BFE4A67ECA}" presName="parTransOne" presStyleCnt="0"/>
+      <dgm:spPr/>
+    </dgm:pt>
+    <dgm:pt modelId="{04BBFD12-F9A5-4E81-9B57-A1AAB292B04F}" type="pres">
+      <dgm:prSet presAssocID="{E68BCF31-7D5B-4B36-8C51-76BFE4A67ECA}" presName="horzOne" presStyleCnt="0"/>
+      <dgm:spPr/>
+    </dgm:pt>
+    <dgm:pt modelId="{F85F95D5-9ED4-46BE-AACA-16854D0DF342}" type="pres">
+      <dgm:prSet presAssocID="{58693C97-7C3B-45B1-AC6A-78758FDB932C}" presName="vertTwo" presStyleCnt="0"/>
+      <dgm:spPr/>
+    </dgm:pt>
+    <dgm:pt modelId="{8AFB375D-E227-4444-8218-F8241D7BF1E8}" type="pres">
+      <dgm:prSet presAssocID="{58693C97-7C3B-45B1-AC6A-78758FDB932C}" presName="txTwo" presStyleLbl="node2" presStyleIdx="0" presStyleCnt="1">
+        <dgm:presLayoutVars>
+          <dgm:chPref val="3"/>
+        </dgm:presLayoutVars>
+      </dgm:prSet>
+      <dgm:spPr/>
+      <dgm:t>
+        <a:bodyPr/>
+        <a:lstStyle/>
+        <a:p>
+          <a:endParaRPr lang="pt-BR"/>
+        </a:p>
+      </dgm:t>
+    </dgm:pt>
+    <dgm:pt modelId="{027AAEBE-B3D1-4AAE-8788-B2C90A7092D0}" type="pres">
+      <dgm:prSet presAssocID="{58693C97-7C3B-45B1-AC6A-78758FDB932C}" presName="parTransTwo" presStyleCnt="0"/>
+      <dgm:spPr/>
+    </dgm:pt>
+    <dgm:pt modelId="{72C1FEEE-ACA1-454F-A10B-279F6B18E347}" type="pres">
+      <dgm:prSet presAssocID="{58693C97-7C3B-45B1-AC6A-78758FDB932C}" presName="horzTwo" presStyleCnt="0"/>
+      <dgm:spPr/>
+    </dgm:pt>
+    <dgm:pt modelId="{68318C63-B9AF-46B8-BD35-AF3329885212}" type="pres">
+      <dgm:prSet presAssocID="{7A50C5DA-9A91-41CC-83B8-B56E21944801}" presName="vertThree" presStyleCnt="0"/>
+      <dgm:spPr/>
+    </dgm:pt>
+    <dgm:pt modelId="{9BF0B472-AFA3-467F-AFCE-3DD1ADF6F7D3}" type="pres">
+      <dgm:prSet presAssocID="{7A50C5DA-9A91-41CC-83B8-B56E21944801}" presName="txThree" presStyleLbl="node3" presStyleIdx="0" presStyleCnt="3">
+        <dgm:presLayoutVars>
+          <dgm:chPref val="3"/>
+        </dgm:presLayoutVars>
+      </dgm:prSet>
+      <dgm:spPr/>
+      <dgm:t>
+        <a:bodyPr/>
+        <a:lstStyle/>
+        <a:p>
+          <a:endParaRPr lang="pt-BR"/>
+        </a:p>
+      </dgm:t>
+    </dgm:pt>
+    <dgm:pt modelId="{C71D2676-3D53-42E2-BE1F-AB47B50C9783}" type="pres">
+      <dgm:prSet presAssocID="{7A50C5DA-9A91-41CC-83B8-B56E21944801}" presName="horzThree" presStyleCnt="0"/>
+      <dgm:spPr/>
+    </dgm:pt>
+    <dgm:pt modelId="{A67C993E-4831-45DA-9C42-C2D0218B12FF}" type="pres">
+      <dgm:prSet presAssocID="{3C07B390-A25B-4D5B-8E43-8676D56E82E2}" presName="sibSpaceThree" presStyleCnt="0"/>
+      <dgm:spPr/>
+    </dgm:pt>
+    <dgm:pt modelId="{3FD9970B-DF05-4E56-B537-DC0A4F665796}" type="pres">
+      <dgm:prSet presAssocID="{8D8C4983-307D-45CC-80AE-C51642E9DEF8}" presName="vertThree" presStyleCnt="0"/>
+      <dgm:spPr/>
+    </dgm:pt>
+    <dgm:pt modelId="{804BB60F-6FFE-4FD9-9270-F2916E5378D9}" type="pres">
+      <dgm:prSet presAssocID="{8D8C4983-307D-45CC-80AE-C51642E9DEF8}" presName="txThree" presStyleLbl="node3" presStyleIdx="1" presStyleCnt="3" custScaleX="32737" custScaleY="39166" custLinFactNeighborX="0" custLinFactNeighborY="30417">
+        <dgm:presLayoutVars>
+          <dgm:chPref val="3"/>
+        </dgm:presLayoutVars>
+      </dgm:prSet>
+      <dgm:spPr/>
+      <dgm:t>
+        <a:bodyPr/>
+        <a:lstStyle/>
+        <a:p>
+          <a:endParaRPr lang="pt-BR"/>
+        </a:p>
+      </dgm:t>
+    </dgm:pt>
+    <dgm:pt modelId="{242F677C-A076-4740-9FF5-02D6B1FFFB1D}" type="pres">
+      <dgm:prSet presAssocID="{8D8C4983-307D-45CC-80AE-C51642E9DEF8}" presName="horzThree" presStyleCnt="0"/>
+      <dgm:spPr/>
+    </dgm:pt>
+    <dgm:pt modelId="{717ACC1E-C478-42F7-A042-9DA8E1357802}" type="pres">
+      <dgm:prSet presAssocID="{781EB0EF-259D-433B-AF88-D6CA99BBDC50}" presName="sibSpaceThree" presStyleCnt="0"/>
+      <dgm:spPr/>
+    </dgm:pt>
+    <dgm:pt modelId="{6EB3D48C-2AC7-4443-9A4B-37EAAAB4E78B}" type="pres">
+      <dgm:prSet presAssocID="{186224DA-22E0-4D29-A48B-D9A8E9BC7D95}" presName="vertThree" presStyleCnt="0"/>
+      <dgm:spPr/>
+    </dgm:pt>
+    <dgm:pt modelId="{98ED6051-6218-470B-A184-E94E28F96F4E}" type="pres">
+      <dgm:prSet presAssocID="{186224DA-22E0-4D29-A48B-D9A8E9BC7D95}" presName="txThree" presStyleLbl="node3" presStyleIdx="2" presStyleCnt="3">
+        <dgm:presLayoutVars>
+          <dgm:chPref val="3"/>
+        </dgm:presLayoutVars>
+      </dgm:prSet>
+      <dgm:spPr/>
+      <dgm:t>
+        <a:bodyPr/>
+        <a:lstStyle/>
+        <a:p>
+          <a:endParaRPr lang="pt-BR"/>
+        </a:p>
+      </dgm:t>
+    </dgm:pt>
+    <dgm:pt modelId="{6E4B6C91-9148-413C-B827-20EE3F933A40}" type="pres">
+      <dgm:prSet presAssocID="{186224DA-22E0-4D29-A48B-D9A8E9BC7D95}" presName="horzThree" presStyleCnt="0"/>
+      <dgm:spPr/>
+    </dgm:pt>
+  </dgm:ptLst>
+  <dgm:cxnLst>
+    <dgm:cxn modelId="{51279364-84F3-4CF1-B0F3-3B87C041016E}" srcId="{E68BCF31-7D5B-4B36-8C51-76BFE4A67ECA}" destId="{58693C97-7C3B-45B1-AC6A-78758FDB932C}" srcOrd="0" destOrd="0" parTransId="{23590AF2-C2D2-4B9C-ACF4-CAD1ADD64544}" sibTransId="{A825D5E7-BCF9-4BBD-953C-7BD335D2FDD1}"/>
+    <dgm:cxn modelId="{9694CD78-BB3E-45FC-8290-7DE82EC2CC68}" type="presOf" srcId="{58693C97-7C3B-45B1-AC6A-78758FDB932C}" destId="{8AFB375D-E227-4444-8218-F8241D7BF1E8}" srcOrd="0" destOrd="0" presId="urn:microsoft.com/office/officeart/2005/8/layout/hierarchy4"/>
+    <dgm:cxn modelId="{5A54A779-B14C-4BD7-BDB0-182FAC095079}" type="presOf" srcId="{E68BCF31-7D5B-4B36-8C51-76BFE4A67ECA}" destId="{9445868C-F4A0-4876-B5D7-03CBA1E73487}" srcOrd="0" destOrd="0" presId="urn:microsoft.com/office/officeart/2005/8/layout/hierarchy4"/>
+    <dgm:cxn modelId="{54C7459B-5F3F-4C26-9535-249BAEFCD66D}" srcId="{4B7AFAA9-C2C4-4511-9A77-486BA7AE86A9}" destId="{E68BCF31-7D5B-4B36-8C51-76BFE4A67ECA}" srcOrd="0" destOrd="0" parTransId="{7C734590-2885-4B87-B303-596DD11CC32B}" sibTransId="{C45F70BB-C99B-4B24-AE07-CACAAE6D36B1}"/>
+    <dgm:cxn modelId="{E55F912B-8519-418C-B62B-704B2C8ED3F1}" type="presOf" srcId="{7A50C5DA-9A91-41CC-83B8-B56E21944801}" destId="{9BF0B472-AFA3-467F-AFCE-3DD1ADF6F7D3}" srcOrd="0" destOrd="0" presId="urn:microsoft.com/office/officeart/2005/8/layout/hierarchy4"/>
+    <dgm:cxn modelId="{D8F6E671-2D59-46F3-8EF3-CDC381FD8B31}" type="presOf" srcId="{8D8C4983-307D-45CC-80AE-C51642E9DEF8}" destId="{804BB60F-6FFE-4FD9-9270-F2916E5378D9}" srcOrd="0" destOrd="0" presId="urn:microsoft.com/office/officeart/2005/8/layout/hierarchy4"/>
+    <dgm:cxn modelId="{6FAC9056-B82F-4A03-828A-D778CFB6FAE2}" srcId="{58693C97-7C3B-45B1-AC6A-78758FDB932C}" destId="{7A50C5DA-9A91-41CC-83B8-B56E21944801}" srcOrd="0" destOrd="0" parTransId="{4BEAE208-7211-4741-B146-0E3BE15D4B68}" sibTransId="{3C07B390-A25B-4D5B-8E43-8676D56E82E2}"/>
+    <dgm:cxn modelId="{8124C1E4-C69B-45AF-B77E-EE6BBC1011B1}" srcId="{58693C97-7C3B-45B1-AC6A-78758FDB932C}" destId="{186224DA-22E0-4D29-A48B-D9A8E9BC7D95}" srcOrd="2" destOrd="0" parTransId="{A04E93D0-F690-4A3F-8EA5-6FFEAA73930B}" sibTransId="{8C14D75D-DABC-40A2-8409-E75D49CA2882}"/>
+    <dgm:cxn modelId="{8C719100-539C-4B9E-8CFD-A81338F96AEF}" type="presOf" srcId="{4B7AFAA9-C2C4-4511-9A77-486BA7AE86A9}" destId="{F2C5C55E-AAD5-46C7-B490-9EDB0EC9665F}" srcOrd="0" destOrd="0" presId="urn:microsoft.com/office/officeart/2005/8/layout/hierarchy4"/>
+    <dgm:cxn modelId="{FE37B63C-73EE-495C-94A3-02460135E8D3}" srcId="{58693C97-7C3B-45B1-AC6A-78758FDB932C}" destId="{8D8C4983-307D-45CC-80AE-C51642E9DEF8}" srcOrd="1" destOrd="0" parTransId="{8268F7B3-37CC-48F9-9969-6C1E993D3915}" sibTransId="{781EB0EF-259D-433B-AF88-D6CA99BBDC50}"/>
+    <dgm:cxn modelId="{8F3C81AB-A704-421C-A2E0-C05C61BE2F6D}" type="presOf" srcId="{186224DA-22E0-4D29-A48B-D9A8E9BC7D95}" destId="{98ED6051-6218-470B-A184-E94E28F96F4E}" srcOrd="0" destOrd="0" presId="urn:microsoft.com/office/officeart/2005/8/layout/hierarchy4"/>
+    <dgm:cxn modelId="{CC408E5F-ECF8-4A96-969B-409788B5DD4F}" type="presParOf" srcId="{F2C5C55E-AAD5-46C7-B490-9EDB0EC9665F}" destId="{05BAE430-0C74-4AEB-80BE-49230D249B63}" srcOrd="0" destOrd="0" presId="urn:microsoft.com/office/officeart/2005/8/layout/hierarchy4"/>
+    <dgm:cxn modelId="{0DCC2DDD-B408-4A95-9550-DD12E1AE3FB7}" type="presParOf" srcId="{05BAE430-0C74-4AEB-80BE-49230D249B63}" destId="{9445868C-F4A0-4876-B5D7-03CBA1E73487}" srcOrd="0" destOrd="0" presId="urn:microsoft.com/office/officeart/2005/8/layout/hierarchy4"/>
+    <dgm:cxn modelId="{E4815F00-DA2D-4512-A52E-20187AD7A199}" type="presParOf" srcId="{05BAE430-0C74-4AEB-80BE-49230D249B63}" destId="{D9F7CDC9-D59E-4939-A732-71302C1CB80D}" srcOrd="1" destOrd="0" presId="urn:microsoft.com/office/officeart/2005/8/layout/hierarchy4"/>
+    <dgm:cxn modelId="{FB3677E4-287A-4918-8B4A-AA0E850410BE}" type="presParOf" srcId="{05BAE430-0C74-4AEB-80BE-49230D249B63}" destId="{04BBFD12-F9A5-4E81-9B57-A1AAB292B04F}" srcOrd="2" destOrd="0" presId="urn:microsoft.com/office/officeart/2005/8/layout/hierarchy4"/>
+    <dgm:cxn modelId="{E808FC54-5913-464E-B90F-47F65CA9B66A}" type="presParOf" srcId="{04BBFD12-F9A5-4E81-9B57-A1AAB292B04F}" destId="{F85F95D5-9ED4-46BE-AACA-16854D0DF342}" srcOrd="0" destOrd="0" presId="urn:microsoft.com/office/officeart/2005/8/layout/hierarchy4"/>
+    <dgm:cxn modelId="{73F9A48A-87A5-4542-B453-8F085BE50E3B}" type="presParOf" srcId="{F85F95D5-9ED4-46BE-AACA-16854D0DF342}" destId="{8AFB375D-E227-4444-8218-F8241D7BF1E8}" srcOrd="0" destOrd="0" presId="urn:microsoft.com/office/officeart/2005/8/layout/hierarchy4"/>
+    <dgm:cxn modelId="{87A79DD5-7045-4A75-8EC4-EC93ACEE2F88}" type="presParOf" srcId="{F85F95D5-9ED4-46BE-AACA-16854D0DF342}" destId="{027AAEBE-B3D1-4AAE-8788-B2C90A7092D0}" srcOrd="1" destOrd="0" presId="urn:microsoft.com/office/officeart/2005/8/layout/hierarchy4"/>
+    <dgm:cxn modelId="{D5FC9718-F236-4C55-B0BA-200520682952}" type="presParOf" srcId="{F85F95D5-9ED4-46BE-AACA-16854D0DF342}" destId="{72C1FEEE-ACA1-454F-A10B-279F6B18E347}" srcOrd="2" destOrd="0" presId="urn:microsoft.com/office/officeart/2005/8/layout/hierarchy4"/>
+    <dgm:cxn modelId="{2FC04779-0BA2-4AE8-808B-101FB52844AE}" type="presParOf" srcId="{72C1FEEE-ACA1-454F-A10B-279F6B18E347}" destId="{68318C63-B9AF-46B8-BD35-AF3329885212}" srcOrd="0" destOrd="0" presId="urn:microsoft.com/office/officeart/2005/8/layout/hierarchy4"/>
+    <dgm:cxn modelId="{2EC7C156-5FA4-4C79-BC65-B04B4785EC9C}" type="presParOf" srcId="{68318C63-B9AF-46B8-BD35-AF3329885212}" destId="{9BF0B472-AFA3-467F-AFCE-3DD1ADF6F7D3}" srcOrd="0" destOrd="0" presId="urn:microsoft.com/office/officeart/2005/8/layout/hierarchy4"/>
+    <dgm:cxn modelId="{30A77E33-C8F6-4D3E-916A-6DD52DCA89CD}" type="presParOf" srcId="{68318C63-B9AF-46B8-BD35-AF3329885212}" destId="{C71D2676-3D53-42E2-BE1F-AB47B50C9783}" srcOrd="1" destOrd="0" presId="urn:microsoft.com/office/officeart/2005/8/layout/hierarchy4"/>
+    <dgm:cxn modelId="{C82D1FB7-4A3C-4245-8ECC-6924335EF10C}" type="presParOf" srcId="{72C1FEEE-ACA1-454F-A10B-279F6B18E347}" destId="{A67C993E-4831-45DA-9C42-C2D0218B12FF}" srcOrd="1" destOrd="0" presId="urn:microsoft.com/office/officeart/2005/8/layout/hierarchy4"/>
+    <dgm:cxn modelId="{5F4E1FA1-708F-4691-920C-91E35440E793}" type="presParOf" srcId="{72C1FEEE-ACA1-454F-A10B-279F6B18E347}" destId="{3FD9970B-DF05-4E56-B537-DC0A4F665796}" srcOrd="2" destOrd="0" presId="urn:microsoft.com/office/officeart/2005/8/layout/hierarchy4"/>
+    <dgm:cxn modelId="{EDB69F05-E385-4D4D-8CBD-D1FBED250168}" type="presParOf" srcId="{3FD9970B-DF05-4E56-B537-DC0A4F665796}" destId="{804BB60F-6FFE-4FD9-9270-F2916E5378D9}" srcOrd="0" destOrd="0" presId="urn:microsoft.com/office/officeart/2005/8/layout/hierarchy4"/>
+    <dgm:cxn modelId="{E552E913-8ED2-4475-AFC4-C0B4F9417EBA}" type="presParOf" srcId="{3FD9970B-DF05-4E56-B537-DC0A4F665796}" destId="{242F677C-A076-4740-9FF5-02D6B1FFFB1D}" srcOrd="1" destOrd="0" presId="urn:microsoft.com/office/officeart/2005/8/layout/hierarchy4"/>
+    <dgm:cxn modelId="{1A9657E2-3D1B-4B1D-B283-BB722BABFD98}" type="presParOf" srcId="{72C1FEEE-ACA1-454F-A10B-279F6B18E347}" destId="{717ACC1E-C478-42F7-A042-9DA8E1357802}" srcOrd="3" destOrd="0" presId="urn:microsoft.com/office/officeart/2005/8/layout/hierarchy4"/>
+    <dgm:cxn modelId="{1DC5A6ED-8AE9-4131-B148-E1F956AA2751}" type="presParOf" srcId="{72C1FEEE-ACA1-454F-A10B-279F6B18E347}" destId="{6EB3D48C-2AC7-4443-9A4B-37EAAAB4E78B}" srcOrd="4" destOrd="0" presId="urn:microsoft.com/office/officeart/2005/8/layout/hierarchy4"/>
+    <dgm:cxn modelId="{CEC8A880-F347-4F3E-AAAC-65DF69B79FF7}" type="presParOf" srcId="{6EB3D48C-2AC7-4443-9A4B-37EAAAB4E78B}" destId="{98ED6051-6218-470B-A184-E94E28F96F4E}" srcOrd="0" destOrd="0" presId="urn:microsoft.com/office/officeart/2005/8/layout/hierarchy4"/>
+    <dgm:cxn modelId="{0B90C192-239E-4C46-9F5B-B1BD547DC1A2}" type="presParOf" srcId="{6EB3D48C-2AC7-4443-9A4B-37EAAAB4E78B}" destId="{6E4B6C91-9148-413C-B827-20EE3F933A40}" srcOrd="1" destOrd="0" presId="urn:microsoft.com/office/officeart/2005/8/layout/hierarchy4"/>
+  </dgm:cxnLst>
+  <dgm:bg/>
+  <dgm:whole/>
+  <dgm:extLst>
+    <a:ext uri="http://schemas.microsoft.com/office/drawing/2008/diagram">
+      <dsp:dataModelExt xmlns:dsp="http://schemas.microsoft.com/office/drawing/2008/diagram" relId="rId6" minVer="http://schemas.openxmlformats.org/drawingml/2006/diagram"/>
+    </a:ext>
+  </dgm:extLst>
+</dgm:dataModel>
+</file>
+
 <file path=ppt/diagrams/drawing1.xml><?xml version="1.0" encoding="utf-8"?>
 <dsp:drawing xmlns:dgm="http://schemas.openxmlformats.org/drawingml/2006/diagram" xmlns:dsp="http://schemas.microsoft.com/office/drawing/2008/diagram" xmlns:a="http://schemas.openxmlformats.org/drawingml/2006/main">
   <dsp:spTree>
@@ -1496,7 +2820,426 @@
           </a:pPr>
           <a:r>
             <a:rPr lang="pt-BR" sz="2400" kern="1200" dirty="0" smtClean="0"/>
-            <a:t>Motor de Heurísticas</a:t>
+            <a:t>Motor </a:t>
+          </a:r>
+          <a:r>
+            <a:rPr lang="pt-BR" sz="2400" kern="1200" smtClean="0"/>
+            <a:t>de </a:t>
+          </a:r>
+          <a:r>
+            <a:rPr lang="pt-BR" sz="2400" kern="1200" smtClean="0"/>
+            <a:t>Heurísticas</a:t>
+          </a:r>
+          <a:endParaRPr lang="pt-BR" sz="2400" kern="1200" dirty="0"/>
+        </a:p>
+      </dsp:txBody>
+      <dsp:txXfrm>
+        <a:off x="16605" y="16074"/>
+        <a:ext cx="2879112" cy="516660"/>
+      </dsp:txXfrm>
+    </dsp:sp>
+    <dsp:sp modelId="{8AFB375D-E227-4444-8218-F8241D7BF1E8}">
+      <dsp:nvSpPr>
+        <dsp:cNvPr id="0" name=""/>
+        <dsp:cNvSpPr/>
+      </dsp:nvSpPr>
+      <dsp:spPr>
+        <a:xfrm>
+          <a:off x="3372" y="600953"/>
+          <a:ext cx="2905577" cy="548808"/>
+        </a:xfrm>
+        <a:prstGeom prst="roundRect">
+          <a:avLst>
+            <a:gd name="adj" fmla="val 10000"/>
+          </a:avLst>
+        </a:prstGeom>
+        <a:solidFill>
+          <a:schemeClr val="accent2">
+            <a:hueOff val="0"/>
+            <a:satOff val="0"/>
+            <a:lumOff val="0"/>
+            <a:alphaOff val="0"/>
+          </a:schemeClr>
+        </a:solidFill>
+        <a:ln w="25400" cap="flat" cmpd="sng" algn="ctr">
+          <a:solidFill>
+            <a:schemeClr val="lt1">
+              <a:hueOff val="0"/>
+              <a:satOff val="0"/>
+              <a:lumOff val="0"/>
+              <a:alphaOff val="0"/>
+            </a:schemeClr>
+          </a:solidFill>
+          <a:prstDash val="solid"/>
+        </a:ln>
+        <a:effectLst/>
+      </dsp:spPr>
+      <dsp:style>
+        <a:lnRef idx="2">
+          <a:scrgbClr r="0" g="0" b="0"/>
+        </a:lnRef>
+        <a:fillRef idx="1">
+          <a:scrgbClr r="0" g="0" b="0"/>
+        </a:fillRef>
+        <a:effectRef idx="0">
+          <a:scrgbClr r="0" g="0" b="0"/>
+        </a:effectRef>
+        <a:fontRef idx="minor">
+          <a:schemeClr val="lt1"/>
+        </a:fontRef>
+      </dsp:style>
+      <dsp:txBody>
+        <a:bodyPr spcFirstLastPara="0" vert="horz" wrap="square" lIns="106680" tIns="106680" rIns="106680" bIns="106680" numCol="1" spcCol="1270" anchor="ctr" anchorCtr="0">
+          <a:noAutofit/>
+        </a:bodyPr>
+        <a:lstStyle/>
+        <a:p>
+          <a:pPr lvl="0" algn="ctr" defTabSz="1244600">
+            <a:lnSpc>
+              <a:spcPct val="90000"/>
+            </a:lnSpc>
+            <a:spcBef>
+              <a:spcPct val="0"/>
+            </a:spcBef>
+            <a:spcAft>
+              <a:spcPct val="35000"/>
+            </a:spcAft>
+          </a:pPr>
+          <a:r>
+            <a:rPr lang="pt-BR" sz="2800" kern="1200" dirty="0" smtClean="0"/>
+            <a:t>Framework</a:t>
+          </a:r>
+          <a:endParaRPr lang="pt-BR" sz="2800" kern="1200" dirty="0"/>
+        </a:p>
+      </dsp:txBody>
+      <dsp:txXfrm>
+        <a:off x="19446" y="617027"/>
+        <a:ext cx="2873429" cy="516660"/>
+      </dsp:txXfrm>
+    </dsp:sp>
+    <dsp:sp modelId="{9BF0B472-AFA3-467F-AFCE-3DD1ADF6F7D3}">
+      <dsp:nvSpPr>
+        <dsp:cNvPr id="0" name=""/>
+        <dsp:cNvSpPr/>
+      </dsp:nvSpPr>
+      <dsp:spPr>
+        <a:xfrm>
+          <a:off x="3372" y="1200887"/>
+          <a:ext cx="1204948" cy="548808"/>
+        </a:xfrm>
+        <a:prstGeom prst="roundRect">
+          <a:avLst>
+            <a:gd name="adj" fmla="val 10000"/>
+          </a:avLst>
+        </a:prstGeom>
+        <a:solidFill>
+          <a:schemeClr val="accent3">
+            <a:hueOff val="0"/>
+            <a:satOff val="0"/>
+            <a:lumOff val="0"/>
+            <a:alphaOff val="0"/>
+          </a:schemeClr>
+        </a:solidFill>
+        <a:ln w="25400" cap="flat" cmpd="sng" algn="ctr">
+          <a:solidFill>
+            <a:schemeClr val="lt1">
+              <a:hueOff val="0"/>
+              <a:satOff val="0"/>
+              <a:lumOff val="0"/>
+              <a:alphaOff val="0"/>
+            </a:schemeClr>
+          </a:solidFill>
+          <a:prstDash val="solid"/>
+        </a:ln>
+        <a:effectLst/>
+      </dsp:spPr>
+      <dsp:style>
+        <a:lnRef idx="2">
+          <a:scrgbClr r="0" g="0" b="0"/>
+        </a:lnRef>
+        <a:fillRef idx="1">
+          <a:scrgbClr r="0" g="0" b="0"/>
+        </a:fillRef>
+        <a:effectRef idx="0">
+          <a:scrgbClr r="0" g="0" b="0"/>
+        </a:effectRef>
+        <a:fontRef idx="minor">
+          <a:schemeClr val="lt1"/>
+        </a:fontRef>
+      </dsp:style>
+      <dsp:txBody>
+        <a:bodyPr spcFirstLastPara="0" vert="horz" wrap="square" lIns="68580" tIns="68580" rIns="68580" bIns="68580" numCol="1" spcCol="1270" anchor="ctr" anchorCtr="0">
+          <a:noAutofit/>
+        </a:bodyPr>
+        <a:lstStyle/>
+        <a:p>
+          <a:pPr lvl="0" algn="ctr" defTabSz="800100">
+            <a:lnSpc>
+              <a:spcPct val="90000"/>
+            </a:lnSpc>
+            <a:spcBef>
+              <a:spcPct val="0"/>
+            </a:spcBef>
+            <a:spcAft>
+              <a:spcPct val="35000"/>
+            </a:spcAft>
+          </a:pPr>
+          <a:r>
+            <a:rPr lang="pt-BR" sz="1800" kern="1200" dirty="0" smtClean="0"/>
+            <a:t>Heurística 01</a:t>
+          </a:r>
+          <a:endParaRPr lang="pt-BR" sz="1800" kern="1200" dirty="0"/>
+        </a:p>
+      </dsp:txBody>
+      <dsp:txXfrm>
+        <a:off x="19446" y="1216961"/>
+        <a:ext cx="1172800" cy="516660"/>
+      </dsp:txXfrm>
+    </dsp:sp>
+    <dsp:sp modelId="{804BB60F-6FFE-4FD9-9270-F2916E5378D9}">
+      <dsp:nvSpPr>
+        <dsp:cNvPr id="0" name=""/>
+        <dsp:cNvSpPr/>
+      </dsp:nvSpPr>
+      <dsp:spPr>
+        <a:xfrm>
+          <a:off x="1258929" y="1367818"/>
+          <a:ext cx="394464" cy="214946"/>
+        </a:xfrm>
+        <a:prstGeom prst="roundRect">
+          <a:avLst>
+            <a:gd name="adj" fmla="val 10000"/>
+          </a:avLst>
+        </a:prstGeom>
+        <a:solidFill>
+          <a:schemeClr val="accent3">
+            <a:hueOff val="0"/>
+            <a:satOff val="0"/>
+            <a:lumOff val="0"/>
+            <a:alphaOff val="0"/>
+          </a:schemeClr>
+        </a:solidFill>
+        <a:ln w="25400" cap="flat" cmpd="sng" algn="ctr">
+          <a:solidFill>
+            <a:schemeClr val="lt1">
+              <a:hueOff val="0"/>
+              <a:satOff val="0"/>
+              <a:lumOff val="0"/>
+              <a:alphaOff val="0"/>
+            </a:schemeClr>
+          </a:solidFill>
+          <a:prstDash val="solid"/>
+        </a:ln>
+        <a:effectLst/>
+      </dsp:spPr>
+      <dsp:style>
+        <a:lnRef idx="2">
+          <a:scrgbClr r="0" g="0" b="0"/>
+        </a:lnRef>
+        <a:fillRef idx="1">
+          <a:scrgbClr r="0" g="0" b="0"/>
+        </a:fillRef>
+        <a:effectRef idx="0">
+          <a:scrgbClr r="0" g="0" b="0"/>
+        </a:effectRef>
+        <a:fontRef idx="minor">
+          <a:schemeClr val="lt1"/>
+        </a:fontRef>
+      </dsp:style>
+      <dsp:txBody>
+        <a:bodyPr spcFirstLastPara="0" vert="horz" wrap="square" lIns="76200" tIns="76200" rIns="76200" bIns="76200" numCol="1" spcCol="1270" anchor="ctr" anchorCtr="0">
+          <a:noAutofit/>
+        </a:bodyPr>
+        <a:lstStyle/>
+        <a:p>
+          <a:pPr lvl="0" algn="ctr" defTabSz="889000">
+            <a:lnSpc>
+              <a:spcPct val="90000"/>
+            </a:lnSpc>
+            <a:spcBef>
+              <a:spcPct val="0"/>
+            </a:spcBef>
+            <a:spcAft>
+              <a:spcPct val="35000"/>
+            </a:spcAft>
+          </a:pPr>
+          <a:r>
+            <a:rPr lang="pt-BR" sz="2000" kern="1200" dirty="0" smtClean="0"/>
+            <a:t>...</a:t>
+          </a:r>
+          <a:endParaRPr lang="pt-BR" sz="2000" kern="1200" dirty="0"/>
+        </a:p>
+      </dsp:txBody>
+      <dsp:txXfrm>
+        <a:off x="1265225" y="1374114"/>
+        <a:ext cx="381872" cy="202354"/>
+      </dsp:txXfrm>
+    </dsp:sp>
+    <dsp:sp modelId="{98ED6051-6218-470B-A184-E94E28F96F4E}">
+      <dsp:nvSpPr>
+        <dsp:cNvPr id="0" name=""/>
+        <dsp:cNvSpPr/>
+      </dsp:nvSpPr>
+      <dsp:spPr>
+        <a:xfrm>
+          <a:off x="1704001" y="1200887"/>
+          <a:ext cx="1204948" cy="548808"/>
+        </a:xfrm>
+        <a:prstGeom prst="roundRect">
+          <a:avLst>
+            <a:gd name="adj" fmla="val 10000"/>
+          </a:avLst>
+        </a:prstGeom>
+        <a:solidFill>
+          <a:schemeClr val="accent3">
+            <a:hueOff val="0"/>
+            <a:satOff val="0"/>
+            <a:lumOff val="0"/>
+            <a:alphaOff val="0"/>
+          </a:schemeClr>
+        </a:solidFill>
+        <a:ln w="25400" cap="flat" cmpd="sng" algn="ctr">
+          <a:solidFill>
+            <a:schemeClr val="lt1">
+              <a:hueOff val="0"/>
+              <a:satOff val="0"/>
+              <a:lumOff val="0"/>
+              <a:alphaOff val="0"/>
+            </a:schemeClr>
+          </a:solidFill>
+          <a:prstDash val="solid"/>
+        </a:ln>
+        <a:effectLst/>
+      </dsp:spPr>
+      <dsp:style>
+        <a:lnRef idx="2">
+          <a:scrgbClr r="0" g="0" b="0"/>
+        </a:lnRef>
+        <a:fillRef idx="1">
+          <a:scrgbClr r="0" g="0" b="0"/>
+        </a:fillRef>
+        <a:effectRef idx="0">
+          <a:scrgbClr r="0" g="0" b="0"/>
+        </a:effectRef>
+        <a:fontRef idx="minor">
+          <a:schemeClr val="lt1"/>
+        </a:fontRef>
+      </dsp:style>
+      <dsp:txBody>
+        <a:bodyPr spcFirstLastPara="0" vert="horz" wrap="square" lIns="68580" tIns="68580" rIns="68580" bIns="68580" numCol="1" spcCol="1270" anchor="ctr" anchorCtr="0">
+          <a:noAutofit/>
+        </a:bodyPr>
+        <a:lstStyle/>
+        <a:p>
+          <a:pPr lvl="0" algn="ctr" defTabSz="800100">
+            <a:lnSpc>
+              <a:spcPct val="90000"/>
+            </a:lnSpc>
+            <a:spcBef>
+              <a:spcPct val="0"/>
+            </a:spcBef>
+            <a:spcAft>
+              <a:spcPct val="35000"/>
+            </a:spcAft>
+          </a:pPr>
+          <a:r>
+            <a:rPr lang="pt-BR" sz="1800" kern="1200" dirty="0" smtClean="0"/>
+            <a:t>Heurística N</a:t>
+          </a:r>
+          <a:endParaRPr lang="pt-BR" sz="1800" kern="1200" dirty="0"/>
+        </a:p>
+      </dsp:txBody>
+      <dsp:txXfrm>
+        <a:off x="1720075" y="1216961"/>
+        <a:ext cx="1172800" cy="516660"/>
+      </dsp:txXfrm>
+    </dsp:sp>
+  </dsp:spTree>
+</dsp:drawing>
+</file>
+
+<file path=ppt/diagrams/drawing2.xml><?xml version="1.0" encoding="utf-8"?>
+<dsp:drawing xmlns:dgm="http://schemas.openxmlformats.org/drawingml/2006/diagram" xmlns:dsp="http://schemas.microsoft.com/office/drawing/2008/diagram" xmlns:a="http://schemas.openxmlformats.org/drawingml/2006/main">
+  <dsp:spTree>
+    <dsp:nvGrpSpPr>
+      <dsp:cNvPr id="0" name=""/>
+      <dsp:cNvGrpSpPr/>
+    </dsp:nvGrpSpPr>
+    <dsp:grpSpPr/>
+    <dsp:sp modelId="{9445868C-F4A0-4876-B5D7-03CBA1E73487}">
+      <dsp:nvSpPr>
+        <dsp:cNvPr id="0" name=""/>
+        <dsp:cNvSpPr/>
+      </dsp:nvSpPr>
+      <dsp:spPr>
+        <a:xfrm>
+          <a:off x="531" y="0"/>
+          <a:ext cx="2911260" cy="548808"/>
+        </a:xfrm>
+        <a:prstGeom prst="roundRect">
+          <a:avLst>
+            <a:gd name="adj" fmla="val 10000"/>
+          </a:avLst>
+        </a:prstGeom>
+        <a:solidFill>
+          <a:schemeClr val="accent1">
+            <a:hueOff val="0"/>
+            <a:satOff val="0"/>
+            <a:lumOff val="0"/>
+            <a:alphaOff val="0"/>
+          </a:schemeClr>
+        </a:solidFill>
+        <a:ln w="25400" cap="flat" cmpd="sng" algn="ctr">
+          <a:solidFill>
+            <a:schemeClr val="lt1">
+              <a:hueOff val="0"/>
+              <a:satOff val="0"/>
+              <a:lumOff val="0"/>
+              <a:alphaOff val="0"/>
+            </a:schemeClr>
+          </a:solidFill>
+          <a:prstDash val="solid"/>
+        </a:ln>
+        <a:effectLst/>
+      </dsp:spPr>
+      <dsp:style>
+        <a:lnRef idx="2">
+          <a:scrgbClr r="0" g="0" b="0"/>
+        </a:lnRef>
+        <a:fillRef idx="1">
+          <a:scrgbClr r="0" g="0" b="0"/>
+        </a:fillRef>
+        <a:effectRef idx="0">
+          <a:scrgbClr r="0" g="0" b="0"/>
+        </a:effectRef>
+        <a:fontRef idx="minor">
+          <a:schemeClr val="lt1"/>
+        </a:fontRef>
+      </dsp:style>
+      <dsp:txBody>
+        <a:bodyPr spcFirstLastPara="0" vert="horz" wrap="square" lIns="91440" tIns="91440" rIns="91440" bIns="91440" numCol="1" spcCol="1270" anchor="ctr" anchorCtr="0">
+          <a:noAutofit/>
+        </a:bodyPr>
+        <a:lstStyle/>
+        <a:p>
+          <a:pPr lvl="0" algn="ctr" defTabSz="1066800">
+            <a:lnSpc>
+              <a:spcPct val="90000"/>
+            </a:lnSpc>
+            <a:spcBef>
+              <a:spcPct val="0"/>
+            </a:spcBef>
+            <a:spcAft>
+              <a:spcPct val="35000"/>
+            </a:spcAft>
+          </a:pPr>
+          <a:r>
+            <a:rPr lang="pt-BR" sz="2400" kern="1200" dirty="0" smtClean="0"/>
+            <a:t>Motor de </a:t>
+          </a:r>
+          <a:r>
+            <a:rPr lang="pt-BR" sz="2400" kern="1200" dirty="0" smtClean="0"/>
+            <a:t>Estratégias</a:t>
           </a:r>
           <a:endParaRPr lang="pt-BR" sz="2400" kern="1200" dirty="0"/>
         </a:p>
@@ -2348,7 +4091,1563 @@
 </dgm:layoutDef>
 </file>
 
+<file path=ppt/diagrams/layout2.xml><?xml version="1.0" encoding="utf-8"?>
+<dgm:layoutDef xmlns:dgm="http://schemas.openxmlformats.org/drawingml/2006/diagram" xmlns:a="http://schemas.openxmlformats.org/drawingml/2006/main" uniqueId="urn:microsoft.com/office/officeart/2005/8/layout/hierarchy4">
+  <dgm:title val=""/>
+  <dgm:desc val=""/>
+  <dgm:catLst>
+    <dgm:cat type="hierarchy" pri="4000"/>
+    <dgm:cat type="list" pri="24000"/>
+    <dgm:cat type="relationship" pri="10000"/>
+  </dgm:catLst>
+  <dgm:sampData>
+    <dgm:dataModel>
+      <dgm:ptLst>
+        <dgm:pt modelId="0" type="doc"/>
+        <dgm:pt modelId="1">
+          <dgm:prSet phldr="1"/>
+        </dgm:pt>
+        <dgm:pt modelId="2">
+          <dgm:prSet phldr="1"/>
+        </dgm:pt>
+        <dgm:pt modelId="21">
+          <dgm:prSet phldr="1"/>
+        </dgm:pt>
+        <dgm:pt modelId="22">
+          <dgm:prSet phldr="1"/>
+        </dgm:pt>
+        <dgm:pt modelId="3">
+          <dgm:prSet phldr="1"/>
+        </dgm:pt>
+        <dgm:pt modelId="31">
+          <dgm:prSet phldr="1"/>
+        </dgm:pt>
+      </dgm:ptLst>
+      <dgm:cxnLst>
+        <dgm:cxn modelId="4" srcId="0" destId="1" srcOrd="0" destOrd="0"/>
+        <dgm:cxn modelId="5" srcId="1" destId="2" srcOrd="0" destOrd="0"/>
+        <dgm:cxn modelId="6" srcId="1" destId="3" srcOrd="1" destOrd="0"/>
+        <dgm:cxn modelId="23" srcId="2" destId="21" srcOrd="0" destOrd="0"/>
+        <dgm:cxn modelId="24" srcId="2" destId="22" srcOrd="1" destOrd="0"/>
+        <dgm:cxn modelId="33" srcId="3" destId="31" srcOrd="0" destOrd="0"/>
+      </dgm:cxnLst>
+      <dgm:bg/>
+      <dgm:whole/>
+    </dgm:dataModel>
+  </dgm:sampData>
+  <dgm:styleData>
+    <dgm:dataModel>
+      <dgm:ptLst>
+        <dgm:pt modelId="0" type="doc"/>
+        <dgm:pt modelId="1"/>
+        <dgm:pt modelId="11"/>
+        <dgm:pt modelId="12"/>
+      </dgm:ptLst>
+      <dgm:cxnLst>
+        <dgm:cxn modelId="2" srcId="0" destId="1" srcOrd="0" destOrd="0"/>
+        <dgm:cxn modelId="13" srcId="1" destId="11" srcOrd="0" destOrd="0"/>
+        <dgm:cxn modelId="14" srcId="1" destId="12" srcOrd="1" destOrd="0"/>
+      </dgm:cxnLst>
+      <dgm:bg/>
+      <dgm:whole/>
+    </dgm:dataModel>
+  </dgm:styleData>
+  <dgm:clrData>
+    <dgm:dataModel>
+      <dgm:ptLst>
+        <dgm:pt modelId="0" type="doc"/>
+        <dgm:pt modelId="1"/>
+        <dgm:pt modelId="2"/>
+        <dgm:pt modelId="21"/>
+        <dgm:pt modelId="211"/>
+        <dgm:pt modelId="3"/>
+        <dgm:pt modelId="31"/>
+        <dgm:pt modelId="311"/>
+      </dgm:ptLst>
+      <dgm:cxnLst>
+        <dgm:cxn modelId="4" srcId="0" destId="1" srcOrd="0" destOrd="0"/>
+        <dgm:cxn modelId="5" srcId="1" destId="2" srcOrd="0" destOrd="0"/>
+        <dgm:cxn modelId="6" srcId="1" destId="3" srcOrd="1" destOrd="0"/>
+        <dgm:cxn modelId="23" srcId="2" destId="21" srcOrd="0" destOrd="0"/>
+        <dgm:cxn modelId="24" srcId="21" destId="211" srcOrd="0" destOrd="0"/>
+        <dgm:cxn modelId="33" srcId="3" destId="31" srcOrd="0" destOrd="0"/>
+        <dgm:cxn modelId="34" srcId="31" destId="311" srcOrd="0" destOrd="0"/>
+      </dgm:cxnLst>
+      <dgm:bg/>
+      <dgm:whole/>
+    </dgm:dataModel>
+  </dgm:clrData>
+  <dgm:layoutNode name="Name0">
+    <dgm:varLst>
+      <dgm:chPref val="1"/>
+      <dgm:dir/>
+      <dgm:animOne val="branch"/>
+      <dgm:animLvl val="lvl"/>
+      <dgm:resizeHandles/>
+    </dgm:varLst>
+    <dgm:choose name="Name1">
+      <dgm:if name="Name2" func="var" arg="dir" op="equ" val="norm">
+        <dgm:alg type="lin">
+          <dgm:param type="linDir" val="fromL"/>
+          <dgm:param type="nodeVertAlign" val="t"/>
+        </dgm:alg>
+      </dgm:if>
+      <dgm:else name="Name3">
+        <dgm:alg type="lin">
+          <dgm:param type="linDir" val="fromR"/>
+          <dgm:param type="nodeVertAlign" val="t"/>
+        </dgm:alg>
+      </dgm:else>
+    </dgm:choose>
+    <dgm:shape xmlns:r="http://schemas.openxmlformats.org/officeDocument/2006/relationships" r:blip="">
+      <dgm:adjLst/>
+    </dgm:shape>
+    <dgm:presOf/>
+    <dgm:constrLst>
+      <dgm:constr type="w" for="ch" forName="vertOne" refType="w"/>
+      <dgm:constr type="w" for="des" forName="horzOne" refType="w"/>
+      <dgm:constr type="w" for="des" forName="txOne" refType="w"/>
+      <dgm:constr type="w" for="des" forName="vertTwo" refType="w"/>
+      <dgm:constr type="w" for="des" forName="horzTwo" refType="w"/>
+      <dgm:constr type="w" for="des" forName="txTwo" refType="w"/>
+      <dgm:constr type="w" for="des" forName="vertThree" refType="w"/>
+      <dgm:constr type="w" for="des" forName="horzThree" refType="w"/>
+      <dgm:constr type="w" for="des" forName="txThree" refType="w"/>
+      <dgm:constr type="w" for="des" forName="vertFour" refType="w"/>
+      <dgm:constr type="w" for="des" forName="horzFour" refType="w"/>
+      <dgm:constr type="w" for="des" forName="txFour" refType="w"/>
+      <dgm:constr type="h" for="des" ptType="node" op="equ"/>
+      <dgm:constr type="h" for="des" forName="txOne" refType="h"/>
+      <dgm:constr type="userH" for="des" ptType="node" refType="h" refFor="des" refForName="txOne"/>
+      <dgm:constr type="primFontSz" for="des" forName="txOne" val="65"/>
+      <dgm:constr type="primFontSz" for="des" forName="txTwo" val="65"/>
+      <dgm:constr type="primFontSz" for="des" forName="txTwo" refType="primFontSz" refFor="des" refForName="txOne" op="lte"/>
+      <dgm:constr type="primFontSz" for="des" forName="txThree" val="65"/>
+      <dgm:constr type="primFontSz" for="des" forName="txThree" refType="primFontSz" refFor="des" refForName="txOne" op="lte"/>
+      <dgm:constr type="primFontSz" for="des" forName="txThree" refType="primFontSz" refFor="des" refForName="txTwo" op="lte"/>
+      <dgm:constr type="primFontSz" for="des" forName="txFour" val="65"/>
+      <dgm:constr type="primFontSz" for="des" forName="txFour" refType="primFontSz" refFor="des" refForName="txOne" op="lte"/>
+      <dgm:constr type="primFontSz" for="des" forName="txFour" refType="primFontSz" refFor="des" refForName="txTwo" op="lte"/>
+      <dgm:constr type="primFontSz" for="des" forName="txFour" refType="primFontSz" refFor="des" refForName="txThree" op="lte"/>
+      <dgm:constr type="w" for="des" forName="sibSpaceOne" refType="w" fact="0.168"/>
+      <dgm:constr type="w" for="des" forName="sibSpaceTwo" refType="w" refFor="des" refForName="sibSpaceOne" op="equ" fact="0.5"/>
+      <dgm:constr type="w" for="des" forName="sibSpaceThree" refType="w" refFor="des" refForName="sibSpaceTwo" op="equ" fact="0.5"/>
+      <dgm:constr type="w" for="des" forName="sibSpaceFour" refType="w" refFor="des" refForName="sibSpaceThree" op="equ" fact="0.5"/>
+      <dgm:constr type="h" for="des" forName="parTransOne" refType="w" fact="0.056"/>
+      <dgm:constr type="h" for="des" forName="parTransTwo" refType="h" refFor="des" refForName="parTransOne" op="equ"/>
+      <dgm:constr type="h" for="des" forName="parTransThree" refType="h" refFor="des" refForName="parTransTwo" op="equ"/>
+      <dgm:constr type="h" for="des" forName="parTransFour" refType="h" refFor="des" refForName="parTransThree" op="equ"/>
+    </dgm:constrLst>
+    <dgm:ruleLst/>
+    <dgm:forEach name="Name4" axis="ch" ptType="node">
+      <dgm:layoutNode name="vertOne">
+        <dgm:alg type="lin">
+          <dgm:param type="linDir" val="fromT"/>
+        </dgm:alg>
+        <dgm:shape xmlns:r="http://schemas.openxmlformats.org/officeDocument/2006/relationships" r:blip="">
+          <dgm:adjLst/>
+        </dgm:shape>
+        <dgm:presOf/>
+        <dgm:constrLst>
+          <dgm:constr type="w" for="ch" forName="txOne" refType="w" refFor="ch" refForName="horzOne" op="gte"/>
+        </dgm:constrLst>
+        <dgm:ruleLst/>
+        <dgm:layoutNode name="txOne" styleLbl="node0">
+          <dgm:varLst>
+            <dgm:chPref val="3"/>
+          </dgm:varLst>
+          <dgm:alg type="tx"/>
+          <dgm:shape xmlns:r="http://schemas.openxmlformats.org/officeDocument/2006/relationships" type="roundRect" r:blip="">
+            <dgm:adjLst>
+              <dgm:adj idx="1" val="0.1"/>
+            </dgm:adjLst>
+          </dgm:shape>
+          <dgm:presOf axis="self"/>
+          <dgm:constrLst>
+            <dgm:constr type="tMarg" refType="primFontSz" fact="0.3"/>
+            <dgm:constr type="bMarg" refType="primFontSz" fact="0.3"/>
+            <dgm:constr type="lMarg" refType="primFontSz" fact="0.3"/>
+            <dgm:constr type="rMarg" refType="primFontSz" fact="0.3"/>
+          </dgm:constrLst>
+          <dgm:ruleLst>
+            <dgm:rule type="primFontSz" val="5" fact="NaN" max="NaN"/>
+          </dgm:ruleLst>
+        </dgm:layoutNode>
+        <dgm:choose name="Name5">
+          <dgm:if name="Name6" axis="des" ptType="node" func="cnt" op="gt" val="0">
+            <dgm:layoutNode name="parTransOne">
+              <dgm:alg type="sp"/>
+              <dgm:shape xmlns:r="http://schemas.openxmlformats.org/officeDocument/2006/relationships" r:blip="">
+                <dgm:adjLst/>
+              </dgm:shape>
+              <dgm:presOf/>
+              <dgm:constrLst/>
+              <dgm:ruleLst/>
+            </dgm:layoutNode>
+          </dgm:if>
+          <dgm:else name="Name7"/>
+        </dgm:choose>
+        <dgm:layoutNode name="horzOne">
+          <dgm:choose name="Name8">
+            <dgm:if name="Name9" func="var" arg="dir" op="equ" val="norm">
+              <dgm:alg type="lin">
+                <dgm:param type="linDir" val="fromL"/>
+                <dgm:param type="nodeVertAlign" val="t"/>
+              </dgm:alg>
+            </dgm:if>
+            <dgm:else name="Name10">
+              <dgm:alg type="lin">
+                <dgm:param type="linDir" val="fromR"/>
+                <dgm:param type="nodeVertAlign" val="t"/>
+              </dgm:alg>
+            </dgm:else>
+          </dgm:choose>
+          <dgm:shape xmlns:r="http://schemas.openxmlformats.org/officeDocument/2006/relationships" r:blip="">
+            <dgm:adjLst/>
+          </dgm:shape>
+          <dgm:presOf/>
+          <dgm:constrLst/>
+          <dgm:ruleLst>
+            <dgm:rule type="w" val="INF" fact="NaN" max="NaN"/>
+          </dgm:ruleLst>
+          <dgm:forEach name="Name11" axis="ch" ptType="node">
+            <dgm:layoutNode name="vertTwo">
+              <dgm:alg type="lin">
+                <dgm:param type="linDir" val="fromT"/>
+              </dgm:alg>
+              <dgm:shape xmlns:r="http://schemas.openxmlformats.org/officeDocument/2006/relationships" r:blip="">
+                <dgm:adjLst/>
+              </dgm:shape>
+              <dgm:presOf/>
+              <dgm:constrLst>
+                <dgm:constr type="w" for="ch" forName="txTwo" refType="w" refFor="ch" refForName="horzTwo" op="gte"/>
+              </dgm:constrLst>
+              <dgm:ruleLst/>
+              <dgm:layoutNode name="txTwo">
+                <dgm:varLst>
+                  <dgm:chPref val="3"/>
+                </dgm:varLst>
+                <dgm:alg type="tx"/>
+                <dgm:shape xmlns:r="http://schemas.openxmlformats.org/officeDocument/2006/relationships" type="roundRect" r:blip="">
+                  <dgm:adjLst>
+                    <dgm:adj idx="1" val="0.1"/>
+                  </dgm:adjLst>
+                </dgm:shape>
+                <dgm:presOf axis="self"/>
+                <dgm:constrLst>
+                  <dgm:constr type="userH"/>
+                  <dgm:constr type="h" refType="userH"/>
+                  <dgm:constr type="tMarg" refType="primFontSz" fact="0.3"/>
+                  <dgm:constr type="bMarg" refType="primFontSz" fact="0.3"/>
+                  <dgm:constr type="lMarg" refType="primFontSz" fact="0.3"/>
+                  <dgm:constr type="rMarg" refType="primFontSz" fact="0.3"/>
+                </dgm:constrLst>
+                <dgm:ruleLst>
+                  <dgm:rule type="primFontSz" val="5" fact="NaN" max="NaN"/>
+                </dgm:ruleLst>
+              </dgm:layoutNode>
+              <dgm:choose name="Name12">
+                <dgm:if name="Name13" axis="des" ptType="node" func="cnt" op="gt" val="0">
+                  <dgm:layoutNode name="parTransTwo">
+                    <dgm:alg type="sp"/>
+                    <dgm:shape xmlns:r="http://schemas.openxmlformats.org/officeDocument/2006/relationships" r:blip="">
+                      <dgm:adjLst/>
+                    </dgm:shape>
+                    <dgm:presOf/>
+                    <dgm:constrLst/>
+                    <dgm:ruleLst/>
+                  </dgm:layoutNode>
+                </dgm:if>
+                <dgm:else name="Name14"/>
+              </dgm:choose>
+              <dgm:layoutNode name="horzTwo">
+                <dgm:choose name="Name15">
+                  <dgm:if name="Name16" func="var" arg="dir" op="equ" val="norm">
+                    <dgm:alg type="lin">
+                      <dgm:param type="linDir" val="fromL"/>
+                      <dgm:param type="nodeVertAlign" val="t"/>
+                    </dgm:alg>
+                  </dgm:if>
+                  <dgm:else name="Name17">
+                    <dgm:alg type="lin">
+                      <dgm:param type="linDir" val="fromR"/>
+                      <dgm:param type="nodeVertAlign" val="t"/>
+                    </dgm:alg>
+                  </dgm:else>
+                </dgm:choose>
+                <dgm:shape xmlns:r="http://schemas.openxmlformats.org/officeDocument/2006/relationships" r:blip="">
+                  <dgm:adjLst/>
+                </dgm:shape>
+                <dgm:presOf/>
+                <dgm:constrLst/>
+                <dgm:ruleLst>
+                  <dgm:rule type="w" val="INF" fact="NaN" max="NaN"/>
+                </dgm:ruleLst>
+                <dgm:forEach name="Name18" axis="ch" ptType="node">
+                  <dgm:layoutNode name="vertThree">
+                    <dgm:alg type="lin">
+                      <dgm:param type="linDir" val="fromT"/>
+                    </dgm:alg>
+                    <dgm:shape xmlns:r="http://schemas.openxmlformats.org/officeDocument/2006/relationships" r:blip="">
+                      <dgm:adjLst/>
+                    </dgm:shape>
+                    <dgm:presOf/>
+                    <dgm:constrLst>
+                      <dgm:constr type="w" for="ch" forName="txThree" refType="w" refFor="ch" refForName="horzThree" op="gte"/>
+                    </dgm:constrLst>
+                    <dgm:ruleLst/>
+                    <dgm:layoutNode name="txThree">
+                      <dgm:varLst>
+                        <dgm:chPref val="3"/>
+                      </dgm:varLst>
+                      <dgm:alg type="tx"/>
+                      <dgm:shape xmlns:r="http://schemas.openxmlformats.org/officeDocument/2006/relationships" type="roundRect" r:blip="">
+                        <dgm:adjLst>
+                          <dgm:adj idx="1" val="0.1"/>
+                        </dgm:adjLst>
+                      </dgm:shape>
+                      <dgm:presOf axis="self"/>
+                      <dgm:constrLst>
+                        <dgm:constr type="userH"/>
+                        <dgm:constr type="h" refType="userH"/>
+                        <dgm:constr type="tMarg" refType="primFontSz" fact="0.3"/>
+                        <dgm:constr type="bMarg" refType="primFontSz" fact="0.3"/>
+                        <dgm:constr type="lMarg" refType="primFontSz" fact="0.3"/>
+                        <dgm:constr type="rMarg" refType="primFontSz" fact="0.3"/>
+                      </dgm:constrLst>
+                      <dgm:ruleLst>
+                        <dgm:rule type="primFontSz" val="5" fact="NaN" max="NaN"/>
+                      </dgm:ruleLst>
+                    </dgm:layoutNode>
+                    <dgm:choose name="Name19">
+                      <dgm:if name="Name20" axis="des" ptType="node" func="cnt" op="gt" val="0">
+                        <dgm:layoutNode name="parTransThree">
+                          <dgm:alg type="sp"/>
+                          <dgm:shape xmlns:r="http://schemas.openxmlformats.org/officeDocument/2006/relationships" r:blip="">
+                            <dgm:adjLst/>
+                          </dgm:shape>
+                          <dgm:presOf/>
+                          <dgm:constrLst/>
+                          <dgm:ruleLst/>
+                        </dgm:layoutNode>
+                      </dgm:if>
+                      <dgm:else name="Name21"/>
+                    </dgm:choose>
+                    <dgm:layoutNode name="horzThree">
+                      <dgm:choose name="Name22">
+                        <dgm:if name="Name23" func="var" arg="dir" op="equ" val="norm">
+                          <dgm:alg type="lin">
+                            <dgm:param type="linDir" val="fromL"/>
+                            <dgm:param type="nodeVertAlign" val="t"/>
+                          </dgm:alg>
+                        </dgm:if>
+                        <dgm:else name="Name24">
+                          <dgm:alg type="lin">
+                            <dgm:param type="linDir" val="fromR"/>
+                            <dgm:param type="nodeVertAlign" val="t"/>
+                          </dgm:alg>
+                        </dgm:else>
+                      </dgm:choose>
+                      <dgm:shape xmlns:r="http://schemas.openxmlformats.org/officeDocument/2006/relationships" r:blip="">
+                        <dgm:adjLst/>
+                      </dgm:shape>
+                      <dgm:presOf/>
+                      <dgm:constrLst/>
+                      <dgm:ruleLst>
+                        <dgm:rule type="w" val="INF" fact="NaN" max="NaN"/>
+                      </dgm:ruleLst>
+                      <dgm:forEach name="repeat" axis="ch" ptType="node">
+                        <dgm:layoutNode name="vertFour">
+                          <dgm:varLst>
+                            <dgm:chPref val="3"/>
+                          </dgm:varLst>
+                          <dgm:alg type="lin">
+                            <dgm:param type="linDir" val="fromT"/>
+                          </dgm:alg>
+                          <dgm:shape xmlns:r="http://schemas.openxmlformats.org/officeDocument/2006/relationships" r:blip="">
+                            <dgm:adjLst/>
+                          </dgm:shape>
+                          <dgm:presOf/>
+                          <dgm:constrLst>
+                            <dgm:constr type="w" for="ch" forName="txFour" refType="w" refFor="ch" refForName="horzFour" op="gte"/>
+                          </dgm:constrLst>
+                          <dgm:ruleLst/>
+                          <dgm:layoutNode name="txFour">
+                            <dgm:varLst>
+                              <dgm:chPref val="3"/>
+                            </dgm:varLst>
+                            <dgm:alg type="tx"/>
+                            <dgm:shape xmlns:r="http://schemas.openxmlformats.org/officeDocument/2006/relationships" type="roundRect" r:blip="">
+                              <dgm:adjLst>
+                                <dgm:adj idx="1" val="0.1"/>
+                              </dgm:adjLst>
+                            </dgm:shape>
+                            <dgm:presOf axis="self"/>
+                            <dgm:constrLst>
+                              <dgm:constr type="userH"/>
+                              <dgm:constr type="h" refType="userH"/>
+                              <dgm:constr type="tMarg" refType="primFontSz" fact="0.3"/>
+                              <dgm:constr type="bMarg" refType="primFontSz" fact="0.3"/>
+                              <dgm:constr type="lMarg" refType="primFontSz" fact="0.3"/>
+                              <dgm:constr type="rMarg" refType="primFontSz" fact="0.3"/>
+                            </dgm:constrLst>
+                            <dgm:ruleLst>
+                              <dgm:rule type="primFontSz" val="5" fact="NaN" max="NaN"/>
+                            </dgm:ruleLst>
+                          </dgm:layoutNode>
+                          <dgm:choose name="Name25">
+                            <dgm:if name="Name26" axis="des" ptType="node" func="cnt" op="gt" val="0">
+                              <dgm:layoutNode name="parTransFour">
+                                <dgm:alg type="sp"/>
+                                <dgm:shape xmlns:r="http://schemas.openxmlformats.org/officeDocument/2006/relationships" r:blip="">
+                                  <dgm:adjLst/>
+                                </dgm:shape>
+                                <dgm:presOf/>
+                                <dgm:constrLst/>
+                                <dgm:ruleLst/>
+                              </dgm:layoutNode>
+                            </dgm:if>
+                            <dgm:else name="Name27"/>
+                          </dgm:choose>
+                          <dgm:layoutNode name="horzFour">
+                            <dgm:choose name="Name28">
+                              <dgm:if name="Name29" func="var" arg="dir" op="equ" val="norm">
+                                <dgm:alg type="lin">
+                                  <dgm:param type="linDir" val="fromL"/>
+                                  <dgm:param type="nodeVertAlign" val="t"/>
+                                </dgm:alg>
+                              </dgm:if>
+                              <dgm:else name="Name30">
+                                <dgm:alg type="lin">
+                                  <dgm:param type="linDir" val="fromR"/>
+                                  <dgm:param type="nodeVertAlign" val="t"/>
+                                </dgm:alg>
+                              </dgm:else>
+                            </dgm:choose>
+                            <dgm:shape xmlns:r="http://schemas.openxmlformats.org/officeDocument/2006/relationships" r:blip="">
+                              <dgm:adjLst/>
+                            </dgm:shape>
+                            <dgm:presOf/>
+                            <dgm:constrLst/>
+                            <dgm:ruleLst>
+                              <dgm:rule type="w" val="INF" fact="NaN" max="NaN"/>
+                            </dgm:ruleLst>
+                            <dgm:forEach name="Name31" ref="repeat"/>
+                          </dgm:layoutNode>
+                        </dgm:layoutNode>
+                        <dgm:choose name="Name32">
+                          <dgm:if name="Name33" axis="self" ptType="node" func="revPos" op="gte" val="2">
+                            <dgm:forEach name="Name34" axis="followSib" ptType="sibTrans" cnt="1">
+                              <dgm:layoutNode name="sibSpaceFour">
+                                <dgm:alg type="sp"/>
+                                <dgm:shape xmlns:r="http://schemas.openxmlformats.org/officeDocument/2006/relationships" r:blip="">
+                                  <dgm:adjLst/>
+                                </dgm:shape>
+                                <dgm:presOf/>
+                                <dgm:constrLst/>
+                                <dgm:ruleLst/>
+                              </dgm:layoutNode>
+                            </dgm:forEach>
+                          </dgm:if>
+                          <dgm:else name="Name35"/>
+                        </dgm:choose>
+                      </dgm:forEach>
+                    </dgm:layoutNode>
+                  </dgm:layoutNode>
+                  <dgm:choose name="Name36">
+                    <dgm:if name="Name37" axis="self" ptType="node" func="revPos" op="gte" val="2">
+                      <dgm:forEach name="Name38" axis="followSib" ptType="sibTrans" cnt="1">
+                        <dgm:layoutNode name="sibSpaceThree">
+                          <dgm:alg type="sp"/>
+                          <dgm:shape xmlns:r="http://schemas.openxmlformats.org/officeDocument/2006/relationships" r:blip="">
+                            <dgm:adjLst/>
+                          </dgm:shape>
+                          <dgm:presOf/>
+                          <dgm:constrLst/>
+                          <dgm:ruleLst/>
+                        </dgm:layoutNode>
+                      </dgm:forEach>
+                    </dgm:if>
+                    <dgm:else name="Name39"/>
+                  </dgm:choose>
+                </dgm:forEach>
+              </dgm:layoutNode>
+            </dgm:layoutNode>
+            <dgm:choose name="Name40">
+              <dgm:if name="Name41" axis="self" ptType="node" func="revPos" op="gte" val="2">
+                <dgm:forEach name="Name42" axis="followSib" ptType="sibTrans" cnt="1">
+                  <dgm:layoutNode name="sibSpaceTwo">
+                    <dgm:alg type="sp"/>
+                    <dgm:shape xmlns:r="http://schemas.openxmlformats.org/officeDocument/2006/relationships" r:blip="">
+                      <dgm:adjLst/>
+                    </dgm:shape>
+                    <dgm:presOf/>
+                    <dgm:constrLst/>
+                    <dgm:ruleLst/>
+                  </dgm:layoutNode>
+                </dgm:forEach>
+              </dgm:if>
+              <dgm:else name="Name43"/>
+            </dgm:choose>
+          </dgm:forEach>
+        </dgm:layoutNode>
+      </dgm:layoutNode>
+      <dgm:choose name="Name44">
+        <dgm:if name="Name45" axis="self" ptType="node" func="revPos" op="gte" val="2">
+          <dgm:forEach name="Name46" axis="followSib" ptType="sibTrans" cnt="1">
+            <dgm:layoutNode name="sibSpaceOne">
+              <dgm:alg type="sp"/>
+              <dgm:shape xmlns:r="http://schemas.openxmlformats.org/officeDocument/2006/relationships" r:blip="">
+                <dgm:adjLst/>
+              </dgm:shape>
+              <dgm:presOf/>
+              <dgm:constrLst/>
+              <dgm:ruleLst/>
+            </dgm:layoutNode>
+          </dgm:forEach>
+        </dgm:if>
+        <dgm:else name="Name47"/>
+      </dgm:choose>
+    </dgm:forEach>
+  </dgm:layoutNode>
+</dgm:layoutDef>
+</file>
+
 <file path=ppt/diagrams/quickStyle1.xml><?xml version="1.0" encoding="utf-8"?>
+<dgm:styleDef xmlns:dgm="http://schemas.openxmlformats.org/drawingml/2006/diagram" xmlns:a="http://schemas.openxmlformats.org/drawingml/2006/main" uniqueId="urn:microsoft.com/office/officeart/2005/8/quickstyle/simple1">
+  <dgm:title val=""/>
+  <dgm:desc val=""/>
+  <dgm:catLst>
+    <dgm:cat type="simple" pri="10100"/>
+  </dgm:catLst>
+  <dgm:scene3d>
+    <a:camera prst="orthographicFront"/>
+    <a:lightRig rig="threePt" dir="t"/>
+  </dgm:scene3d>
+  <dgm:styleLbl name="node0">
+    <dgm:scene3d>
+      <a:camera prst="orthographicFront"/>
+      <a:lightRig rig="threePt" dir="t"/>
+    </dgm:scene3d>
+    <dgm:sp3d/>
+    <dgm:txPr/>
+    <dgm:style>
+      <a:lnRef idx="2">
+        <a:scrgbClr r="0" g="0" b="0"/>
+      </a:lnRef>
+      <a:fillRef idx="1">
+        <a:scrgbClr r="0" g="0" b="0"/>
+      </a:fillRef>
+      <a:effectRef idx="0">
+        <a:scrgbClr r="0" g="0" b="0"/>
+      </a:effectRef>
+      <a:fontRef idx="minor">
+        <a:schemeClr val="lt1"/>
+      </a:fontRef>
+    </dgm:style>
+  </dgm:styleLbl>
+  <dgm:styleLbl name="lnNode1">
+    <dgm:scene3d>
+      <a:camera prst="orthographicFront"/>
+      <a:lightRig rig="threePt" dir="t"/>
+    </dgm:scene3d>
+    <dgm:sp3d/>
+    <dgm:txPr/>
+    <dgm:style>
+      <a:lnRef idx="2">
+        <a:scrgbClr r="0" g="0" b="0"/>
+      </a:lnRef>
+      <a:fillRef idx="1">
+        <a:scrgbClr r="0" g="0" b="0"/>
+      </a:fillRef>
+      <a:effectRef idx="0">
+        <a:scrgbClr r="0" g="0" b="0"/>
+      </a:effectRef>
+      <a:fontRef idx="minor">
+        <a:schemeClr val="lt1"/>
+      </a:fontRef>
+    </dgm:style>
+  </dgm:styleLbl>
+  <dgm:styleLbl name="vennNode1">
+    <dgm:scene3d>
+      <a:camera prst="orthographicFront"/>
+      <a:lightRig rig="threePt" dir="t"/>
+    </dgm:scene3d>
+    <dgm:sp3d/>
+    <dgm:txPr/>
+    <dgm:style>
+      <a:lnRef idx="2">
+        <a:scrgbClr r="0" g="0" b="0"/>
+      </a:lnRef>
+      <a:fillRef idx="1">
+        <a:scrgbClr r="0" g="0" b="0"/>
+      </a:fillRef>
+      <a:effectRef idx="0">
+        <a:scrgbClr r="0" g="0" b="0"/>
+      </a:effectRef>
+      <a:fontRef idx="minor">
+        <a:schemeClr val="tx1"/>
+      </a:fontRef>
+    </dgm:style>
+  </dgm:styleLbl>
+  <dgm:styleLbl name="alignNode1">
+    <dgm:scene3d>
+      <a:camera prst="orthographicFront"/>
+      <a:lightRig rig="threePt" dir="t"/>
+    </dgm:scene3d>
+    <dgm:sp3d/>
+    <dgm:txPr/>
+    <dgm:style>
+      <a:lnRef idx="2">
+        <a:scrgbClr r="0" g="0" b="0"/>
+      </a:lnRef>
+      <a:fillRef idx="1">
+        <a:scrgbClr r="0" g="0" b="0"/>
+      </a:fillRef>
+      <a:effectRef idx="0">
+        <a:scrgbClr r="0" g="0" b="0"/>
+      </a:effectRef>
+      <a:fontRef idx="minor">
+        <a:schemeClr val="lt1"/>
+      </a:fontRef>
+    </dgm:style>
+  </dgm:styleLbl>
+  <dgm:styleLbl name="node1">
+    <dgm:scene3d>
+      <a:camera prst="orthographicFront"/>
+      <a:lightRig rig="threePt" dir="t"/>
+    </dgm:scene3d>
+    <dgm:sp3d/>
+    <dgm:txPr/>
+    <dgm:style>
+      <a:lnRef idx="2">
+        <a:scrgbClr r="0" g="0" b="0"/>
+      </a:lnRef>
+      <a:fillRef idx="1">
+        <a:scrgbClr r="0" g="0" b="0"/>
+      </a:fillRef>
+      <a:effectRef idx="0">
+        <a:scrgbClr r="0" g="0" b="0"/>
+      </a:effectRef>
+      <a:fontRef idx="minor">
+        <a:schemeClr val="lt1"/>
+      </a:fontRef>
+    </dgm:style>
+  </dgm:styleLbl>
+  <dgm:styleLbl name="node2">
+    <dgm:scene3d>
+      <a:camera prst="orthographicFront"/>
+      <a:lightRig rig="threePt" dir="t"/>
+    </dgm:scene3d>
+    <dgm:sp3d/>
+    <dgm:txPr/>
+    <dgm:style>
+      <a:lnRef idx="2">
+        <a:scrgbClr r="0" g="0" b="0"/>
+      </a:lnRef>
+      <a:fillRef idx="1">
+        <a:scrgbClr r="0" g="0" b="0"/>
+      </a:fillRef>
+      <a:effectRef idx="0">
+        <a:scrgbClr r="0" g="0" b="0"/>
+      </a:effectRef>
+      <a:fontRef idx="minor">
+        <a:schemeClr val="lt1"/>
+      </a:fontRef>
+    </dgm:style>
+  </dgm:styleLbl>
+  <dgm:styleLbl name="node3">
+    <dgm:scene3d>
+      <a:camera prst="orthographicFront"/>
+      <a:lightRig rig="threePt" dir="t"/>
+    </dgm:scene3d>
+    <dgm:sp3d/>
+    <dgm:txPr/>
+    <dgm:style>
+      <a:lnRef idx="2">
+        <a:scrgbClr r="0" g="0" b="0"/>
+      </a:lnRef>
+      <a:fillRef idx="1">
+        <a:scrgbClr r="0" g="0" b="0"/>
+      </a:fillRef>
+      <a:effectRef idx="0">
+        <a:scrgbClr r="0" g="0" b="0"/>
+      </a:effectRef>
+      <a:fontRef idx="minor">
+        <a:schemeClr val="lt1"/>
+      </a:fontRef>
+    </dgm:style>
+  </dgm:styleLbl>
+  <dgm:styleLbl name="node4">
+    <dgm:scene3d>
+      <a:camera prst="orthographicFront"/>
+      <a:lightRig rig="threePt" dir="t"/>
+    </dgm:scene3d>
+    <dgm:sp3d/>
+    <dgm:txPr/>
+    <dgm:style>
+      <a:lnRef idx="2">
+        <a:scrgbClr r="0" g="0" b="0"/>
+      </a:lnRef>
+      <a:fillRef idx="1">
+        <a:scrgbClr r="0" g="0" b="0"/>
+      </a:fillRef>
+      <a:effectRef idx="0">
+        <a:scrgbClr r="0" g="0" b="0"/>
+      </a:effectRef>
+      <a:fontRef idx="minor">
+        <a:schemeClr val="lt1"/>
+      </a:fontRef>
+    </dgm:style>
+  </dgm:styleLbl>
+  <dgm:styleLbl name="fgImgPlace1">
+    <dgm:scene3d>
+      <a:camera prst="orthographicFront"/>
+      <a:lightRig rig="threePt" dir="t"/>
+    </dgm:scene3d>
+    <dgm:sp3d/>
+    <dgm:txPr/>
+    <dgm:style>
+      <a:lnRef idx="2">
+        <a:scrgbClr r="0" g="0" b="0"/>
+      </a:lnRef>
+      <a:fillRef idx="1">
+        <a:scrgbClr r="0" g="0" b="0"/>
+      </a:fillRef>
+      <a:effectRef idx="0">
+        <a:scrgbClr r="0" g="0" b="0"/>
+      </a:effectRef>
+      <a:fontRef idx="minor"/>
+    </dgm:style>
+  </dgm:styleLbl>
+  <dgm:styleLbl name="alignImgPlace1">
+    <dgm:scene3d>
+      <a:camera prst="orthographicFront"/>
+      <a:lightRig rig="threePt" dir="t"/>
+    </dgm:scene3d>
+    <dgm:sp3d/>
+    <dgm:txPr/>
+    <dgm:style>
+      <a:lnRef idx="2">
+        <a:scrgbClr r="0" g="0" b="0"/>
+      </a:lnRef>
+      <a:fillRef idx="1">
+        <a:scrgbClr r="0" g="0" b="0"/>
+      </a:fillRef>
+      <a:effectRef idx="0">
+        <a:scrgbClr r="0" g="0" b="0"/>
+      </a:effectRef>
+      <a:fontRef idx="minor"/>
+    </dgm:style>
+  </dgm:styleLbl>
+  <dgm:styleLbl name="bgImgPlace1">
+    <dgm:scene3d>
+      <a:camera prst="orthographicFront"/>
+      <a:lightRig rig="threePt" dir="t"/>
+    </dgm:scene3d>
+    <dgm:sp3d/>
+    <dgm:txPr/>
+    <dgm:style>
+      <a:lnRef idx="2">
+        <a:scrgbClr r="0" g="0" b="0"/>
+      </a:lnRef>
+      <a:fillRef idx="1">
+        <a:scrgbClr r="0" g="0" b="0"/>
+      </a:fillRef>
+      <a:effectRef idx="0">
+        <a:scrgbClr r="0" g="0" b="0"/>
+      </a:effectRef>
+      <a:fontRef idx="minor"/>
+    </dgm:style>
+  </dgm:styleLbl>
+  <dgm:styleLbl name="sibTrans2D1">
+    <dgm:scene3d>
+      <a:camera prst="orthographicFront"/>
+      <a:lightRig rig="threePt" dir="t"/>
+    </dgm:scene3d>
+    <dgm:sp3d/>
+    <dgm:txPr/>
+    <dgm:style>
+      <a:lnRef idx="0">
+        <a:scrgbClr r="0" g="0" b="0"/>
+      </a:lnRef>
+      <a:fillRef idx="1">
+        <a:scrgbClr r="0" g="0" b="0"/>
+      </a:fillRef>
+      <a:effectRef idx="0">
+        <a:scrgbClr r="0" g="0" b="0"/>
+      </a:effectRef>
+      <a:fontRef idx="minor">
+        <a:schemeClr val="lt1"/>
+      </a:fontRef>
+    </dgm:style>
+  </dgm:styleLbl>
+  <dgm:styleLbl name="fgSibTrans2D1">
+    <dgm:scene3d>
+      <a:camera prst="orthographicFront"/>
+      <a:lightRig rig="threePt" dir="t"/>
+    </dgm:scene3d>
+    <dgm:sp3d/>
+    <dgm:txPr/>
+    <dgm:style>
+      <a:lnRef idx="0">
+        <a:scrgbClr r="0" g="0" b="0"/>
+      </a:lnRef>
+      <a:fillRef idx="1">
+        <a:scrgbClr r="0" g="0" b="0"/>
+      </a:fillRef>
+      <a:effectRef idx="0">
+        <a:scrgbClr r="0" g="0" b="0"/>
+      </a:effectRef>
+      <a:fontRef idx="minor">
+        <a:schemeClr val="lt1"/>
+      </a:fontRef>
+    </dgm:style>
+  </dgm:styleLbl>
+  <dgm:styleLbl name="bgSibTrans2D1">
+    <dgm:scene3d>
+      <a:camera prst="orthographicFront"/>
+      <a:lightRig rig="threePt" dir="t"/>
+    </dgm:scene3d>
+    <dgm:sp3d/>
+    <dgm:txPr/>
+    <dgm:style>
+      <a:lnRef idx="0">
+        <a:scrgbClr r="0" g="0" b="0"/>
+      </a:lnRef>
+      <a:fillRef idx="1">
+        <a:scrgbClr r="0" g="0" b="0"/>
+      </a:fillRef>
+      <a:effectRef idx="0">
+        <a:scrgbClr r="0" g="0" b="0"/>
+      </a:effectRef>
+      <a:fontRef idx="minor">
+        <a:schemeClr val="lt1"/>
+      </a:fontRef>
+    </dgm:style>
+  </dgm:styleLbl>
+  <dgm:styleLbl name="sibTrans1D1">
+    <dgm:scene3d>
+      <a:camera prst="orthographicFront"/>
+      <a:lightRig rig="threePt" dir="t"/>
+    </dgm:scene3d>
+    <dgm:sp3d/>
+    <dgm:txPr/>
+    <dgm:style>
+      <a:lnRef idx="1">
+        <a:scrgbClr r="0" g="0" b="0"/>
+      </a:lnRef>
+      <a:fillRef idx="0">
+        <a:scrgbClr r="0" g="0" b="0"/>
+      </a:fillRef>
+      <a:effectRef idx="0">
+        <a:scrgbClr r="0" g="0" b="0"/>
+      </a:effectRef>
+      <a:fontRef idx="minor"/>
+    </dgm:style>
+  </dgm:styleLbl>
+  <dgm:styleLbl name="callout">
+    <dgm:scene3d>
+      <a:camera prst="orthographicFront"/>
+      <a:lightRig rig="threePt" dir="t"/>
+    </dgm:scene3d>
+    <dgm:sp3d/>
+    <dgm:txPr/>
+    <dgm:style>
+      <a:lnRef idx="2">
+        <a:scrgbClr r="0" g="0" b="0"/>
+      </a:lnRef>
+      <a:fillRef idx="1">
+        <a:scrgbClr r="0" g="0" b="0"/>
+      </a:fillRef>
+      <a:effectRef idx="0">
+        <a:scrgbClr r="0" g="0" b="0"/>
+      </a:effectRef>
+      <a:fontRef idx="minor"/>
+    </dgm:style>
+  </dgm:styleLbl>
+  <dgm:styleLbl name="asst0">
+    <dgm:scene3d>
+      <a:camera prst="orthographicFront"/>
+      <a:lightRig rig="threePt" dir="t"/>
+    </dgm:scene3d>
+    <dgm:sp3d/>
+    <dgm:txPr/>
+    <dgm:style>
+      <a:lnRef idx="2">
+        <a:scrgbClr r="0" g="0" b="0"/>
+      </a:lnRef>
+      <a:fillRef idx="1">
+        <a:scrgbClr r="0" g="0" b="0"/>
+      </a:fillRef>
+      <a:effectRef idx="0">
+        <a:scrgbClr r="0" g="0" b="0"/>
+      </a:effectRef>
+      <a:fontRef idx="minor">
+        <a:schemeClr val="lt1"/>
+      </a:fontRef>
+    </dgm:style>
+  </dgm:styleLbl>
+  <dgm:styleLbl name="asst1">
+    <dgm:scene3d>
+      <a:camera prst="orthographicFront"/>
+      <a:lightRig rig="threePt" dir="t"/>
+    </dgm:scene3d>
+    <dgm:sp3d/>
+    <dgm:txPr/>
+    <dgm:style>
+      <a:lnRef idx="2">
+        <a:scrgbClr r="0" g="0" b="0"/>
+      </a:lnRef>
+      <a:fillRef idx="1">
+        <a:scrgbClr r="0" g="0" b="0"/>
+      </a:fillRef>
+      <a:effectRef idx="0">
+        <a:scrgbClr r="0" g="0" b="0"/>
+      </a:effectRef>
+      <a:fontRef idx="minor">
+        <a:schemeClr val="lt1"/>
+      </a:fontRef>
+    </dgm:style>
+  </dgm:styleLbl>
+  <dgm:styleLbl name="asst2">
+    <dgm:scene3d>
+      <a:camera prst="orthographicFront"/>
+      <a:lightRig rig="threePt" dir="t"/>
+    </dgm:scene3d>
+    <dgm:sp3d/>
+    <dgm:txPr/>
+    <dgm:style>
+      <a:lnRef idx="2">
+        <a:scrgbClr r="0" g="0" b="0"/>
+      </a:lnRef>
+      <a:fillRef idx="1">
+        <a:scrgbClr r="0" g="0" b="0"/>
+      </a:fillRef>
+      <a:effectRef idx="0">
+        <a:scrgbClr r="0" g="0" b="0"/>
+      </a:effectRef>
+      <a:fontRef idx="minor">
+        <a:schemeClr val="lt1"/>
+      </a:fontRef>
+    </dgm:style>
+  </dgm:styleLbl>
+  <dgm:styleLbl name="asst3">
+    <dgm:scene3d>
+      <a:camera prst="orthographicFront"/>
+      <a:lightRig rig="threePt" dir="t"/>
+    </dgm:scene3d>
+    <dgm:sp3d/>
+    <dgm:txPr/>
+    <dgm:style>
+      <a:lnRef idx="2">
+        <a:scrgbClr r="0" g="0" b="0"/>
+      </a:lnRef>
+      <a:fillRef idx="1">
+        <a:scrgbClr r="0" g="0" b="0"/>
+      </a:fillRef>
+      <a:effectRef idx="0">
+        <a:scrgbClr r="0" g="0" b="0"/>
+      </a:effectRef>
+      <a:fontRef idx="minor">
+        <a:schemeClr val="lt1"/>
+      </a:fontRef>
+    </dgm:style>
+  </dgm:styleLbl>
+  <dgm:styleLbl name="asst4">
+    <dgm:scene3d>
+      <a:camera prst="orthographicFront"/>
+      <a:lightRig rig="threePt" dir="t"/>
+    </dgm:scene3d>
+    <dgm:sp3d/>
+    <dgm:txPr/>
+    <dgm:style>
+      <a:lnRef idx="2">
+        <a:scrgbClr r="0" g="0" b="0"/>
+      </a:lnRef>
+      <a:fillRef idx="1">
+        <a:scrgbClr r="0" g="0" b="0"/>
+      </a:fillRef>
+      <a:effectRef idx="0">
+        <a:scrgbClr r="0" g="0" b="0"/>
+      </a:effectRef>
+      <a:fontRef idx="minor">
+        <a:schemeClr val="lt1"/>
+      </a:fontRef>
+    </dgm:style>
+  </dgm:styleLbl>
+  <dgm:styleLbl name="parChTrans2D1">
+    <dgm:scene3d>
+      <a:camera prst="orthographicFront"/>
+      <a:lightRig rig="threePt" dir="t"/>
+    </dgm:scene3d>
+    <dgm:sp3d/>
+    <dgm:txPr/>
+    <dgm:style>
+      <a:lnRef idx="2">
+        <a:scrgbClr r="0" g="0" b="0"/>
+      </a:lnRef>
+      <a:fillRef idx="1">
+        <a:scrgbClr r="0" g="0" b="0"/>
+      </a:fillRef>
+      <a:effectRef idx="0">
+        <a:scrgbClr r="0" g="0" b="0"/>
+      </a:effectRef>
+      <a:fontRef idx="minor">
+        <a:schemeClr val="lt1"/>
+      </a:fontRef>
+    </dgm:style>
+  </dgm:styleLbl>
+  <dgm:styleLbl name="parChTrans2D2">
+    <dgm:scene3d>
+      <a:camera prst="orthographicFront"/>
+      <a:lightRig rig="threePt" dir="t"/>
+    </dgm:scene3d>
+    <dgm:sp3d/>
+    <dgm:txPr/>
+    <dgm:style>
+      <a:lnRef idx="2">
+        <a:scrgbClr r="0" g="0" b="0"/>
+      </a:lnRef>
+      <a:fillRef idx="1">
+        <a:scrgbClr r="0" g="0" b="0"/>
+      </a:fillRef>
+      <a:effectRef idx="0">
+        <a:scrgbClr r="0" g="0" b="0"/>
+      </a:effectRef>
+      <a:fontRef idx="minor">
+        <a:schemeClr val="lt1"/>
+      </a:fontRef>
+    </dgm:style>
+  </dgm:styleLbl>
+  <dgm:styleLbl name="parChTrans2D3">
+    <dgm:scene3d>
+      <a:camera prst="orthographicFront"/>
+      <a:lightRig rig="threePt" dir="t"/>
+    </dgm:scene3d>
+    <dgm:sp3d/>
+    <dgm:txPr/>
+    <dgm:style>
+      <a:lnRef idx="2">
+        <a:scrgbClr r="0" g="0" b="0"/>
+      </a:lnRef>
+      <a:fillRef idx="1">
+        <a:scrgbClr r="0" g="0" b="0"/>
+      </a:fillRef>
+      <a:effectRef idx="0">
+        <a:scrgbClr r="0" g="0" b="0"/>
+      </a:effectRef>
+      <a:fontRef idx="minor">
+        <a:schemeClr val="lt1"/>
+      </a:fontRef>
+    </dgm:style>
+  </dgm:styleLbl>
+  <dgm:styleLbl name="parChTrans2D4">
+    <dgm:scene3d>
+      <a:camera prst="orthographicFront"/>
+      <a:lightRig rig="threePt" dir="t"/>
+    </dgm:scene3d>
+    <dgm:sp3d/>
+    <dgm:txPr/>
+    <dgm:style>
+      <a:lnRef idx="2">
+        <a:scrgbClr r="0" g="0" b="0"/>
+      </a:lnRef>
+      <a:fillRef idx="1">
+        <a:scrgbClr r="0" g="0" b="0"/>
+      </a:fillRef>
+      <a:effectRef idx="0">
+        <a:scrgbClr r="0" g="0" b="0"/>
+      </a:effectRef>
+      <a:fontRef idx="minor">
+        <a:schemeClr val="lt1"/>
+      </a:fontRef>
+    </dgm:style>
+  </dgm:styleLbl>
+  <dgm:styleLbl name="parChTrans1D1">
+    <dgm:scene3d>
+      <a:camera prst="orthographicFront"/>
+      <a:lightRig rig="threePt" dir="t"/>
+    </dgm:scene3d>
+    <dgm:sp3d/>
+    <dgm:txPr/>
+    <dgm:style>
+      <a:lnRef idx="2">
+        <a:scrgbClr r="0" g="0" b="0"/>
+      </a:lnRef>
+      <a:fillRef idx="0">
+        <a:scrgbClr r="0" g="0" b="0"/>
+      </a:fillRef>
+      <a:effectRef idx="0">
+        <a:scrgbClr r="0" g="0" b="0"/>
+      </a:effectRef>
+      <a:fontRef idx="minor"/>
+    </dgm:style>
+  </dgm:styleLbl>
+  <dgm:styleLbl name="parChTrans1D2">
+    <dgm:scene3d>
+      <a:camera prst="orthographicFront"/>
+      <a:lightRig rig="threePt" dir="t"/>
+    </dgm:scene3d>
+    <dgm:sp3d/>
+    <dgm:txPr/>
+    <dgm:style>
+      <a:lnRef idx="2">
+        <a:scrgbClr r="0" g="0" b="0"/>
+      </a:lnRef>
+      <a:fillRef idx="0">
+        <a:scrgbClr r="0" g="0" b="0"/>
+      </a:fillRef>
+      <a:effectRef idx="0">
+        <a:scrgbClr r="0" g="0" b="0"/>
+      </a:effectRef>
+      <a:fontRef idx="minor"/>
+    </dgm:style>
+  </dgm:styleLbl>
+  <dgm:styleLbl name="parChTrans1D3">
+    <dgm:scene3d>
+      <a:camera prst="orthographicFront"/>
+      <a:lightRig rig="threePt" dir="t"/>
+    </dgm:scene3d>
+    <dgm:sp3d/>
+    <dgm:txPr/>
+    <dgm:style>
+      <a:lnRef idx="2">
+        <a:scrgbClr r="0" g="0" b="0"/>
+      </a:lnRef>
+      <a:fillRef idx="0">
+        <a:scrgbClr r="0" g="0" b="0"/>
+      </a:fillRef>
+      <a:effectRef idx="0">
+        <a:scrgbClr r="0" g="0" b="0"/>
+      </a:effectRef>
+      <a:fontRef idx="minor"/>
+    </dgm:style>
+  </dgm:styleLbl>
+  <dgm:styleLbl name="parChTrans1D4">
+    <dgm:scene3d>
+      <a:camera prst="orthographicFront"/>
+      <a:lightRig rig="threePt" dir="t"/>
+    </dgm:scene3d>
+    <dgm:sp3d/>
+    <dgm:txPr/>
+    <dgm:style>
+      <a:lnRef idx="2">
+        <a:scrgbClr r="0" g="0" b="0"/>
+      </a:lnRef>
+      <a:fillRef idx="0">
+        <a:scrgbClr r="0" g="0" b="0"/>
+      </a:fillRef>
+      <a:effectRef idx="0">
+        <a:scrgbClr r="0" g="0" b="0"/>
+      </a:effectRef>
+      <a:fontRef idx="minor"/>
+    </dgm:style>
+  </dgm:styleLbl>
+  <dgm:styleLbl name="fgAcc1">
+    <dgm:scene3d>
+      <a:camera prst="orthographicFront"/>
+      <a:lightRig rig="threePt" dir="t"/>
+    </dgm:scene3d>
+    <dgm:sp3d/>
+    <dgm:txPr/>
+    <dgm:style>
+      <a:lnRef idx="2">
+        <a:scrgbClr r="0" g="0" b="0"/>
+      </a:lnRef>
+      <a:fillRef idx="1">
+        <a:scrgbClr r="0" g="0" b="0"/>
+      </a:fillRef>
+      <a:effectRef idx="0">
+        <a:scrgbClr r="0" g="0" b="0"/>
+      </a:effectRef>
+      <a:fontRef idx="minor"/>
+    </dgm:style>
+  </dgm:styleLbl>
+  <dgm:styleLbl name="conFgAcc1">
+    <dgm:scene3d>
+      <a:camera prst="orthographicFront"/>
+      <a:lightRig rig="threePt" dir="t"/>
+    </dgm:scene3d>
+    <dgm:sp3d/>
+    <dgm:txPr/>
+    <dgm:style>
+      <a:lnRef idx="2">
+        <a:scrgbClr r="0" g="0" b="0"/>
+      </a:lnRef>
+      <a:fillRef idx="1">
+        <a:scrgbClr r="0" g="0" b="0"/>
+      </a:fillRef>
+      <a:effectRef idx="0">
+        <a:scrgbClr r="0" g="0" b="0"/>
+      </a:effectRef>
+      <a:fontRef idx="minor"/>
+    </dgm:style>
+  </dgm:styleLbl>
+  <dgm:styleLbl name="alignAcc1">
+    <dgm:scene3d>
+      <a:camera prst="orthographicFront"/>
+      <a:lightRig rig="threePt" dir="t"/>
+    </dgm:scene3d>
+    <dgm:sp3d/>
+    <dgm:txPr/>
+    <dgm:style>
+      <a:lnRef idx="2">
+        <a:scrgbClr r="0" g="0" b="0"/>
+      </a:lnRef>
+      <a:fillRef idx="1">
+        <a:scrgbClr r="0" g="0" b="0"/>
+      </a:fillRef>
+      <a:effectRef idx="0">
+        <a:scrgbClr r="0" g="0" b="0"/>
+      </a:effectRef>
+      <a:fontRef idx="minor"/>
+    </dgm:style>
+  </dgm:styleLbl>
+  <dgm:styleLbl name="trAlignAcc1">
+    <dgm:scene3d>
+      <a:camera prst="orthographicFront"/>
+      <a:lightRig rig="threePt" dir="t"/>
+    </dgm:scene3d>
+    <dgm:sp3d/>
+    <dgm:txPr/>
+    <dgm:style>
+      <a:lnRef idx="1">
+        <a:scrgbClr r="0" g="0" b="0"/>
+      </a:lnRef>
+      <a:fillRef idx="1">
+        <a:scrgbClr r="0" g="0" b="0"/>
+      </a:fillRef>
+      <a:effectRef idx="0">
+        <a:scrgbClr r="0" g="0" b="0"/>
+      </a:effectRef>
+      <a:fontRef idx="minor"/>
+    </dgm:style>
+  </dgm:styleLbl>
+  <dgm:styleLbl name="bgAcc1">
+    <dgm:scene3d>
+      <a:camera prst="orthographicFront"/>
+      <a:lightRig rig="threePt" dir="t"/>
+    </dgm:scene3d>
+    <dgm:sp3d/>
+    <dgm:txPr/>
+    <dgm:style>
+      <a:lnRef idx="2">
+        <a:scrgbClr r="0" g="0" b="0"/>
+      </a:lnRef>
+      <a:fillRef idx="1">
+        <a:scrgbClr r="0" g="0" b="0"/>
+      </a:fillRef>
+      <a:effectRef idx="0">
+        <a:scrgbClr r="0" g="0" b="0"/>
+      </a:effectRef>
+      <a:fontRef idx="minor"/>
+    </dgm:style>
+  </dgm:styleLbl>
+  <dgm:styleLbl name="solidFgAcc1">
+    <dgm:scene3d>
+      <a:camera prst="orthographicFront"/>
+      <a:lightRig rig="threePt" dir="t"/>
+    </dgm:scene3d>
+    <dgm:sp3d/>
+    <dgm:txPr/>
+    <dgm:style>
+      <a:lnRef idx="2">
+        <a:scrgbClr r="0" g="0" b="0"/>
+      </a:lnRef>
+      <a:fillRef idx="1">
+        <a:scrgbClr r="0" g="0" b="0"/>
+      </a:fillRef>
+      <a:effectRef idx="0">
+        <a:scrgbClr r="0" g="0" b="0"/>
+      </a:effectRef>
+      <a:fontRef idx="minor"/>
+    </dgm:style>
+  </dgm:styleLbl>
+  <dgm:styleLbl name="solidAlignAcc1">
+    <dgm:scene3d>
+      <a:camera prst="orthographicFront"/>
+      <a:lightRig rig="threePt" dir="t"/>
+    </dgm:scene3d>
+    <dgm:sp3d/>
+    <dgm:txPr/>
+    <dgm:style>
+      <a:lnRef idx="2">
+        <a:scrgbClr r="0" g="0" b="0"/>
+      </a:lnRef>
+      <a:fillRef idx="1">
+        <a:scrgbClr r="0" g="0" b="0"/>
+      </a:fillRef>
+      <a:effectRef idx="0">
+        <a:scrgbClr r="0" g="0" b="0"/>
+      </a:effectRef>
+      <a:fontRef idx="minor"/>
+    </dgm:style>
+  </dgm:styleLbl>
+  <dgm:styleLbl name="solidBgAcc1">
+    <dgm:scene3d>
+      <a:camera prst="orthographicFront"/>
+      <a:lightRig rig="threePt" dir="t"/>
+    </dgm:scene3d>
+    <dgm:sp3d/>
+    <dgm:txPr/>
+    <dgm:style>
+      <a:lnRef idx="2">
+        <a:scrgbClr r="0" g="0" b="0"/>
+      </a:lnRef>
+      <a:fillRef idx="1">
+        <a:scrgbClr r="0" g="0" b="0"/>
+      </a:fillRef>
+      <a:effectRef idx="0">
+        <a:scrgbClr r="0" g="0" b="0"/>
+      </a:effectRef>
+      <a:fontRef idx="minor"/>
+    </dgm:style>
+  </dgm:styleLbl>
+  <dgm:styleLbl name="fgAccFollowNode1">
+    <dgm:scene3d>
+      <a:camera prst="orthographicFront"/>
+      <a:lightRig rig="threePt" dir="t"/>
+    </dgm:scene3d>
+    <dgm:sp3d/>
+    <dgm:txPr/>
+    <dgm:style>
+      <a:lnRef idx="2">
+        <a:scrgbClr r="0" g="0" b="0"/>
+      </a:lnRef>
+      <a:fillRef idx="1">
+        <a:scrgbClr r="0" g="0" b="0"/>
+      </a:fillRef>
+      <a:effectRef idx="0">
+        <a:scrgbClr r="0" g="0" b="0"/>
+      </a:effectRef>
+      <a:fontRef idx="minor"/>
+    </dgm:style>
+  </dgm:styleLbl>
+  <dgm:styleLbl name="alignAccFollowNode1">
+    <dgm:scene3d>
+      <a:camera prst="orthographicFront"/>
+      <a:lightRig rig="threePt" dir="t"/>
+    </dgm:scene3d>
+    <dgm:sp3d/>
+    <dgm:txPr/>
+    <dgm:style>
+      <a:lnRef idx="2">
+        <a:scrgbClr r="0" g="0" b="0"/>
+      </a:lnRef>
+      <a:fillRef idx="1">
+        <a:scrgbClr r="0" g="0" b="0"/>
+      </a:fillRef>
+      <a:effectRef idx="0">
+        <a:scrgbClr r="0" g="0" b="0"/>
+      </a:effectRef>
+      <a:fontRef idx="minor"/>
+    </dgm:style>
+  </dgm:styleLbl>
+  <dgm:styleLbl name="bgAccFollowNode1">
+    <dgm:scene3d>
+      <a:camera prst="orthographicFront"/>
+      <a:lightRig rig="threePt" dir="t"/>
+    </dgm:scene3d>
+    <dgm:sp3d/>
+    <dgm:txPr/>
+    <dgm:style>
+      <a:lnRef idx="2">
+        <a:scrgbClr r="0" g="0" b="0"/>
+      </a:lnRef>
+      <a:fillRef idx="1">
+        <a:scrgbClr r="0" g="0" b="0"/>
+      </a:fillRef>
+      <a:effectRef idx="0">
+        <a:scrgbClr r="0" g="0" b="0"/>
+      </a:effectRef>
+      <a:fontRef idx="minor"/>
+    </dgm:style>
+  </dgm:styleLbl>
+  <dgm:styleLbl name="fgAcc0">
+    <dgm:scene3d>
+      <a:camera prst="orthographicFront"/>
+      <a:lightRig rig="threePt" dir="t"/>
+    </dgm:scene3d>
+    <dgm:sp3d/>
+    <dgm:txPr/>
+    <dgm:style>
+      <a:lnRef idx="2">
+        <a:scrgbClr r="0" g="0" b="0"/>
+      </a:lnRef>
+      <a:fillRef idx="1">
+        <a:scrgbClr r="0" g="0" b="0"/>
+      </a:fillRef>
+      <a:effectRef idx="0">
+        <a:scrgbClr r="0" g="0" b="0"/>
+      </a:effectRef>
+      <a:fontRef idx="minor"/>
+    </dgm:style>
+  </dgm:styleLbl>
+  <dgm:styleLbl name="fgAcc2">
+    <dgm:scene3d>
+      <a:camera prst="orthographicFront"/>
+      <a:lightRig rig="threePt" dir="t"/>
+    </dgm:scene3d>
+    <dgm:sp3d/>
+    <dgm:txPr/>
+    <dgm:style>
+      <a:lnRef idx="2">
+        <a:scrgbClr r="0" g="0" b="0"/>
+      </a:lnRef>
+      <a:fillRef idx="1">
+        <a:scrgbClr r="0" g="0" b="0"/>
+      </a:fillRef>
+      <a:effectRef idx="0">
+        <a:scrgbClr r="0" g="0" b="0"/>
+      </a:effectRef>
+      <a:fontRef idx="minor"/>
+    </dgm:style>
+  </dgm:styleLbl>
+  <dgm:styleLbl name="fgAcc3">
+    <dgm:scene3d>
+      <a:camera prst="orthographicFront"/>
+      <a:lightRig rig="threePt" dir="t"/>
+    </dgm:scene3d>
+    <dgm:sp3d/>
+    <dgm:txPr/>
+    <dgm:style>
+      <a:lnRef idx="2">
+        <a:scrgbClr r="0" g="0" b="0"/>
+      </a:lnRef>
+      <a:fillRef idx="1">
+        <a:scrgbClr r="0" g="0" b="0"/>
+      </a:fillRef>
+      <a:effectRef idx="0">
+        <a:scrgbClr r="0" g="0" b="0"/>
+      </a:effectRef>
+      <a:fontRef idx="minor"/>
+    </dgm:style>
+  </dgm:styleLbl>
+  <dgm:styleLbl name="fgAcc4">
+    <dgm:scene3d>
+      <a:camera prst="orthographicFront"/>
+      <a:lightRig rig="threePt" dir="t"/>
+    </dgm:scene3d>
+    <dgm:sp3d/>
+    <dgm:txPr/>
+    <dgm:style>
+      <a:lnRef idx="2">
+        <a:scrgbClr r="0" g="0" b="0"/>
+      </a:lnRef>
+      <a:fillRef idx="1">
+        <a:scrgbClr r="0" g="0" b="0"/>
+      </a:fillRef>
+      <a:effectRef idx="0">
+        <a:scrgbClr r="0" g="0" b="0"/>
+      </a:effectRef>
+      <a:fontRef idx="minor"/>
+    </dgm:style>
+  </dgm:styleLbl>
+  <dgm:styleLbl name="bgShp">
+    <dgm:scene3d>
+      <a:camera prst="orthographicFront"/>
+      <a:lightRig rig="threePt" dir="t"/>
+    </dgm:scene3d>
+    <dgm:sp3d/>
+    <dgm:txPr/>
+    <dgm:style>
+      <a:lnRef idx="0">
+        <a:scrgbClr r="0" g="0" b="0"/>
+      </a:lnRef>
+      <a:fillRef idx="1">
+        <a:scrgbClr r="0" g="0" b="0"/>
+      </a:fillRef>
+      <a:effectRef idx="0">
+        <a:scrgbClr r="0" g="0" b="0"/>
+      </a:effectRef>
+      <a:fontRef idx="minor"/>
+    </dgm:style>
+  </dgm:styleLbl>
+  <dgm:styleLbl name="dkBgShp">
+    <dgm:scene3d>
+      <a:camera prst="orthographicFront"/>
+      <a:lightRig rig="threePt" dir="t"/>
+    </dgm:scene3d>
+    <dgm:sp3d/>
+    <dgm:txPr/>
+    <dgm:style>
+      <a:lnRef idx="0">
+        <a:scrgbClr r="0" g="0" b="0"/>
+      </a:lnRef>
+      <a:fillRef idx="1">
+        <a:scrgbClr r="0" g="0" b="0"/>
+      </a:fillRef>
+      <a:effectRef idx="0">
+        <a:scrgbClr r="0" g="0" b="0"/>
+      </a:effectRef>
+      <a:fontRef idx="minor"/>
+    </dgm:style>
+  </dgm:styleLbl>
+  <dgm:styleLbl name="trBgShp">
+    <dgm:scene3d>
+      <a:camera prst="orthographicFront"/>
+      <a:lightRig rig="threePt" dir="t"/>
+    </dgm:scene3d>
+    <dgm:sp3d/>
+    <dgm:txPr/>
+    <dgm:style>
+      <a:lnRef idx="0">
+        <a:scrgbClr r="0" g="0" b="0"/>
+      </a:lnRef>
+      <a:fillRef idx="1">
+        <a:scrgbClr r="0" g="0" b="0"/>
+      </a:fillRef>
+      <a:effectRef idx="0">
+        <a:scrgbClr r="0" g="0" b="0"/>
+      </a:effectRef>
+      <a:fontRef idx="minor"/>
+    </dgm:style>
+  </dgm:styleLbl>
+  <dgm:styleLbl name="fgShp">
+    <dgm:scene3d>
+      <a:camera prst="orthographicFront"/>
+      <a:lightRig rig="threePt" dir="t"/>
+    </dgm:scene3d>
+    <dgm:sp3d/>
+    <dgm:txPr/>
+    <dgm:style>
+      <a:lnRef idx="2">
+        <a:scrgbClr r="0" g="0" b="0"/>
+      </a:lnRef>
+      <a:fillRef idx="1">
+        <a:scrgbClr r="0" g="0" b="0"/>
+      </a:fillRef>
+      <a:effectRef idx="0">
+        <a:scrgbClr r="0" g="0" b="0"/>
+      </a:effectRef>
+      <a:fontRef idx="minor"/>
+    </dgm:style>
+  </dgm:styleLbl>
+  <dgm:styleLbl name="revTx">
+    <dgm:scene3d>
+      <a:camera prst="orthographicFront"/>
+      <a:lightRig rig="threePt" dir="t"/>
+    </dgm:scene3d>
+    <dgm:sp3d/>
+    <dgm:txPr/>
+    <dgm:style>
+      <a:lnRef idx="0">
+        <a:scrgbClr r="0" g="0" b="0"/>
+      </a:lnRef>
+      <a:fillRef idx="0">
+        <a:scrgbClr r="0" g="0" b="0"/>
+      </a:fillRef>
+      <a:effectRef idx="0">
+        <a:scrgbClr r="0" g="0" b="0"/>
+      </a:effectRef>
+      <a:fontRef idx="minor"/>
+    </dgm:style>
+  </dgm:styleLbl>
+</dgm:styleDef>
+</file>
+
+<file path=ppt/diagrams/quickStyle2.xml><?xml version="1.0" encoding="utf-8"?>
 <dgm:styleDef xmlns:dgm="http://schemas.openxmlformats.org/drawingml/2006/diagram" xmlns:a="http://schemas.openxmlformats.org/drawingml/2006/main" uniqueId="urn:microsoft.com/office/officeart/2005/8/quickstyle/simple1">
   <dgm:title val=""/>
   <dgm:desc val=""/>
@@ -3563,7 +6862,7 @@
           <a:p>
             <a:fld id="{F6EDC76F-EB2F-4A40-9717-D29568F0D7D1}" type="datetimeFigureOut">
               <a:rPr lang="pt-BR" smtClean="0"/>
-              <a:t>22/07/2013</a:t>
+              <a:t>22/10/2014</a:t>
             </a:fld>
             <a:endParaRPr lang="pt-BR"/>
           </a:p>
@@ -3733,7 +7032,7 @@
           <a:p>
             <a:fld id="{F6EDC76F-EB2F-4A40-9717-D29568F0D7D1}" type="datetimeFigureOut">
               <a:rPr lang="pt-BR" smtClean="0"/>
-              <a:t>22/07/2013</a:t>
+              <a:t>22/10/2014</a:t>
             </a:fld>
             <a:endParaRPr lang="pt-BR"/>
           </a:p>
@@ -3913,7 +7212,7 @@
           <a:p>
             <a:fld id="{F6EDC76F-EB2F-4A40-9717-D29568F0D7D1}" type="datetimeFigureOut">
               <a:rPr lang="pt-BR" smtClean="0"/>
-              <a:t>22/07/2013</a:t>
+              <a:t>22/10/2014</a:t>
             </a:fld>
             <a:endParaRPr lang="pt-BR"/>
           </a:p>
@@ -4083,7 +7382,7 @@
           <a:p>
             <a:fld id="{F6EDC76F-EB2F-4A40-9717-D29568F0D7D1}" type="datetimeFigureOut">
               <a:rPr lang="pt-BR" smtClean="0"/>
-              <a:t>22/07/2013</a:t>
+              <a:t>22/10/2014</a:t>
             </a:fld>
             <a:endParaRPr lang="pt-BR"/>
           </a:p>
@@ -4329,7 +7628,7 @@
           <a:p>
             <a:fld id="{F6EDC76F-EB2F-4A40-9717-D29568F0D7D1}" type="datetimeFigureOut">
               <a:rPr lang="pt-BR" smtClean="0"/>
-              <a:t>22/07/2013</a:t>
+              <a:t>22/10/2014</a:t>
             </a:fld>
             <a:endParaRPr lang="pt-BR"/>
           </a:p>
@@ -4617,7 +7916,7 @@
           <a:p>
             <a:fld id="{F6EDC76F-EB2F-4A40-9717-D29568F0D7D1}" type="datetimeFigureOut">
               <a:rPr lang="pt-BR" smtClean="0"/>
-              <a:t>22/07/2013</a:t>
+              <a:t>22/10/2014</a:t>
             </a:fld>
             <a:endParaRPr lang="pt-BR"/>
           </a:p>
@@ -5039,7 +8338,7 @@
           <a:p>
             <a:fld id="{F6EDC76F-EB2F-4A40-9717-D29568F0D7D1}" type="datetimeFigureOut">
               <a:rPr lang="pt-BR" smtClean="0"/>
-              <a:t>22/07/2013</a:t>
+              <a:t>22/10/2014</a:t>
             </a:fld>
             <a:endParaRPr lang="pt-BR"/>
           </a:p>
@@ -5157,7 +8456,7 @@
           <a:p>
             <a:fld id="{F6EDC76F-EB2F-4A40-9717-D29568F0D7D1}" type="datetimeFigureOut">
               <a:rPr lang="pt-BR" smtClean="0"/>
-              <a:t>22/07/2013</a:t>
+              <a:t>22/10/2014</a:t>
             </a:fld>
             <a:endParaRPr lang="pt-BR"/>
           </a:p>
@@ -5252,7 +8551,7 @@
           <a:p>
             <a:fld id="{F6EDC76F-EB2F-4A40-9717-D29568F0D7D1}" type="datetimeFigureOut">
               <a:rPr lang="pt-BR" smtClean="0"/>
-              <a:t>22/07/2013</a:t>
+              <a:t>22/10/2014</a:t>
             </a:fld>
             <a:endParaRPr lang="pt-BR"/>
           </a:p>
@@ -5529,7 +8828,7 @@
           <a:p>
             <a:fld id="{F6EDC76F-EB2F-4A40-9717-D29568F0D7D1}" type="datetimeFigureOut">
               <a:rPr lang="pt-BR" smtClean="0"/>
-              <a:t>22/07/2013</a:t>
+              <a:t>22/10/2014</a:t>
             </a:fld>
             <a:endParaRPr lang="pt-BR"/>
           </a:p>
@@ -5782,7 +9081,7 @@
           <a:p>
             <a:fld id="{F6EDC76F-EB2F-4A40-9717-D29568F0D7D1}" type="datetimeFigureOut">
               <a:rPr lang="pt-BR" smtClean="0"/>
-              <a:t>22/07/2013</a:t>
+              <a:t>22/10/2014</a:t>
             </a:fld>
             <a:endParaRPr lang="pt-BR"/>
           </a:p>
@@ -5995,7 +9294,7 @@
           <a:p>
             <a:fld id="{F6EDC76F-EB2F-4A40-9717-D29568F0D7D1}" type="datetimeFigureOut">
               <a:rPr lang="pt-BR" smtClean="0"/>
-              <a:t>22/07/2013</a:t>
+              <a:t>22/10/2014</a:t>
             </a:fld>
             <a:endParaRPr lang="pt-BR"/>
           </a:p>
@@ -6672,11 +9971,7 @@
                 <a:pPr algn="ctr"/>
                 <a:r>
                   <a:rPr lang="pt-BR" sz="1400" dirty="0" smtClean="0"/>
-                  <a:t>Métricas de </a:t>
-                </a:r>
-                <a:r>
-                  <a:rPr lang="pt-BR" sz="1400" dirty="0" smtClean="0"/>
-                  <a:t>Desempenho</a:t>
+                  <a:t>Métricas de Desempenho</a:t>
                 </a:r>
                 <a:endParaRPr lang="pt-BR" sz="1400" dirty="0"/>
               </a:p>
@@ -6780,11 +10075,7 @@
                 <a:pPr algn="ctr"/>
                 <a:r>
                   <a:rPr lang="pt-BR" sz="1400" dirty="0" smtClean="0"/>
-                  <a:t>Parâmetros </a:t>
-                </a:r>
-                <a:r>
-                  <a:rPr lang="pt-BR" sz="1400" dirty="0" smtClean="0"/>
-                  <a:t>de Aceitação</a:t>
+                  <a:t>Parâmetros de Aceitação</a:t>
                 </a:r>
                 <a:endParaRPr lang="pt-BR" sz="1400" dirty="0"/>
               </a:p>
@@ -7127,11 +10418,7 @@
                 <a:pPr algn="ctr"/>
                 <a:r>
                   <a:rPr lang="pt-BR" sz="1200" dirty="0" smtClean="0"/>
-                  <a:t>Resultado </a:t>
-                </a:r>
-                <a:r>
-                  <a:rPr lang="pt-BR" sz="1200" dirty="0" smtClean="0"/>
-                  <a:t>Execução</a:t>
+                  <a:t>Resultado Execução</a:t>
                 </a:r>
                 <a:endParaRPr lang="pt-BR" sz="1200" dirty="0"/>
               </a:p>
@@ -7670,11 +10957,7 @@
               <a:pPr algn="ctr"/>
               <a:r>
                 <a:rPr lang="pt-BR" sz="2000" dirty="0" smtClean="0"/>
-                <a:t>Dados de </a:t>
-              </a:r>
-              <a:r>
-                <a:rPr lang="pt-BR" sz="2000" dirty="0" smtClean="0"/>
-                <a:t>Saída</a:t>
+                <a:t>Dados de Saída</a:t>
               </a:r>
               <a:endParaRPr lang="pt-BR" sz="2000" dirty="0"/>
             </a:p>
@@ -7804,6 +11087,1440 @@
 </file>
 
 <file path=ppt/slides/slide2.xml><?xml version="1.0" encoding="utf-8"?>
+<p:sld xmlns:a="http://schemas.openxmlformats.org/drawingml/2006/main" xmlns:r="http://schemas.openxmlformats.org/officeDocument/2006/relationships" xmlns:p="http://schemas.openxmlformats.org/presentationml/2006/main">
+  <p:cSld>
+    <p:spTree>
+      <p:nvGrpSpPr>
+        <p:cNvPr id="1" name=""/>
+        <p:cNvGrpSpPr/>
+        <p:nvPr/>
+      </p:nvGrpSpPr>
+      <p:grpSpPr>
+        <a:xfrm>
+          <a:off x="0" y="0"/>
+          <a:ext cx="0" cy="0"/>
+          <a:chOff x="0" y="0"/>
+          <a:chExt cx="0" cy="0"/>
+        </a:xfrm>
+      </p:grpSpPr>
+      <p:sp>
+        <p:nvSpPr>
+          <p:cNvPr id="5" name="Retângulo de cantos arredondados 4"/>
+          <p:cNvSpPr/>
+          <p:nvPr/>
+        </p:nvSpPr>
+        <p:spPr>
+          <a:xfrm>
+            <a:off x="2820567" y="2827563"/>
+            <a:ext cx="3194161" cy="2009230"/>
+          </a:xfrm>
+          <a:prstGeom prst="roundRect">
+            <a:avLst>
+              <a:gd name="adj" fmla="val 5424"/>
+            </a:avLst>
+          </a:prstGeom>
+          <a:solidFill>
+            <a:schemeClr val="accent1">
+              <a:lumMod val="75000"/>
+            </a:schemeClr>
+          </a:solidFill>
+        </p:spPr>
+        <p:style>
+          <a:lnRef idx="2">
+            <a:schemeClr val="accent1">
+              <a:shade val="50000"/>
+            </a:schemeClr>
+          </a:lnRef>
+          <a:fillRef idx="1">
+            <a:schemeClr val="accent1"/>
+          </a:fillRef>
+          <a:effectRef idx="0">
+            <a:schemeClr val="accent1"/>
+          </a:effectRef>
+          <a:fontRef idx="minor">
+            <a:schemeClr val="lt1"/>
+          </a:fontRef>
+        </p:style>
+        <p:txBody>
+          <a:bodyPr rtlCol="0" anchor="ctr"/>
+          <a:lstStyle/>
+          <a:p>
+            <a:pPr algn="ctr"/>
+            <a:endParaRPr lang="pt-BR" sz="1200" dirty="0"/>
+          </a:p>
+        </p:txBody>
+      </p:sp>
+      <p:graphicFrame>
+        <p:nvGraphicFramePr>
+          <p:cNvPr id="4" name="Diagrama 3"/>
+          <p:cNvGraphicFramePr/>
+          <p:nvPr>
+            <p:extLst>
+              <p:ext uri="{D42A27DB-BD31-4B8C-83A1-F6EECF244321}">
+                <p14:modId xmlns:p14="http://schemas.microsoft.com/office/powerpoint/2010/main" val="1289761912"/>
+              </p:ext>
+            </p:extLst>
+          </p:nvPr>
+        </p:nvGraphicFramePr>
+        <p:xfrm>
+          <a:off x="2961486" y="2955301"/>
+          <a:ext cx="2912323" cy="1750716"/>
+        </p:xfrm>
+        <a:graphic>
+          <a:graphicData uri="http://schemas.openxmlformats.org/drawingml/2006/diagram">
+            <dgm:relIds xmlns:dgm="http://schemas.openxmlformats.org/drawingml/2006/diagram" xmlns:r="http://schemas.openxmlformats.org/officeDocument/2006/relationships" r:dm="rId2" r:lo="rId3" r:qs="rId4" r:cs="rId5"/>
+          </a:graphicData>
+        </a:graphic>
+      </p:graphicFrame>
+      <p:grpSp>
+        <p:nvGrpSpPr>
+          <p:cNvPr id="2" name="Grupo 1"/>
+          <p:cNvGrpSpPr/>
+          <p:nvPr/>
+        </p:nvGrpSpPr>
+        <p:grpSpPr>
+          <a:xfrm>
+            <a:off x="141412" y="2829083"/>
+            <a:ext cx="2218677" cy="2009230"/>
+            <a:chOff x="467543" y="2541051"/>
+            <a:chExt cx="2218677" cy="2009230"/>
+          </a:xfrm>
+        </p:grpSpPr>
+        <p:sp>
+          <p:nvSpPr>
+            <p:cNvPr id="76" name="Retângulo de cantos arredondados 75"/>
+            <p:cNvSpPr/>
+            <p:nvPr/>
+          </p:nvSpPr>
+          <p:spPr>
+            <a:xfrm>
+              <a:off x="467543" y="2541051"/>
+              <a:ext cx="2218677" cy="2009230"/>
+            </a:xfrm>
+            <a:prstGeom prst="roundRect">
+              <a:avLst>
+                <a:gd name="adj" fmla="val 4399"/>
+              </a:avLst>
+            </a:prstGeom>
+            <a:solidFill>
+              <a:schemeClr val="accent6">
+                <a:lumMod val="75000"/>
+              </a:schemeClr>
+            </a:solidFill>
+            <a:ln>
+              <a:solidFill>
+                <a:schemeClr val="accent6">
+                  <a:lumMod val="60000"/>
+                  <a:lumOff val="40000"/>
+                </a:schemeClr>
+              </a:solidFill>
+            </a:ln>
+          </p:spPr>
+          <p:style>
+            <a:lnRef idx="2">
+              <a:schemeClr val="accent1">
+                <a:shade val="50000"/>
+              </a:schemeClr>
+            </a:lnRef>
+            <a:fillRef idx="1">
+              <a:schemeClr val="accent1"/>
+            </a:fillRef>
+            <a:effectRef idx="0">
+              <a:schemeClr val="accent1"/>
+            </a:effectRef>
+            <a:fontRef idx="minor">
+              <a:schemeClr val="lt1"/>
+            </a:fontRef>
+          </p:style>
+          <p:txBody>
+            <a:bodyPr vert="vert270" rtlCol="0" anchor="ctr"/>
+            <a:lstStyle/>
+            <a:p>
+              <a:pPr algn="ctr"/>
+              <a:endParaRPr lang="pt-BR" dirty="0"/>
+            </a:p>
+          </p:txBody>
+        </p:sp>
+        <p:sp>
+          <p:nvSpPr>
+            <p:cNvPr id="8" name="Retângulo de cantos arredondados 7"/>
+            <p:cNvSpPr/>
+            <p:nvPr/>
+          </p:nvSpPr>
+          <p:spPr>
+            <a:xfrm>
+              <a:off x="2387458" y="2636912"/>
+              <a:ext cx="271270" cy="1800200"/>
+            </a:xfrm>
+            <a:prstGeom prst="roundRect">
+              <a:avLst/>
+            </a:prstGeom>
+            <a:solidFill>
+              <a:schemeClr val="accent6">
+                <a:lumMod val="75000"/>
+              </a:schemeClr>
+            </a:solidFill>
+            <a:ln>
+              <a:noFill/>
+            </a:ln>
+          </p:spPr>
+          <p:style>
+            <a:lnRef idx="2">
+              <a:schemeClr val="accent1">
+                <a:shade val="50000"/>
+              </a:schemeClr>
+            </a:lnRef>
+            <a:fillRef idx="1">
+              <a:schemeClr val="accent1"/>
+            </a:fillRef>
+            <a:effectRef idx="0">
+              <a:schemeClr val="accent1"/>
+            </a:effectRef>
+            <a:fontRef idx="minor">
+              <a:schemeClr val="lt1"/>
+            </a:fontRef>
+          </p:style>
+          <p:txBody>
+            <a:bodyPr vert="vert270" rtlCol="0" anchor="ctr"/>
+            <a:lstStyle/>
+            <a:p>
+              <a:pPr algn="ctr"/>
+              <a:r>
+                <a:rPr lang="pt-BR" dirty="0" smtClean="0"/>
+                <a:t>Dados de Entrada</a:t>
+              </a:r>
+              <a:endParaRPr lang="pt-BR" dirty="0"/>
+            </a:p>
+          </p:txBody>
+        </p:sp>
+        <p:grpSp>
+          <p:nvGrpSpPr>
+            <p:cNvPr id="77" name="Grupo 76"/>
+            <p:cNvGrpSpPr/>
+            <p:nvPr/>
+          </p:nvGrpSpPr>
+          <p:grpSpPr>
+            <a:xfrm>
+              <a:off x="560329" y="2638655"/>
+              <a:ext cx="1779423" cy="1814022"/>
+              <a:chOff x="200289" y="2636911"/>
+              <a:chExt cx="1779423" cy="1814022"/>
+            </a:xfrm>
+          </p:grpSpPr>
+          <p:sp>
+            <p:nvSpPr>
+              <p:cNvPr id="9" name="Retângulo de cantos arredondados 8"/>
+              <p:cNvSpPr/>
+              <p:nvPr/>
+            </p:nvSpPr>
+            <p:spPr>
+              <a:xfrm>
+                <a:off x="209655" y="2636911"/>
+                <a:ext cx="1770057" cy="373861"/>
+              </a:xfrm>
+              <a:prstGeom prst="roundRect">
+                <a:avLst/>
+              </a:prstGeom>
+              <a:solidFill>
+                <a:schemeClr val="accent2">
+                  <a:lumMod val="75000"/>
+                </a:schemeClr>
+              </a:solidFill>
+              <a:ln>
+                <a:noFill/>
+              </a:ln>
+            </p:spPr>
+            <p:style>
+              <a:lnRef idx="2">
+                <a:schemeClr val="accent1">
+                  <a:shade val="50000"/>
+                </a:schemeClr>
+              </a:lnRef>
+              <a:fillRef idx="1">
+                <a:schemeClr val="accent1"/>
+              </a:fillRef>
+              <a:effectRef idx="0">
+                <a:schemeClr val="accent1"/>
+              </a:effectRef>
+              <a:fontRef idx="minor">
+                <a:schemeClr val="lt1"/>
+              </a:fontRef>
+            </p:style>
+            <p:txBody>
+              <a:bodyPr rtlCol="0" anchor="ctr"/>
+              <a:lstStyle/>
+              <a:p>
+                <a:pPr algn="ctr"/>
+                <a:r>
+                  <a:rPr lang="pt-BR" sz="1600" dirty="0" smtClean="0"/>
+                  <a:t>Cenários de Teste</a:t>
+                </a:r>
+                <a:endParaRPr lang="pt-BR" sz="1600" dirty="0"/>
+              </a:p>
+            </p:txBody>
+          </p:sp>
+          <p:sp>
+            <p:nvSpPr>
+              <p:cNvPr id="10" name="Retângulo de cantos arredondados 9"/>
+              <p:cNvSpPr/>
+              <p:nvPr/>
+            </p:nvSpPr>
+            <p:spPr>
+              <a:xfrm>
+                <a:off x="209622" y="3116965"/>
+                <a:ext cx="1761155" cy="373861"/>
+              </a:xfrm>
+              <a:prstGeom prst="roundRect">
+                <a:avLst/>
+              </a:prstGeom>
+              <a:solidFill>
+                <a:schemeClr val="accent2">
+                  <a:lumMod val="75000"/>
+                </a:schemeClr>
+              </a:solidFill>
+              <a:ln>
+                <a:noFill/>
+              </a:ln>
+            </p:spPr>
+            <p:style>
+              <a:lnRef idx="2">
+                <a:schemeClr val="accent1">
+                  <a:shade val="50000"/>
+                </a:schemeClr>
+              </a:lnRef>
+              <a:fillRef idx="1">
+                <a:schemeClr val="accent1"/>
+              </a:fillRef>
+              <a:effectRef idx="0">
+                <a:schemeClr val="accent1"/>
+              </a:effectRef>
+              <a:fontRef idx="minor">
+                <a:schemeClr val="lt1"/>
+              </a:fontRef>
+            </p:style>
+            <p:txBody>
+              <a:bodyPr rtlCol="0" anchor="ctr"/>
+              <a:lstStyle/>
+              <a:p>
+                <a:pPr algn="ctr"/>
+                <a:r>
+                  <a:rPr lang="pt-BR" sz="1400" dirty="0" smtClean="0"/>
+                  <a:t>Métricas de Desempenho</a:t>
+                </a:r>
+                <a:endParaRPr lang="pt-BR" sz="1400" dirty="0"/>
+              </a:p>
+            </p:txBody>
+          </p:sp>
+          <p:sp>
+            <p:nvSpPr>
+              <p:cNvPr id="11" name="Retângulo de cantos arredondados 10"/>
+              <p:cNvSpPr/>
+              <p:nvPr/>
+            </p:nvSpPr>
+            <p:spPr>
+              <a:xfrm>
+                <a:off x="200289" y="3597019"/>
+                <a:ext cx="1770057" cy="373861"/>
+              </a:xfrm>
+              <a:prstGeom prst="roundRect">
+                <a:avLst/>
+              </a:prstGeom>
+              <a:solidFill>
+                <a:schemeClr val="accent2">
+                  <a:lumMod val="75000"/>
+                </a:schemeClr>
+              </a:solidFill>
+              <a:ln>
+                <a:noFill/>
+              </a:ln>
+            </p:spPr>
+            <p:style>
+              <a:lnRef idx="2">
+                <a:schemeClr val="accent1">
+                  <a:shade val="50000"/>
+                </a:schemeClr>
+              </a:lnRef>
+              <a:fillRef idx="1">
+                <a:schemeClr val="accent1"/>
+              </a:fillRef>
+              <a:effectRef idx="0">
+                <a:schemeClr val="accent1"/>
+              </a:effectRef>
+              <a:fontRef idx="minor">
+                <a:schemeClr val="lt1"/>
+              </a:fontRef>
+            </p:style>
+            <p:txBody>
+              <a:bodyPr rtlCol="0" anchor="ctr"/>
+              <a:lstStyle/>
+              <a:p>
+                <a:pPr algn="ctr"/>
+                <a:r>
+                  <a:rPr lang="pt-BR" sz="1400" dirty="0" smtClean="0"/>
+                  <a:t>Cargas de Trabalho</a:t>
+                </a:r>
+                <a:endParaRPr lang="pt-BR" sz="1400" dirty="0"/>
+              </a:p>
+            </p:txBody>
+          </p:sp>
+          <p:sp>
+            <p:nvSpPr>
+              <p:cNvPr id="13" name="Retângulo de cantos arredondados 12"/>
+              <p:cNvSpPr/>
+              <p:nvPr/>
+            </p:nvSpPr>
+            <p:spPr>
+              <a:xfrm>
+                <a:off x="200289" y="4077072"/>
+                <a:ext cx="1770057" cy="373861"/>
+              </a:xfrm>
+              <a:prstGeom prst="roundRect">
+                <a:avLst/>
+              </a:prstGeom>
+              <a:solidFill>
+                <a:schemeClr val="accent2">
+                  <a:lumMod val="75000"/>
+                </a:schemeClr>
+              </a:solidFill>
+              <a:ln>
+                <a:noFill/>
+              </a:ln>
+            </p:spPr>
+            <p:style>
+              <a:lnRef idx="2">
+                <a:schemeClr val="accent1">
+                  <a:shade val="50000"/>
+                </a:schemeClr>
+              </a:lnRef>
+              <a:fillRef idx="1">
+                <a:schemeClr val="accent1"/>
+              </a:fillRef>
+              <a:effectRef idx="0">
+                <a:schemeClr val="accent1"/>
+              </a:effectRef>
+              <a:fontRef idx="minor">
+                <a:schemeClr val="lt1"/>
+              </a:fontRef>
+            </p:style>
+            <p:txBody>
+              <a:bodyPr rtlCol="0" anchor="ctr"/>
+              <a:lstStyle/>
+              <a:p>
+                <a:pPr algn="ctr"/>
+                <a:r>
+                  <a:rPr lang="pt-BR" sz="1400" dirty="0" smtClean="0"/>
+                  <a:t>Parâmetros de Aceitação</a:t>
+                </a:r>
+                <a:endParaRPr lang="pt-BR" sz="1400" dirty="0"/>
+              </a:p>
+            </p:txBody>
+          </p:sp>
+        </p:grpSp>
+      </p:grpSp>
+      <p:sp>
+        <p:nvSpPr>
+          <p:cNvPr id="23" name="Seta para a direita 22"/>
+          <p:cNvSpPr/>
+          <p:nvPr/>
+        </p:nvSpPr>
+        <p:spPr>
+          <a:xfrm>
+            <a:off x="2408418" y="3656255"/>
+            <a:ext cx="360631" cy="348810"/>
+          </a:xfrm>
+          <a:prstGeom prst="rightArrow">
+            <a:avLst/>
+          </a:prstGeom>
+          <a:solidFill>
+            <a:schemeClr val="tx2">
+              <a:lumMod val="60000"/>
+              <a:lumOff val="40000"/>
+            </a:schemeClr>
+          </a:solidFill>
+          <a:ln w="12700">
+            <a:solidFill>
+              <a:schemeClr val="tx1"/>
+            </a:solidFill>
+          </a:ln>
+        </p:spPr>
+        <p:style>
+          <a:lnRef idx="2">
+            <a:schemeClr val="accent1">
+              <a:shade val="50000"/>
+            </a:schemeClr>
+          </a:lnRef>
+          <a:fillRef idx="1">
+            <a:schemeClr val="accent1"/>
+          </a:fillRef>
+          <a:effectRef idx="0">
+            <a:schemeClr val="accent1"/>
+          </a:effectRef>
+          <a:fontRef idx="minor">
+            <a:schemeClr val="lt1"/>
+          </a:fontRef>
+        </p:style>
+        <p:txBody>
+          <a:bodyPr rtlCol="0" anchor="ctr"/>
+          <a:lstStyle/>
+          <a:p>
+            <a:pPr algn="ctr"/>
+            <a:endParaRPr lang="pt-BR" sz="1200"/>
+          </a:p>
+        </p:txBody>
+      </p:sp>
+      <p:sp>
+        <p:nvSpPr>
+          <p:cNvPr id="25" name="Retângulo de cantos arredondados 24"/>
+          <p:cNvSpPr/>
+          <p:nvPr/>
+        </p:nvSpPr>
+        <p:spPr>
+          <a:xfrm>
+            <a:off x="2820567" y="404664"/>
+            <a:ext cx="3194161" cy="515187"/>
+          </a:xfrm>
+          <a:prstGeom prst="roundRect">
+            <a:avLst/>
+          </a:prstGeom>
+          <a:solidFill>
+            <a:schemeClr val="tx2">
+              <a:lumMod val="20000"/>
+              <a:lumOff val="80000"/>
+            </a:schemeClr>
+          </a:solidFill>
+          <a:ln>
+            <a:prstDash val="lgDash"/>
+          </a:ln>
+        </p:spPr>
+        <p:style>
+          <a:lnRef idx="2">
+            <a:schemeClr val="accent1">
+              <a:shade val="50000"/>
+            </a:schemeClr>
+          </a:lnRef>
+          <a:fillRef idx="1">
+            <a:schemeClr val="accent1"/>
+          </a:fillRef>
+          <a:effectRef idx="0">
+            <a:schemeClr val="accent1"/>
+          </a:effectRef>
+          <a:fontRef idx="minor">
+            <a:schemeClr val="lt1"/>
+          </a:fontRef>
+        </p:style>
+        <p:txBody>
+          <a:bodyPr rtlCol="0" anchor="ctr"/>
+          <a:lstStyle/>
+          <a:p>
+            <a:pPr algn="ctr"/>
+            <a:r>
+              <a:rPr lang="pt-BR" sz="1600" dirty="0" smtClean="0">
+                <a:solidFill>
+                  <a:schemeClr val="tx2"/>
+                </a:solidFill>
+              </a:rPr>
+              <a:t>Execução Automatizada de Testes</a:t>
+            </a:r>
+            <a:endParaRPr lang="pt-BR" sz="1600" dirty="0">
+              <a:solidFill>
+                <a:schemeClr val="tx2"/>
+              </a:solidFill>
+            </a:endParaRPr>
+          </a:p>
+        </p:txBody>
+      </p:sp>
+      <p:sp>
+        <p:nvSpPr>
+          <p:cNvPr id="26" name="Seta para a direita 25"/>
+          <p:cNvSpPr/>
+          <p:nvPr/>
+        </p:nvSpPr>
+        <p:spPr>
+          <a:xfrm rot="16200000">
+            <a:off x="2026567" y="1739304"/>
+            <a:ext cx="1814363" cy="256078"/>
+          </a:xfrm>
+          <a:prstGeom prst="rightArrow">
+            <a:avLst/>
+          </a:prstGeom>
+          <a:solidFill>
+            <a:schemeClr val="tx2">
+              <a:lumMod val="60000"/>
+              <a:lumOff val="40000"/>
+            </a:schemeClr>
+          </a:solidFill>
+          <a:ln w="12700">
+            <a:solidFill>
+              <a:schemeClr val="tx1"/>
+            </a:solidFill>
+          </a:ln>
+        </p:spPr>
+        <p:style>
+          <a:lnRef idx="2">
+            <a:schemeClr val="accent1">
+              <a:shade val="50000"/>
+            </a:schemeClr>
+          </a:lnRef>
+          <a:fillRef idx="1">
+            <a:schemeClr val="accent1"/>
+          </a:fillRef>
+          <a:effectRef idx="0">
+            <a:schemeClr val="accent1"/>
+          </a:effectRef>
+          <a:fontRef idx="minor">
+            <a:schemeClr val="lt1"/>
+          </a:fontRef>
+        </p:style>
+        <p:txBody>
+          <a:bodyPr rtlCol="0" anchor="ctr"/>
+          <a:lstStyle/>
+          <a:p>
+            <a:pPr algn="ctr"/>
+            <a:endParaRPr lang="pt-BR" sz="1200"/>
+          </a:p>
+        </p:txBody>
+      </p:sp>
+      <p:sp>
+        <p:nvSpPr>
+          <p:cNvPr id="27" name="Seta para baixo 26"/>
+          <p:cNvSpPr/>
+          <p:nvPr/>
+        </p:nvSpPr>
+        <p:spPr>
+          <a:xfrm>
+            <a:off x="4278704" y="988780"/>
+            <a:ext cx="543230" cy="423358"/>
+          </a:xfrm>
+          <a:prstGeom prst="downArrow">
+            <a:avLst/>
+          </a:prstGeom>
+          <a:solidFill>
+            <a:srgbClr val="FFC000"/>
+          </a:solidFill>
+        </p:spPr>
+        <p:style>
+          <a:lnRef idx="2">
+            <a:schemeClr val="accent1">
+              <a:shade val="50000"/>
+            </a:schemeClr>
+          </a:lnRef>
+          <a:fillRef idx="1">
+            <a:schemeClr val="accent1"/>
+          </a:fillRef>
+          <a:effectRef idx="0">
+            <a:schemeClr val="accent1"/>
+          </a:effectRef>
+          <a:fontRef idx="minor">
+            <a:schemeClr val="lt1"/>
+          </a:fontRef>
+        </p:style>
+        <p:txBody>
+          <a:bodyPr rtlCol="0" anchor="ctr"/>
+          <a:lstStyle/>
+          <a:p>
+            <a:pPr algn="ctr"/>
+            <a:endParaRPr lang="pt-BR" sz="1200"/>
+          </a:p>
+        </p:txBody>
+      </p:sp>
+      <p:grpSp>
+        <p:nvGrpSpPr>
+          <p:cNvPr id="74" name="Grupo 73"/>
+          <p:cNvGrpSpPr/>
+          <p:nvPr/>
+        </p:nvGrpSpPr>
+        <p:grpSpPr>
+          <a:xfrm>
+            <a:off x="3085911" y="1461732"/>
+            <a:ext cx="2928817" cy="824299"/>
+            <a:chOff x="3515390" y="1167162"/>
+            <a:chExt cx="2928817" cy="824299"/>
+          </a:xfrm>
+        </p:grpSpPr>
+        <p:sp>
+          <p:nvSpPr>
+            <p:cNvPr id="65" name="Retângulo de cantos arredondados 64"/>
+            <p:cNvSpPr/>
+            <p:nvPr/>
+          </p:nvSpPr>
+          <p:spPr>
+            <a:xfrm rot="5400000">
+              <a:off x="4567649" y="114903"/>
+              <a:ext cx="824299" cy="2928817"/>
+            </a:xfrm>
+            <a:prstGeom prst="roundRect">
+              <a:avLst>
+                <a:gd name="adj" fmla="val 10075"/>
+              </a:avLst>
+            </a:prstGeom>
+            <a:solidFill>
+              <a:schemeClr val="accent6">
+                <a:lumMod val="75000"/>
+              </a:schemeClr>
+            </a:solidFill>
+            <a:ln>
+              <a:solidFill>
+                <a:schemeClr val="accent6">
+                  <a:lumMod val="60000"/>
+                  <a:lumOff val="40000"/>
+                </a:schemeClr>
+              </a:solidFill>
+            </a:ln>
+          </p:spPr>
+          <p:style>
+            <a:lnRef idx="2">
+              <a:schemeClr val="accent1">
+                <a:shade val="50000"/>
+              </a:schemeClr>
+            </a:lnRef>
+            <a:fillRef idx="1">
+              <a:schemeClr val="accent1"/>
+            </a:fillRef>
+            <a:effectRef idx="0">
+              <a:schemeClr val="accent1"/>
+            </a:effectRef>
+            <a:fontRef idx="minor">
+              <a:schemeClr val="lt1"/>
+            </a:fontRef>
+          </p:style>
+          <p:txBody>
+            <a:bodyPr vert="vert270" rtlCol="0" anchor="ctr"/>
+            <a:lstStyle/>
+            <a:p>
+              <a:pPr algn="ctr"/>
+              <a:endParaRPr lang="pt-BR" sz="1200" dirty="0"/>
+            </a:p>
+          </p:txBody>
+        </p:sp>
+        <p:grpSp>
+          <p:nvGrpSpPr>
+            <p:cNvPr id="73" name="Grupo 72"/>
+            <p:cNvGrpSpPr/>
+            <p:nvPr/>
+          </p:nvGrpSpPr>
+          <p:grpSpPr>
+            <a:xfrm>
+              <a:off x="3558016" y="1233327"/>
+              <a:ext cx="2843563" cy="430334"/>
+              <a:chOff x="3575193" y="1252015"/>
+              <a:chExt cx="2843563" cy="430334"/>
+            </a:xfrm>
+          </p:grpSpPr>
+          <p:sp>
+            <p:nvSpPr>
+              <p:cNvPr id="66" name="Retângulo de cantos arredondados 65"/>
+              <p:cNvSpPr/>
+              <p:nvPr/>
+            </p:nvSpPr>
+            <p:spPr>
+              <a:xfrm>
+                <a:off x="3575193" y="1252015"/>
+                <a:ext cx="915255" cy="430334"/>
+              </a:xfrm>
+              <a:prstGeom prst="roundRect">
+                <a:avLst/>
+              </a:prstGeom>
+              <a:solidFill>
+                <a:schemeClr val="accent2">
+                  <a:lumMod val="75000"/>
+                </a:schemeClr>
+              </a:solidFill>
+              <a:ln>
+                <a:noFill/>
+              </a:ln>
+            </p:spPr>
+            <p:style>
+              <a:lnRef idx="2">
+                <a:schemeClr val="accent1">
+                  <a:shade val="50000"/>
+                </a:schemeClr>
+              </a:lnRef>
+              <a:fillRef idx="1">
+                <a:schemeClr val="accent1"/>
+              </a:fillRef>
+              <a:effectRef idx="0">
+                <a:schemeClr val="accent1"/>
+              </a:effectRef>
+              <a:fontRef idx="minor">
+                <a:schemeClr val="lt1"/>
+              </a:fontRef>
+            </p:style>
+            <p:txBody>
+              <a:bodyPr rtlCol="0" anchor="ctr"/>
+              <a:lstStyle/>
+              <a:p>
+                <a:pPr algn="ctr"/>
+                <a:r>
+                  <a:rPr lang="pt-BR" sz="1200" dirty="0" smtClean="0"/>
+                  <a:t>Resultado Execução</a:t>
+                </a:r>
+                <a:endParaRPr lang="pt-BR" sz="1200" dirty="0"/>
+              </a:p>
+            </p:txBody>
+          </p:sp>
+          <p:sp>
+            <p:nvSpPr>
+              <p:cNvPr id="67" name="Retângulo de cantos arredondados 66"/>
+              <p:cNvSpPr/>
+              <p:nvPr/>
+            </p:nvSpPr>
+            <p:spPr>
+              <a:xfrm>
+                <a:off x="5508104" y="1252015"/>
+                <a:ext cx="910652" cy="430334"/>
+              </a:xfrm>
+              <a:prstGeom prst="roundRect">
+                <a:avLst/>
+              </a:prstGeom>
+              <a:solidFill>
+                <a:schemeClr val="accent2">
+                  <a:lumMod val="75000"/>
+                </a:schemeClr>
+              </a:solidFill>
+              <a:ln>
+                <a:noFill/>
+              </a:ln>
+            </p:spPr>
+            <p:style>
+              <a:lnRef idx="2">
+                <a:schemeClr val="accent1">
+                  <a:shade val="50000"/>
+                </a:schemeClr>
+              </a:lnRef>
+              <a:fillRef idx="1">
+                <a:schemeClr val="accent1"/>
+              </a:fillRef>
+              <a:effectRef idx="0">
+                <a:schemeClr val="accent1"/>
+              </a:effectRef>
+              <a:fontRef idx="minor">
+                <a:schemeClr val="lt1"/>
+              </a:fontRef>
+            </p:style>
+            <p:txBody>
+              <a:bodyPr rtlCol="0" anchor="ctr"/>
+              <a:lstStyle/>
+              <a:p>
+                <a:pPr algn="ctr"/>
+                <a:r>
+                  <a:rPr lang="pt-BR" sz="1200" dirty="0" smtClean="0"/>
+                  <a:t>Carga de Memória</a:t>
+                </a:r>
+                <a:endParaRPr lang="pt-BR" sz="1200" dirty="0"/>
+              </a:p>
+            </p:txBody>
+          </p:sp>
+          <p:sp>
+            <p:nvSpPr>
+              <p:cNvPr id="68" name="Retângulo de cantos arredondados 67"/>
+              <p:cNvSpPr/>
+              <p:nvPr/>
+            </p:nvSpPr>
+            <p:spPr>
+              <a:xfrm>
+                <a:off x="4541649" y="1252015"/>
+                <a:ext cx="915255" cy="430334"/>
+              </a:xfrm>
+              <a:prstGeom prst="roundRect">
+                <a:avLst/>
+              </a:prstGeom>
+              <a:solidFill>
+                <a:schemeClr val="accent2">
+                  <a:lumMod val="75000"/>
+                </a:schemeClr>
+              </a:solidFill>
+              <a:ln>
+                <a:noFill/>
+              </a:ln>
+            </p:spPr>
+            <p:style>
+              <a:lnRef idx="2">
+                <a:schemeClr val="accent1">
+                  <a:shade val="50000"/>
+                </a:schemeClr>
+              </a:lnRef>
+              <a:fillRef idx="1">
+                <a:schemeClr val="accent1"/>
+              </a:fillRef>
+              <a:effectRef idx="0">
+                <a:schemeClr val="accent1"/>
+              </a:effectRef>
+              <a:fontRef idx="minor">
+                <a:schemeClr val="lt1"/>
+              </a:fontRef>
+            </p:style>
+            <p:txBody>
+              <a:bodyPr rtlCol="0" anchor="ctr"/>
+              <a:lstStyle/>
+              <a:p>
+                <a:pPr algn="ctr"/>
+                <a:r>
+                  <a:rPr lang="pt-BR" sz="1200" dirty="0" smtClean="0"/>
+                  <a:t>Carga de CPU</a:t>
+                </a:r>
+                <a:endParaRPr lang="pt-BR" sz="1200" dirty="0"/>
+              </a:p>
+            </p:txBody>
+          </p:sp>
+        </p:grpSp>
+        <p:sp>
+          <p:nvSpPr>
+            <p:cNvPr id="69" name="Retângulo de cantos arredondados 68"/>
+            <p:cNvSpPr/>
+            <p:nvPr/>
+          </p:nvSpPr>
+          <p:spPr>
+            <a:xfrm rot="5400000">
+              <a:off x="4819986" y="431185"/>
+              <a:ext cx="309111" cy="2811442"/>
+            </a:xfrm>
+            <a:prstGeom prst="roundRect">
+              <a:avLst/>
+            </a:prstGeom>
+            <a:solidFill>
+              <a:schemeClr val="accent6">
+                <a:lumMod val="75000"/>
+              </a:schemeClr>
+            </a:solidFill>
+            <a:ln>
+              <a:noFill/>
+            </a:ln>
+          </p:spPr>
+          <p:style>
+            <a:lnRef idx="2">
+              <a:schemeClr val="accent1">
+                <a:shade val="50000"/>
+              </a:schemeClr>
+            </a:lnRef>
+            <a:fillRef idx="1">
+              <a:schemeClr val="accent1"/>
+            </a:fillRef>
+            <a:effectRef idx="0">
+              <a:schemeClr val="accent1"/>
+            </a:effectRef>
+            <a:fontRef idx="minor">
+              <a:schemeClr val="lt1"/>
+            </a:fontRef>
+          </p:style>
+          <p:txBody>
+            <a:bodyPr vert="vert270" rtlCol="0" anchor="ctr"/>
+            <a:lstStyle/>
+            <a:p>
+              <a:pPr algn="ctr"/>
+              <a:r>
+                <a:rPr lang="pt-BR" dirty="0" smtClean="0"/>
+                <a:t>Dados de Execução</a:t>
+              </a:r>
+              <a:endParaRPr lang="pt-BR" dirty="0"/>
+            </a:p>
+          </p:txBody>
+        </p:sp>
+      </p:grpSp>
+      <p:sp>
+        <p:nvSpPr>
+          <p:cNvPr id="71" name="Seta para baixo 70"/>
+          <p:cNvSpPr/>
+          <p:nvPr/>
+        </p:nvSpPr>
+        <p:spPr>
+          <a:xfrm>
+            <a:off x="4281005" y="2335625"/>
+            <a:ext cx="543230" cy="423358"/>
+          </a:xfrm>
+          <a:prstGeom prst="downArrow">
+            <a:avLst/>
+          </a:prstGeom>
+          <a:solidFill>
+            <a:srgbClr val="FFC000"/>
+          </a:solidFill>
+        </p:spPr>
+        <p:style>
+          <a:lnRef idx="2">
+            <a:schemeClr val="accent1">
+              <a:shade val="50000"/>
+            </a:schemeClr>
+          </a:lnRef>
+          <a:fillRef idx="1">
+            <a:schemeClr val="accent1"/>
+          </a:fillRef>
+          <a:effectRef idx="0">
+            <a:schemeClr val="accent1"/>
+          </a:effectRef>
+          <a:fontRef idx="minor">
+            <a:schemeClr val="lt1"/>
+          </a:fontRef>
+        </p:style>
+        <p:txBody>
+          <a:bodyPr rtlCol="0" anchor="ctr"/>
+          <a:lstStyle/>
+          <a:p>
+            <a:pPr algn="ctr"/>
+            <a:endParaRPr lang="pt-BR" sz="1200"/>
+          </a:p>
+        </p:txBody>
+      </p:sp>
+      <p:sp>
+        <p:nvSpPr>
+          <p:cNvPr id="75" name="Seta para baixo 74"/>
+          <p:cNvSpPr/>
+          <p:nvPr/>
+        </p:nvSpPr>
+        <p:spPr>
+          <a:xfrm>
+            <a:off x="4146032" y="4881860"/>
+            <a:ext cx="543230" cy="423358"/>
+          </a:xfrm>
+          <a:prstGeom prst="downArrow">
+            <a:avLst/>
+          </a:prstGeom>
+          <a:solidFill>
+            <a:srgbClr val="FFC000"/>
+          </a:solidFill>
+        </p:spPr>
+        <p:style>
+          <a:lnRef idx="2">
+            <a:schemeClr val="accent1">
+              <a:shade val="50000"/>
+            </a:schemeClr>
+          </a:lnRef>
+          <a:fillRef idx="1">
+            <a:schemeClr val="accent1"/>
+          </a:fillRef>
+          <a:effectRef idx="0">
+            <a:schemeClr val="accent1"/>
+          </a:effectRef>
+          <a:fontRef idx="minor">
+            <a:schemeClr val="lt1"/>
+          </a:fontRef>
+        </p:style>
+        <p:txBody>
+          <a:bodyPr rtlCol="0" anchor="ctr"/>
+          <a:lstStyle/>
+          <a:p>
+            <a:pPr algn="ctr"/>
+            <a:endParaRPr lang="pt-BR" sz="1200"/>
+          </a:p>
+        </p:txBody>
+      </p:sp>
+      <p:grpSp>
+        <p:nvGrpSpPr>
+          <p:cNvPr id="24" name="Grupo 23"/>
+          <p:cNvGrpSpPr/>
+          <p:nvPr/>
+        </p:nvGrpSpPr>
+        <p:grpSpPr>
+          <a:xfrm>
+            <a:off x="2805710" y="5341005"/>
+            <a:ext cx="3184896" cy="824299"/>
+            <a:chOff x="3515390" y="1167162"/>
+            <a:chExt cx="2928817" cy="824299"/>
+          </a:xfrm>
+        </p:grpSpPr>
+        <p:sp>
+          <p:nvSpPr>
+            <p:cNvPr id="28" name="Retângulo de cantos arredondados 27"/>
+            <p:cNvSpPr/>
+            <p:nvPr/>
+          </p:nvSpPr>
+          <p:spPr>
+            <a:xfrm rot="5400000">
+              <a:off x="4567649" y="114903"/>
+              <a:ext cx="824299" cy="2928817"/>
+            </a:xfrm>
+            <a:prstGeom prst="roundRect">
+              <a:avLst>
+                <a:gd name="adj" fmla="val 10075"/>
+              </a:avLst>
+            </a:prstGeom>
+            <a:solidFill>
+              <a:schemeClr val="accent6">
+                <a:lumMod val="75000"/>
+              </a:schemeClr>
+            </a:solidFill>
+            <a:ln>
+              <a:solidFill>
+                <a:schemeClr val="accent6">
+                  <a:lumMod val="60000"/>
+                  <a:lumOff val="40000"/>
+                </a:schemeClr>
+              </a:solidFill>
+            </a:ln>
+          </p:spPr>
+          <p:style>
+            <a:lnRef idx="2">
+              <a:schemeClr val="accent1">
+                <a:shade val="50000"/>
+              </a:schemeClr>
+            </a:lnRef>
+            <a:fillRef idx="1">
+              <a:schemeClr val="accent1"/>
+            </a:fillRef>
+            <a:effectRef idx="0">
+              <a:schemeClr val="accent1"/>
+            </a:effectRef>
+            <a:fontRef idx="minor">
+              <a:schemeClr val="lt1"/>
+            </a:fontRef>
+          </p:style>
+          <p:txBody>
+            <a:bodyPr vert="vert270" rtlCol="0" anchor="ctr"/>
+            <a:lstStyle/>
+            <a:p>
+              <a:pPr algn="ctr"/>
+              <a:endParaRPr lang="pt-BR" sz="1200" dirty="0"/>
+            </a:p>
+          </p:txBody>
+        </p:sp>
+        <p:sp>
+          <p:nvSpPr>
+            <p:cNvPr id="33" name="Retângulo de cantos arredondados 32"/>
+            <p:cNvSpPr/>
+            <p:nvPr/>
+          </p:nvSpPr>
+          <p:spPr>
+            <a:xfrm>
+              <a:off x="3592944" y="1233327"/>
+              <a:ext cx="2787320" cy="430334"/>
+            </a:xfrm>
+            <a:prstGeom prst="roundRect">
+              <a:avLst/>
+            </a:prstGeom>
+            <a:solidFill>
+              <a:schemeClr val="accent2">
+                <a:lumMod val="75000"/>
+              </a:schemeClr>
+            </a:solidFill>
+            <a:ln>
+              <a:noFill/>
+            </a:ln>
+          </p:spPr>
+          <p:style>
+            <a:lnRef idx="2">
+              <a:schemeClr val="accent1">
+                <a:shade val="50000"/>
+              </a:schemeClr>
+            </a:lnRef>
+            <a:fillRef idx="1">
+              <a:schemeClr val="accent1"/>
+            </a:fillRef>
+            <a:effectRef idx="0">
+              <a:schemeClr val="accent1"/>
+            </a:effectRef>
+            <a:fontRef idx="minor">
+              <a:schemeClr val="lt1"/>
+            </a:fontRef>
+          </p:style>
+          <p:txBody>
+            <a:bodyPr rtlCol="0" anchor="ctr"/>
+            <a:lstStyle/>
+            <a:p>
+              <a:pPr algn="ctr"/>
+              <a:r>
+                <a:rPr lang="pt-BR" sz="1600" dirty="0" smtClean="0"/>
+                <a:t>Planilha Desempenho Preenchida</a:t>
+              </a:r>
+              <a:endParaRPr lang="pt-BR" sz="1600" dirty="0"/>
+            </a:p>
+          </p:txBody>
+        </p:sp>
+        <p:sp>
+          <p:nvSpPr>
+            <p:cNvPr id="30" name="Retângulo de cantos arredondados 29"/>
+            <p:cNvSpPr/>
+            <p:nvPr/>
+          </p:nvSpPr>
+          <p:spPr>
+            <a:xfrm rot="5400000">
+              <a:off x="4819986" y="431185"/>
+              <a:ext cx="309111" cy="2811442"/>
+            </a:xfrm>
+            <a:prstGeom prst="roundRect">
+              <a:avLst/>
+            </a:prstGeom>
+            <a:solidFill>
+              <a:schemeClr val="accent6">
+                <a:lumMod val="75000"/>
+              </a:schemeClr>
+            </a:solidFill>
+            <a:ln>
+              <a:noFill/>
+            </a:ln>
+          </p:spPr>
+          <p:style>
+            <a:lnRef idx="2">
+              <a:schemeClr val="accent1">
+                <a:shade val="50000"/>
+              </a:schemeClr>
+            </a:lnRef>
+            <a:fillRef idx="1">
+              <a:schemeClr val="accent1"/>
+            </a:fillRef>
+            <a:effectRef idx="0">
+              <a:schemeClr val="accent1"/>
+            </a:effectRef>
+            <a:fontRef idx="minor">
+              <a:schemeClr val="lt1"/>
+            </a:fontRef>
+          </p:style>
+          <p:txBody>
+            <a:bodyPr vert="vert270" rtlCol="0" anchor="ctr"/>
+            <a:lstStyle/>
+            <a:p>
+              <a:pPr algn="ctr"/>
+              <a:r>
+                <a:rPr lang="pt-BR" sz="2000" dirty="0" smtClean="0"/>
+                <a:t>Resultados Intermediários</a:t>
+              </a:r>
+              <a:endParaRPr lang="pt-BR" sz="2000" dirty="0"/>
+            </a:p>
+          </p:txBody>
+        </p:sp>
+      </p:grpSp>
+      <p:grpSp>
+        <p:nvGrpSpPr>
+          <p:cNvPr id="6" name="Grupo 5"/>
+          <p:cNvGrpSpPr/>
+          <p:nvPr/>
+        </p:nvGrpSpPr>
+        <p:grpSpPr>
+          <a:xfrm>
+            <a:off x="6779719" y="2827563"/>
+            <a:ext cx="2218677" cy="2009230"/>
+            <a:chOff x="6745811" y="2829083"/>
+            <a:chExt cx="2218677" cy="2009230"/>
+          </a:xfrm>
+        </p:grpSpPr>
+        <p:sp>
+          <p:nvSpPr>
+            <p:cNvPr id="36" name="Retângulo de cantos arredondados 35"/>
+            <p:cNvSpPr/>
+            <p:nvPr/>
+          </p:nvSpPr>
+          <p:spPr>
+            <a:xfrm>
+              <a:off x="6745811" y="2829083"/>
+              <a:ext cx="2218677" cy="2009230"/>
+            </a:xfrm>
+            <a:prstGeom prst="roundRect">
+              <a:avLst>
+                <a:gd name="adj" fmla="val 4399"/>
+              </a:avLst>
+            </a:prstGeom>
+            <a:solidFill>
+              <a:schemeClr val="accent6">
+                <a:lumMod val="75000"/>
+              </a:schemeClr>
+            </a:solidFill>
+            <a:ln>
+              <a:solidFill>
+                <a:schemeClr val="accent6">
+                  <a:lumMod val="60000"/>
+                  <a:lumOff val="40000"/>
+                </a:schemeClr>
+              </a:solidFill>
+            </a:ln>
+          </p:spPr>
+          <p:style>
+            <a:lnRef idx="2">
+              <a:schemeClr val="accent1">
+                <a:shade val="50000"/>
+              </a:schemeClr>
+            </a:lnRef>
+            <a:fillRef idx="1">
+              <a:schemeClr val="accent1"/>
+            </a:fillRef>
+            <a:effectRef idx="0">
+              <a:schemeClr val="accent1"/>
+            </a:effectRef>
+            <a:fontRef idx="minor">
+              <a:schemeClr val="lt1"/>
+            </a:fontRef>
+          </p:style>
+          <p:txBody>
+            <a:bodyPr vert="vert270" rtlCol="0" anchor="ctr"/>
+            <a:lstStyle/>
+            <a:p>
+              <a:pPr algn="ctr"/>
+              <a:endParaRPr lang="pt-BR" dirty="0"/>
+            </a:p>
+          </p:txBody>
+        </p:sp>
+        <p:sp>
+          <p:nvSpPr>
+            <p:cNvPr id="37" name="Retângulo de cantos arredondados 36"/>
+            <p:cNvSpPr/>
+            <p:nvPr/>
+          </p:nvSpPr>
+          <p:spPr>
+            <a:xfrm>
+              <a:off x="6790867" y="2978507"/>
+              <a:ext cx="301413" cy="1710383"/>
+            </a:xfrm>
+            <a:prstGeom prst="roundRect">
+              <a:avLst/>
+            </a:prstGeom>
+            <a:solidFill>
+              <a:schemeClr val="accent6">
+                <a:lumMod val="75000"/>
+              </a:schemeClr>
+            </a:solidFill>
+            <a:ln>
+              <a:noFill/>
+            </a:ln>
+          </p:spPr>
+          <p:style>
+            <a:lnRef idx="2">
+              <a:schemeClr val="accent1">
+                <a:shade val="50000"/>
+              </a:schemeClr>
+            </a:lnRef>
+            <a:fillRef idx="1">
+              <a:schemeClr val="accent1"/>
+            </a:fillRef>
+            <a:effectRef idx="0">
+              <a:schemeClr val="accent1"/>
+            </a:effectRef>
+            <a:fontRef idx="minor">
+              <a:schemeClr val="lt1"/>
+            </a:fontRef>
+          </p:style>
+          <p:txBody>
+            <a:bodyPr vert="vert270" rtlCol="0" anchor="ctr"/>
+            <a:lstStyle/>
+            <a:p>
+              <a:pPr algn="ctr"/>
+              <a:r>
+                <a:rPr lang="pt-BR" sz="2000" dirty="0" smtClean="0"/>
+                <a:t>Dados de Saída</a:t>
+              </a:r>
+              <a:endParaRPr lang="pt-BR" sz="2000" dirty="0"/>
+            </a:p>
+          </p:txBody>
+        </p:sp>
+        <p:sp>
+          <p:nvSpPr>
+            <p:cNvPr id="39" name="Retângulo de cantos arredondados 38"/>
+            <p:cNvSpPr/>
+            <p:nvPr/>
+          </p:nvSpPr>
+          <p:spPr>
+            <a:xfrm>
+              <a:off x="7122423" y="3447110"/>
+              <a:ext cx="1770057" cy="773176"/>
+            </a:xfrm>
+            <a:prstGeom prst="roundRect">
+              <a:avLst/>
+            </a:prstGeom>
+            <a:solidFill>
+              <a:schemeClr val="accent2">
+                <a:lumMod val="75000"/>
+              </a:schemeClr>
+            </a:solidFill>
+            <a:ln>
+              <a:noFill/>
+            </a:ln>
+          </p:spPr>
+          <p:style>
+            <a:lnRef idx="2">
+              <a:schemeClr val="accent1">
+                <a:shade val="50000"/>
+              </a:schemeClr>
+            </a:lnRef>
+            <a:fillRef idx="1">
+              <a:schemeClr val="accent1"/>
+            </a:fillRef>
+            <a:effectRef idx="0">
+              <a:schemeClr val="accent1"/>
+            </a:effectRef>
+            <a:fontRef idx="minor">
+              <a:schemeClr val="lt1"/>
+            </a:fontRef>
+          </p:style>
+          <p:txBody>
+            <a:bodyPr rtlCol="0" anchor="ctr"/>
+            <a:lstStyle/>
+            <a:p>
+              <a:pPr algn="ctr"/>
+              <a:r>
+                <a:rPr lang="pt-BR" dirty="0" smtClean="0"/>
+                <a:t>Configuração de Menor Custo Identificada</a:t>
+              </a:r>
+              <a:endParaRPr lang="pt-BR" dirty="0"/>
+            </a:p>
+          </p:txBody>
+        </p:sp>
+      </p:grpSp>
+      <p:sp>
+        <p:nvSpPr>
+          <p:cNvPr id="3" name="Seta para a direita 2"/>
+          <p:cNvSpPr/>
+          <p:nvPr/>
+        </p:nvSpPr>
+        <p:spPr>
+          <a:xfrm>
+            <a:off x="6071468" y="3392493"/>
+            <a:ext cx="661643" cy="879370"/>
+          </a:xfrm>
+          <a:prstGeom prst="rightArrow">
+            <a:avLst/>
+          </a:prstGeom>
+          <a:solidFill>
+            <a:srgbClr val="92D050"/>
+          </a:solidFill>
+          <a:ln>
+            <a:solidFill>
+              <a:schemeClr val="accent3">
+                <a:lumMod val="50000"/>
+              </a:schemeClr>
+            </a:solidFill>
+          </a:ln>
+        </p:spPr>
+        <p:style>
+          <a:lnRef idx="2">
+            <a:schemeClr val="accent1">
+              <a:shade val="50000"/>
+            </a:schemeClr>
+          </a:lnRef>
+          <a:fillRef idx="1">
+            <a:schemeClr val="accent1"/>
+          </a:fillRef>
+          <a:effectRef idx="0">
+            <a:schemeClr val="accent1"/>
+          </a:effectRef>
+          <a:fontRef idx="minor">
+            <a:schemeClr val="lt1"/>
+          </a:fontRef>
+        </p:style>
+        <p:txBody>
+          <a:bodyPr rtlCol="0" anchor="ctr"/>
+          <a:lstStyle/>
+          <a:p>
+            <a:pPr algn="ctr"/>
+            <a:endParaRPr lang="pt-BR"/>
+          </a:p>
+        </p:txBody>
+      </p:sp>
+    </p:spTree>
+    <p:extLst>
+      <p:ext uri="{BB962C8B-B14F-4D97-AF65-F5344CB8AC3E}">
+        <p14:creationId xmlns:p14="http://schemas.microsoft.com/office/powerpoint/2010/main" val="2757792418"/>
+      </p:ext>
+    </p:extLst>
+  </p:cSld>
+  <p:clrMapOvr>
+    <a:masterClrMapping/>
+  </p:clrMapOvr>
+  <p:timing>
+    <p:tnLst>
+      <p:par>
+        <p:cTn id="1" dur="indefinite" restart="never" nodeType="tmRoot"/>
+      </p:par>
+    </p:tnLst>
+  </p:timing>
+</p:sld>
+</file>
+
+<file path=ppt/slides/slide3.xml><?xml version="1.0" encoding="utf-8"?>
 <p:sld xmlns:a="http://schemas.openxmlformats.org/drawingml/2006/main" xmlns:r="http://schemas.openxmlformats.org/officeDocument/2006/relationships" xmlns:p="http://schemas.openxmlformats.org/presentationml/2006/main">
   <p:cSld>
     <p:spTree>

</xml_diff>

<commit_message>
Imagem Processo Alto Nivel
</commit_message>
<xml_diff>
--- a/Ilustracoes Dissertacao.pptx
+++ b/Ilustracoes Dissertacao.pptx
@@ -7,7 +7,8 @@
   <p:sldIdLst>
     <p:sldId id="256" r:id="rId2"/>
     <p:sldId id="258" r:id="rId3"/>
-    <p:sldId id="257" r:id="rId4"/>
+    <p:sldId id="259" r:id="rId4"/>
+    <p:sldId id="257" r:id="rId5"/>
   </p:sldIdLst>
   <p:sldSz cx="9144000" cy="6858000" type="screen4x3"/>
   <p:notesSz cx="6858000" cy="9144000"/>
@@ -1947,6 +1948,925 @@
 </dgm:colorsDef>
 </file>
 
+<file path=ppt/diagrams/colors3.xml><?xml version="1.0" encoding="utf-8"?>
+<dgm:colorsDef xmlns:dgm="http://schemas.openxmlformats.org/drawingml/2006/diagram" xmlns:a="http://schemas.openxmlformats.org/drawingml/2006/main" uniqueId="urn:microsoft.com/office/officeart/2005/8/colors/colorful1">
+  <dgm:title val=""/>
+  <dgm:desc val=""/>
+  <dgm:catLst>
+    <dgm:cat type="colorful" pri="10100"/>
+  </dgm:catLst>
+  <dgm:styleLbl name="node0">
+    <dgm:fillClrLst meth="repeat">
+      <a:schemeClr val="accent1"/>
+    </dgm:fillClrLst>
+    <dgm:linClrLst meth="repeat">
+      <a:schemeClr val="lt1"/>
+    </dgm:linClrLst>
+    <dgm:effectClrLst/>
+    <dgm:txLinClrLst/>
+    <dgm:txFillClrLst/>
+    <dgm:txEffectClrLst/>
+  </dgm:styleLbl>
+  <dgm:styleLbl name="node1">
+    <dgm:fillClrLst meth="repeat">
+      <a:schemeClr val="accent2"/>
+      <a:schemeClr val="accent3"/>
+      <a:schemeClr val="accent4"/>
+      <a:schemeClr val="accent5"/>
+      <a:schemeClr val="accent6"/>
+    </dgm:fillClrLst>
+    <dgm:linClrLst meth="repeat">
+      <a:schemeClr val="lt1"/>
+    </dgm:linClrLst>
+    <dgm:effectClrLst/>
+    <dgm:txLinClrLst/>
+    <dgm:txFillClrLst/>
+    <dgm:txEffectClrLst/>
+  </dgm:styleLbl>
+  <dgm:styleLbl name="alignNode1">
+    <dgm:fillClrLst meth="repeat">
+      <a:schemeClr val="accent2"/>
+      <a:schemeClr val="accent3"/>
+      <a:schemeClr val="accent4"/>
+      <a:schemeClr val="accent5"/>
+      <a:schemeClr val="accent6"/>
+    </dgm:fillClrLst>
+    <dgm:linClrLst meth="repeat">
+      <a:schemeClr val="accent2"/>
+      <a:schemeClr val="accent3"/>
+      <a:schemeClr val="accent4"/>
+      <a:schemeClr val="accent5"/>
+      <a:schemeClr val="accent6"/>
+    </dgm:linClrLst>
+    <dgm:effectClrLst/>
+    <dgm:txLinClrLst/>
+    <dgm:txFillClrLst/>
+    <dgm:txEffectClrLst/>
+  </dgm:styleLbl>
+  <dgm:styleLbl name="lnNode1">
+    <dgm:fillClrLst meth="repeat">
+      <a:schemeClr val="accent2"/>
+      <a:schemeClr val="accent3"/>
+      <a:schemeClr val="accent4"/>
+      <a:schemeClr val="accent5"/>
+      <a:schemeClr val="accent6"/>
+    </dgm:fillClrLst>
+    <dgm:linClrLst meth="repeat">
+      <a:schemeClr val="lt1"/>
+    </dgm:linClrLst>
+    <dgm:effectClrLst/>
+    <dgm:txLinClrLst/>
+    <dgm:txFillClrLst/>
+    <dgm:txEffectClrLst/>
+  </dgm:styleLbl>
+  <dgm:styleLbl name="vennNode1">
+    <dgm:fillClrLst meth="repeat">
+      <a:schemeClr val="accent2">
+        <a:alpha val="50000"/>
+      </a:schemeClr>
+      <a:schemeClr val="accent3">
+        <a:alpha val="50000"/>
+      </a:schemeClr>
+      <a:schemeClr val="accent4">
+        <a:alpha val="50000"/>
+      </a:schemeClr>
+      <a:schemeClr val="accent5">
+        <a:alpha val="50000"/>
+      </a:schemeClr>
+      <a:schemeClr val="accent6">
+        <a:alpha val="50000"/>
+      </a:schemeClr>
+    </dgm:fillClrLst>
+    <dgm:linClrLst meth="repeat">
+      <a:schemeClr val="lt1"/>
+    </dgm:linClrLst>
+    <dgm:effectClrLst/>
+    <dgm:txLinClrLst/>
+    <dgm:txFillClrLst/>
+    <dgm:txEffectClrLst/>
+  </dgm:styleLbl>
+  <dgm:styleLbl name="node2">
+    <dgm:fillClrLst>
+      <a:schemeClr val="accent2"/>
+    </dgm:fillClrLst>
+    <dgm:linClrLst meth="repeat">
+      <a:schemeClr val="lt1"/>
+    </dgm:linClrLst>
+    <dgm:effectClrLst/>
+    <dgm:txLinClrLst/>
+    <dgm:txFillClrLst/>
+    <dgm:txEffectClrLst/>
+  </dgm:styleLbl>
+  <dgm:styleLbl name="node3">
+    <dgm:fillClrLst>
+      <a:schemeClr val="accent3"/>
+    </dgm:fillClrLst>
+    <dgm:linClrLst meth="repeat">
+      <a:schemeClr val="lt1"/>
+    </dgm:linClrLst>
+    <dgm:effectClrLst/>
+    <dgm:txLinClrLst/>
+    <dgm:txFillClrLst/>
+    <dgm:txEffectClrLst/>
+  </dgm:styleLbl>
+  <dgm:styleLbl name="node4">
+    <dgm:fillClrLst>
+      <a:schemeClr val="accent4"/>
+    </dgm:fillClrLst>
+    <dgm:linClrLst meth="repeat">
+      <a:schemeClr val="lt1"/>
+    </dgm:linClrLst>
+    <dgm:effectClrLst/>
+    <dgm:txLinClrLst/>
+    <dgm:txFillClrLst/>
+    <dgm:txEffectClrLst/>
+  </dgm:styleLbl>
+  <dgm:styleLbl name="fgImgPlace1">
+    <dgm:fillClrLst meth="repeat">
+      <a:schemeClr val="accent2">
+        <a:tint val="50000"/>
+      </a:schemeClr>
+      <a:schemeClr val="accent3">
+        <a:tint val="50000"/>
+      </a:schemeClr>
+      <a:schemeClr val="accent4">
+        <a:tint val="50000"/>
+      </a:schemeClr>
+      <a:schemeClr val="accent5">
+        <a:tint val="50000"/>
+      </a:schemeClr>
+      <a:schemeClr val="accent6">
+        <a:tint val="50000"/>
+      </a:schemeClr>
+    </dgm:fillClrLst>
+    <dgm:linClrLst meth="repeat">
+      <a:schemeClr val="lt1"/>
+    </dgm:linClrLst>
+    <dgm:effectClrLst/>
+    <dgm:txLinClrLst/>
+    <dgm:txFillClrLst meth="repeat">
+      <a:schemeClr val="lt1"/>
+    </dgm:txFillClrLst>
+    <dgm:txEffectClrLst/>
+  </dgm:styleLbl>
+  <dgm:styleLbl name="alignImgPlace1">
+    <dgm:fillClrLst>
+      <a:schemeClr val="accent1">
+        <a:tint val="50000"/>
+      </a:schemeClr>
+      <a:schemeClr val="accent2">
+        <a:tint val="20000"/>
+      </a:schemeClr>
+    </dgm:fillClrLst>
+    <dgm:linClrLst meth="repeat">
+      <a:schemeClr val="lt1"/>
+    </dgm:linClrLst>
+    <dgm:effectClrLst/>
+    <dgm:txLinClrLst/>
+    <dgm:txFillClrLst meth="repeat">
+      <a:schemeClr val="lt1"/>
+    </dgm:txFillClrLst>
+    <dgm:txEffectClrLst/>
+  </dgm:styleLbl>
+  <dgm:styleLbl name="bgImgPlace1">
+    <dgm:fillClrLst>
+      <a:schemeClr val="accent1">
+        <a:tint val="50000"/>
+      </a:schemeClr>
+      <a:schemeClr val="accent2">
+        <a:tint val="20000"/>
+      </a:schemeClr>
+    </dgm:fillClrLst>
+    <dgm:linClrLst meth="repeat">
+      <a:schemeClr val="lt1"/>
+    </dgm:linClrLst>
+    <dgm:effectClrLst/>
+    <dgm:txLinClrLst/>
+    <dgm:txFillClrLst meth="repeat">
+      <a:schemeClr val="lt1"/>
+    </dgm:txFillClrLst>
+    <dgm:txEffectClrLst/>
+  </dgm:styleLbl>
+  <dgm:styleLbl name="sibTrans2D1">
+    <dgm:fillClrLst meth="repeat">
+      <a:schemeClr val="accent2"/>
+      <a:schemeClr val="accent3"/>
+      <a:schemeClr val="accent4"/>
+      <a:schemeClr val="accent5"/>
+      <a:schemeClr val="accent6"/>
+    </dgm:fillClrLst>
+    <dgm:linClrLst meth="cycle">
+      <a:schemeClr val="lt1"/>
+    </dgm:linClrLst>
+    <dgm:effectClrLst/>
+    <dgm:txLinClrLst/>
+    <dgm:txFillClrLst/>
+    <dgm:txEffectClrLst/>
+  </dgm:styleLbl>
+  <dgm:styleLbl name="fgSibTrans2D1">
+    <dgm:fillClrLst meth="repeat">
+      <a:schemeClr val="accent2"/>
+      <a:schemeClr val="accent3"/>
+      <a:schemeClr val="accent4"/>
+      <a:schemeClr val="accent5"/>
+      <a:schemeClr val="accent6"/>
+    </dgm:fillClrLst>
+    <dgm:linClrLst meth="cycle">
+      <a:schemeClr val="lt1"/>
+    </dgm:linClrLst>
+    <dgm:effectClrLst/>
+    <dgm:txLinClrLst/>
+    <dgm:txFillClrLst meth="repeat">
+      <a:schemeClr val="lt1"/>
+    </dgm:txFillClrLst>
+    <dgm:txEffectClrLst/>
+  </dgm:styleLbl>
+  <dgm:styleLbl name="bgSibTrans2D1">
+    <dgm:fillClrLst meth="repeat">
+      <a:schemeClr val="accent2"/>
+      <a:schemeClr val="accent3"/>
+      <a:schemeClr val="accent4"/>
+      <a:schemeClr val="accent5"/>
+      <a:schemeClr val="accent6"/>
+    </dgm:fillClrLst>
+    <dgm:linClrLst meth="cycle">
+      <a:schemeClr val="lt1"/>
+    </dgm:linClrLst>
+    <dgm:effectClrLst/>
+    <dgm:txLinClrLst/>
+    <dgm:txFillClrLst meth="repeat">
+      <a:schemeClr val="lt1"/>
+    </dgm:txFillClrLst>
+    <dgm:txEffectClrLst/>
+  </dgm:styleLbl>
+  <dgm:styleLbl name="sibTrans1D1">
+    <dgm:fillClrLst meth="repeat">
+      <a:schemeClr val="accent2"/>
+      <a:schemeClr val="accent3"/>
+      <a:schemeClr val="accent4"/>
+      <a:schemeClr val="accent5"/>
+      <a:schemeClr val="accent6"/>
+    </dgm:fillClrLst>
+    <dgm:linClrLst meth="repeat">
+      <a:schemeClr val="accent2"/>
+      <a:schemeClr val="accent3"/>
+      <a:schemeClr val="accent4"/>
+      <a:schemeClr val="accent5"/>
+      <a:schemeClr val="accent6"/>
+    </dgm:linClrLst>
+    <dgm:effectClrLst/>
+    <dgm:txLinClrLst/>
+    <dgm:txFillClrLst meth="repeat">
+      <a:schemeClr val="tx1"/>
+    </dgm:txFillClrLst>
+    <dgm:txEffectClrLst/>
+  </dgm:styleLbl>
+  <dgm:styleLbl name="callout">
+    <dgm:fillClrLst meth="repeat">
+      <a:schemeClr val="accent2"/>
+    </dgm:fillClrLst>
+    <dgm:linClrLst meth="repeat">
+      <a:schemeClr val="accent2">
+        <a:tint val="50000"/>
+      </a:schemeClr>
+    </dgm:linClrLst>
+    <dgm:effectClrLst/>
+    <dgm:txLinClrLst/>
+    <dgm:txFillClrLst meth="repeat">
+      <a:schemeClr val="tx1"/>
+    </dgm:txFillClrLst>
+    <dgm:txEffectClrLst/>
+  </dgm:styleLbl>
+  <dgm:styleLbl name="asst0">
+    <dgm:fillClrLst meth="repeat">
+      <a:schemeClr val="accent1"/>
+    </dgm:fillClrLst>
+    <dgm:linClrLst meth="repeat">
+      <a:schemeClr val="lt1"/>
+    </dgm:linClrLst>
+    <dgm:effectClrLst/>
+    <dgm:txLinClrLst/>
+    <dgm:txFillClrLst/>
+    <dgm:txEffectClrLst/>
+  </dgm:styleLbl>
+  <dgm:styleLbl name="asst1">
+    <dgm:fillClrLst meth="repeat">
+      <a:schemeClr val="accent2"/>
+    </dgm:fillClrLst>
+    <dgm:linClrLst meth="repeat">
+      <a:schemeClr val="lt1"/>
+    </dgm:linClrLst>
+    <dgm:effectClrLst/>
+    <dgm:txLinClrLst/>
+    <dgm:txFillClrLst/>
+    <dgm:txEffectClrLst/>
+  </dgm:styleLbl>
+  <dgm:styleLbl name="asst2">
+    <dgm:fillClrLst>
+      <a:schemeClr val="accent3"/>
+    </dgm:fillClrLst>
+    <dgm:linClrLst meth="repeat">
+      <a:schemeClr val="lt1"/>
+    </dgm:linClrLst>
+    <dgm:effectClrLst/>
+    <dgm:txLinClrLst/>
+    <dgm:txFillClrLst/>
+    <dgm:txEffectClrLst/>
+  </dgm:styleLbl>
+  <dgm:styleLbl name="asst3">
+    <dgm:fillClrLst>
+      <a:schemeClr val="accent4"/>
+    </dgm:fillClrLst>
+    <dgm:linClrLst meth="repeat">
+      <a:schemeClr val="lt1"/>
+    </dgm:linClrLst>
+    <dgm:effectClrLst/>
+    <dgm:txLinClrLst/>
+    <dgm:txFillClrLst/>
+    <dgm:txEffectClrLst/>
+  </dgm:styleLbl>
+  <dgm:styleLbl name="asst4">
+    <dgm:fillClrLst>
+      <a:schemeClr val="accent5"/>
+    </dgm:fillClrLst>
+    <dgm:linClrLst meth="repeat">
+      <a:schemeClr val="lt1"/>
+    </dgm:linClrLst>
+    <dgm:effectClrLst/>
+    <dgm:txLinClrLst/>
+    <dgm:txFillClrLst/>
+    <dgm:txEffectClrLst/>
+  </dgm:styleLbl>
+  <dgm:styleLbl name="parChTrans2D1">
+    <dgm:fillClrLst meth="repeat">
+      <a:schemeClr val="accent2"/>
+    </dgm:fillClrLst>
+    <dgm:linClrLst meth="repeat">
+      <a:schemeClr val="lt1"/>
+    </dgm:linClrLst>
+    <dgm:effectClrLst/>
+    <dgm:txLinClrLst/>
+    <dgm:txFillClrLst meth="repeat">
+      <a:schemeClr val="lt1"/>
+    </dgm:txFillClrLst>
+    <dgm:txEffectClrLst/>
+  </dgm:styleLbl>
+  <dgm:styleLbl name="parChTrans2D2">
+    <dgm:fillClrLst meth="repeat">
+      <a:schemeClr val="accent3"/>
+    </dgm:fillClrLst>
+    <dgm:linClrLst meth="repeat">
+      <a:schemeClr val="lt1"/>
+    </dgm:linClrLst>
+    <dgm:effectClrLst/>
+    <dgm:txLinClrLst/>
+    <dgm:txFillClrLst/>
+    <dgm:txEffectClrLst/>
+  </dgm:styleLbl>
+  <dgm:styleLbl name="parChTrans2D3">
+    <dgm:fillClrLst meth="repeat">
+      <a:schemeClr val="accent4"/>
+    </dgm:fillClrLst>
+    <dgm:linClrLst meth="repeat">
+      <a:schemeClr val="lt1"/>
+    </dgm:linClrLst>
+    <dgm:effectClrLst/>
+    <dgm:txLinClrLst/>
+    <dgm:txFillClrLst/>
+    <dgm:txEffectClrLst/>
+  </dgm:styleLbl>
+  <dgm:styleLbl name="parChTrans2D4">
+    <dgm:fillClrLst meth="repeat">
+      <a:schemeClr val="accent5"/>
+    </dgm:fillClrLst>
+    <dgm:linClrLst meth="repeat">
+      <a:schemeClr val="lt1"/>
+    </dgm:linClrLst>
+    <dgm:effectClrLst/>
+    <dgm:txLinClrLst/>
+    <dgm:txFillClrLst meth="repeat">
+      <a:schemeClr val="lt1"/>
+    </dgm:txFillClrLst>
+    <dgm:txEffectClrLst/>
+  </dgm:styleLbl>
+  <dgm:styleLbl name="parChTrans1D1">
+    <dgm:fillClrLst meth="repeat">
+      <a:schemeClr val="accent2"/>
+    </dgm:fillClrLst>
+    <dgm:linClrLst meth="repeat">
+      <a:schemeClr val="accent1"/>
+    </dgm:linClrLst>
+    <dgm:effectClrLst/>
+    <dgm:txLinClrLst/>
+    <dgm:txFillClrLst meth="repeat">
+      <a:schemeClr val="tx1"/>
+    </dgm:txFillClrLst>
+    <dgm:txEffectClrLst/>
+  </dgm:styleLbl>
+  <dgm:styleLbl name="parChTrans1D2">
+    <dgm:fillClrLst meth="repeat">
+      <a:schemeClr val="accent3">
+        <a:tint val="90000"/>
+      </a:schemeClr>
+    </dgm:fillClrLst>
+    <dgm:linClrLst meth="repeat">
+      <a:schemeClr val="accent2"/>
+    </dgm:linClrLst>
+    <dgm:effectClrLst/>
+    <dgm:txLinClrLst/>
+    <dgm:txFillClrLst meth="repeat">
+      <a:schemeClr val="tx1"/>
+    </dgm:txFillClrLst>
+    <dgm:txEffectClrLst/>
+  </dgm:styleLbl>
+  <dgm:styleLbl name="parChTrans1D3">
+    <dgm:fillClrLst meth="repeat">
+      <a:schemeClr val="accent4">
+        <a:tint val="70000"/>
+      </a:schemeClr>
+    </dgm:fillClrLst>
+    <dgm:linClrLst meth="repeat">
+      <a:schemeClr val="accent3"/>
+    </dgm:linClrLst>
+    <dgm:effectClrLst/>
+    <dgm:txLinClrLst/>
+    <dgm:txFillClrLst meth="repeat">
+      <a:schemeClr val="tx1"/>
+    </dgm:txFillClrLst>
+    <dgm:txEffectClrLst/>
+  </dgm:styleLbl>
+  <dgm:styleLbl name="parChTrans1D4">
+    <dgm:fillClrLst meth="repeat">
+      <a:schemeClr val="accent5">
+        <a:tint val="50000"/>
+      </a:schemeClr>
+    </dgm:fillClrLst>
+    <dgm:linClrLst meth="repeat">
+      <a:schemeClr val="accent4"/>
+    </dgm:linClrLst>
+    <dgm:effectClrLst/>
+    <dgm:txLinClrLst/>
+    <dgm:txFillClrLst meth="repeat">
+      <a:schemeClr val="tx1"/>
+    </dgm:txFillClrLst>
+    <dgm:txEffectClrLst/>
+  </dgm:styleLbl>
+  <dgm:styleLbl name="fgAcc1">
+    <dgm:fillClrLst meth="repeat">
+      <a:schemeClr val="lt1">
+        <a:alpha val="90000"/>
+      </a:schemeClr>
+    </dgm:fillClrLst>
+    <dgm:linClrLst meth="repeat">
+      <a:schemeClr val="accent2"/>
+      <a:schemeClr val="accent3"/>
+      <a:schemeClr val="accent4"/>
+      <a:schemeClr val="accent5"/>
+      <a:schemeClr val="accent6"/>
+    </dgm:linClrLst>
+    <dgm:effectClrLst/>
+    <dgm:txLinClrLst/>
+    <dgm:txFillClrLst meth="repeat">
+      <a:schemeClr val="dk1"/>
+    </dgm:txFillClrLst>
+    <dgm:txEffectClrLst/>
+  </dgm:styleLbl>
+  <dgm:styleLbl name="conFgAcc1">
+    <dgm:fillClrLst meth="repeat">
+      <a:schemeClr val="lt1">
+        <a:alpha val="90000"/>
+      </a:schemeClr>
+    </dgm:fillClrLst>
+    <dgm:linClrLst meth="repeat">
+      <a:schemeClr val="accent2"/>
+      <a:schemeClr val="accent3"/>
+      <a:schemeClr val="accent4"/>
+      <a:schemeClr val="accent5"/>
+      <a:schemeClr val="accent6"/>
+    </dgm:linClrLst>
+    <dgm:effectClrLst/>
+    <dgm:txLinClrLst/>
+    <dgm:txFillClrLst meth="repeat">
+      <a:schemeClr val="dk1"/>
+    </dgm:txFillClrLst>
+    <dgm:txEffectClrLst/>
+  </dgm:styleLbl>
+  <dgm:styleLbl name="alignAcc1">
+    <dgm:fillClrLst meth="repeat">
+      <a:schemeClr val="lt1">
+        <a:alpha val="90000"/>
+      </a:schemeClr>
+    </dgm:fillClrLst>
+    <dgm:linClrLst meth="repeat">
+      <a:schemeClr val="accent2"/>
+      <a:schemeClr val="accent3"/>
+      <a:schemeClr val="accent4"/>
+      <a:schemeClr val="accent5"/>
+      <a:schemeClr val="accent6"/>
+    </dgm:linClrLst>
+    <dgm:effectClrLst/>
+    <dgm:txLinClrLst/>
+    <dgm:txFillClrLst meth="repeat">
+      <a:schemeClr val="dk1"/>
+    </dgm:txFillClrLst>
+    <dgm:txEffectClrLst/>
+  </dgm:styleLbl>
+  <dgm:styleLbl name="trAlignAcc1">
+    <dgm:fillClrLst meth="repeat">
+      <a:schemeClr val="lt1">
+        <a:alpha val="40000"/>
+      </a:schemeClr>
+    </dgm:fillClrLst>
+    <dgm:linClrLst meth="repeat">
+      <a:schemeClr val="accent1"/>
+    </dgm:linClrLst>
+    <dgm:effectClrLst/>
+    <dgm:txLinClrLst/>
+    <dgm:txFillClrLst meth="repeat">
+      <a:schemeClr val="dk1"/>
+    </dgm:txFillClrLst>
+    <dgm:txEffectClrLst/>
+  </dgm:styleLbl>
+  <dgm:styleLbl name="bgAcc1">
+    <dgm:fillClrLst meth="repeat">
+      <a:schemeClr val="lt1">
+        <a:alpha val="90000"/>
+      </a:schemeClr>
+    </dgm:fillClrLst>
+    <dgm:linClrLst meth="repeat">
+      <a:schemeClr val="accent2"/>
+      <a:schemeClr val="accent3"/>
+      <a:schemeClr val="accent4"/>
+      <a:schemeClr val="accent5"/>
+      <a:schemeClr val="accent6"/>
+    </dgm:linClrLst>
+    <dgm:effectClrLst/>
+    <dgm:txLinClrLst/>
+    <dgm:txFillClrLst meth="repeat">
+      <a:schemeClr val="dk1"/>
+    </dgm:txFillClrLst>
+    <dgm:txEffectClrLst/>
+  </dgm:styleLbl>
+  <dgm:styleLbl name="solidFgAcc1">
+    <dgm:fillClrLst meth="repeat">
+      <a:schemeClr val="lt1"/>
+    </dgm:fillClrLst>
+    <dgm:linClrLst meth="repeat">
+      <a:schemeClr val="accent2"/>
+      <a:schemeClr val="accent3"/>
+      <a:schemeClr val="accent4"/>
+      <a:schemeClr val="accent5"/>
+      <a:schemeClr val="accent6"/>
+    </dgm:linClrLst>
+    <dgm:effectClrLst/>
+    <dgm:txLinClrLst/>
+    <dgm:txFillClrLst meth="repeat">
+      <a:schemeClr val="dk1"/>
+    </dgm:txFillClrLst>
+    <dgm:txEffectClrLst/>
+  </dgm:styleLbl>
+  <dgm:styleLbl name="solidAlignAcc1">
+    <dgm:fillClrLst meth="repeat">
+      <a:schemeClr val="lt1"/>
+    </dgm:fillClrLst>
+    <dgm:linClrLst meth="repeat">
+      <a:schemeClr val="accent2"/>
+      <a:schemeClr val="accent3"/>
+      <a:schemeClr val="accent4"/>
+      <a:schemeClr val="accent5"/>
+      <a:schemeClr val="accent6"/>
+    </dgm:linClrLst>
+    <dgm:effectClrLst/>
+    <dgm:txLinClrLst/>
+    <dgm:txFillClrLst meth="repeat">
+      <a:schemeClr val="dk1"/>
+    </dgm:txFillClrLst>
+    <dgm:txEffectClrLst/>
+  </dgm:styleLbl>
+  <dgm:styleLbl name="solidBgAcc1">
+    <dgm:fillClrLst meth="repeat">
+      <a:schemeClr val="lt1"/>
+    </dgm:fillClrLst>
+    <dgm:linClrLst meth="repeat">
+      <a:schemeClr val="accent2"/>
+      <a:schemeClr val="accent3"/>
+      <a:schemeClr val="accent4"/>
+      <a:schemeClr val="accent5"/>
+      <a:schemeClr val="accent6"/>
+    </dgm:linClrLst>
+    <dgm:effectClrLst/>
+    <dgm:txLinClrLst/>
+    <dgm:txFillClrLst meth="repeat">
+      <a:schemeClr val="dk1"/>
+    </dgm:txFillClrLst>
+    <dgm:txEffectClrLst/>
+  </dgm:styleLbl>
+  <dgm:styleLbl name="fgAccFollowNode1">
+    <dgm:fillClrLst meth="repeat">
+      <a:schemeClr val="accent2">
+        <a:tint val="40000"/>
+        <a:alpha val="90000"/>
+      </a:schemeClr>
+      <a:schemeClr val="accent3">
+        <a:tint val="40000"/>
+        <a:alpha val="90000"/>
+      </a:schemeClr>
+      <a:schemeClr val="accent4">
+        <a:tint val="40000"/>
+        <a:alpha val="90000"/>
+      </a:schemeClr>
+      <a:schemeClr val="accent5">
+        <a:tint val="40000"/>
+        <a:alpha val="90000"/>
+      </a:schemeClr>
+      <a:schemeClr val="accent6">
+        <a:tint val="40000"/>
+        <a:alpha val="90000"/>
+      </a:schemeClr>
+    </dgm:fillClrLst>
+    <dgm:linClrLst meth="repeat">
+      <a:schemeClr val="accent2">
+        <a:tint val="40000"/>
+        <a:alpha val="90000"/>
+      </a:schemeClr>
+      <a:schemeClr val="accent3">
+        <a:tint val="40000"/>
+        <a:alpha val="90000"/>
+      </a:schemeClr>
+      <a:schemeClr val="accent4">
+        <a:tint val="40000"/>
+        <a:alpha val="90000"/>
+      </a:schemeClr>
+      <a:schemeClr val="accent5">
+        <a:tint val="40000"/>
+        <a:alpha val="90000"/>
+      </a:schemeClr>
+      <a:schemeClr val="accent6">
+        <a:tint val="40000"/>
+        <a:alpha val="90000"/>
+      </a:schemeClr>
+    </dgm:linClrLst>
+    <dgm:effectClrLst/>
+    <dgm:txLinClrLst/>
+    <dgm:txFillClrLst meth="repeat">
+      <a:schemeClr val="dk1"/>
+    </dgm:txFillClrLst>
+    <dgm:txEffectClrLst/>
+  </dgm:styleLbl>
+  <dgm:styleLbl name="alignAccFollowNode1">
+    <dgm:fillClrLst meth="repeat">
+      <a:schemeClr val="accent2">
+        <a:tint val="40000"/>
+        <a:alpha val="90000"/>
+      </a:schemeClr>
+      <a:schemeClr val="accent3">
+        <a:tint val="40000"/>
+        <a:alpha val="90000"/>
+      </a:schemeClr>
+      <a:schemeClr val="accent4">
+        <a:tint val="40000"/>
+        <a:alpha val="90000"/>
+      </a:schemeClr>
+      <a:schemeClr val="accent5">
+        <a:tint val="40000"/>
+        <a:alpha val="90000"/>
+      </a:schemeClr>
+      <a:schemeClr val="accent6">
+        <a:tint val="40000"/>
+        <a:alpha val="90000"/>
+      </a:schemeClr>
+    </dgm:fillClrLst>
+    <dgm:linClrLst meth="repeat">
+      <a:schemeClr val="accent2">
+        <a:tint val="40000"/>
+        <a:alpha val="90000"/>
+      </a:schemeClr>
+      <a:schemeClr val="accent3">
+        <a:tint val="40000"/>
+        <a:alpha val="90000"/>
+      </a:schemeClr>
+      <a:schemeClr val="accent4">
+        <a:tint val="40000"/>
+        <a:alpha val="90000"/>
+      </a:schemeClr>
+      <a:schemeClr val="accent5">
+        <a:tint val="40000"/>
+        <a:alpha val="90000"/>
+      </a:schemeClr>
+      <a:schemeClr val="accent6">
+        <a:tint val="40000"/>
+        <a:alpha val="90000"/>
+      </a:schemeClr>
+    </dgm:linClrLst>
+    <dgm:effectClrLst/>
+    <dgm:txLinClrLst/>
+    <dgm:txFillClrLst meth="repeat">
+      <a:schemeClr val="dk1"/>
+    </dgm:txFillClrLst>
+    <dgm:txEffectClrLst/>
+  </dgm:styleLbl>
+  <dgm:styleLbl name="bgAccFollowNode1">
+    <dgm:fillClrLst meth="repeat">
+      <a:schemeClr val="accent2">
+        <a:tint val="40000"/>
+        <a:alpha val="90000"/>
+      </a:schemeClr>
+      <a:schemeClr val="accent3">
+        <a:tint val="40000"/>
+        <a:alpha val="90000"/>
+      </a:schemeClr>
+      <a:schemeClr val="accent4">
+        <a:tint val="40000"/>
+        <a:alpha val="90000"/>
+      </a:schemeClr>
+      <a:schemeClr val="accent5">
+        <a:tint val="40000"/>
+        <a:alpha val="90000"/>
+      </a:schemeClr>
+      <a:schemeClr val="accent6">
+        <a:tint val="40000"/>
+        <a:alpha val="90000"/>
+      </a:schemeClr>
+    </dgm:fillClrLst>
+    <dgm:linClrLst meth="repeat">
+      <a:schemeClr val="accent2">
+        <a:tint val="40000"/>
+        <a:alpha val="90000"/>
+      </a:schemeClr>
+      <a:schemeClr val="accent3">
+        <a:tint val="40000"/>
+        <a:alpha val="90000"/>
+      </a:schemeClr>
+      <a:schemeClr val="accent4">
+        <a:tint val="40000"/>
+        <a:alpha val="90000"/>
+      </a:schemeClr>
+      <a:schemeClr val="accent5">
+        <a:tint val="40000"/>
+        <a:alpha val="90000"/>
+      </a:schemeClr>
+      <a:schemeClr val="accent6">
+        <a:tint val="40000"/>
+        <a:alpha val="90000"/>
+      </a:schemeClr>
+    </dgm:linClrLst>
+    <dgm:effectClrLst/>
+    <dgm:txLinClrLst/>
+    <dgm:txFillClrLst meth="repeat">
+      <a:schemeClr val="dk1"/>
+    </dgm:txFillClrLst>
+    <dgm:txEffectClrLst/>
+  </dgm:styleLbl>
+  <dgm:styleLbl name="fgAcc0">
+    <dgm:fillClrLst meth="repeat">
+      <a:schemeClr val="lt1">
+        <a:alpha val="90000"/>
+      </a:schemeClr>
+    </dgm:fillClrLst>
+    <dgm:linClrLst>
+      <a:schemeClr val="accent1"/>
+    </dgm:linClrLst>
+    <dgm:effectClrLst/>
+    <dgm:txLinClrLst/>
+    <dgm:txFillClrLst meth="repeat">
+      <a:schemeClr val="dk1"/>
+    </dgm:txFillClrLst>
+    <dgm:txEffectClrLst/>
+  </dgm:styleLbl>
+  <dgm:styleLbl name="fgAcc2">
+    <dgm:fillClrLst meth="repeat">
+      <a:schemeClr val="lt1">
+        <a:alpha val="90000"/>
+      </a:schemeClr>
+    </dgm:fillClrLst>
+    <dgm:linClrLst>
+      <a:schemeClr val="accent2"/>
+    </dgm:linClrLst>
+    <dgm:effectClrLst/>
+    <dgm:txLinClrLst/>
+    <dgm:txFillClrLst meth="repeat">
+      <a:schemeClr val="dk1"/>
+    </dgm:txFillClrLst>
+    <dgm:txEffectClrLst/>
+  </dgm:styleLbl>
+  <dgm:styleLbl name="fgAcc3">
+    <dgm:fillClrLst meth="repeat">
+      <a:schemeClr val="lt1">
+        <a:alpha val="90000"/>
+      </a:schemeClr>
+    </dgm:fillClrLst>
+    <dgm:linClrLst>
+      <a:schemeClr val="accent3"/>
+    </dgm:linClrLst>
+    <dgm:effectClrLst/>
+    <dgm:txLinClrLst/>
+    <dgm:txFillClrLst meth="repeat">
+      <a:schemeClr val="dk1"/>
+    </dgm:txFillClrLst>
+    <dgm:txEffectClrLst/>
+  </dgm:styleLbl>
+  <dgm:styleLbl name="fgAcc4">
+    <dgm:fillClrLst meth="repeat">
+      <a:schemeClr val="lt1">
+        <a:alpha val="90000"/>
+      </a:schemeClr>
+    </dgm:fillClrLst>
+    <dgm:linClrLst>
+      <a:schemeClr val="accent4"/>
+    </dgm:linClrLst>
+    <dgm:effectClrLst/>
+    <dgm:txLinClrLst/>
+    <dgm:txFillClrLst meth="repeat">
+      <a:schemeClr val="dk1"/>
+    </dgm:txFillClrLst>
+    <dgm:txEffectClrLst/>
+  </dgm:styleLbl>
+  <dgm:styleLbl name="bgShp">
+    <dgm:fillClrLst meth="repeat">
+      <a:schemeClr val="accent2">
+        <a:tint val="40000"/>
+      </a:schemeClr>
+    </dgm:fillClrLst>
+    <dgm:linClrLst meth="repeat">
+      <a:schemeClr val="dk1"/>
+    </dgm:linClrLst>
+    <dgm:effectClrLst/>
+    <dgm:txLinClrLst/>
+    <dgm:txFillClrLst meth="repeat">
+      <a:schemeClr val="dk1"/>
+    </dgm:txFillClrLst>
+    <dgm:txEffectClrLst/>
+  </dgm:styleLbl>
+  <dgm:styleLbl name="dkBgShp">
+    <dgm:fillClrLst meth="repeat">
+      <a:schemeClr val="accent2">
+        <a:shade val="90000"/>
+      </a:schemeClr>
+    </dgm:fillClrLst>
+    <dgm:linClrLst meth="repeat">
+      <a:schemeClr val="dk1"/>
+    </dgm:linClrLst>
+    <dgm:effectClrLst/>
+    <dgm:txLinClrLst/>
+    <dgm:txFillClrLst meth="repeat">
+      <a:schemeClr val="lt1"/>
+    </dgm:txFillClrLst>
+    <dgm:txEffectClrLst/>
+  </dgm:styleLbl>
+  <dgm:styleLbl name="trBgShp">
+    <dgm:fillClrLst meth="repeat">
+      <a:schemeClr val="accent1">
+        <a:tint val="50000"/>
+        <a:alpha val="40000"/>
+      </a:schemeClr>
+    </dgm:fillClrLst>
+    <dgm:linClrLst meth="repeat">
+      <a:schemeClr val="accent2"/>
+    </dgm:linClrLst>
+    <dgm:effectClrLst/>
+    <dgm:txLinClrLst/>
+    <dgm:txFillClrLst meth="repeat">
+      <a:schemeClr val="lt1"/>
+    </dgm:txFillClrLst>
+    <dgm:txEffectClrLst/>
+  </dgm:styleLbl>
+  <dgm:styleLbl name="fgShp">
+    <dgm:fillClrLst meth="repeat">
+      <a:schemeClr val="accent2">
+        <a:tint val="40000"/>
+      </a:schemeClr>
+    </dgm:fillClrLst>
+    <dgm:linClrLst meth="repeat">
+      <a:schemeClr val="lt1"/>
+    </dgm:linClrLst>
+    <dgm:effectClrLst/>
+    <dgm:txLinClrLst/>
+    <dgm:txFillClrLst meth="repeat">
+      <a:schemeClr val="dk1"/>
+    </dgm:txFillClrLst>
+    <dgm:txEffectClrLst/>
+  </dgm:styleLbl>
+  <dgm:styleLbl name="revTx">
+    <dgm:fillClrLst meth="repeat">
+      <a:schemeClr val="lt1">
+        <a:alpha val="0"/>
+      </a:schemeClr>
+    </dgm:fillClrLst>
+    <dgm:linClrLst meth="repeat">
+      <a:schemeClr val="dk1">
+        <a:alpha val="0"/>
+      </a:schemeClr>
+    </dgm:linClrLst>
+    <dgm:effectClrLst/>
+    <dgm:txLinClrLst/>
+    <dgm:txFillClrLst meth="repeat">
+      <a:schemeClr val="tx1"/>
+    </dgm:txFillClrLst>
+    <dgm:txEffectClrLst/>
+  </dgm:styleLbl>
+</dgm:colorsDef>
+</file>
+
 <file path=ppt/diagrams/data1.xml><?xml version="1.0" encoding="utf-8"?>
 <dgm:dataModel xmlns:dgm="http://schemas.openxmlformats.org/drawingml/2006/diagram" xmlns:a="http://schemas.openxmlformats.org/drawingml/2006/main">
   <dgm:ptLst>
@@ -1974,11 +2894,7 @@
           </a:r>
           <a:r>
             <a:rPr lang="pt-BR" sz="2400" smtClean="0"/>
-            <a:t>de </a:t>
-          </a:r>
-          <a:r>
-            <a:rPr lang="pt-BR" sz="2400" smtClean="0"/>
-            <a:t>Heurísticas</a:t>
+            <a:t>de Heurísticas</a:t>
           </a:r>
           <a:endParaRPr lang="pt-BR" sz="2400" dirty="0"/>
         </a:p>
@@ -2370,11 +3286,7 @@
         <a:p>
           <a:r>
             <a:rPr lang="pt-BR" sz="2400" dirty="0" smtClean="0"/>
-            <a:t>Motor de </a:t>
-          </a:r>
-          <a:r>
-            <a:rPr lang="pt-BR" sz="2400" dirty="0" smtClean="0"/>
-            <a:t>Estratégias</a:t>
+            <a:t>Motor de Estratégias</a:t>
           </a:r>
           <a:endParaRPr lang="pt-BR" sz="2400" dirty="0"/>
         </a:p>
@@ -2702,17 +3614,17 @@
     </dgm:pt>
   </dgm:ptLst>
   <dgm:cxnLst>
+    <dgm:cxn modelId="{D8F6E671-2D59-46F3-8EF3-CDC381FD8B31}" type="presOf" srcId="{8D8C4983-307D-45CC-80AE-C51642E9DEF8}" destId="{804BB60F-6FFE-4FD9-9270-F2916E5378D9}" srcOrd="0" destOrd="0" presId="urn:microsoft.com/office/officeart/2005/8/layout/hierarchy4"/>
+    <dgm:cxn modelId="{8F3C81AB-A704-421C-A2E0-C05C61BE2F6D}" type="presOf" srcId="{186224DA-22E0-4D29-A48B-D9A8E9BC7D95}" destId="{98ED6051-6218-470B-A184-E94E28F96F4E}" srcOrd="0" destOrd="0" presId="urn:microsoft.com/office/officeart/2005/8/layout/hierarchy4"/>
+    <dgm:cxn modelId="{8124C1E4-C69B-45AF-B77E-EE6BBC1011B1}" srcId="{58693C97-7C3B-45B1-AC6A-78758FDB932C}" destId="{186224DA-22E0-4D29-A48B-D9A8E9BC7D95}" srcOrd="2" destOrd="0" parTransId="{A04E93D0-F690-4A3F-8EA5-6FFEAA73930B}" sibTransId="{8C14D75D-DABC-40A2-8409-E75D49CA2882}"/>
+    <dgm:cxn modelId="{6FAC9056-B82F-4A03-828A-D778CFB6FAE2}" srcId="{58693C97-7C3B-45B1-AC6A-78758FDB932C}" destId="{7A50C5DA-9A91-41CC-83B8-B56E21944801}" srcOrd="0" destOrd="0" parTransId="{4BEAE208-7211-4741-B146-0E3BE15D4B68}" sibTransId="{3C07B390-A25B-4D5B-8E43-8676D56E82E2}"/>
+    <dgm:cxn modelId="{5A54A779-B14C-4BD7-BDB0-182FAC095079}" type="presOf" srcId="{E68BCF31-7D5B-4B36-8C51-76BFE4A67ECA}" destId="{9445868C-F4A0-4876-B5D7-03CBA1E73487}" srcOrd="0" destOrd="0" presId="urn:microsoft.com/office/officeart/2005/8/layout/hierarchy4"/>
     <dgm:cxn modelId="{51279364-84F3-4CF1-B0F3-3B87C041016E}" srcId="{E68BCF31-7D5B-4B36-8C51-76BFE4A67ECA}" destId="{58693C97-7C3B-45B1-AC6A-78758FDB932C}" srcOrd="0" destOrd="0" parTransId="{23590AF2-C2D2-4B9C-ACF4-CAD1ADD64544}" sibTransId="{A825D5E7-BCF9-4BBD-953C-7BD335D2FDD1}"/>
+    <dgm:cxn modelId="{8C719100-539C-4B9E-8CFD-A81338F96AEF}" type="presOf" srcId="{4B7AFAA9-C2C4-4511-9A77-486BA7AE86A9}" destId="{F2C5C55E-AAD5-46C7-B490-9EDB0EC9665F}" srcOrd="0" destOrd="0" presId="urn:microsoft.com/office/officeart/2005/8/layout/hierarchy4"/>
     <dgm:cxn modelId="{9694CD78-BB3E-45FC-8290-7DE82EC2CC68}" type="presOf" srcId="{58693C97-7C3B-45B1-AC6A-78758FDB932C}" destId="{8AFB375D-E227-4444-8218-F8241D7BF1E8}" srcOrd="0" destOrd="0" presId="urn:microsoft.com/office/officeart/2005/8/layout/hierarchy4"/>
-    <dgm:cxn modelId="{5A54A779-B14C-4BD7-BDB0-182FAC095079}" type="presOf" srcId="{E68BCF31-7D5B-4B36-8C51-76BFE4A67ECA}" destId="{9445868C-F4A0-4876-B5D7-03CBA1E73487}" srcOrd="0" destOrd="0" presId="urn:microsoft.com/office/officeart/2005/8/layout/hierarchy4"/>
+    <dgm:cxn modelId="{E55F912B-8519-418C-B62B-704B2C8ED3F1}" type="presOf" srcId="{7A50C5DA-9A91-41CC-83B8-B56E21944801}" destId="{9BF0B472-AFA3-467F-AFCE-3DD1ADF6F7D3}" srcOrd="0" destOrd="0" presId="urn:microsoft.com/office/officeart/2005/8/layout/hierarchy4"/>
+    <dgm:cxn modelId="{FE37B63C-73EE-495C-94A3-02460135E8D3}" srcId="{58693C97-7C3B-45B1-AC6A-78758FDB932C}" destId="{8D8C4983-307D-45CC-80AE-C51642E9DEF8}" srcOrd="1" destOrd="0" parTransId="{8268F7B3-37CC-48F9-9969-6C1E993D3915}" sibTransId="{781EB0EF-259D-433B-AF88-D6CA99BBDC50}"/>
     <dgm:cxn modelId="{54C7459B-5F3F-4C26-9535-249BAEFCD66D}" srcId="{4B7AFAA9-C2C4-4511-9A77-486BA7AE86A9}" destId="{E68BCF31-7D5B-4B36-8C51-76BFE4A67ECA}" srcOrd="0" destOrd="0" parTransId="{7C734590-2885-4B87-B303-596DD11CC32B}" sibTransId="{C45F70BB-C99B-4B24-AE07-CACAAE6D36B1}"/>
-    <dgm:cxn modelId="{E55F912B-8519-418C-B62B-704B2C8ED3F1}" type="presOf" srcId="{7A50C5DA-9A91-41CC-83B8-B56E21944801}" destId="{9BF0B472-AFA3-467F-AFCE-3DD1ADF6F7D3}" srcOrd="0" destOrd="0" presId="urn:microsoft.com/office/officeart/2005/8/layout/hierarchy4"/>
-    <dgm:cxn modelId="{D8F6E671-2D59-46F3-8EF3-CDC381FD8B31}" type="presOf" srcId="{8D8C4983-307D-45CC-80AE-C51642E9DEF8}" destId="{804BB60F-6FFE-4FD9-9270-F2916E5378D9}" srcOrd="0" destOrd="0" presId="urn:microsoft.com/office/officeart/2005/8/layout/hierarchy4"/>
-    <dgm:cxn modelId="{6FAC9056-B82F-4A03-828A-D778CFB6FAE2}" srcId="{58693C97-7C3B-45B1-AC6A-78758FDB932C}" destId="{7A50C5DA-9A91-41CC-83B8-B56E21944801}" srcOrd="0" destOrd="0" parTransId="{4BEAE208-7211-4741-B146-0E3BE15D4B68}" sibTransId="{3C07B390-A25B-4D5B-8E43-8676D56E82E2}"/>
-    <dgm:cxn modelId="{8124C1E4-C69B-45AF-B77E-EE6BBC1011B1}" srcId="{58693C97-7C3B-45B1-AC6A-78758FDB932C}" destId="{186224DA-22E0-4D29-A48B-D9A8E9BC7D95}" srcOrd="2" destOrd="0" parTransId="{A04E93D0-F690-4A3F-8EA5-6FFEAA73930B}" sibTransId="{8C14D75D-DABC-40A2-8409-E75D49CA2882}"/>
-    <dgm:cxn modelId="{8C719100-539C-4B9E-8CFD-A81338F96AEF}" type="presOf" srcId="{4B7AFAA9-C2C4-4511-9A77-486BA7AE86A9}" destId="{F2C5C55E-AAD5-46C7-B490-9EDB0EC9665F}" srcOrd="0" destOrd="0" presId="urn:microsoft.com/office/officeart/2005/8/layout/hierarchy4"/>
-    <dgm:cxn modelId="{FE37B63C-73EE-495C-94A3-02460135E8D3}" srcId="{58693C97-7C3B-45B1-AC6A-78758FDB932C}" destId="{8D8C4983-307D-45CC-80AE-C51642E9DEF8}" srcOrd="1" destOrd="0" parTransId="{8268F7B3-37CC-48F9-9969-6C1E993D3915}" sibTransId="{781EB0EF-259D-433B-AF88-D6CA99BBDC50}"/>
-    <dgm:cxn modelId="{8F3C81AB-A704-421C-A2E0-C05C61BE2F6D}" type="presOf" srcId="{186224DA-22E0-4D29-A48B-D9A8E9BC7D95}" destId="{98ED6051-6218-470B-A184-E94E28F96F4E}" srcOrd="0" destOrd="0" presId="urn:microsoft.com/office/officeart/2005/8/layout/hierarchy4"/>
     <dgm:cxn modelId="{CC408E5F-ECF8-4A96-969B-409788B5DD4F}" type="presParOf" srcId="{F2C5C55E-AAD5-46C7-B490-9EDB0EC9665F}" destId="{05BAE430-0C74-4AEB-80BE-49230D249B63}" srcOrd="0" destOrd="0" presId="urn:microsoft.com/office/officeart/2005/8/layout/hierarchy4"/>
     <dgm:cxn modelId="{0DCC2DDD-B408-4A95-9550-DD12E1AE3FB7}" type="presParOf" srcId="{05BAE430-0C74-4AEB-80BE-49230D249B63}" destId="{9445868C-F4A0-4876-B5D7-03CBA1E73487}" srcOrd="0" destOrd="0" presId="urn:microsoft.com/office/officeart/2005/8/layout/hierarchy4"/>
     <dgm:cxn modelId="{E4815F00-DA2D-4512-A52E-20187AD7A199}" type="presParOf" srcId="{05BAE430-0C74-4AEB-80BE-49230D249B63}" destId="{D9F7CDC9-D59E-4939-A732-71302C1CB80D}" srcOrd="1" destOrd="0" presId="urn:microsoft.com/office/officeart/2005/8/layout/hierarchy4"/>
@@ -2732,6 +3644,118 @@
     <dgm:cxn modelId="{1DC5A6ED-8AE9-4131-B148-E1F956AA2751}" type="presParOf" srcId="{72C1FEEE-ACA1-454F-A10B-279F6B18E347}" destId="{6EB3D48C-2AC7-4443-9A4B-37EAAAB4E78B}" srcOrd="4" destOrd="0" presId="urn:microsoft.com/office/officeart/2005/8/layout/hierarchy4"/>
     <dgm:cxn modelId="{CEC8A880-F347-4F3E-AAAC-65DF69B79FF7}" type="presParOf" srcId="{6EB3D48C-2AC7-4443-9A4B-37EAAAB4E78B}" destId="{98ED6051-6218-470B-A184-E94E28F96F4E}" srcOrd="0" destOrd="0" presId="urn:microsoft.com/office/officeart/2005/8/layout/hierarchy4"/>
     <dgm:cxn modelId="{0B90C192-239E-4C46-9F5B-B1BD547DC1A2}" type="presParOf" srcId="{6EB3D48C-2AC7-4443-9A4B-37EAAAB4E78B}" destId="{6E4B6C91-9148-413C-B827-20EE3F933A40}" srcOrd="1" destOrd="0" presId="urn:microsoft.com/office/officeart/2005/8/layout/hierarchy4"/>
+  </dgm:cxnLst>
+  <dgm:bg/>
+  <dgm:whole/>
+  <dgm:extLst>
+    <a:ext uri="http://schemas.microsoft.com/office/drawing/2008/diagram">
+      <dsp:dataModelExt xmlns:dsp="http://schemas.microsoft.com/office/drawing/2008/diagram" relId="rId6" minVer="http://schemas.openxmlformats.org/drawingml/2006/diagram"/>
+    </a:ext>
+  </dgm:extLst>
+</dgm:dataModel>
+</file>
+
+<file path=ppt/diagrams/data3.xml><?xml version="1.0" encoding="utf-8"?>
+<dgm:dataModel xmlns:dgm="http://schemas.openxmlformats.org/drawingml/2006/diagram" xmlns:a="http://schemas.openxmlformats.org/drawingml/2006/main">
+  <dgm:ptLst>
+    <dgm:pt modelId="{4B7AFAA9-C2C4-4511-9A77-486BA7AE86A9}" type="doc">
+      <dgm:prSet loTypeId="urn:microsoft.com/office/officeart/2005/8/layout/hierarchy4" loCatId="relationship" qsTypeId="urn:microsoft.com/office/officeart/2005/8/quickstyle/simple1" qsCatId="simple" csTypeId="urn:microsoft.com/office/officeart/2005/8/colors/colorful1" csCatId="colorful" phldr="1"/>
+      <dgm:spPr/>
+      <dgm:t>
+        <a:bodyPr/>
+        <a:lstStyle/>
+        <a:p>
+          <a:endParaRPr lang="pt-BR"/>
+        </a:p>
+      </dgm:t>
+    </dgm:pt>
+    <dgm:pt modelId="{E68BCF31-7D5B-4B36-8C51-76BFE4A67ECA}">
+      <dgm:prSet phldrT="[Texto]" custT="1"/>
+      <dgm:spPr/>
+      <dgm:t>
+        <a:bodyPr/>
+        <a:lstStyle/>
+        <a:p>
+          <a:r>
+            <a:rPr lang="pt-BR" sz="2400" dirty="0" smtClean="0"/>
+            <a:t>Processo de Avaliação de Capacidade</a:t>
+          </a:r>
+          <a:endParaRPr lang="pt-BR" sz="2400" dirty="0"/>
+        </a:p>
+      </dgm:t>
+    </dgm:pt>
+    <dgm:pt modelId="{7C734590-2885-4B87-B303-596DD11CC32B}" type="parTrans" cxnId="{54C7459B-5F3F-4C26-9535-249BAEFCD66D}">
+      <dgm:prSet/>
+      <dgm:spPr/>
+      <dgm:t>
+        <a:bodyPr/>
+        <a:lstStyle/>
+        <a:p>
+          <a:endParaRPr lang="pt-BR"/>
+        </a:p>
+      </dgm:t>
+    </dgm:pt>
+    <dgm:pt modelId="{C45F70BB-C99B-4B24-AE07-CACAAE6D36B1}" type="sibTrans" cxnId="{54C7459B-5F3F-4C26-9535-249BAEFCD66D}">
+      <dgm:prSet/>
+      <dgm:spPr/>
+      <dgm:t>
+        <a:bodyPr/>
+        <a:lstStyle/>
+        <a:p>
+          <a:endParaRPr lang="pt-BR"/>
+        </a:p>
+      </dgm:t>
+    </dgm:pt>
+    <dgm:pt modelId="{F2C5C55E-AAD5-46C7-B490-9EDB0EC9665F}" type="pres">
+      <dgm:prSet presAssocID="{4B7AFAA9-C2C4-4511-9A77-486BA7AE86A9}" presName="Name0" presStyleCnt="0">
+        <dgm:presLayoutVars>
+          <dgm:chPref val="1"/>
+          <dgm:dir/>
+          <dgm:animOne val="branch"/>
+          <dgm:animLvl val="lvl"/>
+          <dgm:resizeHandles/>
+        </dgm:presLayoutVars>
+      </dgm:prSet>
+      <dgm:spPr/>
+      <dgm:t>
+        <a:bodyPr/>
+        <a:lstStyle/>
+        <a:p>
+          <a:endParaRPr lang="pt-BR"/>
+        </a:p>
+      </dgm:t>
+    </dgm:pt>
+    <dgm:pt modelId="{05BAE430-0C74-4AEB-80BE-49230D249B63}" type="pres">
+      <dgm:prSet presAssocID="{E68BCF31-7D5B-4B36-8C51-76BFE4A67ECA}" presName="vertOne" presStyleCnt="0"/>
+      <dgm:spPr/>
+    </dgm:pt>
+    <dgm:pt modelId="{9445868C-F4A0-4876-B5D7-03CBA1E73487}" type="pres">
+      <dgm:prSet presAssocID="{E68BCF31-7D5B-4B36-8C51-76BFE4A67ECA}" presName="txOne" presStyleLbl="node0" presStyleIdx="0" presStyleCnt="1" custLinFactNeighborX="0" custLinFactNeighborY="-8216">
+        <dgm:presLayoutVars>
+          <dgm:chPref val="3"/>
+        </dgm:presLayoutVars>
+      </dgm:prSet>
+      <dgm:spPr/>
+      <dgm:t>
+        <a:bodyPr/>
+        <a:lstStyle/>
+        <a:p>
+          <a:endParaRPr lang="pt-BR"/>
+        </a:p>
+      </dgm:t>
+    </dgm:pt>
+    <dgm:pt modelId="{04BBFD12-F9A5-4E81-9B57-A1AAB292B04F}" type="pres">
+      <dgm:prSet presAssocID="{E68BCF31-7D5B-4B36-8C51-76BFE4A67ECA}" presName="horzOne" presStyleCnt="0"/>
+      <dgm:spPr/>
+    </dgm:pt>
+  </dgm:ptLst>
+  <dgm:cxnLst>
+    <dgm:cxn modelId="{B5067E56-F961-4C25-8C1C-F88F4E77BBE7}" type="presOf" srcId="{E68BCF31-7D5B-4B36-8C51-76BFE4A67ECA}" destId="{9445868C-F4A0-4876-B5D7-03CBA1E73487}" srcOrd="0" destOrd="0" presId="urn:microsoft.com/office/officeart/2005/8/layout/hierarchy4"/>
+    <dgm:cxn modelId="{85FCA5E4-33EA-45AE-8E23-BA96D7A92052}" type="presOf" srcId="{4B7AFAA9-C2C4-4511-9A77-486BA7AE86A9}" destId="{F2C5C55E-AAD5-46C7-B490-9EDB0EC9665F}" srcOrd="0" destOrd="0" presId="urn:microsoft.com/office/officeart/2005/8/layout/hierarchy4"/>
+    <dgm:cxn modelId="{54C7459B-5F3F-4C26-9535-249BAEFCD66D}" srcId="{4B7AFAA9-C2C4-4511-9A77-486BA7AE86A9}" destId="{E68BCF31-7D5B-4B36-8C51-76BFE4A67ECA}" srcOrd="0" destOrd="0" parTransId="{7C734590-2885-4B87-B303-596DD11CC32B}" sibTransId="{C45F70BB-C99B-4B24-AE07-CACAAE6D36B1}"/>
+    <dgm:cxn modelId="{722B09FE-05C0-41C1-937C-C743314A7057}" type="presParOf" srcId="{F2C5C55E-AAD5-46C7-B490-9EDB0EC9665F}" destId="{05BAE430-0C74-4AEB-80BE-49230D249B63}" srcOrd="0" destOrd="0" presId="urn:microsoft.com/office/officeart/2005/8/layout/hierarchy4"/>
+    <dgm:cxn modelId="{DD585EAD-9083-4FDA-A75B-AD0D158D43FB}" type="presParOf" srcId="{05BAE430-0C74-4AEB-80BE-49230D249B63}" destId="{9445868C-F4A0-4876-B5D7-03CBA1E73487}" srcOrd="0" destOrd="0" presId="urn:microsoft.com/office/officeart/2005/8/layout/hierarchy4"/>
+    <dgm:cxn modelId="{E2A4DE37-4979-4A01-9987-8A1375588729}" type="presParOf" srcId="{05BAE430-0C74-4AEB-80BE-49230D249B63}" destId="{04BBFD12-F9A5-4E81-9B57-A1AAB292B04F}" srcOrd="1" destOrd="0" presId="urn:microsoft.com/office/officeart/2005/8/layout/hierarchy4"/>
   </dgm:cxnLst>
   <dgm:bg/>
   <dgm:whole/>
@@ -2824,11 +3848,7 @@
           </a:r>
           <a:r>
             <a:rPr lang="pt-BR" sz="2400" kern="1200" smtClean="0"/>
-            <a:t>de </a:t>
-          </a:r>
-          <a:r>
-            <a:rPr lang="pt-BR" sz="2400" kern="1200" smtClean="0"/>
-            <a:t>Heurísticas</a:t>
+            <a:t>de Heurísticas</a:t>
           </a:r>
           <a:endParaRPr lang="pt-BR" sz="2400" kern="1200" dirty="0"/>
         </a:p>
@@ -3235,11 +4255,7 @@
           </a:pPr>
           <a:r>
             <a:rPr lang="pt-BR" sz="2400" kern="1200" dirty="0" smtClean="0"/>
-            <a:t>Motor de </a:t>
-          </a:r>
-          <a:r>
-            <a:rPr lang="pt-BR" sz="2400" kern="1200" dirty="0" smtClean="0"/>
-            <a:t>Estratégias</a:t>
+            <a:t>Motor de Estratégias</a:t>
           </a:r>
           <a:endParaRPr lang="pt-BR" sz="2400" kern="1200" dirty="0"/>
         </a:p>
@@ -3563,6 +4579,97 @@
       <dsp:txXfrm>
         <a:off x="1720075" y="1216961"/>
         <a:ext cx="1172800" cy="516660"/>
+      </dsp:txXfrm>
+    </dsp:sp>
+  </dsp:spTree>
+</dsp:drawing>
+</file>
+
+<file path=ppt/diagrams/drawing3.xml><?xml version="1.0" encoding="utf-8"?>
+<dsp:drawing xmlns:dgm="http://schemas.openxmlformats.org/drawingml/2006/diagram" xmlns:dsp="http://schemas.microsoft.com/office/drawing/2008/diagram" xmlns:a="http://schemas.openxmlformats.org/drawingml/2006/main">
+  <dsp:spTree>
+    <dsp:nvGrpSpPr>
+      <dsp:cNvPr id="0" name=""/>
+      <dsp:cNvGrpSpPr/>
+    </dsp:nvGrpSpPr>
+    <dsp:grpSpPr/>
+    <dsp:sp modelId="{9445868C-F4A0-4876-B5D7-03CBA1E73487}">
+      <dsp:nvSpPr>
+        <dsp:cNvPr id="0" name=""/>
+        <dsp:cNvSpPr/>
+      </dsp:nvSpPr>
+      <dsp:spPr>
+        <a:xfrm>
+          <a:off x="0" y="0"/>
+          <a:ext cx="2912323" cy="1750716"/>
+        </a:xfrm>
+        <a:prstGeom prst="roundRect">
+          <a:avLst>
+            <a:gd name="adj" fmla="val 10000"/>
+          </a:avLst>
+        </a:prstGeom>
+        <a:solidFill>
+          <a:schemeClr val="accent1">
+            <a:hueOff val="0"/>
+            <a:satOff val="0"/>
+            <a:lumOff val="0"/>
+            <a:alphaOff val="0"/>
+          </a:schemeClr>
+        </a:solidFill>
+        <a:ln w="25400" cap="flat" cmpd="sng" algn="ctr">
+          <a:solidFill>
+            <a:schemeClr val="lt1">
+              <a:hueOff val="0"/>
+              <a:satOff val="0"/>
+              <a:lumOff val="0"/>
+              <a:alphaOff val="0"/>
+            </a:schemeClr>
+          </a:solidFill>
+          <a:prstDash val="solid"/>
+        </a:ln>
+        <a:effectLst/>
+      </dsp:spPr>
+      <dsp:style>
+        <a:lnRef idx="2">
+          <a:scrgbClr r="0" g="0" b="0"/>
+        </a:lnRef>
+        <a:fillRef idx="1">
+          <a:scrgbClr r="0" g="0" b="0"/>
+        </a:fillRef>
+        <a:effectRef idx="0">
+          <a:scrgbClr r="0" g="0" b="0"/>
+        </a:effectRef>
+        <a:fontRef idx="minor">
+          <a:schemeClr val="lt1"/>
+        </a:fontRef>
+      </dsp:style>
+      <dsp:txBody>
+        <a:bodyPr spcFirstLastPara="0" vert="horz" wrap="square" lIns="91440" tIns="91440" rIns="91440" bIns="91440" numCol="1" spcCol="1270" anchor="ctr" anchorCtr="0">
+          <a:noAutofit/>
+        </a:bodyPr>
+        <a:lstStyle/>
+        <a:p>
+          <a:pPr lvl="0" algn="ctr" defTabSz="1066800">
+            <a:lnSpc>
+              <a:spcPct val="90000"/>
+            </a:lnSpc>
+            <a:spcBef>
+              <a:spcPct val="0"/>
+            </a:spcBef>
+            <a:spcAft>
+              <a:spcPct val="35000"/>
+            </a:spcAft>
+          </a:pPr>
+          <a:r>
+            <a:rPr lang="pt-BR" sz="2400" kern="1200" dirty="0" smtClean="0"/>
+            <a:t>Processo de Avaliação de Capacidade</a:t>
+          </a:r>
+          <a:endParaRPr lang="pt-BR" sz="2400" kern="1200" dirty="0"/>
+        </a:p>
+      </dsp:txBody>
+      <dsp:txXfrm>
+        <a:off x="51277" y="51277"/>
+        <a:ext cx="2809769" cy="1648162"/>
       </dsp:txXfrm>
     </dsp:sp>
   </dsp:spTree>
@@ -4613,6 +5720,528 @@
 </dgm:layoutDef>
 </file>
 
+<file path=ppt/diagrams/layout3.xml><?xml version="1.0" encoding="utf-8"?>
+<dgm:layoutDef xmlns:dgm="http://schemas.openxmlformats.org/drawingml/2006/diagram" xmlns:a="http://schemas.openxmlformats.org/drawingml/2006/main" uniqueId="urn:microsoft.com/office/officeart/2005/8/layout/hierarchy4">
+  <dgm:title val=""/>
+  <dgm:desc val=""/>
+  <dgm:catLst>
+    <dgm:cat type="hierarchy" pri="4000"/>
+    <dgm:cat type="list" pri="24000"/>
+    <dgm:cat type="relationship" pri="10000"/>
+  </dgm:catLst>
+  <dgm:sampData>
+    <dgm:dataModel>
+      <dgm:ptLst>
+        <dgm:pt modelId="0" type="doc"/>
+        <dgm:pt modelId="1">
+          <dgm:prSet phldr="1"/>
+        </dgm:pt>
+        <dgm:pt modelId="2">
+          <dgm:prSet phldr="1"/>
+        </dgm:pt>
+        <dgm:pt modelId="21">
+          <dgm:prSet phldr="1"/>
+        </dgm:pt>
+        <dgm:pt modelId="22">
+          <dgm:prSet phldr="1"/>
+        </dgm:pt>
+        <dgm:pt modelId="3">
+          <dgm:prSet phldr="1"/>
+        </dgm:pt>
+        <dgm:pt modelId="31">
+          <dgm:prSet phldr="1"/>
+        </dgm:pt>
+      </dgm:ptLst>
+      <dgm:cxnLst>
+        <dgm:cxn modelId="4" srcId="0" destId="1" srcOrd="0" destOrd="0"/>
+        <dgm:cxn modelId="5" srcId="1" destId="2" srcOrd="0" destOrd="0"/>
+        <dgm:cxn modelId="6" srcId="1" destId="3" srcOrd="1" destOrd="0"/>
+        <dgm:cxn modelId="23" srcId="2" destId="21" srcOrd="0" destOrd="0"/>
+        <dgm:cxn modelId="24" srcId="2" destId="22" srcOrd="1" destOrd="0"/>
+        <dgm:cxn modelId="33" srcId="3" destId="31" srcOrd="0" destOrd="0"/>
+      </dgm:cxnLst>
+      <dgm:bg/>
+      <dgm:whole/>
+    </dgm:dataModel>
+  </dgm:sampData>
+  <dgm:styleData>
+    <dgm:dataModel>
+      <dgm:ptLst>
+        <dgm:pt modelId="0" type="doc"/>
+        <dgm:pt modelId="1"/>
+        <dgm:pt modelId="11"/>
+        <dgm:pt modelId="12"/>
+      </dgm:ptLst>
+      <dgm:cxnLst>
+        <dgm:cxn modelId="2" srcId="0" destId="1" srcOrd="0" destOrd="0"/>
+        <dgm:cxn modelId="13" srcId="1" destId="11" srcOrd="0" destOrd="0"/>
+        <dgm:cxn modelId="14" srcId="1" destId="12" srcOrd="1" destOrd="0"/>
+      </dgm:cxnLst>
+      <dgm:bg/>
+      <dgm:whole/>
+    </dgm:dataModel>
+  </dgm:styleData>
+  <dgm:clrData>
+    <dgm:dataModel>
+      <dgm:ptLst>
+        <dgm:pt modelId="0" type="doc"/>
+        <dgm:pt modelId="1"/>
+        <dgm:pt modelId="2"/>
+        <dgm:pt modelId="21"/>
+        <dgm:pt modelId="211"/>
+        <dgm:pt modelId="3"/>
+        <dgm:pt modelId="31"/>
+        <dgm:pt modelId="311"/>
+      </dgm:ptLst>
+      <dgm:cxnLst>
+        <dgm:cxn modelId="4" srcId="0" destId="1" srcOrd="0" destOrd="0"/>
+        <dgm:cxn modelId="5" srcId="1" destId="2" srcOrd="0" destOrd="0"/>
+        <dgm:cxn modelId="6" srcId="1" destId="3" srcOrd="1" destOrd="0"/>
+        <dgm:cxn modelId="23" srcId="2" destId="21" srcOrd="0" destOrd="0"/>
+        <dgm:cxn modelId="24" srcId="21" destId="211" srcOrd="0" destOrd="0"/>
+        <dgm:cxn modelId="33" srcId="3" destId="31" srcOrd="0" destOrd="0"/>
+        <dgm:cxn modelId="34" srcId="31" destId="311" srcOrd="0" destOrd="0"/>
+      </dgm:cxnLst>
+      <dgm:bg/>
+      <dgm:whole/>
+    </dgm:dataModel>
+  </dgm:clrData>
+  <dgm:layoutNode name="Name0">
+    <dgm:varLst>
+      <dgm:chPref val="1"/>
+      <dgm:dir/>
+      <dgm:animOne val="branch"/>
+      <dgm:animLvl val="lvl"/>
+      <dgm:resizeHandles/>
+    </dgm:varLst>
+    <dgm:choose name="Name1">
+      <dgm:if name="Name2" func="var" arg="dir" op="equ" val="norm">
+        <dgm:alg type="lin">
+          <dgm:param type="linDir" val="fromL"/>
+          <dgm:param type="nodeVertAlign" val="t"/>
+        </dgm:alg>
+      </dgm:if>
+      <dgm:else name="Name3">
+        <dgm:alg type="lin">
+          <dgm:param type="linDir" val="fromR"/>
+          <dgm:param type="nodeVertAlign" val="t"/>
+        </dgm:alg>
+      </dgm:else>
+    </dgm:choose>
+    <dgm:shape xmlns:r="http://schemas.openxmlformats.org/officeDocument/2006/relationships" r:blip="">
+      <dgm:adjLst/>
+    </dgm:shape>
+    <dgm:presOf/>
+    <dgm:constrLst>
+      <dgm:constr type="w" for="ch" forName="vertOne" refType="w"/>
+      <dgm:constr type="w" for="des" forName="horzOne" refType="w"/>
+      <dgm:constr type="w" for="des" forName="txOne" refType="w"/>
+      <dgm:constr type="w" for="des" forName="vertTwo" refType="w"/>
+      <dgm:constr type="w" for="des" forName="horzTwo" refType="w"/>
+      <dgm:constr type="w" for="des" forName="txTwo" refType="w"/>
+      <dgm:constr type="w" for="des" forName="vertThree" refType="w"/>
+      <dgm:constr type="w" for="des" forName="horzThree" refType="w"/>
+      <dgm:constr type="w" for="des" forName="txThree" refType="w"/>
+      <dgm:constr type="w" for="des" forName="vertFour" refType="w"/>
+      <dgm:constr type="w" for="des" forName="horzFour" refType="w"/>
+      <dgm:constr type="w" for="des" forName="txFour" refType="w"/>
+      <dgm:constr type="h" for="des" ptType="node" op="equ"/>
+      <dgm:constr type="h" for="des" forName="txOne" refType="h"/>
+      <dgm:constr type="userH" for="des" ptType="node" refType="h" refFor="des" refForName="txOne"/>
+      <dgm:constr type="primFontSz" for="des" forName="txOne" val="65"/>
+      <dgm:constr type="primFontSz" for="des" forName="txTwo" val="65"/>
+      <dgm:constr type="primFontSz" for="des" forName="txTwo" refType="primFontSz" refFor="des" refForName="txOne" op="lte"/>
+      <dgm:constr type="primFontSz" for="des" forName="txThree" val="65"/>
+      <dgm:constr type="primFontSz" for="des" forName="txThree" refType="primFontSz" refFor="des" refForName="txOne" op="lte"/>
+      <dgm:constr type="primFontSz" for="des" forName="txThree" refType="primFontSz" refFor="des" refForName="txTwo" op="lte"/>
+      <dgm:constr type="primFontSz" for="des" forName="txFour" val="65"/>
+      <dgm:constr type="primFontSz" for="des" forName="txFour" refType="primFontSz" refFor="des" refForName="txOne" op="lte"/>
+      <dgm:constr type="primFontSz" for="des" forName="txFour" refType="primFontSz" refFor="des" refForName="txTwo" op="lte"/>
+      <dgm:constr type="primFontSz" for="des" forName="txFour" refType="primFontSz" refFor="des" refForName="txThree" op="lte"/>
+      <dgm:constr type="w" for="des" forName="sibSpaceOne" refType="w" fact="0.168"/>
+      <dgm:constr type="w" for="des" forName="sibSpaceTwo" refType="w" refFor="des" refForName="sibSpaceOne" op="equ" fact="0.5"/>
+      <dgm:constr type="w" for="des" forName="sibSpaceThree" refType="w" refFor="des" refForName="sibSpaceTwo" op="equ" fact="0.5"/>
+      <dgm:constr type="w" for="des" forName="sibSpaceFour" refType="w" refFor="des" refForName="sibSpaceThree" op="equ" fact="0.5"/>
+      <dgm:constr type="h" for="des" forName="parTransOne" refType="w" fact="0.056"/>
+      <dgm:constr type="h" for="des" forName="parTransTwo" refType="h" refFor="des" refForName="parTransOne" op="equ"/>
+      <dgm:constr type="h" for="des" forName="parTransThree" refType="h" refFor="des" refForName="parTransTwo" op="equ"/>
+      <dgm:constr type="h" for="des" forName="parTransFour" refType="h" refFor="des" refForName="parTransThree" op="equ"/>
+    </dgm:constrLst>
+    <dgm:ruleLst/>
+    <dgm:forEach name="Name4" axis="ch" ptType="node">
+      <dgm:layoutNode name="vertOne">
+        <dgm:alg type="lin">
+          <dgm:param type="linDir" val="fromT"/>
+        </dgm:alg>
+        <dgm:shape xmlns:r="http://schemas.openxmlformats.org/officeDocument/2006/relationships" r:blip="">
+          <dgm:adjLst/>
+        </dgm:shape>
+        <dgm:presOf/>
+        <dgm:constrLst>
+          <dgm:constr type="w" for="ch" forName="txOne" refType="w" refFor="ch" refForName="horzOne" op="gte"/>
+        </dgm:constrLst>
+        <dgm:ruleLst/>
+        <dgm:layoutNode name="txOne" styleLbl="node0">
+          <dgm:varLst>
+            <dgm:chPref val="3"/>
+          </dgm:varLst>
+          <dgm:alg type="tx"/>
+          <dgm:shape xmlns:r="http://schemas.openxmlformats.org/officeDocument/2006/relationships" type="roundRect" r:blip="">
+            <dgm:adjLst>
+              <dgm:adj idx="1" val="0.1"/>
+            </dgm:adjLst>
+          </dgm:shape>
+          <dgm:presOf axis="self"/>
+          <dgm:constrLst>
+            <dgm:constr type="tMarg" refType="primFontSz" fact="0.3"/>
+            <dgm:constr type="bMarg" refType="primFontSz" fact="0.3"/>
+            <dgm:constr type="lMarg" refType="primFontSz" fact="0.3"/>
+            <dgm:constr type="rMarg" refType="primFontSz" fact="0.3"/>
+          </dgm:constrLst>
+          <dgm:ruleLst>
+            <dgm:rule type="primFontSz" val="5" fact="NaN" max="NaN"/>
+          </dgm:ruleLst>
+        </dgm:layoutNode>
+        <dgm:choose name="Name5">
+          <dgm:if name="Name6" axis="des" ptType="node" func="cnt" op="gt" val="0">
+            <dgm:layoutNode name="parTransOne">
+              <dgm:alg type="sp"/>
+              <dgm:shape xmlns:r="http://schemas.openxmlformats.org/officeDocument/2006/relationships" r:blip="">
+                <dgm:adjLst/>
+              </dgm:shape>
+              <dgm:presOf/>
+              <dgm:constrLst/>
+              <dgm:ruleLst/>
+            </dgm:layoutNode>
+          </dgm:if>
+          <dgm:else name="Name7"/>
+        </dgm:choose>
+        <dgm:layoutNode name="horzOne">
+          <dgm:choose name="Name8">
+            <dgm:if name="Name9" func="var" arg="dir" op="equ" val="norm">
+              <dgm:alg type="lin">
+                <dgm:param type="linDir" val="fromL"/>
+                <dgm:param type="nodeVertAlign" val="t"/>
+              </dgm:alg>
+            </dgm:if>
+            <dgm:else name="Name10">
+              <dgm:alg type="lin">
+                <dgm:param type="linDir" val="fromR"/>
+                <dgm:param type="nodeVertAlign" val="t"/>
+              </dgm:alg>
+            </dgm:else>
+          </dgm:choose>
+          <dgm:shape xmlns:r="http://schemas.openxmlformats.org/officeDocument/2006/relationships" r:blip="">
+            <dgm:adjLst/>
+          </dgm:shape>
+          <dgm:presOf/>
+          <dgm:constrLst/>
+          <dgm:ruleLst>
+            <dgm:rule type="w" val="INF" fact="NaN" max="NaN"/>
+          </dgm:ruleLst>
+          <dgm:forEach name="Name11" axis="ch" ptType="node">
+            <dgm:layoutNode name="vertTwo">
+              <dgm:alg type="lin">
+                <dgm:param type="linDir" val="fromT"/>
+              </dgm:alg>
+              <dgm:shape xmlns:r="http://schemas.openxmlformats.org/officeDocument/2006/relationships" r:blip="">
+                <dgm:adjLst/>
+              </dgm:shape>
+              <dgm:presOf/>
+              <dgm:constrLst>
+                <dgm:constr type="w" for="ch" forName="txTwo" refType="w" refFor="ch" refForName="horzTwo" op="gte"/>
+              </dgm:constrLst>
+              <dgm:ruleLst/>
+              <dgm:layoutNode name="txTwo">
+                <dgm:varLst>
+                  <dgm:chPref val="3"/>
+                </dgm:varLst>
+                <dgm:alg type="tx"/>
+                <dgm:shape xmlns:r="http://schemas.openxmlformats.org/officeDocument/2006/relationships" type="roundRect" r:blip="">
+                  <dgm:adjLst>
+                    <dgm:adj idx="1" val="0.1"/>
+                  </dgm:adjLst>
+                </dgm:shape>
+                <dgm:presOf axis="self"/>
+                <dgm:constrLst>
+                  <dgm:constr type="userH"/>
+                  <dgm:constr type="h" refType="userH"/>
+                  <dgm:constr type="tMarg" refType="primFontSz" fact="0.3"/>
+                  <dgm:constr type="bMarg" refType="primFontSz" fact="0.3"/>
+                  <dgm:constr type="lMarg" refType="primFontSz" fact="0.3"/>
+                  <dgm:constr type="rMarg" refType="primFontSz" fact="0.3"/>
+                </dgm:constrLst>
+                <dgm:ruleLst>
+                  <dgm:rule type="primFontSz" val="5" fact="NaN" max="NaN"/>
+                </dgm:ruleLst>
+              </dgm:layoutNode>
+              <dgm:choose name="Name12">
+                <dgm:if name="Name13" axis="des" ptType="node" func="cnt" op="gt" val="0">
+                  <dgm:layoutNode name="parTransTwo">
+                    <dgm:alg type="sp"/>
+                    <dgm:shape xmlns:r="http://schemas.openxmlformats.org/officeDocument/2006/relationships" r:blip="">
+                      <dgm:adjLst/>
+                    </dgm:shape>
+                    <dgm:presOf/>
+                    <dgm:constrLst/>
+                    <dgm:ruleLst/>
+                  </dgm:layoutNode>
+                </dgm:if>
+                <dgm:else name="Name14"/>
+              </dgm:choose>
+              <dgm:layoutNode name="horzTwo">
+                <dgm:choose name="Name15">
+                  <dgm:if name="Name16" func="var" arg="dir" op="equ" val="norm">
+                    <dgm:alg type="lin">
+                      <dgm:param type="linDir" val="fromL"/>
+                      <dgm:param type="nodeVertAlign" val="t"/>
+                    </dgm:alg>
+                  </dgm:if>
+                  <dgm:else name="Name17">
+                    <dgm:alg type="lin">
+                      <dgm:param type="linDir" val="fromR"/>
+                      <dgm:param type="nodeVertAlign" val="t"/>
+                    </dgm:alg>
+                  </dgm:else>
+                </dgm:choose>
+                <dgm:shape xmlns:r="http://schemas.openxmlformats.org/officeDocument/2006/relationships" r:blip="">
+                  <dgm:adjLst/>
+                </dgm:shape>
+                <dgm:presOf/>
+                <dgm:constrLst/>
+                <dgm:ruleLst>
+                  <dgm:rule type="w" val="INF" fact="NaN" max="NaN"/>
+                </dgm:ruleLst>
+                <dgm:forEach name="Name18" axis="ch" ptType="node">
+                  <dgm:layoutNode name="vertThree">
+                    <dgm:alg type="lin">
+                      <dgm:param type="linDir" val="fromT"/>
+                    </dgm:alg>
+                    <dgm:shape xmlns:r="http://schemas.openxmlformats.org/officeDocument/2006/relationships" r:blip="">
+                      <dgm:adjLst/>
+                    </dgm:shape>
+                    <dgm:presOf/>
+                    <dgm:constrLst>
+                      <dgm:constr type="w" for="ch" forName="txThree" refType="w" refFor="ch" refForName="horzThree" op="gte"/>
+                    </dgm:constrLst>
+                    <dgm:ruleLst/>
+                    <dgm:layoutNode name="txThree">
+                      <dgm:varLst>
+                        <dgm:chPref val="3"/>
+                      </dgm:varLst>
+                      <dgm:alg type="tx"/>
+                      <dgm:shape xmlns:r="http://schemas.openxmlformats.org/officeDocument/2006/relationships" type="roundRect" r:blip="">
+                        <dgm:adjLst>
+                          <dgm:adj idx="1" val="0.1"/>
+                        </dgm:adjLst>
+                      </dgm:shape>
+                      <dgm:presOf axis="self"/>
+                      <dgm:constrLst>
+                        <dgm:constr type="userH"/>
+                        <dgm:constr type="h" refType="userH"/>
+                        <dgm:constr type="tMarg" refType="primFontSz" fact="0.3"/>
+                        <dgm:constr type="bMarg" refType="primFontSz" fact="0.3"/>
+                        <dgm:constr type="lMarg" refType="primFontSz" fact="0.3"/>
+                        <dgm:constr type="rMarg" refType="primFontSz" fact="0.3"/>
+                      </dgm:constrLst>
+                      <dgm:ruleLst>
+                        <dgm:rule type="primFontSz" val="5" fact="NaN" max="NaN"/>
+                      </dgm:ruleLst>
+                    </dgm:layoutNode>
+                    <dgm:choose name="Name19">
+                      <dgm:if name="Name20" axis="des" ptType="node" func="cnt" op="gt" val="0">
+                        <dgm:layoutNode name="parTransThree">
+                          <dgm:alg type="sp"/>
+                          <dgm:shape xmlns:r="http://schemas.openxmlformats.org/officeDocument/2006/relationships" r:blip="">
+                            <dgm:adjLst/>
+                          </dgm:shape>
+                          <dgm:presOf/>
+                          <dgm:constrLst/>
+                          <dgm:ruleLst/>
+                        </dgm:layoutNode>
+                      </dgm:if>
+                      <dgm:else name="Name21"/>
+                    </dgm:choose>
+                    <dgm:layoutNode name="horzThree">
+                      <dgm:choose name="Name22">
+                        <dgm:if name="Name23" func="var" arg="dir" op="equ" val="norm">
+                          <dgm:alg type="lin">
+                            <dgm:param type="linDir" val="fromL"/>
+                            <dgm:param type="nodeVertAlign" val="t"/>
+                          </dgm:alg>
+                        </dgm:if>
+                        <dgm:else name="Name24">
+                          <dgm:alg type="lin">
+                            <dgm:param type="linDir" val="fromR"/>
+                            <dgm:param type="nodeVertAlign" val="t"/>
+                          </dgm:alg>
+                        </dgm:else>
+                      </dgm:choose>
+                      <dgm:shape xmlns:r="http://schemas.openxmlformats.org/officeDocument/2006/relationships" r:blip="">
+                        <dgm:adjLst/>
+                      </dgm:shape>
+                      <dgm:presOf/>
+                      <dgm:constrLst/>
+                      <dgm:ruleLst>
+                        <dgm:rule type="w" val="INF" fact="NaN" max="NaN"/>
+                      </dgm:ruleLst>
+                      <dgm:forEach name="repeat" axis="ch" ptType="node">
+                        <dgm:layoutNode name="vertFour">
+                          <dgm:varLst>
+                            <dgm:chPref val="3"/>
+                          </dgm:varLst>
+                          <dgm:alg type="lin">
+                            <dgm:param type="linDir" val="fromT"/>
+                          </dgm:alg>
+                          <dgm:shape xmlns:r="http://schemas.openxmlformats.org/officeDocument/2006/relationships" r:blip="">
+                            <dgm:adjLst/>
+                          </dgm:shape>
+                          <dgm:presOf/>
+                          <dgm:constrLst>
+                            <dgm:constr type="w" for="ch" forName="txFour" refType="w" refFor="ch" refForName="horzFour" op="gte"/>
+                          </dgm:constrLst>
+                          <dgm:ruleLst/>
+                          <dgm:layoutNode name="txFour">
+                            <dgm:varLst>
+                              <dgm:chPref val="3"/>
+                            </dgm:varLst>
+                            <dgm:alg type="tx"/>
+                            <dgm:shape xmlns:r="http://schemas.openxmlformats.org/officeDocument/2006/relationships" type="roundRect" r:blip="">
+                              <dgm:adjLst>
+                                <dgm:adj idx="1" val="0.1"/>
+                              </dgm:adjLst>
+                            </dgm:shape>
+                            <dgm:presOf axis="self"/>
+                            <dgm:constrLst>
+                              <dgm:constr type="userH"/>
+                              <dgm:constr type="h" refType="userH"/>
+                              <dgm:constr type="tMarg" refType="primFontSz" fact="0.3"/>
+                              <dgm:constr type="bMarg" refType="primFontSz" fact="0.3"/>
+                              <dgm:constr type="lMarg" refType="primFontSz" fact="0.3"/>
+                              <dgm:constr type="rMarg" refType="primFontSz" fact="0.3"/>
+                            </dgm:constrLst>
+                            <dgm:ruleLst>
+                              <dgm:rule type="primFontSz" val="5" fact="NaN" max="NaN"/>
+                            </dgm:ruleLst>
+                          </dgm:layoutNode>
+                          <dgm:choose name="Name25">
+                            <dgm:if name="Name26" axis="des" ptType="node" func="cnt" op="gt" val="0">
+                              <dgm:layoutNode name="parTransFour">
+                                <dgm:alg type="sp"/>
+                                <dgm:shape xmlns:r="http://schemas.openxmlformats.org/officeDocument/2006/relationships" r:blip="">
+                                  <dgm:adjLst/>
+                                </dgm:shape>
+                                <dgm:presOf/>
+                                <dgm:constrLst/>
+                                <dgm:ruleLst/>
+                              </dgm:layoutNode>
+                            </dgm:if>
+                            <dgm:else name="Name27"/>
+                          </dgm:choose>
+                          <dgm:layoutNode name="horzFour">
+                            <dgm:choose name="Name28">
+                              <dgm:if name="Name29" func="var" arg="dir" op="equ" val="norm">
+                                <dgm:alg type="lin">
+                                  <dgm:param type="linDir" val="fromL"/>
+                                  <dgm:param type="nodeVertAlign" val="t"/>
+                                </dgm:alg>
+                              </dgm:if>
+                              <dgm:else name="Name30">
+                                <dgm:alg type="lin">
+                                  <dgm:param type="linDir" val="fromR"/>
+                                  <dgm:param type="nodeVertAlign" val="t"/>
+                                </dgm:alg>
+                              </dgm:else>
+                            </dgm:choose>
+                            <dgm:shape xmlns:r="http://schemas.openxmlformats.org/officeDocument/2006/relationships" r:blip="">
+                              <dgm:adjLst/>
+                            </dgm:shape>
+                            <dgm:presOf/>
+                            <dgm:constrLst/>
+                            <dgm:ruleLst>
+                              <dgm:rule type="w" val="INF" fact="NaN" max="NaN"/>
+                            </dgm:ruleLst>
+                            <dgm:forEach name="Name31" ref="repeat"/>
+                          </dgm:layoutNode>
+                        </dgm:layoutNode>
+                        <dgm:choose name="Name32">
+                          <dgm:if name="Name33" axis="self" ptType="node" func="revPos" op="gte" val="2">
+                            <dgm:forEach name="Name34" axis="followSib" ptType="sibTrans" cnt="1">
+                              <dgm:layoutNode name="sibSpaceFour">
+                                <dgm:alg type="sp"/>
+                                <dgm:shape xmlns:r="http://schemas.openxmlformats.org/officeDocument/2006/relationships" r:blip="">
+                                  <dgm:adjLst/>
+                                </dgm:shape>
+                                <dgm:presOf/>
+                                <dgm:constrLst/>
+                                <dgm:ruleLst/>
+                              </dgm:layoutNode>
+                            </dgm:forEach>
+                          </dgm:if>
+                          <dgm:else name="Name35"/>
+                        </dgm:choose>
+                      </dgm:forEach>
+                    </dgm:layoutNode>
+                  </dgm:layoutNode>
+                  <dgm:choose name="Name36">
+                    <dgm:if name="Name37" axis="self" ptType="node" func="revPos" op="gte" val="2">
+                      <dgm:forEach name="Name38" axis="followSib" ptType="sibTrans" cnt="1">
+                        <dgm:layoutNode name="sibSpaceThree">
+                          <dgm:alg type="sp"/>
+                          <dgm:shape xmlns:r="http://schemas.openxmlformats.org/officeDocument/2006/relationships" r:blip="">
+                            <dgm:adjLst/>
+                          </dgm:shape>
+                          <dgm:presOf/>
+                          <dgm:constrLst/>
+                          <dgm:ruleLst/>
+                        </dgm:layoutNode>
+                      </dgm:forEach>
+                    </dgm:if>
+                    <dgm:else name="Name39"/>
+                  </dgm:choose>
+                </dgm:forEach>
+              </dgm:layoutNode>
+            </dgm:layoutNode>
+            <dgm:choose name="Name40">
+              <dgm:if name="Name41" axis="self" ptType="node" func="revPos" op="gte" val="2">
+                <dgm:forEach name="Name42" axis="followSib" ptType="sibTrans" cnt="1">
+                  <dgm:layoutNode name="sibSpaceTwo">
+                    <dgm:alg type="sp"/>
+                    <dgm:shape xmlns:r="http://schemas.openxmlformats.org/officeDocument/2006/relationships" r:blip="">
+                      <dgm:adjLst/>
+                    </dgm:shape>
+                    <dgm:presOf/>
+                    <dgm:constrLst/>
+                    <dgm:ruleLst/>
+                  </dgm:layoutNode>
+                </dgm:forEach>
+              </dgm:if>
+              <dgm:else name="Name43"/>
+            </dgm:choose>
+          </dgm:forEach>
+        </dgm:layoutNode>
+      </dgm:layoutNode>
+      <dgm:choose name="Name44">
+        <dgm:if name="Name45" axis="self" ptType="node" func="revPos" op="gte" val="2">
+          <dgm:forEach name="Name46" axis="followSib" ptType="sibTrans" cnt="1">
+            <dgm:layoutNode name="sibSpaceOne">
+              <dgm:alg type="sp"/>
+              <dgm:shape xmlns:r="http://schemas.openxmlformats.org/officeDocument/2006/relationships" r:blip="">
+                <dgm:adjLst/>
+              </dgm:shape>
+              <dgm:presOf/>
+              <dgm:constrLst/>
+              <dgm:ruleLst/>
+            </dgm:layoutNode>
+          </dgm:forEach>
+        </dgm:if>
+        <dgm:else name="Name47"/>
+      </dgm:choose>
+    </dgm:forEach>
+  </dgm:layoutNode>
+</dgm:layoutDef>
+</file>
+
 <file path=ppt/diagrams/quickStyle1.xml><?xml version="1.0" encoding="utf-8"?>
 <dgm:styleDef xmlns:dgm="http://schemas.openxmlformats.org/drawingml/2006/diagram" xmlns:a="http://schemas.openxmlformats.org/drawingml/2006/main" uniqueId="urn:microsoft.com/office/officeart/2005/8/quickstyle/simple1">
   <dgm:title val=""/>
@@ -5648,6 +7277,1040 @@
 </file>
 
 <file path=ppt/diagrams/quickStyle2.xml><?xml version="1.0" encoding="utf-8"?>
+<dgm:styleDef xmlns:dgm="http://schemas.openxmlformats.org/drawingml/2006/diagram" xmlns:a="http://schemas.openxmlformats.org/drawingml/2006/main" uniqueId="urn:microsoft.com/office/officeart/2005/8/quickstyle/simple1">
+  <dgm:title val=""/>
+  <dgm:desc val=""/>
+  <dgm:catLst>
+    <dgm:cat type="simple" pri="10100"/>
+  </dgm:catLst>
+  <dgm:scene3d>
+    <a:camera prst="orthographicFront"/>
+    <a:lightRig rig="threePt" dir="t"/>
+  </dgm:scene3d>
+  <dgm:styleLbl name="node0">
+    <dgm:scene3d>
+      <a:camera prst="orthographicFront"/>
+      <a:lightRig rig="threePt" dir="t"/>
+    </dgm:scene3d>
+    <dgm:sp3d/>
+    <dgm:txPr/>
+    <dgm:style>
+      <a:lnRef idx="2">
+        <a:scrgbClr r="0" g="0" b="0"/>
+      </a:lnRef>
+      <a:fillRef idx="1">
+        <a:scrgbClr r="0" g="0" b="0"/>
+      </a:fillRef>
+      <a:effectRef idx="0">
+        <a:scrgbClr r="0" g="0" b="0"/>
+      </a:effectRef>
+      <a:fontRef idx="minor">
+        <a:schemeClr val="lt1"/>
+      </a:fontRef>
+    </dgm:style>
+  </dgm:styleLbl>
+  <dgm:styleLbl name="lnNode1">
+    <dgm:scene3d>
+      <a:camera prst="orthographicFront"/>
+      <a:lightRig rig="threePt" dir="t"/>
+    </dgm:scene3d>
+    <dgm:sp3d/>
+    <dgm:txPr/>
+    <dgm:style>
+      <a:lnRef idx="2">
+        <a:scrgbClr r="0" g="0" b="0"/>
+      </a:lnRef>
+      <a:fillRef idx="1">
+        <a:scrgbClr r="0" g="0" b="0"/>
+      </a:fillRef>
+      <a:effectRef idx="0">
+        <a:scrgbClr r="0" g="0" b="0"/>
+      </a:effectRef>
+      <a:fontRef idx="minor">
+        <a:schemeClr val="lt1"/>
+      </a:fontRef>
+    </dgm:style>
+  </dgm:styleLbl>
+  <dgm:styleLbl name="vennNode1">
+    <dgm:scene3d>
+      <a:camera prst="orthographicFront"/>
+      <a:lightRig rig="threePt" dir="t"/>
+    </dgm:scene3d>
+    <dgm:sp3d/>
+    <dgm:txPr/>
+    <dgm:style>
+      <a:lnRef idx="2">
+        <a:scrgbClr r="0" g="0" b="0"/>
+      </a:lnRef>
+      <a:fillRef idx="1">
+        <a:scrgbClr r="0" g="0" b="0"/>
+      </a:fillRef>
+      <a:effectRef idx="0">
+        <a:scrgbClr r="0" g="0" b="0"/>
+      </a:effectRef>
+      <a:fontRef idx="minor">
+        <a:schemeClr val="tx1"/>
+      </a:fontRef>
+    </dgm:style>
+  </dgm:styleLbl>
+  <dgm:styleLbl name="alignNode1">
+    <dgm:scene3d>
+      <a:camera prst="orthographicFront"/>
+      <a:lightRig rig="threePt" dir="t"/>
+    </dgm:scene3d>
+    <dgm:sp3d/>
+    <dgm:txPr/>
+    <dgm:style>
+      <a:lnRef idx="2">
+        <a:scrgbClr r="0" g="0" b="0"/>
+      </a:lnRef>
+      <a:fillRef idx="1">
+        <a:scrgbClr r="0" g="0" b="0"/>
+      </a:fillRef>
+      <a:effectRef idx="0">
+        <a:scrgbClr r="0" g="0" b="0"/>
+      </a:effectRef>
+      <a:fontRef idx="minor">
+        <a:schemeClr val="lt1"/>
+      </a:fontRef>
+    </dgm:style>
+  </dgm:styleLbl>
+  <dgm:styleLbl name="node1">
+    <dgm:scene3d>
+      <a:camera prst="orthographicFront"/>
+      <a:lightRig rig="threePt" dir="t"/>
+    </dgm:scene3d>
+    <dgm:sp3d/>
+    <dgm:txPr/>
+    <dgm:style>
+      <a:lnRef idx="2">
+        <a:scrgbClr r="0" g="0" b="0"/>
+      </a:lnRef>
+      <a:fillRef idx="1">
+        <a:scrgbClr r="0" g="0" b="0"/>
+      </a:fillRef>
+      <a:effectRef idx="0">
+        <a:scrgbClr r="0" g="0" b="0"/>
+      </a:effectRef>
+      <a:fontRef idx="minor">
+        <a:schemeClr val="lt1"/>
+      </a:fontRef>
+    </dgm:style>
+  </dgm:styleLbl>
+  <dgm:styleLbl name="node2">
+    <dgm:scene3d>
+      <a:camera prst="orthographicFront"/>
+      <a:lightRig rig="threePt" dir="t"/>
+    </dgm:scene3d>
+    <dgm:sp3d/>
+    <dgm:txPr/>
+    <dgm:style>
+      <a:lnRef idx="2">
+        <a:scrgbClr r="0" g="0" b="0"/>
+      </a:lnRef>
+      <a:fillRef idx="1">
+        <a:scrgbClr r="0" g="0" b="0"/>
+      </a:fillRef>
+      <a:effectRef idx="0">
+        <a:scrgbClr r="0" g="0" b="0"/>
+      </a:effectRef>
+      <a:fontRef idx="minor">
+        <a:schemeClr val="lt1"/>
+      </a:fontRef>
+    </dgm:style>
+  </dgm:styleLbl>
+  <dgm:styleLbl name="node3">
+    <dgm:scene3d>
+      <a:camera prst="orthographicFront"/>
+      <a:lightRig rig="threePt" dir="t"/>
+    </dgm:scene3d>
+    <dgm:sp3d/>
+    <dgm:txPr/>
+    <dgm:style>
+      <a:lnRef idx="2">
+        <a:scrgbClr r="0" g="0" b="0"/>
+      </a:lnRef>
+      <a:fillRef idx="1">
+        <a:scrgbClr r="0" g="0" b="0"/>
+      </a:fillRef>
+      <a:effectRef idx="0">
+        <a:scrgbClr r="0" g="0" b="0"/>
+      </a:effectRef>
+      <a:fontRef idx="minor">
+        <a:schemeClr val="lt1"/>
+      </a:fontRef>
+    </dgm:style>
+  </dgm:styleLbl>
+  <dgm:styleLbl name="node4">
+    <dgm:scene3d>
+      <a:camera prst="orthographicFront"/>
+      <a:lightRig rig="threePt" dir="t"/>
+    </dgm:scene3d>
+    <dgm:sp3d/>
+    <dgm:txPr/>
+    <dgm:style>
+      <a:lnRef idx="2">
+        <a:scrgbClr r="0" g="0" b="0"/>
+      </a:lnRef>
+      <a:fillRef idx="1">
+        <a:scrgbClr r="0" g="0" b="0"/>
+      </a:fillRef>
+      <a:effectRef idx="0">
+        <a:scrgbClr r="0" g="0" b="0"/>
+      </a:effectRef>
+      <a:fontRef idx="minor">
+        <a:schemeClr val="lt1"/>
+      </a:fontRef>
+    </dgm:style>
+  </dgm:styleLbl>
+  <dgm:styleLbl name="fgImgPlace1">
+    <dgm:scene3d>
+      <a:camera prst="orthographicFront"/>
+      <a:lightRig rig="threePt" dir="t"/>
+    </dgm:scene3d>
+    <dgm:sp3d/>
+    <dgm:txPr/>
+    <dgm:style>
+      <a:lnRef idx="2">
+        <a:scrgbClr r="0" g="0" b="0"/>
+      </a:lnRef>
+      <a:fillRef idx="1">
+        <a:scrgbClr r="0" g="0" b="0"/>
+      </a:fillRef>
+      <a:effectRef idx="0">
+        <a:scrgbClr r="0" g="0" b="0"/>
+      </a:effectRef>
+      <a:fontRef idx="minor"/>
+    </dgm:style>
+  </dgm:styleLbl>
+  <dgm:styleLbl name="alignImgPlace1">
+    <dgm:scene3d>
+      <a:camera prst="orthographicFront"/>
+      <a:lightRig rig="threePt" dir="t"/>
+    </dgm:scene3d>
+    <dgm:sp3d/>
+    <dgm:txPr/>
+    <dgm:style>
+      <a:lnRef idx="2">
+        <a:scrgbClr r="0" g="0" b="0"/>
+      </a:lnRef>
+      <a:fillRef idx="1">
+        <a:scrgbClr r="0" g="0" b="0"/>
+      </a:fillRef>
+      <a:effectRef idx="0">
+        <a:scrgbClr r="0" g="0" b="0"/>
+      </a:effectRef>
+      <a:fontRef idx="minor"/>
+    </dgm:style>
+  </dgm:styleLbl>
+  <dgm:styleLbl name="bgImgPlace1">
+    <dgm:scene3d>
+      <a:camera prst="orthographicFront"/>
+      <a:lightRig rig="threePt" dir="t"/>
+    </dgm:scene3d>
+    <dgm:sp3d/>
+    <dgm:txPr/>
+    <dgm:style>
+      <a:lnRef idx="2">
+        <a:scrgbClr r="0" g="0" b="0"/>
+      </a:lnRef>
+      <a:fillRef idx="1">
+        <a:scrgbClr r="0" g="0" b="0"/>
+      </a:fillRef>
+      <a:effectRef idx="0">
+        <a:scrgbClr r="0" g="0" b="0"/>
+      </a:effectRef>
+      <a:fontRef idx="minor"/>
+    </dgm:style>
+  </dgm:styleLbl>
+  <dgm:styleLbl name="sibTrans2D1">
+    <dgm:scene3d>
+      <a:camera prst="orthographicFront"/>
+      <a:lightRig rig="threePt" dir="t"/>
+    </dgm:scene3d>
+    <dgm:sp3d/>
+    <dgm:txPr/>
+    <dgm:style>
+      <a:lnRef idx="0">
+        <a:scrgbClr r="0" g="0" b="0"/>
+      </a:lnRef>
+      <a:fillRef idx="1">
+        <a:scrgbClr r="0" g="0" b="0"/>
+      </a:fillRef>
+      <a:effectRef idx="0">
+        <a:scrgbClr r="0" g="0" b="0"/>
+      </a:effectRef>
+      <a:fontRef idx="minor">
+        <a:schemeClr val="lt1"/>
+      </a:fontRef>
+    </dgm:style>
+  </dgm:styleLbl>
+  <dgm:styleLbl name="fgSibTrans2D1">
+    <dgm:scene3d>
+      <a:camera prst="orthographicFront"/>
+      <a:lightRig rig="threePt" dir="t"/>
+    </dgm:scene3d>
+    <dgm:sp3d/>
+    <dgm:txPr/>
+    <dgm:style>
+      <a:lnRef idx="0">
+        <a:scrgbClr r="0" g="0" b="0"/>
+      </a:lnRef>
+      <a:fillRef idx="1">
+        <a:scrgbClr r="0" g="0" b="0"/>
+      </a:fillRef>
+      <a:effectRef idx="0">
+        <a:scrgbClr r="0" g="0" b="0"/>
+      </a:effectRef>
+      <a:fontRef idx="minor">
+        <a:schemeClr val="lt1"/>
+      </a:fontRef>
+    </dgm:style>
+  </dgm:styleLbl>
+  <dgm:styleLbl name="bgSibTrans2D1">
+    <dgm:scene3d>
+      <a:camera prst="orthographicFront"/>
+      <a:lightRig rig="threePt" dir="t"/>
+    </dgm:scene3d>
+    <dgm:sp3d/>
+    <dgm:txPr/>
+    <dgm:style>
+      <a:lnRef idx="0">
+        <a:scrgbClr r="0" g="0" b="0"/>
+      </a:lnRef>
+      <a:fillRef idx="1">
+        <a:scrgbClr r="0" g="0" b="0"/>
+      </a:fillRef>
+      <a:effectRef idx="0">
+        <a:scrgbClr r="0" g="0" b="0"/>
+      </a:effectRef>
+      <a:fontRef idx="minor">
+        <a:schemeClr val="lt1"/>
+      </a:fontRef>
+    </dgm:style>
+  </dgm:styleLbl>
+  <dgm:styleLbl name="sibTrans1D1">
+    <dgm:scene3d>
+      <a:camera prst="orthographicFront"/>
+      <a:lightRig rig="threePt" dir="t"/>
+    </dgm:scene3d>
+    <dgm:sp3d/>
+    <dgm:txPr/>
+    <dgm:style>
+      <a:lnRef idx="1">
+        <a:scrgbClr r="0" g="0" b="0"/>
+      </a:lnRef>
+      <a:fillRef idx="0">
+        <a:scrgbClr r="0" g="0" b="0"/>
+      </a:fillRef>
+      <a:effectRef idx="0">
+        <a:scrgbClr r="0" g="0" b="0"/>
+      </a:effectRef>
+      <a:fontRef idx="minor"/>
+    </dgm:style>
+  </dgm:styleLbl>
+  <dgm:styleLbl name="callout">
+    <dgm:scene3d>
+      <a:camera prst="orthographicFront"/>
+      <a:lightRig rig="threePt" dir="t"/>
+    </dgm:scene3d>
+    <dgm:sp3d/>
+    <dgm:txPr/>
+    <dgm:style>
+      <a:lnRef idx="2">
+        <a:scrgbClr r="0" g="0" b="0"/>
+      </a:lnRef>
+      <a:fillRef idx="1">
+        <a:scrgbClr r="0" g="0" b="0"/>
+      </a:fillRef>
+      <a:effectRef idx="0">
+        <a:scrgbClr r="0" g="0" b="0"/>
+      </a:effectRef>
+      <a:fontRef idx="minor"/>
+    </dgm:style>
+  </dgm:styleLbl>
+  <dgm:styleLbl name="asst0">
+    <dgm:scene3d>
+      <a:camera prst="orthographicFront"/>
+      <a:lightRig rig="threePt" dir="t"/>
+    </dgm:scene3d>
+    <dgm:sp3d/>
+    <dgm:txPr/>
+    <dgm:style>
+      <a:lnRef idx="2">
+        <a:scrgbClr r="0" g="0" b="0"/>
+      </a:lnRef>
+      <a:fillRef idx="1">
+        <a:scrgbClr r="0" g="0" b="0"/>
+      </a:fillRef>
+      <a:effectRef idx="0">
+        <a:scrgbClr r="0" g="0" b="0"/>
+      </a:effectRef>
+      <a:fontRef idx="minor">
+        <a:schemeClr val="lt1"/>
+      </a:fontRef>
+    </dgm:style>
+  </dgm:styleLbl>
+  <dgm:styleLbl name="asst1">
+    <dgm:scene3d>
+      <a:camera prst="orthographicFront"/>
+      <a:lightRig rig="threePt" dir="t"/>
+    </dgm:scene3d>
+    <dgm:sp3d/>
+    <dgm:txPr/>
+    <dgm:style>
+      <a:lnRef idx="2">
+        <a:scrgbClr r="0" g="0" b="0"/>
+      </a:lnRef>
+      <a:fillRef idx="1">
+        <a:scrgbClr r="0" g="0" b="0"/>
+      </a:fillRef>
+      <a:effectRef idx="0">
+        <a:scrgbClr r="0" g="0" b="0"/>
+      </a:effectRef>
+      <a:fontRef idx="minor">
+        <a:schemeClr val="lt1"/>
+      </a:fontRef>
+    </dgm:style>
+  </dgm:styleLbl>
+  <dgm:styleLbl name="asst2">
+    <dgm:scene3d>
+      <a:camera prst="orthographicFront"/>
+      <a:lightRig rig="threePt" dir="t"/>
+    </dgm:scene3d>
+    <dgm:sp3d/>
+    <dgm:txPr/>
+    <dgm:style>
+      <a:lnRef idx="2">
+        <a:scrgbClr r="0" g="0" b="0"/>
+      </a:lnRef>
+      <a:fillRef idx="1">
+        <a:scrgbClr r="0" g="0" b="0"/>
+      </a:fillRef>
+      <a:effectRef idx="0">
+        <a:scrgbClr r="0" g="0" b="0"/>
+      </a:effectRef>
+      <a:fontRef idx="minor">
+        <a:schemeClr val="lt1"/>
+      </a:fontRef>
+    </dgm:style>
+  </dgm:styleLbl>
+  <dgm:styleLbl name="asst3">
+    <dgm:scene3d>
+      <a:camera prst="orthographicFront"/>
+      <a:lightRig rig="threePt" dir="t"/>
+    </dgm:scene3d>
+    <dgm:sp3d/>
+    <dgm:txPr/>
+    <dgm:style>
+      <a:lnRef idx="2">
+        <a:scrgbClr r="0" g="0" b="0"/>
+      </a:lnRef>
+      <a:fillRef idx="1">
+        <a:scrgbClr r="0" g="0" b="0"/>
+      </a:fillRef>
+      <a:effectRef idx="0">
+        <a:scrgbClr r="0" g="0" b="0"/>
+      </a:effectRef>
+      <a:fontRef idx="minor">
+        <a:schemeClr val="lt1"/>
+      </a:fontRef>
+    </dgm:style>
+  </dgm:styleLbl>
+  <dgm:styleLbl name="asst4">
+    <dgm:scene3d>
+      <a:camera prst="orthographicFront"/>
+      <a:lightRig rig="threePt" dir="t"/>
+    </dgm:scene3d>
+    <dgm:sp3d/>
+    <dgm:txPr/>
+    <dgm:style>
+      <a:lnRef idx="2">
+        <a:scrgbClr r="0" g="0" b="0"/>
+      </a:lnRef>
+      <a:fillRef idx="1">
+        <a:scrgbClr r="0" g="0" b="0"/>
+      </a:fillRef>
+      <a:effectRef idx="0">
+        <a:scrgbClr r="0" g="0" b="0"/>
+      </a:effectRef>
+      <a:fontRef idx="minor">
+        <a:schemeClr val="lt1"/>
+      </a:fontRef>
+    </dgm:style>
+  </dgm:styleLbl>
+  <dgm:styleLbl name="parChTrans2D1">
+    <dgm:scene3d>
+      <a:camera prst="orthographicFront"/>
+      <a:lightRig rig="threePt" dir="t"/>
+    </dgm:scene3d>
+    <dgm:sp3d/>
+    <dgm:txPr/>
+    <dgm:style>
+      <a:lnRef idx="2">
+        <a:scrgbClr r="0" g="0" b="0"/>
+      </a:lnRef>
+      <a:fillRef idx="1">
+        <a:scrgbClr r="0" g="0" b="0"/>
+      </a:fillRef>
+      <a:effectRef idx="0">
+        <a:scrgbClr r="0" g="0" b="0"/>
+      </a:effectRef>
+      <a:fontRef idx="minor">
+        <a:schemeClr val="lt1"/>
+      </a:fontRef>
+    </dgm:style>
+  </dgm:styleLbl>
+  <dgm:styleLbl name="parChTrans2D2">
+    <dgm:scene3d>
+      <a:camera prst="orthographicFront"/>
+      <a:lightRig rig="threePt" dir="t"/>
+    </dgm:scene3d>
+    <dgm:sp3d/>
+    <dgm:txPr/>
+    <dgm:style>
+      <a:lnRef idx="2">
+        <a:scrgbClr r="0" g="0" b="0"/>
+      </a:lnRef>
+      <a:fillRef idx="1">
+        <a:scrgbClr r="0" g="0" b="0"/>
+      </a:fillRef>
+      <a:effectRef idx="0">
+        <a:scrgbClr r="0" g="0" b="0"/>
+      </a:effectRef>
+      <a:fontRef idx="minor">
+        <a:schemeClr val="lt1"/>
+      </a:fontRef>
+    </dgm:style>
+  </dgm:styleLbl>
+  <dgm:styleLbl name="parChTrans2D3">
+    <dgm:scene3d>
+      <a:camera prst="orthographicFront"/>
+      <a:lightRig rig="threePt" dir="t"/>
+    </dgm:scene3d>
+    <dgm:sp3d/>
+    <dgm:txPr/>
+    <dgm:style>
+      <a:lnRef idx="2">
+        <a:scrgbClr r="0" g="0" b="0"/>
+      </a:lnRef>
+      <a:fillRef idx="1">
+        <a:scrgbClr r="0" g="0" b="0"/>
+      </a:fillRef>
+      <a:effectRef idx="0">
+        <a:scrgbClr r="0" g="0" b="0"/>
+      </a:effectRef>
+      <a:fontRef idx="minor">
+        <a:schemeClr val="lt1"/>
+      </a:fontRef>
+    </dgm:style>
+  </dgm:styleLbl>
+  <dgm:styleLbl name="parChTrans2D4">
+    <dgm:scene3d>
+      <a:camera prst="orthographicFront"/>
+      <a:lightRig rig="threePt" dir="t"/>
+    </dgm:scene3d>
+    <dgm:sp3d/>
+    <dgm:txPr/>
+    <dgm:style>
+      <a:lnRef idx="2">
+        <a:scrgbClr r="0" g="0" b="0"/>
+      </a:lnRef>
+      <a:fillRef idx="1">
+        <a:scrgbClr r="0" g="0" b="0"/>
+      </a:fillRef>
+      <a:effectRef idx="0">
+        <a:scrgbClr r="0" g="0" b="0"/>
+      </a:effectRef>
+      <a:fontRef idx="minor">
+        <a:schemeClr val="lt1"/>
+      </a:fontRef>
+    </dgm:style>
+  </dgm:styleLbl>
+  <dgm:styleLbl name="parChTrans1D1">
+    <dgm:scene3d>
+      <a:camera prst="orthographicFront"/>
+      <a:lightRig rig="threePt" dir="t"/>
+    </dgm:scene3d>
+    <dgm:sp3d/>
+    <dgm:txPr/>
+    <dgm:style>
+      <a:lnRef idx="2">
+        <a:scrgbClr r="0" g="0" b="0"/>
+      </a:lnRef>
+      <a:fillRef idx="0">
+        <a:scrgbClr r="0" g="0" b="0"/>
+      </a:fillRef>
+      <a:effectRef idx="0">
+        <a:scrgbClr r="0" g="0" b="0"/>
+      </a:effectRef>
+      <a:fontRef idx="minor"/>
+    </dgm:style>
+  </dgm:styleLbl>
+  <dgm:styleLbl name="parChTrans1D2">
+    <dgm:scene3d>
+      <a:camera prst="orthographicFront"/>
+      <a:lightRig rig="threePt" dir="t"/>
+    </dgm:scene3d>
+    <dgm:sp3d/>
+    <dgm:txPr/>
+    <dgm:style>
+      <a:lnRef idx="2">
+        <a:scrgbClr r="0" g="0" b="0"/>
+      </a:lnRef>
+      <a:fillRef idx="0">
+        <a:scrgbClr r="0" g="0" b="0"/>
+      </a:fillRef>
+      <a:effectRef idx="0">
+        <a:scrgbClr r="0" g="0" b="0"/>
+      </a:effectRef>
+      <a:fontRef idx="minor"/>
+    </dgm:style>
+  </dgm:styleLbl>
+  <dgm:styleLbl name="parChTrans1D3">
+    <dgm:scene3d>
+      <a:camera prst="orthographicFront"/>
+      <a:lightRig rig="threePt" dir="t"/>
+    </dgm:scene3d>
+    <dgm:sp3d/>
+    <dgm:txPr/>
+    <dgm:style>
+      <a:lnRef idx="2">
+        <a:scrgbClr r="0" g="0" b="0"/>
+      </a:lnRef>
+      <a:fillRef idx="0">
+        <a:scrgbClr r="0" g="0" b="0"/>
+      </a:fillRef>
+      <a:effectRef idx="0">
+        <a:scrgbClr r="0" g="0" b="0"/>
+      </a:effectRef>
+      <a:fontRef idx="minor"/>
+    </dgm:style>
+  </dgm:styleLbl>
+  <dgm:styleLbl name="parChTrans1D4">
+    <dgm:scene3d>
+      <a:camera prst="orthographicFront"/>
+      <a:lightRig rig="threePt" dir="t"/>
+    </dgm:scene3d>
+    <dgm:sp3d/>
+    <dgm:txPr/>
+    <dgm:style>
+      <a:lnRef idx="2">
+        <a:scrgbClr r="0" g="0" b="0"/>
+      </a:lnRef>
+      <a:fillRef idx="0">
+        <a:scrgbClr r="0" g="0" b="0"/>
+      </a:fillRef>
+      <a:effectRef idx="0">
+        <a:scrgbClr r="0" g="0" b="0"/>
+      </a:effectRef>
+      <a:fontRef idx="minor"/>
+    </dgm:style>
+  </dgm:styleLbl>
+  <dgm:styleLbl name="fgAcc1">
+    <dgm:scene3d>
+      <a:camera prst="orthographicFront"/>
+      <a:lightRig rig="threePt" dir="t"/>
+    </dgm:scene3d>
+    <dgm:sp3d/>
+    <dgm:txPr/>
+    <dgm:style>
+      <a:lnRef idx="2">
+        <a:scrgbClr r="0" g="0" b="0"/>
+      </a:lnRef>
+      <a:fillRef idx="1">
+        <a:scrgbClr r="0" g="0" b="0"/>
+      </a:fillRef>
+      <a:effectRef idx="0">
+        <a:scrgbClr r="0" g="0" b="0"/>
+      </a:effectRef>
+      <a:fontRef idx="minor"/>
+    </dgm:style>
+  </dgm:styleLbl>
+  <dgm:styleLbl name="conFgAcc1">
+    <dgm:scene3d>
+      <a:camera prst="orthographicFront"/>
+      <a:lightRig rig="threePt" dir="t"/>
+    </dgm:scene3d>
+    <dgm:sp3d/>
+    <dgm:txPr/>
+    <dgm:style>
+      <a:lnRef idx="2">
+        <a:scrgbClr r="0" g="0" b="0"/>
+      </a:lnRef>
+      <a:fillRef idx="1">
+        <a:scrgbClr r="0" g="0" b="0"/>
+      </a:fillRef>
+      <a:effectRef idx="0">
+        <a:scrgbClr r="0" g="0" b="0"/>
+      </a:effectRef>
+      <a:fontRef idx="minor"/>
+    </dgm:style>
+  </dgm:styleLbl>
+  <dgm:styleLbl name="alignAcc1">
+    <dgm:scene3d>
+      <a:camera prst="orthographicFront"/>
+      <a:lightRig rig="threePt" dir="t"/>
+    </dgm:scene3d>
+    <dgm:sp3d/>
+    <dgm:txPr/>
+    <dgm:style>
+      <a:lnRef idx="2">
+        <a:scrgbClr r="0" g="0" b="0"/>
+      </a:lnRef>
+      <a:fillRef idx="1">
+        <a:scrgbClr r="0" g="0" b="0"/>
+      </a:fillRef>
+      <a:effectRef idx="0">
+        <a:scrgbClr r="0" g="0" b="0"/>
+      </a:effectRef>
+      <a:fontRef idx="minor"/>
+    </dgm:style>
+  </dgm:styleLbl>
+  <dgm:styleLbl name="trAlignAcc1">
+    <dgm:scene3d>
+      <a:camera prst="orthographicFront"/>
+      <a:lightRig rig="threePt" dir="t"/>
+    </dgm:scene3d>
+    <dgm:sp3d/>
+    <dgm:txPr/>
+    <dgm:style>
+      <a:lnRef idx="1">
+        <a:scrgbClr r="0" g="0" b="0"/>
+      </a:lnRef>
+      <a:fillRef idx="1">
+        <a:scrgbClr r="0" g="0" b="0"/>
+      </a:fillRef>
+      <a:effectRef idx="0">
+        <a:scrgbClr r="0" g="0" b="0"/>
+      </a:effectRef>
+      <a:fontRef idx="minor"/>
+    </dgm:style>
+  </dgm:styleLbl>
+  <dgm:styleLbl name="bgAcc1">
+    <dgm:scene3d>
+      <a:camera prst="orthographicFront"/>
+      <a:lightRig rig="threePt" dir="t"/>
+    </dgm:scene3d>
+    <dgm:sp3d/>
+    <dgm:txPr/>
+    <dgm:style>
+      <a:lnRef idx="2">
+        <a:scrgbClr r="0" g="0" b="0"/>
+      </a:lnRef>
+      <a:fillRef idx="1">
+        <a:scrgbClr r="0" g="0" b="0"/>
+      </a:fillRef>
+      <a:effectRef idx="0">
+        <a:scrgbClr r="0" g="0" b="0"/>
+      </a:effectRef>
+      <a:fontRef idx="minor"/>
+    </dgm:style>
+  </dgm:styleLbl>
+  <dgm:styleLbl name="solidFgAcc1">
+    <dgm:scene3d>
+      <a:camera prst="orthographicFront"/>
+      <a:lightRig rig="threePt" dir="t"/>
+    </dgm:scene3d>
+    <dgm:sp3d/>
+    <dgm:txPr/>
+    <dgm:style>
+      <a:lnRef idx="2">
+        <a:scrgbClr r="0" g="0" b="0"/>
+      </a:lnRef>
+      <a:fillRef idx="1">
+        <a:scrgbClr r="0" g="0" b="0"/>
+      </a:fillRef>
+      <a:effectRef idx="0">
+        <a:scrgbClr r="0" g="0" b="0"/>
+      </a:effectRef>
+      <a:fontRef idx="minor"/>
+    </dgm:style>
+  </dgm:styleLbl>
+  <dgm:styleLbl name="solidAlignAcc1">
+    <dgm:scene3d>
+      <a:camera prst="orthographicFront"/>
+      <a:lightRig rig="threePt" dir="t"/>
+    </dgm:scene3d>
+    <dgm:sp3d/>
+    <dgm:txPr/>
+    <dgm:style>
+      <a:lnRef idx="2">
+        <a:scrgbClr r="0" g="0" b="0"/>
+      </a:lnRef>
+      <a:fillRef idx="1">
+        <a:scrgbClr r="0" g="0" b="0"/>
+      </a:fillRef>
+      <a:effectRef idx="0">
+        <a:scrgbClr r="0" g="0" b="0"/>
+      </a:effectRef>
+      <a:fontRef idx="minor"/>
+    </dgm:style>
+  </dgm:styleLbl>
+  <dgm:styleLbl name="solidBgAcc1">
+    <dgm:scene3d>
+      <a:camera prst="orthographicFront"/>
+      <a:lightRig rig="threePt" dir="t"/>
+    </dgm:scene3d>
+    <dgm:sp3d/>
+    <dgm:txPr/>
+    <dgm:style>
+      <a:lnRef idx="2">
+        <a:scrgbClr r="0" g="0" b="0"/>
+      </a:lnRef>
+      <a:fillRef idx="1">
+        <a:scrgbClr r="0" g="0" b="0"/>
+      </a:fillRef>
+      <a:effectRef idx="0">
+        <a:scrgbClr r="0" g="0" b="0"/>
+      </a:effectRef>
+      <a:fontRef idx="minor"/>
+    </dgm:style>
+  </dgm:styleLbl>
+  <dgm:styleLbl name="fgAccFollowNode1">
+    <dgm:scene3d>
+      <a:camera prst="orthographicFront"/>
+      <a:lightRig rig="threePt" dir="t"/>
+    </dgm:scene3d>
+    <dgm:sp3d/>
+    <dgm:txPr/>
+    <dgm:style>
+      <a:lnRef idx="2">
+        <a:scrgbClr r="0" g="0" b="0"/>
+      </a:lnRef>
+      <a:fillRef idx="1">
+        <a:scrgbClr r="0" g="0" b="0"/>
+      </a:fillRef>
+      <a:effectRef idx="0">
+        <a:scrgbClr r="0" g="0" b="0"/>
+      </a:effectRef>
+      <a:fontRef idx="minor"/>
+    </dgm:style>
+  </dgm:styleLbl>
+  <dgm:styleLbl name="alignAccFollowNode1">
+    <dgm:scene3d>
+      <a:camera prst="orthographicFront"/>
+      <a:lightRig rig="threePt" dir="t"/>
+    </dgm:scene3d>
+    <dgm:sp3d/>
+    <dgm:txPr/>
+    <dgm:style>
+      <a:lnRef idx="2">
+        <a:scrgbClr r="0" g="0" b="0"/>
+      </a:lnRef>
+      <a:fillRef idx="1">
+        <a:scrgbClr r="0" g="0" b="0"/>
+      </a:fillRef>
+      <a:effectRef idx="0">
+        <a:scrgbClr r="0" g="0" b="0"/>
+      </a:effectRef>
+      <a:fontRef idx="minor"/>
+    </dgm:style>
+  </dgm:styleLbl>
+  <dgm:styleLbl name="bgAccFollowNode1">
+    <dgm:scene3d>
+      <a:camera prst="orthographicFront"/>
+      <a:lightRig rig="threePt" dir="t"/>
+    </dgm:scene3d>
+    <dgm:sp3d/>
+    <dgm:txPr/>
+    <dgm:style>
+      <a:lnRef idx="2">
+        <a:scrgbClr r="0" g="0" b="0"/>
+      </a:lnRef>
+      <a:fillRef idx="1">
+        <a:scrgbClr r="0" g="0" b="0"/>
+      </a:fillRef>
+      <a:effectRef idx="0">
+        <a:scrgbClr r="0" g="0" b="0"/>
+      </a:effectRef>
+      <a:fontRef idx="minor"/>
+    </dgm:style>
+  </dgm:styleLbl>
+  <dgm:styleLbl name="fgAcc0">
+    <dgm:scene3d>
+      <a:camera prst="orthographicFront"/>
+      <a:lightRig rig="threePt" dir="t"/>
+    </dgm:scene3d>
+    <dgm:sp3d/>
+    <dgm:txPr/>
+    <dgm:style>
+      <a:lnRef idx="2">
+        <a:scrgbClr r="0" g="0" b="0"/>
+      </a:lnRef>
+      <a:fillRef idx="1">
+        <a:scrgbClr r="0" g="0" b="0"/>
+      </a:fillRef>
+      <a:effectRef idx="0">
+        <a:scrgbClr r="0" g="0" b="0"/>
+      </a:effectRef>
+      <a:fontRef idx="minor"/>
+    </dgm:style>
+  </dgm:styleLbl>
+  <dgm:styleLbl name="fgAcc2">
+    <dgm:scene3d>
+      <a:camera prst="orthographicFront"/>
+      <a:lightRig rig="threePt" dir="t"/>
+    </dgm:scene3d>
+    <dgm:sp3d/>
+    <dgm:txPr/>
+    <dgm:style>
+      <a:lnRef idx="2">
+        <a:scrgbClr r="0" g="0" b="0"/>
+      </a:lnRef>
+      <a:fillRef idx="1">
+        <a:scrgbClr r="0" g="0" b="0"/>
+      </a:fillRef>
+      <a:effectRef idx="0">
+        <a:scrgbClr r="0" g="0" b="0"/>
+      </a:effectRef>
+      <a:fontRef idx="minor"/>
+    </dgm:style>
+  </dgm:styleLbl>
+  <dgm:styleLbl name="fgAcc3">
+    <dgm:scene3d>
+      <a:camera prst="orthographicFront"/>
+      <a:lightRig rig="threePt" dir="t"/>
+    </dgm:scene3d>
+    <dgm:sp3d/>
+    <dgm:txPr/>
+    <dgm:style>
+      <a:lnRef idx="2">
+        <a:scrgbClr r="0" g="0" b="0"/>
+      </a:lnRef>
+      <a:fillRef idx="1">
+        <a:scrgbClr r="0" g="0" b="0"/>
+      </a:fillRef>
+      <a:effectRef idx="0">
+        <a:scrgbClr r="0" g="0" b="0"/>
+      </a:effectRef>
+      <a:fontRef idx="minor"/>
+    </dgm:style>
+  </dgm:styleLbl>
+  <dgm:styleLbl name="fgAcc4">
+    <dgm:scene3d>
+      <a:camera prst="orthographicFront"/>
+      <a:lightRig rig="threePt" dir="t"/>
+    </dgm:scene3d>
+    <dgm:sp3d/>
+    <dgm:txPr/>
+    <dgm:style>
+      <a:lnRef idx="2">
+        <a:scrgbClr r="0" g="0" b="0"/>
+      </a:lnRef>
+      <a:fillRef idx="1">
+        <a:scrgbClr r="0" g="0" b="0"/>
+      </a:fillRef>
+      <a:effectRef idx="0">
+        <a:scrgbClr r="0" g="0" b="0"/>
+      </a:effectRef>
+      <a:fontRef idx="minor"/>
+    </dgm:style>
+  </dgm:styleLbl>
+  <dgm:styleLbl name="bgShp">
+    <dgm:scene3d>
+      <a:camera prst="orthographicFront"/>
+      <a:lightRig rig="threePt" dir="t"/>
+    </dgm:scene3d>
+    <dgm:sp3d/>
+    <dgm:txPr/>
+    <dgm:style>
+      <a:lnRef idx="0">
+        <a:scrgbClr r="0" g="0" b="0"/>
+      </a:lnRef>
+      <a:fillRef idx="1">
+        <a:scrgbClr r="0" g="0" b="0"/>
+      </a:fillRef>
+      <a:effectRef idx="0">
+        <a:scrgbClr r="0" g="0" b="0"/>
+      </a:effectRef>
+      <a:fontRef idx="minor"/>
+    </dgm:style>
+  </dgm:styleLbl>
+  <dgm:styleLbl name="dkBgShp">
+    <dgm:scene3d>
+      <a:camera prst="orthographicFront"/>
+      <a:lightRig rig="threePt" dir="t"/>
+    </dgm:scene3d>
+    <dgm:sp3d/>
+    <dgm:txPr/>
+    <dgm:style>
+      <a:lnRef idx="0">
+        <a:scrgbClr r="0" g="0" b="0"/>
+      </a:lnRef>
+      <a:fillRef idx="1">
+        <a:scrgbClr r="0" g="0" b="0"/>
+      </a:fillRef>
+      <a:effectRef idx="0">
+        <a:scrgbClr r="0" g="0" b="0"/>
+      </a:effectRef>
+      <a:fontRef idx="minor"/>
+    </dgm:style>
+  </dgm:styleLbl>
+  <dgm:styleLbl name="trBgShp">
+    <dgm:scene3d>
+      <a:camera prst="orthographicFront"/>
+      <a:lightRig rig="threePt" dir="t"/>
+    </dgm:scene3d>
+    <dgm:sp3d/>
+    <dgm:txPr/>
+    <dgm:style>
+      <a:lnRef idx="0">
+        <a:scrgbClr r="0" g="0" b="0"/>
+      </a:lnRef>
+      <a:fillRef idx="1">
+        <a:scrgbClr r="0" g="0" b="0"/>
+      </a:fillRef>
+      <a:effectRef idx="0">
+        <a:scrgbClr r="0" g="0" b="0"/>
+      </a:effectRef>
+      <a:fontRef idx="minor"/>
+    </dgm:style>
+  </dgm:styleLbl>
+  <dgm:styleLbl name="fgShp">
+    <dgm:scene3d>
+      <a:camera prst="orthographicFront"/>
+      <a:lightRig rig="threePt" dir="t"/>
+    </dgm:scene3d>
+    <dgm:sp3d/>
+    <dgm:txPr/>
+    <dgm:style>
+      <a:lnRef idx="2">
+        <a:scrgbClr r="0" g="0" b="0"/>
+      </a:lnRef>
+      <a:fillRef idx="1">
+        <a:scrgbClr r="0" g="0" b="0"/>
+      </a:fillRef>
+      <a:effectRef idx="0">
+        <a:scrgbClr r="0" g="0" b="0"/>
+      </a:effectRef>
+      <a:fontRef idx="minor"/>
+    </dgm:style>
+  </dgm:styleLbl>
+  <dgm:styleLbl name="revTx">
+    <dgm:scene3d>
+      <a:camera prst="orthographicFront"/>
+      <a:lightRig rig="threePt" dir="t"/>
+    </dgm:scene3d>
+    <dgm:sp3d/>
+    <dgm:txPr/>
+    <dgm:style>
+      <a:lnRef idx="0">
+        <a:scrgbClr r="0" g="0" b="0"/>
+      </a:lnRef>
+      <a:fillRef idx="0">
+        <a:scrgbClr r="0" g="0" b="0"/>
+      </a:fillRef>
+      <a:effectRef idx="0">
+        <a:scrgbClr r="0" g="0" b="0"/>
+      </a:effectRef>
+      <a:fontRef idx="minor"/>
+    </dgm:style>
+  </dgm:styleLbl>
+</dgm:styleDef>
+</file>
+
+<file path=ppt/diagrams/quickStyle3.xml><?xml version="1.0" encoding="utf-8"?>
 <dgm:styleDef xmlns:dgm="http://schemas.openxmlformats.org/drawingml/2006/diagram" xmlns:a="http://schemas.openxmlformats.org/drawingml/2006/main" uniqueId="urn:microsoft.com/office/officeart/2005/8/quickstyle/simple1">
   <dgm:title val=""/>
   <dgm:desc val=""/>
@@ -6862,7 +9525,7 @@
           <a:p>
             <a:fld id="{F6EDC76F-EB2F-4A40-9717-D29568F0D7D1}" type="datetimeFigureOut">
               <a:rPr lang="pt-BR" smtClean="0"/>
-              <a:t>22/10/2014</a:t>
+              <a:t>04/11/2014</a:t>
             </a:fld>
             <a:endParaRPr lang="pt-BR"/>
           </a:p>
@@ -7032,7 +9695,7 @@
           <a:p>
             <a:fld id="{F6EDC76F-EB2F-4A40-9717-D29568F0D7D1}" type="datetimeFigureOut">
               <a:rPr lang="pt-BR" smtClean="0"/>
-              <a:t>22/10/2014</a:t>
+              <a:t>04/11/2014</a:t>
             </a:fld>
             <a:endParaRPr lang="pt-BR"/>
           </a:p>
@@ -7212,7 +9875,7 @@
           <a:p>
             <a:fld id="{F6EDC76F-EB2F-4A40-9717-D29568F0D7D1}" type="datetimeFigureOut">
               <a:rPr lang="pt-BR" smtClean="0"/>
-              <a:t>22/10/2014</a:t>
+              <a:t>04/11/2014</a:t>
             </a:fld>
             <a:endParaRPr lang="pt-BR"/>
           </a:p>
@@ -7382,7 +10045,7 @@
           <a:p>
             <a:fld id="{F6EDC76F-EB2F-4A40-9717-D29568F0D7D1}" type="datetimeFigureOut">
               <a:rPr lang="pt-BR" smtClean="0"/>
-              <a:t>22/10/2014</a:t>
+              <a:t>04/11/2014</a:t>
             </a:fld>
             <a:endParaRPr lang="pt-BR"/>
           </a:p>
@@ -7628,7 +10291,7 @@
           <a:p>
             <a:fld id="{F6EDC76F-EB2F-4A40-9717-D29568F0D7D1}" type="datetimeFigureOut">
               <a:rPr lang="pt-BR" smtClean="0"/>
-              <a:t>22/10/2014</a:t>
+              <a:t>04/11/2014</a:t>
             </a:fld>
             <a:endParaRPr lang="pt-BR"/>
           </a:p>
@@ -7916,7 +10579,7 @@
           <a:p>
             <a:fld id="{F6EDC76F-EB2F-4A40-9717-D29568F0D7D1}" type="datetimeFigureOut">
               <a:rPr lang="pt-BR" smtClean="0"/>
-              <a:t>22/10/2014</a:t>
+              <a:t>04/11/2014</a:t>
             </a:fld>
             <a:endParaRPr lang="pt-BR"/>
           </a:p>
@@ -8338,7 +11001,7 @@
           <a:p>
             <a:fld id="{F6EDC76F-EB2F-4A40-9717-D29568F0D7D1}" type="datetimeFigureOut">
               <a:rPr lang="pt-BR" smtClean="0"/>
-              <a:t>22/10/2014</a:t>
+              <a:t>04/11/2014</a:t>
             </a:fld>
             <a:endParaRPr lang="pt-BR"/>
           </a:p>
@@ -8456,7 +11119,7 @@
           <a:p>
             <a:fld id="{F6EDC76F-EB2F-4A40-9717-D29568F0D7D1}" type="datetimeFigureOut">
               <a:rPr lang="pt-BR" smtClean="0"/>
-              <a:t>22/10/2014</a:t>
+              <a:t>04/11/2014</a:t>
             </a:fld>
             <a:endParaRPr lang="pt-BR"/>
           </a:p>
@@ -8551,7 +11214,7 @@
           <a:p>
             <a:fld id="{F6EDC76F-EB2F-4A40-9717-D29568F0D7D1}" type="datetimeFigureOut">
               <a:rPr lang="pt-BR" smtClean="0"/>
-              <a:t>22/10/2014</a:t>
+              <a:t>04/11/2014</a:t>
             </a:fld>
             <a:endParaRPr lang="pt-BR"/>
           </a:p>
@@ -8828,7 +11491,7 @@
           <a:p>
             <a:fld id="{F6EDC76F-EB2F-4A40-9717-D29568F0D7D1}" type="datetimeFigureOut">
               <a:rPr lang="pt-BR" smtClean="0"/>
-              <a:t>22/10/2014</a:t>
+              <a:t>04/11/2014</a:t>
             </a:fld>
             <a:endParaRPr lang="pt-BR"/>
           </a:p>
@@ -9081,7 +11744,7 @@
           <a:p>
             <a:fld id="{F6EDC76F-EB2F-4A40-9717-D29568F0D7D1}" type="datetimeFigureOut">
               <a:rPr lang="pt-BR" smtClean="0"/>
-              <a:t>22/10/2014</a:t>
+              <a:t>04/11/2014</a:t>
             </a:fld>
             <a:endParaRPr lang="pt-BR"/>
           </a:p>
@@ -9294,7 +11957,7 @@
           <a:p>
             <a:fld id="{F6EDC76F-EB2F-4A40-9717-D29568F0D7D1}" type="datetimeFigureOut">
               <a:rPr lang="pt-BR" smtClean="0"/>
-              <a:t>22/10/2014</a:t>
+              <a:t>04/11/2014</a:t>
             </a:fld>
             <a:endParaRPr lang="pt-BR"/>
           </a:p>
@@ -12539,6 +15202,1138 @@
       </p:grpSpPr>
       <p:grpSp>
         <p:nvGrpSpPr>
+          <p:cNvPr id="20" name="Grupo 19"/>
+          <p:cNvGrpSpPr/>
+          <p:nvPr/>
+        </p:nvGrpSpPr>
+        <p:grpSpPr>
+          <a:xfrm>
+            <a:off x="141412" y="1052736"/>
+            <a:ext cx="8856984" cy="4433649"/>
+            <a:chOff x="141412" y="1052736"/>
+            <a:chExt cx="8856984" cy="4433649"/>
+          </a:xfrm>
+        </p:grpSpPr>
+        <p:sp>
+          <p:nvSpPr>
+            <p:cNvPr id="5" name="Retângulo de cantos arredondados 4"/>
+            <p:cNvSpPr/>
+            <p:nvPr/>
+          </p:nvSpPr>
+          <p:spPr>
+            <a:xfrm>
+              <a:off x="2820567" y="3475635"/>
+              <a:ext cx="3194161" cy="2009230"/>
+            </a:xfrm>
+            <a:prstGeom prst="roundRect">
+              <a:avLst>
+                <a:gd name="adj" fmla="val 5424"/>
+              </a:avLst>
+            </a:prstGeom>
+            <a:solidFill>
+              <a:schemeClr val="accent1">
+                <a:lumMod val="75000"/>
+              </a:schemeClr>
+            </a:solidFill>
+          </p:spPr>
+          <p:style>
+            <a:lnRef idx="2">
+              <a:schemeClr val="accent1">
+                <a:shade val="50000"/>
+              </a:schemeClr>
+            </a:lnRef>
+            <a:fillRef idx="1">
+              <a:schemeClr val="accent1"/>
+            </a:fillRef>
+            <a:effectRef idx="0">
+              <a:schemeClr val="accent1"/>
+            </a:effectRef>
+            <a:fontRef idx="minor">
+              <a:schemeClr val="lt1"/>
+            </a:fontRef>
+          </p:style>
+          <p:txBody>
+            <a:bodyPr rtlCol="0" anchor="ctr"/>
+            <a:lstStyle/>
+            <a:p>
+              <a:pPr algn="ctr"/>
+              <a:endParaRPr lang="pt-BR" sz="1200" dirty="0"/>
+            </a:p>
+          </p:txBody>
+        </p:sp>
+        <p:graphicFrame>
+          <p:nvGraphicFramePr>
+            <p:cNvPr id="4" name="Diagrama 3"/>
+            <p:cNvGraphicFramePr/>
+            <p:nvPr>
+              <p:extLst>
+                <p:ext uri="{D42A27DB-BD31-4B8C-83A1-F6EECF244321}">
+                  <p14:modId xmlns:p14="http://schemas.microsoft.com/office/powerpoint/2010/main" val="614304109"/>
+                </p:ext>
+              </p:extLst>
+            </p:nvPr>
+          </p:nvGraphicFramePr>
+          <p:xfrm>
+            <a:off x="2961486" y="3603373"/>
+            <a:ext cx="2912323" cy="1750716"/>
+          </p:xfrm>
+          <a:graphic>
+            <a:graphicData uri="http://schemas.openxmlformats.org/drawingml/2006/diagram">
+              <dgm:relIds xmlns:dgm="http://schemas.openxmlformats.org/drawingml/2006/diagram" xmlns:r="http://schemas.openxmlformats.org/officeDocument/2006/relationships" r:dm="rId2" r:lo="rId3" r:qs="rId4" r:cs="rId5"/>
+            </a:graphicData>
+          </a:graphic>
+        </p:graphicFrame>
+        <p:sp>
+          <p:nvSpPr>
+            <p:cNvPr id="23" name="Seta para a direita 22"/>
+            <p:cNvSpPr/>
+            <p:nvPr/>
+          </p:nvSpPr>
+          <p:spPr>
+            <a:xfrm>
+              <a:off x="2408418" y="4304327"/>
+              <a:ext cx="360631" cy="348810"/>
+            </a:xfrm>
+            <a:prstGeom prst="rightArrow">
+              <a:avLst/>
+            </a:prstGeom>
+            <a:solidFill>
+              <a:schemeClr val="tx2">
+                <a:lumMod val="60000"/>
+                <a:lumOff val="40000"/>
+              </a:schemeClr>
+            </a:solidFill>
+            <a:ln w="12700">
+              <a:solidFill>
+                <a:schemeClr val="tx1"/>
+              </a:solidFill>
+            </a:ln>
+          </p:spPr>
+          <p:style>
+            <a:lnRef idx="2">
+              <a:schemeClr val="accent1">
+                <a:shade val="50000"/>
+              </a:schemeClr>
+            </a:lnRef>
+            <a:fillRef idx="1">
+              <a:schemeClr val="accent1"/>
+            </a:fillRef>
+            <a:effectRef idx="0">
+              <a:schemeClr val="accent1"/>
+            </a:effectRef>
+            <a:fontRef idx="minor">
+              <a:schemeClr val="lt1"/>
+            </a:fontRef>
+          </p:style>
+          <p:txBody>
+            <a:bodyPr rtlCol="0" anchor="ctr"/>
+            <a:lstStyle/>
+            <a:p>
+              <a:pPr algn="ctr"/>
+              <a:endParaRPr lang="pt-BR" sz="1200"/>
+            </a:p>
+          </p:txBody>
+        </p:sp>
+        <p:sp>
+          <p:nvSpPr>
+            <p:cNvPr id="25" name="Retângulo de cantos arredondados 24"/>
+            <p:cNvSpPr/>
+            <p:nvPr/>
+          </p:nvSpPr>
+          <p:spPr>
+            <a:xfrm>
+              <a:off x="2820567" y="1052736"/>
+              <a:ext cx="3194161" cy="515187"/>
+            </a:xfrm>
+            <a:prstGeom prst="roundRect">
+              <a:avLst/>
+            </a:prstGeom>
+            <a:solidFill>
+              <a:schemeClr val="tx2">
+                <a:lumMod val="20000"/>
+                <a:lumOff val="80000"/>
+              </a:schemeClr>
+            </a:solidFill>
+            <a:ln>
+              <a:prstDash val="lgDash"/>
+            </a:ln>
+          </p:spPr>
+          <p:style>
+            <a:lnRef idx="2">
+              <a:schemeClr val="accent1">
+                <a:shade val="50000"/>
+              </a:schemeClr>
+            </a:lnRef>
+            <a:fillRef idx="1">
+              <a:schemeClr val="accent1"/>
+            </a:fillRef>
+            <a:effectRef idx="0">
+              <a:schemeClr val="accent1"/>
+            </a:effectRef>
+            <a:fontRef idx="minor">
+              <a:schemeClr val="lt1"/>
+            </a:fontRef>
+          </p:style>
+          <p:txBody>
+            <a:bodyPr rtlCol="0" anchor="ctr"/>
+            <a:lstStyle/>
+            <a:p>
+              <a:pPr algn="ctr"/>
+              <a:r>
+                <a:rPr lang="pt-BR" sz="1600" dirty="0" smtClean="0">
+                  <a:solidFill>
+                    <a:schemeClr val="tx2"/>
+                  </a:solidFill>
+                </a:rPr>
+                <a:t>Execução Automatizada de Testes</a:t>
+              </a:r>
+              <a:endParaRPr lang="pt-BR" sz="1600" dirty="0">
+                <a:solidFill>
+                  <a:schemeClr val="tx2"/>
+                </a:solidFill>
+              </a:endParaRPr>
+            </a:p>
+          </p:txBody>
+        </p:sp>
+        <p:sp>
+          <p:nvSpPr>
+            <p:cNvPr id="26" name="Seta para a direita 25"/>
+            <p:cNvSpPr/>
+            <p:nvPr/>
+          </p:nvSpPr>
+          <p:spPr>
+            <a:xfrm rot="16200000">
+              <a:off x="2026567" y="2387376"/>
+              <a:ext cx="1814363" cy="256078"/>
+            </a:xfrm>
+            <a:prstGeom prst="rightArrow">
+              <a:avLst/>
+            </a:prstGeom>
+            <a:solidFill>
+              <a:schemeClr val="tx2">
+                <a:lumMod val="60000"/>
+                <a:lumOff val="40000"/>
+              </a:schemeClr>
+            </a:solidFill>
+            <a:ln w="12700">
+              <a:solidFill>
+                <a:schemeClr val="tx1"/>
+              </a:solidFill>
+            </a:ln>
+          </p:spPr>
+          <p:style>
+            <a:lnRef idx="2">
+              <a:schemeClr val="accent1">
+                <a:shade val="50000"/>
+              </a:schemeClr>
+            </a:lnRef>
+            <a:fillRef idx="1">
+              <a:schemeClr val="accent1"/>
+            </a:fillRef>
+            <a:effectRef idx="0">
+              <a:schemeClr val="accent1"/>
+            </a:effectRef>
+            <a:fontRef idx="minor">
+              <a:schemeClr val="lt1"/>
+            </a:fontRef>
+          </p:style>
+          <p:txBody>
+            <a:bodyPr rtlCol="0" anchor="ctr"/>
+            <a:lstStyle/>
+            <a:p>
+              <a:pPr algn="ctr"/>
+              <a:endParaRPr lang="pt-BR" sz="1200"/>
+            </a:p>
+          </p:txBody>
+        </p:sp>
+        <p:sp>
+          <p:nvSpPr>
+            <p:cNvPr id="27" name="Seta para baixo 26"/>
+            <p:cNvSpPr/>
+            <p:nvPr/>
+          </p:nvSpPr>
+          <p:spPr>
+            <a:xfrm>
+              <a:off x="4278704" y="1636852"/>
+              <a:ext cx="543230" cy="423358"/>
+            </a:xfrm>
+            <a:prstGeom prst="downArrow">
+              <a:avLst/>
+            </a:prstGeom>
+            <a:solidFill>
+              <a:srgbClr val="FFC000"/>
+            </a:solidFill>
+          </p:spPr>
+          <p:style>
+            <a:lnRef idx="2">
+              <a:schemeClr val="accent1">
+                <a:shade val="50000"/>
+              </a:schemeClr>
+            </a:lnRef>
+            <a:fillRef idx="1">
+              <a:schemeClr val="accent1"/>
+            </a:fillRef>
+            <a:effectRef idx="0">
+              <a:schemeClr val="accent1"/>
+            </a:effectRef>
+            <a:fontRef idx="minor">
+              <a:schemeClr val="lt1"/>
+            </a:fontRef>
+          </p:style>
+          <p:txBody>
+            <a:bodyPr rtlCol="0" anchor="ctr"/>
+            <a:lstStyle/>
+            <a:p>
+              <a:pPr algn="ctr"/>
+              <a:endParaRPr lang="pt-BR" sz="1200"/>
+            </a:p>
+          </p:txBody>
+        </p:sp>
+        <p:grpSp>
+          <p:nvGrpSpPr>
+            <p:cNvPr id="14" name="Grupo 13"/>
+            <p:cNvGrpSpPr/>
+            <p:nvPr/>
+          </p:nvGrpSpPr>
+          <p:grpSpPr>
+            <a:xfrm>
+              <a:off x="3085911" y="2109804"/>
+              <a:ext cx="2928817" cy="824299"/>
+              <a:chOff x="3085911" y="2109804"/>
+              <a:chExt cx="2928817" cy="824299"/>
+            </a:xfrm>
+          </p:grpSpPr>
+          <p:sp>
+            <p:nvSpPr>
+              <p:cNvPr id="65" name="Retângulo de cantos arredondados 64"/>
+              <p:cNvSpPr/>
+              <p:nvPr/>
+            </p:nvSpPr>
+            <p:spPr>
+              <a:xfrm rot="5400000">
+                <a:off x="4138170" y="1057545"/>
+                <a:ext cx="824299" cy="2928817"/>
+              </a:xfrm>
+              <a:prstGeom prst="roundRect">
+                <a:avLst>
+                  <a:gd name="adj" fmla="val 10075"/>
+                </a:avLst>
+              </a:prstGeom>
+              <a:solidFill>
+                <a:schemeClr val="accent6">
+                  <a:lumMod val="75000"/>
+                </a:schemeClr>
+              </a:solidFill>
+              <a:ln>
+                <a:solidFill>
+                  <a:schemeClr val="accent6">
+                    <a:lumMod val="60000"/>
+                    <a:lumOff val="40000"/>
+                  </a:schemeClr>
+                </a:solidFill>
+              </a:ln>
+            </p:spPr>
+            <p:style>
+              <a:lnRef idx="2">
+                <a:schemeClr val="accent1">
+                  <a:shade val="50000"/>
+                </a:schemeClr>
+              </a:lnRef>
+              <a:fillRef idx="1">
+                <a:schemeClr val="accent1"/>
+              </a:fillRef>
+              <a:effectRef idx="0">
+                <a:schemeClr val="accent1"/>
+              </a:effectRef>
+              <a:fontRef idx="minor">
+                <a:schemeClr val="lt1"/>
+              </a:fontRef>
+            </p:style>
+            <p:txBody>
+              <a:bodyPr vert="vert270" rtlCol="0" anchor="ctr"/>
+              <a:lstStyle/>
+              <a:p>
+                <a:pPr algn="ctr"/>
+                <a:endParaRPr lang="pt-BR" sz="1200" dirty="0"/>
+              </a:p>
+            </p:txBody>
+          </p:sp>
+          <p:sp>
+            <p:nvSpPr>
+              <p:cNvPr id="66" name="Retângulo de cantos arredondados 65"/>
+              <p:cNvSpPr/>
+              <p:nvPr/>
+            </p:nvSpPr>
+            <p:spPr>
+              <a:xfrm>
+                <a:off x="3128537" y="2175969"/>
+                <a:ext cx="2822247" cy="430334"/>
+              </a:xfrm>
+              <a:prstGeom prst="roundRect">
+                <a:avLst/>
+              </a:prstGeom>
+              <a:solidFill>
+                <a:schemeClr val="accent2">
+                  <a:lumMod val="75000"/>
+                </a:schemeClr>
+              </a:solidFill>
+              <a:ln>
+                <a:noFill/>
+              </a:ln>
+            </p:spPr>
+            <p:style>
+              <a:lnRef idx="2">
+                <a:schemeClr val="accent1">
+                  <a:shade val="50000"/>
+                </a:schemeClr>
+              </a:lnRef>
+              <a:fillRef idx="1">
+                <a:schemeClr val="accent1"/>
+              </a:fillRef>
+              <a:effectRef idx="0">
+                <a:schemeClr val="accent1"/>
+              </a:effectRef>
+              <a:fontRef idx="minor">
+                <a:schemeClr val="lt1"/>
+              </a:fontRef>
+            </p:style>
+            <p:txBody>
+              <a:bodyPr rtlCol="0" anchor="ctr"/>
+              <a:lstStyle/>
+              <a:p>
+                <a:pPr algn="ctr"/>
+                <a:r>
+                  <a:rPr lang="pt-BR" sz="1400" dirty="0" smtClean="0"/>
+                  <a:t>Valor obtido para a Métrica de Desempenho especificada</a:t>
+                </a:r>
+                <a:endParaRPr lang="pt-BR" sz="1400" dirty="0"/>
+              </a:p>
+            </p:txBody>
+          </p:sp>
+          <p:sp>
+            <p:nvSpPr>
+              <p:cNvPr id="69" name="Retângulo de cantos arredondados 68"/>
+              <p:cNvSpPr/>
+              <p:nvPr/>
+            </p:nvSpPr>
+            <p:spPr>
+              <a:xfrm rot="5400000">
+                <a:off x="4390507" y="1373827"/>
+                <a:ext cx="309111" cy="2811442"/>
+              </a:xfrm>
+              <a:prstGeom prst="roundRect">
+                <a:avLst/>
+              </a:prstGeom>
+              <a:solidFill>
+                <a:schemeClr val="accent6">
+                  <a:lumMod val="75000"/>
+                </a:schemeClr>
+              </a:solidFill>
+              <a:ln>
+                <a:noFill/>
+              </a:ln>
+            </p:spPr>
+            <p:style>
+              <a:lnRef idx="2">
+                <a:schemeClr val="accent1">
+                  <a:shade val="50000"/>
+                </a:schemeClr>
+              </a:lnRef>
+              <a:fillRef idx="1">
+                <a:schemeClr val="accent1"/>
+              </a:fillRef>
+              <a:effectRef idx="0">
+                <a:schemeClr val="accent1"/>
+              </a:effectRef>
+              <a:fontRef idx="minor">
+                <a:schemeClr val="lt1"/>
+              </a:fontRef>
+            </p:style>
+            <p:txBody>
+              <a:bodyPr vert="vert270" rtlCol="0" anchor="ctr"/>
+              <a:lstStyle/>
+              <a:p>
+                <a:pPr algn="ctr"/>
+                <a:r>
+                  <a:rPr lang="pt-BR" dirty="0" smtClean="0"/>
+                  <a:t>Dados de Execução</a:t>
+                </a:r>
+                <a:endParaRPr lang="pt-BR" dirty="0"/>
+              </a:p>
+            </p:txBody>
+          </p:sp>
+        </p:grpSp>
+        <p:sp>
+          <p:nvSpPr>
+            <p:cNvPr id="71" name="Seta para baixo 70"/>
+            <p:cNvSpPr/>
+            <p:nvPr/>
+          </p:nvSpPr>
+          <p:spPr>
+            <a:xfrm>
+              <a:off x="4281005" y="2983697"/>
+              <a:ext cx="543230" cy="423358"/>
+            </a:xfrm>
+            <a:prstGeom prst="downArrow">
+              <a:avLst/>
+            </a:prstGeom>
+            <a:solidFill>
+              <a:srgbClr val="FFC000"/>
+            </a:solidFill>
+          </p:spPr>
+          <p:style>
+            <a:lnRef idx="2">
+              <a:schemeClr val="accent1">
+                <a:shade val="50000"/>
+              </a:schemeClr>
+            </a:lnRef>
+            <a:fillRef idx="1">
+              <a:schemeClr val="accent1"/>
+            </a:fillRef>
+            <a:effectRef idx="0">
+              <a:schemeClr val="accent1"/>
+            </a:effectRef>
+            <a:fontRef idx="minor">
+              <a:schemeClr val="lt1"/>
+            </a:fontRef>
+          </p:style>
+          <p:txBody>
+            <a:bodyPr rtlCol="0" anchor="ctr"/>
+            <a:lstStyle/>
+            <a:p>
+              <a:pPr algn="ctr"/>
+              <a:endParaRPr lang="pt-BR" sz="1200"/>
+            </a:p>
+          </p:txBody>
+        </p:sp>
+        <p:grpSp>
+          <p:nvGrpSpPr>
+            <p:cNvPr id="6" name="Grupo 5"/>
+            <p:cNvGrpSpPr/>
+            <p:nvPr/>
+          </p:nvGrpSpPr>
+          <p:grpSpPr>
+            <a:xfrm>
+              <a:off x="6779719" y="3475635"/>
+              <a:ext cx="2218677" cy="2009230"/>
+              <a:chOff x="6745811" y="2829083"/>
+              <a:chExt cx="2218677" cy="2009230"/>
+            </a:xfrm>
+          </p:grpSpPr>
+          <p:sp>
+            <p:nvSpPr>
+              <p:cNvPr id="36" name="Retângulo de cantos arredondados 35"/>
+              <p:cNvSpPr/>
+              <p:nvPr/>
+            </p:nvSpPr>
+            <p:spPr>
+              <a:xfrm>
+                <a:off x="6745811" y="2829083"/>
+                <a:ext cx="2218677" cy="2009230"/>
+              </a:xfrm>
+              <a:prstGeom prst="roundRect">
+                <a:avLst>
+                  <a:gd name="adj" fmla="val 4399"/>
+                </a:avLst>
+              </a:prstGeom>
+              <a:solidFill>
+                <a:schemeClr val="accent6">
+                  <a:lumMod val="75000"/>
+                </a:schemeClr>
+              </a:solidFill>
+              <a:ln>
+                <a:solidFill>
+                  <a:schemeClr val="accent6">
+                    <a:lumMod val="60000"/>
+                    <a:lumOff val="40000"/>
+                  </a:schemeClr>
+                </a:solidFill>
+              </a:ln>
+            </p:spPr>
+            <p:style>
+              <a:lnRef idx="2">
+                <a:schemeClr val="accent1">
+                  <a:shade val="50000"/>
+                </a:schemeClr>
+              </a:lnRef>
+              <a:fillRef idx="1">
+                <a:schemeClr val="accent1"/>
+              </a:fillRef>
+              <a:effectRef idx="0">
+                <a:schemeClr val="accent1"/>
+              </a:effectRef>
+              <a:fontRef idx="minor">
+                <a:schemeClr val="lt1"/>
+              </a:fontRef>
+            </p:style>
+            <p:txBody>
+              <a:bodyPr vert="vert270" rtlCol="0" anchor="ctr"/>
+              <a:lstStyle/>
+              <a:p>
+                <a:pPr algn="ctr"/>
+                <a:endParaRPr lang="pt-BR" dirty="0"/>
+              </a:p>
+            </p:txBody>
+          </p:sp>
+          <p:sp>
+            <p:nvSpPr>
+              <p:cNvPr id="37" name="Retângulo de cantos arredondados 36"/>
+              <p:cNvSpPr/>
+              <p:nvPr/>
+            </p:nvSpPr>
+            <p:spPr>
+              <a:xfrm>
+                <a:off x="6790867" y="2978507"/>
+                <a:ext cx="301413" cy="1710383"/>
+              </a:xfrm>
+              <a:prstGeom prst="roundRect">
+                <a:avLst/>
+              </a:prstGeom>
+              <a:solidFill>
+                <a:schemeClr val="accent6">
+                  <a:lumMod val="75000"/>
+                </a:schemeClr>
+              </a:solidFill>
+              <a:ln>
+                <a:noFill/>
+              </a:ln>
+            </p:spPr>
+            <p:style>
+              <a:lnRef idx="2">
+                <a:schemeClr val="accent1">
+                  <a:shade val="50000"/>
+                </a:schemeClr>
+              </a:lnRef>
+              <a:fillRef idx="1">
+                <a:schemeClr val="accent1"/>
+              </a:fillRef>
+              <a:effectRef idx="0">
+                <a:schemeClr val="accent1"/>
+              </a:effectRef>
+              <a:fontRef idx="minor">
+                <a:schemeClr val="lt1"/>
+              </a:fontRef>
+            </p:style>
+            <p:txBody>
+              <a:bodyPr vert="vert270" rtlCol="0" anchor="ctr"/>
+              <a:lstStyle/>
+              <a:p>
+                <a:pPr algn="ctr"/>
+                <a:r>
+                  <a:rPr lang="pt-BR" sz="2000" dirty="0" smtClean="0"/>
+                  <a:t>Dados de Saída</a:t>
+                </a:r>
+                <a:endParaRPr lang="pt-BR" sz="2000" dirty="0"/>
+              </a:p>
+            </p:txBody>
+          </p:sp>
+          <p:sp>
+            <p:nvSpPr>
+              <p:cNvPr id="39" name="Retângulo de cantos arredondados 38"/>
+              <p:cNvSpPr/>
+              <p:nvPr/>
+            </p:nvSpPr>
+            <p:spPr>
+              <a:xfrm>
+                <a:off x="7122423" y="2926464"/>
+                <a:ext cx="1770057" cy="1800200"/>
+              </a:xfrm>
+              <a:prstGeom prst="roundRect">
+                <a:avLst/>
+              </a:prstGeom>
+              <a:solidFill>
+                <a:schemeClr val="accent2">
+                  <a:lumMod val="75000"/>
+                </a:schemeClr>
+              </a:solidFill>
+              <a:ln>
+                <a:noFill/>
+              </a:ln>
+            </p:spPr>
+            <p:style>
+              <a:lnRef idx="2">
+                <a:schemeClr val="accent1">
+                  <a:shade val="50000"/>
+                </a:schemeClr>
+              </a:lnRef>
+              <a:fillRef idx="1">
+                <a:schemeClr val="accent1"/>
+              </a:fillRef>
+              <a:effectRef idx="0">
+                <a:schemeClr val="accent1"/>
+              </a:effectRef>
+              <a:fontRef idx="minor">
+                <a:schemeClr val="lt1"/>
+              </a:fontRef>
+            </p:style>
+            <p:txBody>
+              <a:bodyPr rtlCol="0" anchor="ctr"/>
+              <a:lstStyle/>
+              <a:p>
+                <a:pPr algn="ctr"/>
+                <a:r>
+                  <a:rPr lang="pt-BR" dirty="0" smtClean="0"/>
+                  <a:t>Lista de Configurações Capazes de Executar a Aplicação</a:t>
+                </a:r>
+                <a:endParaRPr lang="pt-BR" dirty="0"/>
+              </a:p>
+            </p:txBody>
+          </p:sp>
+        </p:grpSp>
+        <p:sp>
+          <p:nvSpPr>
+            <p:cNvPr id="3" name="Seta para a direita 2"/>
+            <p:cNvSpPr/>
+            <p:nvPr/>
+          </p:nvSpPr>
+          <p:spPr>
+            <a:xfrm>
+              <a:off x="6071468" y="4040565"/>
+              <a:ext cx="661643" cy="879370"/>
+            </a:xfrm>
+            <a:prstGeom prst="rightArrow">
+              <a:avLst/>
+            </a:prstGeom>
+            <a:solidFill>
+              <a:srgbClr val="92D050"/>
+            </a:solidFill>
+            <a:ln>
+              <a:solidFill>
+                <a:schemeClr val="accent3">
+                  <a:lumMod val="50000"/>
+                </a:schemeClr>
+              </a:solidFill>
+            </a:ln>
+          </p:spPr>
+          <p:style>
+            <a:lnRef idx="2">
+              <a:schemeClr val="accent1">
+                <a:shade val="50000"/>
+              </a:schemeClr>
+            </a:lnRef>
+            <a:fillRef idx="1">
+              <a:schemeClr val="accent1"/>
+            </a:fillRef>
+            <a:effectRef idx="0">
+              <a:schemeClr val="accent1"/>
+            </a:effectRef>
+            <a:fontRef idx="minor">
+              <a:schemeClr val="lt1"/>
+            </a:fontRef>
+          </p:style>
+          <p:txBody>
+            <a:bodyPr rtlCol="0" anchor="ctr"/>
+            <a:lstStyle/>
+            <a:p>
+              <a:pPr algn="ctr"/>
+              <a:endParaRPr lang="pt-BR"/>
+            </a:p>
+          </p:txBody>
+        </p:sp>
+        <p:grpSp>
+          <p:nvGrpSpPr>
+            <p:cNvPr id="19" name="Grupo 18"/>
+            <p:cNvGrpSpPr/>
+            <p:nvPr/>
+          </p:nvGrpSpPr>
+          <p:grpSpPr>
+            <a:xfrm>
+              <a:off x="141412" y="3477155"/>
+              <a:ext cx="2218677" cy="2009230"/>
+              <a:chOff x="141412" y="3477155"/>
+              <a:chExt cx="2218677" cy="2009230"/>
+            </a:xfrm>
+          </p:grpSpPr>
+          <p:grpSp>
+            <p:nvGrpSpPr>
+              <p:cNvPr id="15" name="Grupo 14"/>
+              <p:cNvGrpSpPr/>
+              <p:nvPr/>
+            </p:nvGrpSpPr>
+            <p:grpSpPr>
+              <a:xfrm>
+                <a:off x="141412" y="3477155"/>
+                <a:ext cx="2218677" cy="2009230"/>
+                <a:chOff x="141412" y="3477155"/>
+                <a:chExt cx="2218677" cy="2009230"/>
+              </a:xfrm>
+            </p:grpSpPr>
+            <p:sp>
+              <p:nvSpPr>
+                <p:cNvPr id="76" name="Retângulo de cantos arredondados 75"/>
+                <p:cNvSpPr/>
+                <p:nvPr/>
+              </p:nvSpPr>
+              <p:spPr>
+                <a:xfrm>
+                  <a:off x="141412" y="3477155"/>
+                  <a:ext cx="2218677" cy="2009230"/>
+                </a:xfrm>
+                <a:prstGeom prst="roundRect">
+                  <a:avLst>
+                    <a:gd name="adj" fmla="val 4399"/>
+                  </a:avLst>
+                </a:prstGeom>
+                <a:solidFill>
+                  <a:schemeClr val="accent6">
+                    <a:lumMod val="75000"/>
+                  </a:schemeClr>
+                </a:solidFill>
+                <a:ln>
+                  <a:solidFill>
+                    <a:schemeClr val="accent6">
+                      <a:lumMod val="60000"/>
+                      <a:lumOff val="40000"/>
+                    </a:schemeClr>
+                  </a:solidFill>
+                </a:ln>
+              </p:spPr>
+              <p:style>
+                <a:lnRef idx="2">
+                  <a:schemeClr val="accent1">
+                    <a:shade val="50000"/>
+                  </a:schemeClr>
+                </a:lnRef>
+                <a:fillRef idx="1">
+                  <a:schemeClr val="accent1"/>
+                </a:fillRef>
+                <a:effectRef idx="0">
+                  <a:schemeClr val="accent1"/>
+                </a:effectRef>
+                <a:fontRef idx="minor">
+                  <a:schemeClr val="lt1"/>
+                </a:fontRef>
+              </p:style>
+              <p:txBody>
+                <a:bodyPr vert="vert270" rtlCol="0" anchor="ctr"/>
+                <a:lstStyle/>
+                <a:p>
+                  <a:pPr algn="ctr"/>
+                  <a:endParaRPr lang="pt-BR" dirty="0"/>
+                </a:p>
+              </p:txBody>
+            </p:sp>
+            <p:sp>
+              <p:nvSpPr>
+                <p:cNvPr id="8" name="Retângulo de cantos arredondados 7"/>
+                <p:cNvSpPr/>
+                <p:nvPr/>
+              </p:nvSpPr>
+              <p:spPr>
+                <a:xfrm>
+                  <a:off x="2061327" y="3573016"/>
+                  <a:ext cx="271270" cy="1800200"/>
+                </a:xfrm>
+                <a:prstGeom prst="roundRect">
+                  <a:avLst/>
+                </a:prstGeom>
+                <a:solidFill>
+                  <a:schemeClr val="accent6">
+                    <a:lumMod val="75000"/>
+                  </a:schemeClr>
+                </a:solidFill>
+                <a:ln>
+                  <a:noFill/>
+                </a:ln>
+              </p:spPr>
+              <p:style>
+                <a:lnRef idx="2">
+                  <a:schemeClr val="accent1">
+                    <a:shade val="50000"/>
+                  </a:schemeClr>
+                </a:lnRef>
+                <a:fillRef idx="1">
+                  <a:schemeClr val="accent1"/>
+                </a:fillRef>
+                <a:effectRef idx="0">
+                  <a:schemeClr val="accent1"/>
+                </a:effectRef>
+                <a:fontRef idx="minor">
+                  <a:schemeClr val="lt1"/>
+                </a:fontRef>
+              </p:style>
+              <p:txBody>
+                <a:bodyPr vert="vert270" rtlCol="0" anchor="ctr"/>
+                <a:lstStyle/>
+                <a:p>
+                  <a:pPr algn="ctr"/>
+                  <a:r>
+                    <a:rPr lang="pt-BR" dirty="0" smtClean="0"/>
+                    <a:t>Dados de Entrada</a:t>
+                  </a:r>
+                  <a:endParaRPr lang="pt-BR" dirty="0"/>
+                </a:p>
+              </p:txBody>
+            </p:sp>
+          </p:grpSp>
+          <p:grpSp>
+            <p:nvGrpSpPr>
+              <p:cNvPr id="18" name="Grupo 17"/>
+              <p:cNvGrpSpPr/>
+              <p:nvPr/>
+            </p:nvGrpSpPr>
+            <p:grpSpPr>
+              <a:xfrm>
+                <a:off x="234198" y="3573016"/>
+                <a:ext cx="1778477" cy="1853662"/>
+                <a:chOff x="234198" y="3573016"/>
+                <a:chExt cx="1778477" cy="1853662"/>
+              </a:xfrm>
+            </p:grpSpPr>
+            <p:sp>
+              <p:nvSpPr>
+                <p:cNvPr id="45" name="Retângulo de cantos arredondados 44"/>
+                <p:cNvSpPr/>
+                <p:nvPr/>
+              </p:nvSpPr>
+              <p:spPr>
+                <a:xfrm>
+                  <a:off x="243531" y="4499153"/>
+                  <a:ext cx="1761155" cy="373861"/>
+                </a:xfrm>
+                <a:prstGeom prst="roundRect">
+                  <a:avLst/>
+                </a:prstGeom>
+                <a:solidFill>
+                  <a:schemeClr val="accent2">
+                    <a:lumMod val="75000"/>
+                  </a:schemeClr>
+                </a:solidFill>
+                <a:ln>
+                  <a:noFill/>
+                </a:ln>
+              </p:spPr>
+              <p:style>
+                <a:lnRef idx="2">
+                  <a:schemeClr val="accent1">
+                    <a:shade val="50000"/>
+                  </a:schemeClr>
+                </a:lnRef>
+                <a:fillRef idx="1">
+                  <a:schemeClr val="accent1"/>
+                </a:fillRef>
+                <a:effectRef idx="0">
+                  <a:schemeClr val="accent1"/>
+                </a:effectRef>
+                <a:fontRef idx="minor">
+                  <a:schemeClr val="lt1"/>
+                </a:fontRef>
+              </p:style>
+              <p:txBody>
+                <a:bodyPr rtlCol="0" anchor="ctr"/>
+                <a:lstStyle/>
+                <a:p>
+                  <a:pPr algn="ctr"/>
+                  <a:r>
+                    <a:rPr lang="pt-BR" sz="1400" dirty="0" smtClean="0"/>
+                    <a:t>Tipos de VM</a:t>
+                  </a:r>
+                  <a:endParaRPr lang="pt-BR" sz="1400" dirty="0"/>
+                </a:p>
+              </p:txBody>
+            </p:sp>
+            <p:sp>
+              <p:nvSpPr>
+                <p:cNvPr id="46" name="Retângulo de cantos arredondados 45"/>
+                <p:cNvSpPr/>
+                <p:nvPr/>
+              </p:nvSpPr>
+              <p:spPr>
+                <a:xfrm>
+                  <a:off x="234198" y="4063251"/>
+                  <a:ext cx="1770057" cy="373861"/>
+                </a:xfrm>
+                <a:prstGeom prst="roundRect">
+                  <a:avLst/>
+                </a:prstGeom>
+                <a:solidFill>
+                  <a:schemeClr val="accent2">
+                    <a:lumMod val="75000"/>
+                  </a:schemeClr>
+                </a:solidFill>
+                <a:ln>
+                  <a:noFill/>
+                </a:ln>
+              </p:spPr>
+              <p:style>
+                <a:lnRef idx="2">
+                  <a:schemeClr val="accent1">
+                    <a:shade val="50000"/>
+                  </a:schemeClr>
+                </a:lnRef>
+                <a:fillRef idx="1">
+                  <a:schemeClr val="accent1"/>
+                </a:fillRef>
+                <a:effectRef idx="0">
+                  <a:schemeClr val="accent1"/>
+                </a:effectRef>
+                <a:fontRef idx="minor">
+                  <a:schemeClr val="lt1"/>
+                </a:fontRef>
+              </p:style>
+              <p:txBody>
+                <a:bodyPr rtlCol="0" anchor="ctr"/>
+                <a:lstStyle/>
+                <a:p>
+                  <a:pPr algn="ctr"/>
+                  <a:r>
+                    <a:rPr lang="pt-BR" sz="1400" dirty="0" smtClean="0"/>
+                    <a:t>Cargas de </a:t>
+                  </a:r>
+                  <a:r>
+                    <a:rPr lang="pt-BR" sz="1400" dirty="0" smtClean="0"/>
+                    <a:t>Trabalho</a:t>
+                  </a:r>
+                  <a:endParaRPr lang="pt-BR" sz="1400" dirty="0"/>
+                </a:p>
+              </p:txBody>
+            </p:sp>
+            <p:sp>
+              <p:nvSpPr>
+                <p:cNvPr id="47" name="Retângulo de cantos arredondados 46"/>
+                <p:cNvSpPr/>
+                <p:nvPr/>
+              </p:nvSpPr>
+              <p:spPr>
+                <a:xfrm>
+                  <a:off x="234198" y="3573016"/>
+                  <a:ext cx="1770057" cy="418519"/>
+                </a:xfrm>
+                <a:prstGeom prst="roundRect">
+                  <a:avLst/>
+                </a:prstGeom>
+                <a:solidFill>
+                  <a:schemeClr val="accent2">
+                    <a:lumMod val="75000"/>
+                  </a:schemeClr>
+                </a:solidFill>
+                <a:ln>
+                  <a:noFill/>
+                </a:ln>
+              </p:spPr>
+              <p:style>
+                <a:lnRef idx="2">
+                  <a:schemeClr val="accent1">
+                    <a:shade val="50000"/>
+                  </a:schemeClr>
+                </a:lnRef>
+                <a:fillRef idx="1">
+                  <a:schemeClr val="accent1"/>
+                </a:fillRef>
+                <a:effectRef idx="0">
+                  <a:schemeClr val="accent1"/>
+                </a:effectRef>
+                <a:fontRef idx="minor">
+                  <a:schemeClr val="lt1"/>
+                </a:fontRef>
+              </p:style>
+              <p:txBody>
+                <a:bodyPr rtlCol="0" anchor="ctr"/>
+                <a:lstStyle/>
+                <a:p>
+                  <a:pPr algn="ctr"/>
+                  <a:r>
+                    <a:rPr lang="pt-BR" sz="1400" dirty="0" smtClean="0"/>
+                    <a:t>Valor de Referência (SLA)</a:t>
+                  </a:r>
+                  <a:endParaRPr lang="pt-BR" sz="1400" dirty="0"/>
+                </a:p>
+              </p:txBody>
+            </p:sp>
+            <p:sp>
+              <p:nvSpPr>
+                <p:cNvPr id="48" name="Retângulo de cantos arredondados 47"/>
+                <p:cNvSpPr/>
+                <p:nvPr/>
+              </p:nvSpPr>
+              <p:spPr>
+                <a:xfrm>
+                  <a:off x="251520" y="4941168"/>
+                  <a:ext cx="1761155" cy="485510"/>
+                </a:xfrm>
+                <a:prstGeom prst="roundRect">
+                  <a:avLst/>
+                </a:prstGeom>
+                <a:solidFill>
+                  <a:schemeClr val="accent2">
+                    <a:lumMod val="75000"/>
+                  </a:schemeClr>
+                </a:solidFill>
+                <a:ln>
+                  <a:noFill/>
+                </a:ln>
+              </p:spPr>
+              <p:style>
+                <a:lnRef idx="2">
+                  <a:schemeClr val="accent1">
+                    <a:shade val="50000"/>
+                  </a:schemeClr>
+                </a:lnRef>
+                <a:fillRef idx="1">
+                  <a:schemeClr val="accent1"/>
+                </a:fillRef>
+                <a:effectRef idx="0">
+                  <a:schemeClr val="accent1"/>
+                </a:effectRef>
+                <a:fontRef idx="minor">
+                  <a:schemeClr val="lt1"/>
+                </a:fontRef>
+              </p:style>
+              <p:txBody>
+                <a:bodyPr rtlCol="0" anchor="ctr"/>
+                <a:lstStyle/>
+                <a:p>
+                  <a:pPr algn="ctr"/>
+                  <a:r>
+                    <a:rPr lang="pt-BR" sz="1400" dirty="0" smtClean="0"/>
+                    <a:t>Número Máximo de Instâncias</a:t>
+                  </a:r>
+                  <a:endParaRPr lang="pt-BR" sz="1400" dirty="0"/>
+                </a:p>
+              </p:txBody>
+            </p:sp>
+          </p:grpSp>
+        </p:grpSp>
+      </p:grpSp>
+    </p:spTree>
+    <p:extLst>
+      <p:ext uri="{BB962C8B-B14F-4D97-AF65-F5344CB8AC3E}">
+        <p14:creationId xmlns:p14="http://schemas.microsoft.com/office/powerpoint/2010/main" val="2207622324"/>
+      </p:ext>
+    </p:extLst>
+  </p:cSld>
+  <p:clrMapOvr>
+    <a:masterClrMapping/>
+  </p:clrMapOvr>
+  <p:timing>
+    <p:tnLst>
+      <p:par>
+        <p:cTn id="1" dur="indefinite" restart="never" nodeType="tmRoot"/>
+      </p:par>
+    </p:tnLst>
+  </p:timing>
+</p:sld>
+</file>
+
+<file path=ppt/slides/slide4.xml><?xml version="1.0" encoding="utf-8"?>
+<p:sld xmlns:a="http://schemas.openxmlformats.org/drawingml/2006/main" xmlns:r="http://schemas.openxmlformats.org/officeDocument/2006/relationships" xmlns:p="http://schemas.openxmlformats.org/presentationml/2006/main">
+  <p:cSld>
+    <p:spTree>
+      <p:nvGrpSpPr>
+        <p:cNvPr id="1" name=""/>
+        <p:cNvGrpSpPr/>
+        <p:nvPr/>
+      </p:nvGrpSpPr>
+      <p:grpSpPr>
+        <a:xfrm>
+          <a:off x="0" y="0"/>
+          <a:ext cx="0" cy="0"/>
+          <a:chOff x="0" y="0"/>
+          <a:chExt cx="0" cy="0"/>
+        </a:xfrm>
+      </p:grpSpPr>
+      <p:grpSp>
+        <p:nvGrpSpPr>
           <p:cNvPr id="82" name="Grupo 81"/>
           <p:cNvGrpSpPr/>
           <p:nvPr/>

</xml_diff>

<commit_message>
Fonte das ilustracoes do processo
</commit_message>
<xml_diff>
--- a/Ilustracoes Dissertacao.pptx
+++ b/Ilustracoes Dissertacao.pptx
@@ -3750,9 +3750,9 @@
     </dgm:pt>
   </dgm:ptLst>
   <dgm:cxnLst>
+    <dgm:cxn modelId="{54C7459B-5F3F-4C26-9535-249BAEFCD66D}" srcId="{4B7AFAA9-C2C4-4511-9A77-486BA7AE86A9}" destId="{E68BCF31-7D5B-4B36-8C51-76BFE4A67ECA}" srcOrd="0" destOrd="0" parTransId="{7C734590-2885-4B87-B303-596DD11CC32B}" sibTransId="{C45F70BB-C99B-4B24-AE07-CACAAE6D36B1}"/>
     <dgm:cxn modelId="{B5067E56-F961-4C25-8C1C-F88F4E77BBE7}" type="presOf" srcId="{E68BCF31-7D5B-4B36-8C51-76BFE4A67ECA}" destId="{9445868C-F4A0-4876-B5D7-03CBA1E73487}" srcOrd="0" destOrd="0" presId="urn:microsoft.com/office/officeart/2005/8/layout/hierarchy4"/>
     <dgm:cxn modelId="{85FCA5E4-33EA-45AE-8E23-BA96D7A92052}" type="presOf" srcId="{4B7AFAA9-C2C4-4511-9A77-486BA7AE86A9}" destId="{F2C5C55E-AAD5-46C7-B490-9EDB0EC9665F}" srcOrd="0" destOrd="0" presId="urn:microsoft.com/office/officeart/2005/8/layout/hierarchy4"/>
-    <dgm:cxn modelId="{54C7459B-5F3F-4C26-9535-249BAEFCD66D}" srcId="{4B7AFAA9-C2C4-4511-9A77-486BA7AE86A9}" destId="{E68BCF31-7D5B-4B36-8C51-76BFE4A67ECA}" srcOrd="0" destOrd="0" parTransId="{7C734590-2885-4B87-B303-596DD11CC32B}" sibTransId="{C45F70BB-C99B-4B24-AE07-CACAAE6D36B1}"/>
     <dgm:cxn modelId="{722B09FE-05C0-41C1-937C-C743314A7057}" type="presParOf" srcId="{F2C5C55E-AAD5-46C7-B490-9EDB0EC9665F}" destId="{05BAE430-0C74-4AEB-80BE-49230D249B63}" srcOrd="0" destOrd="0" presId="urn:microsoft.com/office/officeart/2005/8/layout/hierarchy4"/>
     <dgm:cxn modelId="{DD585EAD-9083-4FDA-A75B-AD0D158D43FB}" type="presParOf" srcId="{05BAE430-0C74-4AEB-80BE-49230D249B63}" destId="{9445868C-F4A0-4876-B5D7-03CBA1E73487}" srcOrd="0" destOrd="0" presId="urn:microsoft.com/office/officeart/2005/8/layout/hierarchy4"/>
     <dgm:cxn modelId="{E2A4DE37-4979-4A01-9987-8A1375588729}" type="presParOf" srcId="{05BAE430-0C74-4AEB-80BE-49230D249B63}" destId="{04BBFD12-F9A5-4E81-9B57-A1AAB292B04F}" srcOrd="1" destOrd="0" presId="urn:microsoft.com/office/officeart/2005/8/layout/hierarchy4"/>
@@ -4600,8 +4600,8 @@
       </dsp:nvSpPr>
       <dsp:spPr>
         <a:xfrm>
-          <a:off x="0" y="0"/>
-          <a:ext cx="2912323" cy="1750716"/>
+          <a:off x="1422" y="0"/>
+          <a:ext cx="2909478" cy="1049764"/>
         </a:xfrm>
         <a:prstGeom prst="roundRect">
           <a:avLst>
@@ -4668,8 +4668,8 @@
         </a:p>
       </dsp:txBody>
       <dsp:txXfrm>
-        <a:off x="51277" y="51277"/>
-        <a:ext cx="2809769" cy="1648162"/>
+        <a:off x="32169" y="30747"/>
+        <a:ext cx="2847984" cy="988270"/>
       </dsp:txXfrm>
     </dsp:sp>
   </dsp:spTree>
@@ -9525,7 +9525,7 @@
           <a:p>
             <a:fld id="{F6EDC76F-EB2F-4A40-9717-D29568F0D7D1}" type="datetimeFigureOut">
               <a:rPr lang="pt-BR" smtClean="0"/>
-              <a:t>04/11/2014</a:t>
+              <a:t>09/11/2014</a:t>
             </a:fld>
             <a:endParaRPr lang="pt-BR"/>
           </a:p>
@@ -9695,7 +9695,7 @@
           <a:p>
             <a:fld id="{F6EDC76F-EB2F-4A40-9717-D29568F0D7D1}" type="datetimeFigureOut">
               <a:rPr lang="pt-BR" smtClean="0"/>
-              <a:t>04/11/2014</a:t>
+              <a:t>09/11/2014</a:t>
             </a:fld>
             <a:endParaRPr lang="pt-BR"/>
           </a:p>
@@ -9875,7 +9875,7 @@
           <a:p>
             <a:fld id="{F6EDC76F-EB2F-4A40-9717-D29568F0D7D1}" type="datetimeFigureOut">
               <a:rPr lang="pt-BR" smtClean="0"/>
-              <a:t>04/11/2014</a:t>
+              <a:t>09/11/2014</a:t>
             </a:fld>
             <a:endParaRPr lang="pt-BR"/>
           </a:p>
@@ -10045,7 +10045,7 @@
           <a:p>
             <a:fld id="{F6EDC76F-EB2F-4A40-9717-D29568F0D7D1}" type="datetimeFigureOut">
               <a:rPr lang="pt-BR" smtClean="0"/>
-              <a:t>04/11/2014</a:t>
+              <a:t>09/11/2014</a:t>
             </a:fld>
             <a:endParaRPr lang="pt-BR"/>
           </a:p>
@@ -10291,7 +10291,7 @@
           <a:p>
             <a:fld id="{F6EDC76F-EB2F-4A40-9717-D29568F0D7D1}" type="datetimeFigureOut">
               <a:rPr lang="pt-BR" smtClean="0"/>
-              <a:t>04/11/2014</a:t>
+              <a:t>09/11/2014</a:t>
             </a:fld>
             <a:endParaRPr lang="pt-BR"/>
           </a:p>
@@ -10579,7 +10579,7 @@
           <a:p>
             <a:fld id="{F6EDC76F-EB2F-4A40-9717-D29568F0D7D1}" type="datetimeFigureOut">
               <a:rPr lang="pt-BR" smtClean="0"/>
-              <a:t>04/11/2014</a:t>
+              <a:t>09/11/2014</a:t>
             </a:fld>
             <a:endParaRPr lang="pt-BR"/>
           </a:p>
@@ -11001,7 +11001,7 @@
           <a:p>
             <a:fld id="{F6EDC76F-EB2F-4A40-9717-D29568F0D7D1}" type="datetimeFigureOut">
               <a:rPr lang="pt-BR" smtClean="0"/>
-              <a:t>04/11/2014</a:t>
+              <a:t>09/11/2014</a:t>
             </a:fld>
             <a:endParaRPr lang="pt-BR"/>
           </a:p>
@@ -11119,7 +11119,7 @@
           <a:p>
             <a:fld id="{F6EDC76F-EB2F-4A40-9717-D29568F0D7D1}" type="datetimeFigureOut">
               <a:rPr lang="pt-BR" smtClean="0"/>
-              <a:t>04/11/2014</a:t>
+              <a:t>09/11/2014</a:t>
             </a:fld>
             <a:endParaRPr lang="pt-BR"/>
           </a:p>
@@ -11214,7 +11214,7 @@
           <a:p>
             <a:fld id="{F6EDC76F-EB2F-4A40-9717-D29568F0D7D1}" type="datetimeFigureOut">
               <a:rPr lang="pt-BR" smtClean="0"/>
-              <a:t>04/11/2014</a:t>
+              <a:t>09/11/2014</a:t>
             </a:fld>
             <a:endParaRPr lang="pt-BR"/>
           </a:p>
@@ -11491,7 +11491,7 @@
           <a:p>
             <a:fld id="{F6EDC76F-EB2F-4A40-9717-D29568F0D7D1}" type="datetimeFigureOut">
               <a:rPr lang="pt-BR" smtClean="0"/>
-              <a:t>04/11/2014</a:t>
+              <a:t>09/11/2014</a:t>
             </a:fld>
             <a:endParaRPr lang="pt-BR"/>
           </a:p>
@@ -11744,7 +11744,7 @@
           <a:p>
             <a:fld id="{F6EDC76F-EB2F-4A40-9717-D29568F0D7D1}" type="datetimeFigureOut">
               <a:rPr lang="pt-BR" smtClean="0"/>
-              <a:t>04/11/2014</a:t>
+              <a:t>09/11/2014</a:t>
             </a:fld>
             <a:endParaRPr lang="pt-BR"/>
           </a:p>
@@ -11957,7 +11957,7 @@
           <a:p>
             <a:fld id="{F6EDC76F-EB2F-4A40-9717-D29568F0D7D1}" type="datetimeFigureOut">
               <a:rPr lang="pt-BR" smtClean="0"/>
-              <a:t>04/11/2014</a:t>
+              <a:t>09/11/2014</a:t>
             </a:fld>
             <a:endParaRPr lang="pt-BR"/>
           </a:p>
@@ -15202,7 +15202,7 @@
       </p:grpSpPr>
       <p:grpSp>
         <p:nvGrpSpPr>
-          <p:cNvPr id="20" name="Grupo 19"/>
+          <p:cNvPr id="7" name="Grupo 6"/>
           <p:cNvGrpSpPr/>
           <p:nvPr/>
         </p:nvGrpSpPr>
@@ -15214,322 +15214,112 @@
             <a:chExt cx="8856984" cy="4433649"/>
           </a:xfrm>
         </p:grpSpPr>
-        <p:sp>
-          <p:nvSpPr>
-            <p:cNvPr id="5" name="Retângulo de cantos arredondados 4"/>
-            <p:cNvSpPr/>
-            <p:nvPr/>
-          </p:nvSpPr>
-          <p:spPr>
-            <a:xfrm>
-              <a:off x="2820567" y="3475635"/>
-              <a:ext cx="3194161" cy="2009230"/>
-            </a:xfrm>
-            <a:prstGeom prst="roundRect">
-              <a:avLst>
-                <a:gd name="adj" fmla="val 5424"/>
-              </a:avLst>
-            </a:prstGeom>
-            <a:solidFill>
-              <a:schemeClr val="accent1">
-                <a:lumMod val="75000"/>
-              </a:schemeClr>
-            </a:solidFill>
-          </p:spPr>
-          <p:style>
-            <a:lnRef idx="2">
-              <a:schemeClr val="accent1">
-                <a:shade val="50000"/>
-              </a:schemeClr>
-            </a:lnRef>
-            <a:fillRef idx="1">
-              <a:schemeClr val="accent1"/>
-            </a:fillRef>
-            <a:effectRef idx="0">
-              <a:schemeClr val="accent1"/>
-            </a:effectRef>
-            <a:fontRef idx="minor">
-              <a:schemeClr val="lt1"/>
-            </a:fontRef>
-          </p:style>
-          <p:txBody>
-            <a:bodyPr rtlCol="0" anchor="ctr"/>
-            <a:lstStyle/>
-            <a:p>
-              <a:pPr algn="ctr"/>
-              <a:endParaRPr lang="pt-BR" sz="1200" dirty="0"/>
-            </a:p>
-          </p:txBody>
-        </p:sp>
-        <p:graphicFrame>
-          <p:nvGraphicFramePr>
-            <p:cNvPr id="4" name="Diagrama 3"/>
-            <p:cNvGraphicFramePr/>
-            <p:nvPr>
-              <p:extLst>
-                <p:ext uri="{D42A27DB-BD31-4B8C-83A1-F6EECF244321}">
-                  <p14:modId xmlns:p14="http://schemas.microsoft.com/office/powerpoint/2010/main" val="614304109"/>
-                </p:ext>
-              </p:extLst>
-            </p:nvPr>
-          </p:nvGraphicFramePr>
-          <p:xfrm>
-            <a:off x="2961486" y="3603373"/>
-            <a:ext cx="2912323" cy="1750716"/>
-          </p:xfrm>
-          <a:graphic>
-            <a:graphicData uri="http://schemas.openxmlformats.org/drawingml/2006/diagram">
-              <dgm:relIds xmlns:dgm="http://schemas.openxmlformats.org/drawingml/2006/diagram" xmlns:r="http://schemas.openxmlformats.org/officeDocument/2006/relationships" r:dm="rId2" r:lo="rId3" r:qs="rId4" r:cs="rId5"/>
-            </a:graphicData>
-          </a:graphic>
-        </p:graphicFrame>
-        <p:sp>
-          <p:nvSpPr>
-            <p:cNvPr id="23" name="Seta para a direita 22"/>
-            <p:cNvSpPr/>
-            <p:nvPr/>
-          </p:nvSpPr>
-          <p:spPr>
-            <a:xfrm>
-              <a:off x="2408418" y="4304327"/>
-              <a:ext cx="360631" cy="348810"/>
-            </a:xfrm>
-            <a:prstGeom prst="rightArrow">
-              <a:avLst/>
-            </a:prstGeom>
-            <a:solidFill>
-              <a:schemeClr val="tx2">
-                <a:lumMod val="60000"/>
-                <a:lumOff val="40000"/>
-              </a:schemeClr>
-            </a:solidFill>
-            <a:ln w="12700">
-              <a:solidFill>
-                <a:schemeClr val="tx1"/>
-              </a:solidFill>
-            </a:ln>
-          </p:spPr>
-          <p:style>
-            <a:lnRef idx="2">
-              <a:schemeClr val="accent1">
-                <a:shade val="50000"/>
-              </a:schemeClr>
-            </a:lnRef>
-            <a:fillRef idx="1">
-              <a:schemeClr val="accent1"/>
-            </a:fillRef>
-            <a:effectRef idx="0">
-              <a:schemeClr val="accent1"/>
-            </a:effectRef>
-            <a:fontRef idx="minor">
-              <a:schemeClr val="lt1"/>
-            </a:fontRef>
-          </p:style>
-          <p:txBody>
-            <a:bodyPr rtlCol="0" anchor="ctr"/>
-            <a:lstStyle/>
-            <a:p>
-              <a:pPr algn="ctr"/>
-              <a:endParaRPr lang="pt-BR" sz="1200"/>
-            </a:p>
-          </p:txBody>
-        </p:sp>
-        <p:sp>
-          <p:nvSpPr>
-            <p:cNvPr id="25" name="Retângulo de cantos arredondados 24"/>
-            <p:cNvSpPr/>
-            <p:nvPr/>
-          </p:nvSpPr>
-          <p:spPr>
-            <a:xfrm>
-              <a:off x="2820567" y="1052736"/>
-              <a:ext cx="3194161" cy="515187"/>
-            </a:xfrm>
-            <a:prstGeom prst="roundRect">
-              <a:avLst/>
-            </a:prstGeom>
-            <a:solidFill>
-              <a:schemeClr val="tx2">
-                <a:lumMod val="20000"/>
-                <a:lumOff val="80000"/>
-              </a:schemeClr>
-            </a:solidFill>
-            <a:ln>
-              <a:prstDash val="lgDash"/>
-            </a:ln>
-          </p:spPr>
-          <p:style>
-            <a:lnRef idx="2">
-              <a:schemeClr val="accent1">
-                <a:shade val="50000"/>
-              </a:schemeClr>
-            </a:lnRef>
-            <a:fillRef idx="1">
-              <a:schemeClr val="accent1"/>
-            </a:fillRef>
-            <a:effectRef idx="0">
-              <a:schemeClr val="accent1"/>
-            </a:effectRef>
-            <a:fontRef idx="minor">
-              <a:schemeClr val="lt1"/>
-            </a:fontRef>
-          </p:style>
-          <p:txBody>
-            <a:bodyPr rtlCol="0" anchor="ctr"/>
-            <a:lstStyle/>
-            <a:p>
-              <a:pPr algn="ctr"/>
-              <a:r>
-                <a:rPr lang="pt-BR" sz="1600" dirty="0" smtClean="0">
-                  <a:solidFill>
-                    <a:schemeClr val="tx2"/>
-                  </a:solidFill>
-                </a:rPr>
-                <a:t>Execução Automatizada de Testes</a:t>
-              </a:r>
-              <a:endParaRPr lang="pt-BR" sz="1600" dirty="0">
-                <a:solidFill>
-                  <a:schemeClr val="tx2"/>
-                </a:solidFill>
-              </a:endParaRPr>
-            </a:p>
-          </p:txBody>
-        </p:sp>
-        <p:sp>
-          <p:nvSpPr>
-            <p:cNvPr id="26" name="Seta para a direita 25"/>
-            <p:cNvSpPr/>
-            <p:nvPr/>
-          </p:nvSpPr>
-          <p:spPr>
-            <a:xfrm rot="16200000">
-              <a:off x="2026567" y="2387376"/>
-              <a:ext cx="1814363" cy="256078"/>
-            </a:xfrm>
-            <a:prstGeom prst="rightArrow">
-              <a:avLst/>
-            </a:prstGeom>
-            <a:solidFill>
-              <a:schemeClr val="tx2">
-                <a:lumMod val="60000"/>
-                <a:lumOff val="40000"/>
-              </a:schemeClr>
-            </a:solidFill>
-            <a:ln w="12700">
-              <a:solidFill>
-                <a:schemeClr val="tx1"/>
-              </a:solidFill>
-            </a:ln>
-          </p:spPr>
-          <p:style>
-            <a:lnRef idx="2">
-              <a:schemeClr val="accent1">
-                <a:shade val="50000"/>
-              </a:schemeClr>
-            </a:lnRef>
-            <a:fillRef idx="1">
-              <a:schemeClr val="accent1"/>
-            </a:fillRef>
-            <a:effectRef idx="0">
-              <a:schemeClr val="accent1"/>
-            </a:effectRef>
-            <a:fontRef idx="minor">
-              <a:schemeClr val="lt1"/>
-            </a:fontRef>
-          </p:style>
-          <p:txBody>
-            <a:bodyPr rtlCol="0" anchor="ctr"/>
-            <a:lstStyle/>
-            <a:p>
-              <a:pPr algn="ctr"/>
-              <a:endParaRPr lang="pt-BR" sz="1200"/>
-            </a:p>
-          </p:txBody>
-        </p:sp>
-        <p:sp>
-          <p:nvSpPr>
-            <p:cNvPr id="27" name="Seta para baixo 26"/>
-            <p:cNvSpPr/>
-            <p:nvPr/>
-          </p:nvSpPr>
-          <p:spPr>
-            <a:xfrm>
-              <a:off x="4278704" y="1636852"/>
-              <a:ext cx="543230" cy="423358"/>
-            </a:xfrm>
-            <a:prstGeom prst="downArrow">
-              <a:avLst/>
-            </a:prstGeom>
-            <a:solidFill>
-              <a:srgbClr val="FFC000"/>
-            </a:solidFill>
-          </p:spPr>
-          <p:style>
-            <a:lnRef idx="2">
-              <a:schemeClr val="accent1">
-                <a:shade val="50000"/>
-              </a:schemeClr>
-            </a:lnRef>
-            <a:fillRef idx="1">
-              <a:schemeClr val="accent1"/>
-            </a:fillRef>
-            <a:effectRef idx="0">
-              <a:schemeClr val="accent1"/>
-            </a:effectRef>
-            <a:fontRef idx="minor">
-              <a:schemeClr val="lt1"/>
-            </a:fontRef>
-          </p:style>
-          <p:txBody>
-            <a:bodyPr rtlCol="0" anchor="ctr"/>
-            <a:lstStyle/>
-            <a:p>
-              <a:pPr algn="ctr"/>
-              <a:endParaRPr lang="pt-BR" sz="1200"/>
-            </a:p>
-          </p:txBody>
-        </p:sp>
         <p:grpSp>
           <p:nvGrpSpPr>
-            <p:cNvPr id="14" name="Grupo 13"/>
+            <p:cNvPr id="2" name="Grupo 1"/>
             <p:cNvGrpSpPr/>
             <p:nvPr/>
           </p:nvGrpSpPr>
           <p:grpSpPr>
             <a:xfrm>
-              <a:off x="3085911" y="2109804"/>
-              <a:ext cx="2928817" cy="824299"/>
-              <a:chOff x="3085911" y="2109804"/>
-              <a:chExt cx="2928817" cy="824299"/>
+              <a:off x="141412" y="1052736"/>
+              <a:ext cx="8856984" cy="4433649"/>
+              <a:chOff x="141412" y="1052736"/>
+              <a:chExt cx="8856984" cy="4433649"/>
             </a:xfrm>
           </p:grpSpPr>
           <p:sp>
             <p:nvSpPr>
-              <p:cNvPr id="65" name="Retângulo de cantos arredondados 64"/>
+              <p:cNvPr id="5" name="Retângulo de cantos arredondados 4"/>
               <p:cNvSpPr/>
               <p:nvPr/>
             </p:nvSpPr>
             <p:spPr>
-              <a:xfrm rot="5400000">
-                <a:off x="4138170" y="1057545"/>
-                <a:ext cx="824299" cy="2928817"/>
+              <a:xfrm>
+                <a:off x="2820567" y="3475635"/>
+                <a:ext cx="3194161" cy="2009230"/>
               </a:xfrm>
               <a:prstGeom prst="roundRect">
                 <a:avLst>
-                  <a:gd name="adj" fmla="val 10075"/>
+                  <a:gd name="adj" fmla="val 5424"/>
                 </a:avLst>
               </a:prstGeom>
               <a:solidFill>
-                <a:schemeClr val="accent6">
+                <a:schemeClr val="accent1">
                   <a:lumMod val="75000"/>
                 </a:schemeClr>
               </a:solidFill>
-              <a:ln>
+            </p:spPr>
+            <p:style>
+              <a:lnRef idx="2">
+                <a:schemeClr val="accent1">
+                  <a:shade val="50000"/>
+                </a:schemeClr>
+              </a:lnRef>
+              <a:fillRef idx="1">
+                <a:schemeClr val="accent1"/>
+              </a:fillRef>
+              <a:effectRef idx="0">
+                <a:schemeClr val="accent1"/>
+              </a:effectRef>
+              <a:fontRef idx="minor">
+                <a:schemeClr val="lt1"/>
+              </a:fontRef>
+            </p:style>
+            <p:txBody>
+              <a:bodyPr rtlCol="0" anchor="ctr"/>
+              <a:lstStyle/>
+              <a:p>
+                <a:pPr algn="ctr"/>
+                <a:endParaRPr lang="pt-BR" sz="1200" dirty="0"/>
+              </a:p>
+            </p:txBody>
+          </p:sp>
+          <p:graphicFrame>
+            <p:nvGraphicFramePr>
+              <p:cNvPr id="4" name="Diagrama 3"/>
+              <p:cNvGraphicFramePr/>
+              <p:nvPr>
+                <p:extLst>
+                  <p:ext uri="{D42A27DB-BD31-4B8C-83A1-F6EECF244321}">
+                    <p14:modId xmlns:p14="http://schemas.microsoft.com/office/powerpoint/2010/main" val="4218196894"/>
+                  </p:ext>
+                </p:extLst>
+              </p:nvPr>
+            </p:nvGraphicFramePr>
+            <p:xfrm>
+              <a:off x="2961486" y="3603373"/>
+              <a:ext cx="2912323" cy="1049764"/>
+            </p:xfrm>
+            <a:graphic>
+              <a:graphicData uri="http://schemas.openxmlformats.org/drawingml/2006/diagram">
+                <dgm:relIds xmlns:dgm="http://schemas.openxmlformats.org/drawingml/2006/diagram" xmlns:r="http://schemas.openxmlformats.org/officeDocument/2006/relationships" r:dm="rId2" r:lo="rId3" r:qs="rId4" r:cs="rId5"/>
+              </a:graphicData>
+            </a:graphic>
+          </p:graphicFrame>
+          <p:sp>
+            <p:nvSpPr>
+              <p:cNvPr id="23" name="Seta para a direita 22"/>
+              <p:cNvSpPr/>
+              <p:nvPr/>
+            </p:nvSpPr>
+            <p:spPr>
+              <a:xfrm>
+                <a:off x="2408418" y="4304327"/>
+                <a:ext cx="360631" cy="348810"/>
+              </a:xfrm>
+              <a:prstGeom prst="rightArrow">
+                <a:avLst/>
+              </a:prstGeom>
+              <a:solidFill>
+                <a:schemeClr val="tx2">
+                  <a:lumMod val="60000"/>
+                  <a:lumOff val="40000"/>
+                </a:schemeClr>
+              </a:solidFill>
+              <a:ln w="12700">
                 <a:solidFill>
-                  <a:schemeClr val="accent6">
-                    <a:lumMod val="60000"/>
-                    <a:lumOff val="40000"/>
-                  </a:schemeClr>
+                  <a:schemeClr val="tx1"/>
                 </a:solidFill>
               </a:ln>
             </p:spPr>
@@ -15550,35 +15340,36 @@
               </a:fontRef>
             </p:style>
             <p:txBody>
-              <a:bodyPr vert="vert270" rtlCol="0" anchor="ctr"/>
+              <a:bodyPr rtlCol="0" anchor="ctr"/>
               <a:lstStyle/>
               <a:p>
                 <a:pPr algn="ctr"/>
-                <a:endParaRPr lang="pt-BR" sz="1200" dirty="0"/>
+                <a:endParaRPr lang="pt-BR" sz="1200"/>
               </a:p>
             </p:txBody>
           </p:sp>
           <p:sp>
             <p:nvSpPr>
-              <p:cNvPr id="66" name="Retângulo de cantos arredondados 65"/>
+              <p:cNvPr id="25" name="Retângulo de cantos arredondados 24"/>
               <p:cNvSpPr/>
               <p:nvPr/>
             </p:nvSpPr>
             <p:spPr>
               <a:xfrm>
-                <a:off x="3128537" y="2175969"/>
-                <a:ext cx="2822247" cy="430334"/>
+                <a:off x="2820567" y="1052736"/>
+                <a:ext cx="3194161" cy="515187"/>
               </a:xfrm>
               <a:prstGeom prst="roundRect">
                 <a:avLst/>
               </a:prstGeom>
               <a:solidFill>
-                <a:schemeClr val="accent2">
-                  <a:lumMod val="75000"/>
+                <a:schemeClr val="tx2">
+                  <a:lumMod val="20000"/>
+                  <a:lumOff val="80000"/>
                 </a:schemeClr>
               </a:solidFill>
               <a:ln>
-                <a:noFill/>
+                <a:prstDash val="lgDash"/>
               </a:ln>
             </p:spPr>
             <p:style>
@@ -15603,251 +15394,45 @@
               <a:p>
                 <a:pPr algn="ctr"/>
                 <a:r>
-                  <a:rPr lang="pt-BR" sz="1400" dirty="0" smtClean="0"/>
-                  <a:t>Valor obtido para a Métrica de Desempenho especificada</a:t>
+                  <a:rPr lang="pt-BR" sz="1600" dirty="0" smtClean="0">
+                    <a:solidFill>
+                      <a:schemeClr val="tx2"/>
+                    </a:solidFill>
+                  </a:rPr>
+                  <a:t>Execução Automatizada de Testes</a:t>
                 </a:r>
-                <a:endParaRPr lang="pt-BR" sz="1400" dirty="0"/>
+                <a:endParaRPr lang="pt-BR" sz="1600" dirty="0">
+                  <a:solidFill>
+                    <a:schemeClr val="tx2"/>
+                  </a:solidFill>
+                </a:endParaRPr>
               </a:p>
             </p:txBody>
           </p:sp>
           <p:sp>
             <p:nvSpPr>
-              <p:cNvPr id="69" name="Retângulo de cantos arredondados 68"/>
+              <p:cNvPr id="26" name="Seta para a direita 25"/>
               <p:cNvSpPr/>
               <p:nvPr/>
             </p:nvSpPr>
             <p:spPr>
-              <a:xfrm rot="5400000">
-                <a:off x="4390507" y="1373827"/>
-                <a:ext cx="309111" cy="2811442"/>
+              <a:xfrm rot="16200000">
+                <a:off x="2026567" y="2387376"/>
+                <a:ext cx="1814363" cy="256078"/>
               </a:xfrm>
-              <a:prstGeom prst="roundRect">
+              <a:prstGeom prst="rightArrow">
                 <a:avLst/>
               </a:prstGeom>
               <a:solidFill>
-                <a:schemeClr val="accent6">
-                  <a:lumMod val="75000"/>
+                <a:schemeClr val="tx2">
+                  <a:lumMod val="60000"/>
+                  <a:lumOff val="40000"/>
                 </a:schemeClr>
               </a:solidFill>
-              <a:ln>
-                <a:noFill/>
-              </a:ln>
-            </p:spPr>
-            <p:style>
-              <a:lnRef idx="2">
-                <a:schemeClr val="accent1">
-                  <a:shade val="50000"/>
-                </a:schemeClr>
-              </a:lnRef>
-              <a:fillRef idx="1">
-                <a:schemeClr val="accent1"/>
-              </a:fillRef>
-              <a:effectRef idx="0">
-                <a:schemeClr val="accent1"/>
-              </a:effectRef>
-              <a:fontRef idx="minor">
-                <a:schemeClr val="lt1"/>
-              </a:fontRef>
-            </p:style>
-            <p:txBody>
-              <a:bodyPr vert="vert270" rtlCol="0" anchor="ctr"/>
-              <a:lstStyle/>
-              <a:p>
-                <a:pPr algn="ctr"/>
-                <a:r>
-                  <a:rPr lang="pt-BR" dirty="0" smtClean="0"/>
-                  <a:t>Dados de Execução</a:t>
-                </a:r>
-                <a:endParaRPr lang="pt-BR" dirty="0"/>
-              </a:p>
-            </p:txBody>
-          </p:sp>
-        </p:grpSp>
-        <p:sp>
-          <p:nvSpPr>
-            <p:cNvPr id="71" name="Seta para baixo 70"/>
-            <p:cNvSpPr/>
-            <p:nvPr/>
-          </p:nvSpPr>
-          <p:spPr>
-            <a:xfrm>
-              <a:off x="4281005" y="2983697"/>
-              <a:ext cx="543230" cy="423358"/>
-            </a:xfrm>
-            <a:prstGeom prst="downArrow">
-              <a:avLst/>
-            </a:prstGeom>
-            <a:solidFill>
-              <a:srgbClr val="FFC000"/>
-            </a:solidFill>
-          </p:spPr>
-          <p:style>
-            <a:lnRef idx="2">
-              <a:schemeClr val="accent1">
-                <a:shade val="50000"/>
-              </a:schemeClr>
-            </a:lnRef>
-            <a:fillRef idx="1">
-              <a:schemeClr val="accent1"/>
-            </a:fillRef>
-            <a:effectRef idx="0">
-              <a:schemeClr val="accent1"/>
-            </a:effectRef>
-            <a:fontRef idx="minor">
-              <a:schemeClr val="lt1"/>
-            </a:fontRef>
-          </p:style>
-          <p:txBody>
-            <a:bodyPr rtlCol="0" anchor="ctr"/>
-            <a:lstStyle/>
-            <a:p>
-              <a:pPr algn="ctr"/>
-              <a:endParaRPr lang="pt-BR" sz="1200"/>
-            </a:p>
-          </p:txBody>
-        </p:sp>
-        <p:grpSp>
-          <p:nvGrpSpPr>
-            <p:cNvPr id="6" name="Grupo 5"/>
-            <p:cNvGrpSpPr/>
-            <p:nvPr/>
-          </p:nvGrpSpPr>
-          <p:grpSpPr>
-            <a:xfrm>
-              <a:off x="6779719" y="3475635"/>
-              <a:ext cx="2218677" cy="2009230"/>
-              <a:chOff x="6745811" y="2829083"/>
-              <a:chExt cx="2218677" cy="2009230"/>
-            </a:xfrm>
-          </p:grpSpPr>
-          <p:sp>
-            <p:nvSpPr>
-              <p:cNvPr id="36" name="Retângulo de cantos arredondados 35"/>
-              <p:cNvSpPr/>
-              <p:nvPr/>
-            </p:nvSpPr>
-            <p:spPr>
-              <a:xfrm>
-                <a:off x="6745811" y="2829083"/>
-                <a:ext cx="2218677" cy="2009230"/>
-              </a:xfrm>
-              <a:prstGeom prst="roundRect">
-                <a:avLst>
-                  <a:gd name="adj" fmla="val 4399"/>
-                </a:avLst>
-              </a:prstGeom>
-              <a:solidFill>
-                <a:schemeClr val="accent6">
-                  <a:lumMod val="75000"/>
-                </a:schemeClr>
-              </a:solidFill>
-              <a:ln>
+              <a:ln w="12700">
                 <a:solidFill>
-                  <a:schemeClr val="accent6">
-                    <a:lumMod val="60000"/>
-                    <a:lumOff val="40000"/>
-                  </a:schemeClr>
+                  <a:schemeClr val="tx1"/>
                 </a:solidFill>
-              </a:ln>
-            </p:spPr>
-            <p:style>
-              <a:lnRef idx="2">
-                <a:schemeClr val="accent1">
-                  <a:shade val="50000"/>
-                </a:schemeClr>
-              </a:lnRef>
-              <a:fillRef idx="1">
-                <a:schemeClr val="accent1"/>
-              </a:fillRef>
-              <a:effectRef idx="0">
-                <a:schemeClr val="accent1"/>
-              </a:effectRef>
-              <a:fontRef idx="minor">
-                <a:schemeClr val="lt1"/>
-              </a:fontRef>
-            </p:style>
-            <p:txBody>
-              <a:bodyPr vert="vert270" rtlCol="0" anchor="ctr"/>
-              <a:lstStyle/>
-              <a:p>
-                <a:pPr algn="ctr"/>
-                <a:endParaRPr lang="pt-BR" dirty="0"/>
-              </a:p>
-            </p:txBody>
-          </p:sp>
-          <p:sp>
-            <p:nvSpPr>
-              <p:cNvPr id="37" name="Retângulo de cantos arredondados 36"/>
-              <p:cNvSpPr/>
-              <p:nvPr/>
-            </p:nvSpPr>
-            <p:spPr>
-              <a:xfrm>
-                <a:off x="6790867" y="2978507"/>
-                <a:ext cx="301413" cy="1710383"/>
-              </a:xfrm>
-              <a:prstGeom prst="roundRect">
-                <a:avLst/>
-              </a:prstGeom>
-              <a:solidFill>
-                <a:schemeClr val="accent6">
-                  <a:lumMod val="75000"/>
-                </a:schemeClr>
-              </a:solidFill>
-              <a:ln>
-                <a:noFill/>
-              </a:ln>
-            </p:spPr>
-            <p:style>
-              <a:lnRef idx="2">
-                <a:schemeClr val="accent1">
-                  <a:shade val="50000"/>
-                </a:schemeClr>
-              </a:lnRef>
-              <a:fillRef idx="1">
-                <a:schemeClr val="accent1"/>
-              </a:fillRef>
-              <a:effectRef idx="0">
-                <a:schemeClr val="accent1"/>
-              </a:effectRef>
-              <a:fontRef idx="minor">
-                <a:schemeClr val="lt1"/>
-              </a:fontRef>
-            </p:style>
-            <p:txBody>
-              <a:bodyPr vert="vert270" rtlCol="0" anchor="ctr"/>
-              <a:lstStyle/>
-              <a:p>
-                <a:pPr algn="ctr"/>
-                <a:r>
-                  <a:rPr lang="pt-BR" sz="2000" dirty="0" smtClean="0"/>
-                  <a:t>Dados de Saída</a:t>
-                </a:r>
-                <a:endParaRPr lang="pt-BR" sz="2000" dirty="0"/>
-              </a:p>
-            </p:txBody>
-          </p:sp>
-          <p:sp>
-            <p:nvSpPr>
-              <p:cNvPr id="39" name="Retângulo de cantos arredondados 38"/>
-              <p:cNvSpPr/>
-              <p:nvPr/>
-            </p:nvSpPr>
-            <p:spPr>
-              <a:xfrm>
-                <a:off x="7122423" y="2926464"/>
-                <a:ext cx="1770057" cy="1800200"/>
-              </a:xfrm>
-              <a:prstGeom prst="roundRect">
-                <a:avLst/>
-              </a:prstGeom>
-              <a:solidFill>
-                <a:schemeClr val="accent2">
-                  <a:lumMod val="75000"/>
-                </a:schemeClr>
-              </a:solidFill>
-              <a:ln>
-                <a:noFill/>
               </a:ln>
             </p:spPr>
             <p:style>
@@ -15871,102 +15456,293 @@
               <a:lstStyle/>
               <a:p>
                 <a:pPr algn="ctr"/>
-                <a:r>
-                  <a:rPr lang="pt-BR" dirty="0" smtClean="0"/>
-                  <a:t>Lista de Configurações Capazes de Executar a Aplicação</a:t>
-                </a:r>
-                <a:endParaRPr lang="pt-BR" dirty="0"/>
+                <a:endParaRPr lang="pt-BR" sz="1200"/>
               </a:p>
             </p:txBody>
           </p:sp>
-        </p:grpSp>
-        <p:sp>
-          <p:nvSpPr>
-            <p:cNvPr id="3" name="Seta para a direita 2"/>
-            <p:cNvSpPr/>
-            <p:nvPr/>
-          </p:nvSpPr>
-          <p:spPr>
-            <a:xfrm>
-              <a:off x="6071468" y="4040565"/>
-              <a:ext cx="661643" cy="879370"/>
-            </a:xfrm>
-            <a:prstGeom prst="rightArrow">
-              <a:avLst/>
-            </a:prstGeom>
-            <a:solidFill>
-              <a:srgbClr val="92D050"/>
-            </a:solidFill>
-            <a:ln>
+          <p:sp>
+            <p:nvSpPr>
+              <p:cNvPr id="27" name="Seta para baixo 26"/>
+              <p:cNvSpPr/>
+              <p:nvPr/>
+            </p:nvSpPr>
+            <p:spPr>
+              <a:xfrm>
+                <a:off x="4278704" y="1636852"/>
+                <a:ext cx="543230" cy="423358"/>
+              </a:xfrm>
+              <a:prstGeom prst="downArrow">
+                <a:avLst/>
+              </a:prstGeom>
               <a:solidFill>
-                <a:schemeClr val="accent3">
-                  <a:lumMod val="50000"/>
+                <a:srgbClr val="FFC000"/>
+              </a:solidFill>
+            </p:spPr>
+            <p:style>
+              <a:lnRef idx="2">
+                <a:schemeClr val="accent1">
+                  <a:shade val="50000"/>
                 </a:schemeClr>
-              </a:solidFill>
-            </a:ln>
-          </p:spPr>
-          <p:style>
-            <a:lnRef idx="2">
-              <a:schemeClr val="accent1">
-                <a:shade val="50000"/>
-              </a:schemeClr>
-            </a:lnRef>
-            <a:fillRef idx="1">
-              <a:schemeClr val="accent1"/>
-            </a:fillRef>
-            <a:effectRef idx="0">
-              <a:schemeClr val="accent1"/>
-            </a:effectRef>
-            <a:fontRef idx="minor">
-              <a:schemeClr val="lt1"/>
-            </a:fontRef>
-          </p:style>
-          <p:txBody>
-            <a:bodyPr rtlCol="0" anchor="ctr"/>
-            <a:lstStyle/>
-            <a:p>
-              <a:pPr algn="ctr"/>
-              <a:endParaRPr lang="pt-BR"/>
-            </a:p>
-          </p:txBody>
-        </p:sp>
-        <p:grpSp>
-          <p:nvGrpSpPr>
-            <p:cNvPr id="19" name="Grupo 18"/>
-            <p:cNvGrpSpPr/>
-            <p:nvPr/>
-          </p:nvGrpSpPr>
-          <p:grpSpPr>
-            <a:xfrm>
-              <a:off x="141412" y="3477155"/>
-              <a:ext cx="2218677" cy="2009230"/>
-              <a:chOff x="141412" y="3477155"/>
-              <a:chExt cx="2218677" cy="2009230"/>
-            </a:xfrm>
-          </p:grpSpPr>
+              </a:lnRef>
+              <a:fillRef idx="1">
+                <a:schemeClr val="accent1"/>
+              </a:fillRef>
+              <a:effectRef idx="0">
+                <a:schemeClr val="accent1"/>
+              </a:effectRef>
+              <a:fontRef idx="minor">
+                <a:schemeClr val="lt1"/>
+              </a:fontRef>
+            </p:style>
+            <p:txBody>
+              <a:bodyPr rtlCol="0" anchor="ctr"/>
+              <a:lstStyle/>
+              <a:p>
+                <a:pPr algn="ctr"/>
+                <a:endParaRPr lang="pt-BR" sz="1200"/>
+              </a:p>
+            </p:txBody>
+          </p:sp>
           <p:grpSp>
             <p:nvGrpSpPr>
-              <p:cNvPr id="15" name="Grupo 14"/>
+              <p:cNvPr id="14" name="Grupo 13"/>
               <p:cNvGrpSpPr/>
               <p:nvPr/>
             </p:nvGrpSpPr>
             <p:grpSpPr>
               <a:xfrm>
-                <a:off x="141412" y="3477155"/>
+                <a:off x="3085911" y="2109804"/>
+                <a:ext cx="2928817" cy="824299"/>
+                <a:chOff x="3085911" y="2109804"/>
+                <a:chExt cx="2928817" cy="824299"/>
+              </a:xfrm>
+            </p:grpSpPr>
+            <p:sp>
+              <p:nvSpPr>
+                <p:cNvPr id="65" name="Retângulo de cantos arredondados 64"/>
+                <p:cNvSpPr/>
+                <p:nvPr/>
+              </p:nvSpPr>
+              <p:spPr>
+                <a:xfrm rot="5400000">
+                  <a:off x="4138170" y="1057545"/>
+                  <a:ext cx="824299" cy="2928817"/>
+                </a:xfrm>
+                <a:prstGeom prst="roundRect">
+                  <a:avLst>
+                    <a:gd name="adj" fmla="val 10075"/>
+                  </a:avLst>
+                </a:prstGeom>
+                <a:solidFill>
+                  <a:schemeClr val="accent6">
+                    <a:lumMod val="75000"/>
+                  </a:schemeClr>
+                </a:solidFill>
+                <a:ln>
+                  <a:solidFill>
+                    <a:schemeClr val="accent6">
+                      <a:lumMod val="60000"/>
+                      <a:lumOff val="40000"/>
+                    </a:schemeClr>
+                  </a:solidFill>
+                </a:ln>
+              </p:spPr>
+              <p:style>
+                <a:lnRef idx="2">
+                  <a:schemeClr val="accent1">
+                    <a:shade val="50000"/>
+                  </a:schemeClr>
+                </a:lnRef>
+                <a:fillRef idx="1">
+                  <a:schemeClr val="accent1"/>
+                </a:fillRef>
+                <a:effectRef idx="0">
+                  <a:schemeClr val="accent1"/>
+                </a:effectRef>
+                <a:fontRef idx="minor">
+                  <a:schemeClr val="lt1"/>
+                </a:fontRef>
+              </p:style>
+              <p:txBody>
+                <a:bodyPr vert="vert270" rtlCol="0" anchor="ctr"/>
+                <a:lstStyle/>
+                <a:p>
+                  <a:pPr algn="ctr"/>
+                  <a:endParaRPr lang="pt-BR" sz="1200" dirty="0"/>
+                </a:p>
+              </p:txBody>
+            </p:sp>
+            <p:sp>
+              <p:nvSpPr>
+                <p:cNvPr id="66" name="Retângulo de cantos arredondados 65"/>
+                <p:cNvSpPr/>
+                <p:nvPr/>
+              </p:nvSpPr>
+              <p:spPr>
+                <a:xfrm>
+                  <a:off x="3128537" y="2175969"/>
+                  <a:ext cx="2822247" cy="430334"/>
+                </a:xfrm>
+                <a:prstGeom prst="roundRect">
+                  <a:avLst/>
+                </a:prstGeom>
+                <a:solidFill>
+                  <a:schemeClr val="accent2">
+                    <a:lumMod val="75000"/>
+                  </a:schemeClr>
+                </a:solidFill>
+                <a:ln>
+                  <a:noFill/>
+                </a:ln>
+              </p:spPr>
+              <p:style>
+                <a:lnRef idx="2">
+                  <a:schemeClr val="accent1">
+                    <a:shade val="50000"/>
+                  </a:schemeClr>
+                </a:lnRef>
+                <a:fillRef idx="1">
+                  <a:schemeClr val="accent1"/>
+                </a:fillRef>
+                <a:effectRef idx="0">
+                  <a:schemeClr val="accent1"/>
+                </a:effectRef>
+                <a:fontRef idx="minor">
+                  <a:schemeClr val="lt1"/>
+                </a:fontRef>
+              </p:style>
+              <p:txBody>
+                <a:bodyPr rtlCol="0" anchor="ctr"/>
+                <a:lstStyle/>
+                <a:p>
+                  <a:pPr algn="ctr"/>
+                  <a:r>
+                    <a:rPr lang="pt-BR" sz="1400" dirty="0" smtClean="0"/>
+                    <a:t>Valor obtido para a Métrica de Desempenho especificada</a:t>
+                  </a:r>
+                  <a:endParaRPr lang="pt-BR" sz="1400" dirty="0"/>
+                </a:p>
+              </p:txBody>
+            </p:sp>
+            <p:sp>
+              <p:nvSpPr>
+                <p:cNvPr id="69" name="Retângulo de cantos arredondados 68"/>
+                <p:cNvSpPr/>
+                <p:nvPr/>
+              </p:nvSpPr>
+              <p:spPr>
+                <a:xfrm rot="5400000">
+                  <a:off x="4390507" y="1373827"/>
+                  <a:ext cx="309111" cy="2811442"/>
+                </a:xfrm>
+                <a:prstGeom prst="roundRect">
+                  <a:avLst/>
+                </a:prstGeom>
+                <a:solidFill>
+                  <a:schemeClr val="accent6">
+                    <a:lumMod val="75000"/>
+                  </a:schemeClr>
+                </a:solidFill>
+                <a:ln>
+                  <a:noFill/>
+                </a:ln>
+              </p:spPr>
+              <p:style>
+                <a:lnRef idx="2">
+                  <a:schemeClr val="accent1">
+                    <a:shade val="50000"/>
+                  </a:schemeClr>
+                </a:lnRef>
+                <a:fillRef idx="1">
+                  <a:schemeClr val="accent1"/>
+                </a:fillRef>
+                <a:effectRef idx="0">
+                  <a:schemeClr val="accent1"/>
+                </a:effectRef>
+                <a:fontRef idx="minor">
+                  <a:schemeClr val="lt1"/>
+                </a:fontRef>
+              </p:style>
+              <p:txBody>
+                <a:bodyPr vert="vert270" rtlCol="0" anchor="ctr"/>
+                <a:lstStyle/>
+                <a:p>
+                  <a:pPr algn="ctr"/>
+                  <a:r>
+                    <a:rPr lang="pt-BR" dirty="0" smtClean="0"/>
+                    <a:t>Dados de Execução</a:t>
+                  </a:r>
+                  <a:endParaRPr lang="pt-BR" dirty="0"/>
+                </a:p>
+              </p:txBody>
+            </p:sp>
+          </p:grpSp>
+          <p:sp>
+            <p:nvSpPr>
+              <p:cNvPr id="71" name="Seta para baixo 70"/>
+              <p:cNvSpPr/>
+              <p:nvPr/>
+            </p:nvSpPr>
+            <p:spPr>
+              <a:xfrm>
+                <a:off x="4281005" y="2983697"/>
+                <a:ext cx="543230" cy="423358"/>
+              </a:xfrm>
+              <a:prstGeom prst="downArrow">
+                <a:avLst/>
+              </a:prstGeom>
+              <a:solidFill>
+                <a:srgbClr val="FFC000"/>
+              </a:solidFill>
+            </p:spPr>
+            <p:style>
+              <a:lnRef idx="2">
+                <a:schemeClr val="accent1">
+                  <a:shade val="50000"/>
+                </a:schemeClr>
+              </a:lnRef>
+              <a:fillRef idx="1">
+                <a:schemeClr val="accent1"/>
+              </a:fillRef>
+              <a:effectRef idx="0">
+                <a:schemeClr val="accent1"/>
+              </a:effectRef>
+              <a:fontRef idx="minor">
+                <a:schemeClr val="lt1"/>
+              </a:fontRef>
+            </p:style>
+            <p:txBody>
+              <a:bodyPr rtlCol="0" anchor="ctr"/>
+              <a:lstStyle/>
+              <a:p>
+                <a:pPr algn="ctr"/>
+                <a:endParaRPr lang="pt-BR" sz="1200"/>
+              </a:p>
+            </p:txBody>
+          </p:sp>
+          <p:grpSp>
+            <p:nvGrpSpPr>
+              <p:cNvPr id="6" name="Grupo 5"/>
+              <p:cNvGrpSpPr/>
+              <p:nvPr/>
+            </p:nvGrpSpPr>
+            <p:grpSpPr>
+              <a:xfrm>
+                <a:off x="6779719" y="3475635"/>
                 <a:ext cx="2218677" cy="2009230"/>
-                <a:chOff x="141412" y="3477155"/>
+                <a:chOff x="6745811" y="2829083"/>
                 <a:chExt cx="2218677" cy="2009230"/>
               </a:xfrm>
             </p:grpSpPr>
             <p:sp>
               <p:nvSpPr>
-                <p:cNvPr id="76" name="Retângulo de cantos arredondados 75"/>
+                <p:cNvPr id="36" name="Retângulo de cantos arredondados 35"/>
                 <p:cNvSpPr/>
                 <p:nvPr/>
               </p:nvSpPr>
               <p:spPr>
                 <a:xfrm>
-                  <a:off x="141412" y="3477155"/>
+                  <a:off x="6745811" y="2829083"/>
                   <a:ext cx="2218677" cy="2009230"/>
                 </a:xfrm>
                 <a:prstGeom prst="roundRect">
@@ -16015,14 +15791,14 @@
             </p:sp>
             <p:sp>
               <p:nvSpPr>
-                <p:cNvPr id="8" name="Retângulo de cantos arredondados 7"/>
+                <p:cNvPr id="37" name="Retângulo de cantos arredondados 36"/>
                 <p:cNvSpPr/>
                 <p:nvPr/>
               </p:nvSpPr>
               <p:spPr>
                 <a:xfrm>
-                  <a:off x="2061327" y="3573016"/>
-                  <a:ext cx="271270" cy="1800200"/>
+                  <a:off x="6790867" y="2978507"/>
+                  <a:ext cx="301413" cy="1710383"/>
                 </a:xfrm>
                 <a:prstGeom prst="roundRect">
                   <a:avLst/>
@@ -16058,38 +15834,23 @@
                 <a:p>
                   <a:pPr algn="ctr"/>
                   <a:r>
-                    <a:rPr lang="pt-BR" dirty="0" smtClean="0"/>
-                    <a:t>Dados de Entrada</a:t>
+                    <a:rPr lang="pt-BR" sz="2000" dirty="0" smtClean="0"/>
+                    <a:t>Dados de Saída</a:t>
                   </a:r>
-                  <a:endParaRPr lang="pt-BR" dirty="0"/>
+                  <a:endParaRPr lang="pt-BR" sz="2000" dirty="0"/>
                 </a:p>
               </p:txBody>
             </p:sp>
-          </p:grpSp>
-          <p:grpSp>
-            <p:nvGrpSpPr>
-              <p:cNvPr id="18" name="Grupo 17"/>
-              <p:cNvGrpSpPr/>
-              <p:nvPr/>
-            </p:nvGrpSpPr>
-            <p:grpSpPr>
-              <a:xfrm>
-                <a:off x="234198" y="3573016"/>
-                <a:ext cx="1778477" cy="1853662"/>
-                <a:chOff x="234198" y="3573016"/>
-                <a:chExt cx="1778477" cy="1853662"/>
-              </a:xfrm>
-            </p:grpSpPr>
             <p:sp>
               <p:nvSpPr>
-                <p:cNvPr id="45" name="Retângulo de cantos arredondados 44"/>
+                <p:cNvPr id="39" name="Retângulo de cantos arredondados 38"/>
                 <p:cNvSpPr/>
                 <p:nvPr/>
               </p:nvSpPr>
               <p:spPr>
                 <a:xfrm>
-                  <a:off x="243531" y="4499153"/>
-                  <a:ext cx="1761155" cy="373861"/>
+                  <a:off x="7122423" y="2926464"/>
+                  <a:ext cx="1770057" cy="1800200"/>
                 </a:xfrm>
                 <a:prstGeom prst="roundRect">
                   <a:avLst/>
@@ -16125,174 +15886,772 @@
                 <a:p>
                   <a:pPr algn="ctr"/>
                   <a:r>
-                    <a:rPr lang="pt-BR" sz="1400" dirty="0" smtClean="0"/>
-                    <a:t>Tipos de VM</a:t>
+                    <a:rPr lang="pt-BR" dirty="0" smtClean="0"/>
+                    <a:t>Lista de Configurações Capazes de Executar a Aplicação</a:t>
                   </a:r>
-                  <a:endParaRPr lang="pt-BR" sz="1400" dirty="0"/>
-                </a:p>
-              </p:txBody>
-            </p:sp>
-            <p:sp>
-              <p:nvSpPr>
-                <p:cNvPr id="46" name="Retângulo de cantos arredondados 45"/>
-                <p:cNvSpPr/>
-                <p:nvPr/>
-              </p:nvSpPr>
-              <p:spPr>
-                <a:xfrm>
-                  <a:off x="234198" y="4063251"/>
-                  <a:ext cx="1770057" cy="373861"/>
-                </a:xfrm>
-                <a:prstGeom prst="roundRect">
-                  <a:avLst/>
-                </a:prstGeom>
-                <a:solidFill>
-                  <a:schemeClr val="accent2">
-                    <a:lumMod val="75000"/>
-                  </a:schemeClr>
-                </a:solidFill>
-                <a:ln>
-                  <a:noFill/>
-                </a:ln>
-              </p:spPr>
-              <p:style>
-                <a:lnRef idx="2">
-                  <a:schemeClr val="accent1">
-                    <a:shade val="50000"/>
-                  </a:schemeClr>
-                </a:lnRef>
-                <a:fillRef idx="1">
-                  <a:schemeClr val="accent1"/>
-                </a:fillRef>
-                <a:effectRef idx="0">
-                  <a:schemeClr val="accent1"/>
-                </a:effectRef>
-                <a:fontRef idx="minor">
-                  <a:schemeClr val="lt1"/>
-                </a:fontRef>
-              </p:style>
-              <p:txBody>
-                <a:bodyPr rtlCol="0" anchor="ctr"/>
-                <a:lstStyle/>
-                <a:p>
-                  <a:pPr algn="ctr"/>
-                  <a:r>
-                    <a:rPr lang="pt-BR" sz="1400" dirty="0" smtClean="0"/>
-                    <a:t>Cargas de </a:t>
-                  </a:r>
-                  <a:r>
-                    <a:rPr lang="pt-BR" sz="1400" dirty="0" smtClean="0"/>
-                    <a:t>Trabalho</a:t>
-                  </a:r>
-                  <a:endParaRPr lang="pt-BR" sz="1400" dirty="0"/>
-                </a:p>
-              </p:txBody>
-            </p:sp>
-            <p:sp>
-              <p:nvSpPr>
-                <p:cNvPr id="47" name="Retângulo de cantos arredondados 46"/>
-                <p:cNvSpPr/>
-                <p:nvPr/>
-              </p:nvSpPr>
-              <p:spPr>
-                <a:xfrm>
-                  <a:off x="234198" y="3573016"/>
-                  <a:ext cx="1770057" cy="418519"/>
-                </a:xfrm>
-                <a:prstGeom prst="roundRect">
-                  <a:avLst/>
-                </a:prstGeom>
-                <a:solidFill>
-                  <a:schemeClr val="accent2">
-                    <a:lumMod val="75000"/>
-                  </a:schemeClr>
-                </a:solidFill>
-                <a:ln>
-                  <a:noFill/>
-                </a:ln>
-              </p:spPr>
-              <p:style>
-                <a:lnRef idx="2">
-                  <a:schemeClr val="accent1">
-                    <a:shade val="50000"/>
-                  </a:schemeClr>
-                </a:lnRef>
-                <a:fillRef idx="1">
-                  <a:schemeClr val="accent1"/>
-                </a:fillRef>
-                <a:effectRef idx="0">
-                  <a:schemeClr val="accent1"/>
-                </a:effectRef>
-                <a:fontRef idx="minor">
-                  <a:schemeClr val="lt1"/>
-                </a:fontRef>
-              </p:style>
-              <p:txBody>
-                <a:bodyPr rtlCol="0" anchor="ctr"/>
-                <a:lstStyle/>
-                <a:p>
-                  <a:pPr algn="ctr"/>
-                  <a:r>
-                    <a:rPr lang="pt-BR" sz="1400" dirty="0" smtClean="0"/>
-                    <a:t>Valor de Referência (SLA)</a:t>
-                  </a:r>
-                  <a:endParaRPr lang="pt-BR" sz="1400" dirty="0"/>
-                </a:p>
-              </p:txBody>
-            </p:sp>
-            <p:sp>
-              <p:nvSpPr>
-                <p:cNvPr id="48" name="Retângulo de cantos arredondados 47"/>
-                <p:cNvSpPr/>
-                <p:nvPr/>
-              </p:nvSpPr>
-              <p:spPr>
-                <a:xfrm>
-                  <a:off x="251520" y="4941168"/>
-                  <a:ext cx="1761155" cy="485510"/>
-                </a:xfrm>
-                <a:prstGeom prst="roundRect">
-                  <a:avLst/>
-                </a:prstGeom>
-                <a:solidFill>
-                  <a:schemeClr val="accent2">
-                    <a:lumMod val="75000"/>
-                  </a:schemeClr>
-                </a:solidFill>
-                <a:ln>
-                  <a:noFill/>
-                </a:ln>
-              </p:spPr>
-              <p:style>
-                <a:lnRef idx="2">
-                  <a:schemeClr val="accent1">
-                    <a:shade val="50000"/>
-                  </a:schemeClr>
-                </a:lnRef>
-                <a:fillRef idx="1">
-                  <a:schemeClr val="accent1"/>
-                </a:fillRef>
-                <a:effectRef idx="0">
-                  <a:schemeClr val="accent1"/>
-                </a:effectRef>
-                <a:fontRef idx="minor">
-                  <a:schemeClr val="lt1"/>
-                </a:fontRef>
-              </p:style>
-              <p:txBody>
-                <a:bodyPr rtlCol="0" anchor="ctr"/>
-                <a:lstStyle/>
-                <a:p>
-                  <a:pPr algn="ctr"/>
-                  <a:r>
-                    <a:rPr lang="pt-BR" sz="1400" dirty="0" smtClean="0"/>
-                    <a:t>Número Máximo de Instâncias</a:t>
-                  </a:r>
-                  <a:endParaRPr lang="pt-BR" sz="1400" dirty="0"/>
+                  <a:endParaRPr lang="pt-BR" dirty="0"/>
                 </a:p>
               </p:txBody>
             </p:sp>
           </p:grpSp>
+          <p:sp>
+            <p:nvSpPr>
+              <p:cNvPr id="3" name="Seta para a direita 2"/>
+              <p:cNvSpPr/>
+              <p:nvPr/>
+            </p:nvSpPr>
+            <p:spPr>
+              <a:xfrm>
+                <a:off x="6071468" y="4040565"/>
+                <a:ext cx="661643" cy="879370"/>
+              </a:xfrm>
+              <a:prstGeom prst="rightArrow">
+                <a:avLst/>
+              </a:prstGeom>
+              <a:solidFill>
+                <a:srgbClr val="92D050"/>
+              </a:solidFill>
+              <a:ln>
+                <a:solidFill>
+                  <a:schemeClr val="accent3">
+                    <a:lumMod val="50000"/>
+                  </a:schemeClr>
+                </a:solidFill>
+              </a:ln>
+            </p:spPr>
+            <p:style>
+              <a:lnRef idx="2">
+                <a:schemeClr val="accent1">
+                  <a:shade val="50000"/>
+                </a:schemeClr>
+              </a:lnRef>
+              <a:fillRef idx="1">
+                <a:schemeClr val="accent1"/>
+              </a:fillRef>
+              <a:effectRef idx="0">
+                <a:schemeClr val="accent1"/>
+              </a:effectRef>
+              <a:fontRef idx="minor">
+                <a:schemeClr val="lt1"/>
+              </a:fontRef>
+            </p:style>
+            <p:txBody>
+              <a:bodyPr rtlCol="0" anchor="ctr"/>
+              <a:lstStyle/>
+              <a:p>
+                <a:pPr algn="ctr"/>
+                <a:endParaRPr lang="pt-BR"/>
+              </a:p>
+            </p:txBody>
+          </p:sp>
+          <p:grpSp>
+            <p:nvGrpSpPr>
+              <p:cNvPr id="19" name="Grupo 18"/>
+              <p:cNvGrpSpPr/>
+              <p:nvPr/>
+            </p:nvGrpSpPr>
+            <p:grpSpPr>
+              <a:xfrm>
+                <a:off x="141412" y="3477155"/>
+                <a:ext cx="2218677" cy="2009230"/>
+                <a:chOff x="141412" y="3477155"/>
+                <a:chExt cx="2218677" cy="2009230"/>
+              </a:xfrm>
+            </p:grpSpPr>
+            <p:grpSp>
+              <p:nvGrpSpPr>
+                <p:cNvPr id="15" name="Grupo 14"/>
+                <p:cNvGrpSpPr/>
+                <p:nvPr/>
+              </p:nvGrpSpPr>
+              <p:grpSpPr>
+                <a:xfrm>
+                  <a:off x="141412" y="3477155"/>
+                  <a:ext cx="2218677" cy="2009230"/>
+                  <a:chOff x="141412" y="3477155"/>
+                  <a:chExt cx="2218677" cy="2009230"/>
+                </a:xfrm>
+              </p:grpSpPr>
+              <p:sp>
+                <p:nvSpPr>
+                  <p:cNvPr id="76" name="Retângulo de cantos arredondados 75"/>
+                  <p:cNvSpPr/>
+                  <p:nvPr/>
+                </p:nvSpPr>
+                <p:spPr>
+                  <a:xfrm>
+                    <a:off x="141412" y="3477155"/>
+                    <a:ext cx="2218677" cy="2009230"/>
+                  </a:xfrm>
+                  <a:prstGeom prst="roundRect">
+                    <a:avLst>
+                      <a:gd name="adj" fmla="val 4399"/>
+                    </a:avLst>
+                  </a:prstGeom>
+                  <a:solidFill>
+                    <a:schemeClr val="accent6">
+                      <a:lumMod val="75000"/>
+                    </a:schemeClr>
+                  </a:solidFill>
+                  <a:ln>
+                    <a:solidFill>
+                      <a:schemeClr val="accent6">
+                        <a:lumMod val="60000"/>
+                        <a:lumOff val="40000"/>
+                      </a:schemeClr>
+                    </a:solidFill>
+                  </a:ln>
+                </p:spPr>
+                <p:style>
+                  <a:lnRef idx="2">
+                    <a:schemeClr val="accent1">
+                      <a:shade val="50000"/>
+                    </a:schemeClr>
+                  </a:lnRef>
+                  <a:fillRef idx="1">
+                    <a:schemeClr val="accent1"/>
+                  </a:fillRef>
+                  <a:effectRef idx="0">
+                    <a:schemeClr val="accent1"/>
+                  </a:effectRef>
+                  <a:fontRef idx="minor">
+                    <a:schemeClr val="lt1"/>
+                  </a:fontRef>
+                </p:style>
+                <p:txBody>
+                  <a:bodyPr vert="vert270" rtlCol="0" anchor="ctr"/>
+                  <a:lstStyle/>
+                  <a:p>
+                    <a:pPr algn="ctr"/>
+                    <a:endParaRPr lang="pt-BR" dirty="0"/>
+                  </a:p>
+                </p:txBody>
+              </p:sp>
+              <p:sp>
+                <p:nvSpPr>
+                  <p:cNvPr id="8" name="Retângulo de cantos arredondados 7"/>
+                  <p:cNvSpPr/>
+                  <p:nvPr/>
+                </p:nvSpPr>
+                <p:spPr>
+                  <a:xfrm>
+                    <a:off x="2061327" y="3573016"/>
+                    <a:ext cx="271270" cy="1800200"/>
+                  </a:xfrm>
+                  <a:prstGeom prst="roundRect">
+                    <a:avLst/>
+                  </a:prstGeom>
+                  <a:solidFill>
+                    <a:schemeClr val="accent6">
+                      <a:lumMod val="75000"/>
+                    </a:schemeClr>
+                  </a:solidFill>
+                  <a:ln>
+                    <a:noFill/>
+                  </a:ln>
+                </p:spPr>
+                <p:style>
+                  <a:lnRef idx="2">
+                    <a:schemeClr val="accent1">
+                      <a:shade val="50000"/>
+                    </a:schemeClr>
+                  </a:lnRef>
+                  <a:fillRef idx="1">
+                    <a:schemeClr val="accent1"/>
+                  </a:fillRef>
+                  <a:effectRef idx="0">
+                    <a:schemeClr val="accent1"/>
+                  </a:effectRef>
+                  <a:fontRef idx="minor">
+                    <a:schemeClr val="lt1"/>
+                  </a:fontRef>
+                </p:style>
+                <p:txBody>
+                  <a:bodyPr vert="vert270" rtlCol="0" anchor="ctr"/>
+                  <a:lstStyle/>
+                  <a:p>
+                    <a:pPr algn="ctr"/>
+                    <a:r>
+                      <a:rPr lang="pt-BR" dirty="0" smtClean="0"/>
+                      <a:t>Dados de Entrada</a:t>
+                    </a:r>
+                    <a:endParaRPr lang="pt-BR" dirty="0"/>
+                  </a:p>
+                </p:txBody>
+              </p:sp>
+            </p:grpSp>
+            <p:grpSp>
+              <p:nvGrpSpPr>
+                <p:cNvPr id="18" name="Grupo 17"/>
+                <p:cNvGrpSpPr/>
+                <p:nvPr/>
+              </p:nvGrpSpPr>
+              <p:grpSpPr>
+                <a:xfrm>
+                  <a:off x="234198" y="3573016"/>
+                  <a:ext cx="1778477" cy="1853662"/>
+                  <a:chOff x="234198" y="3573016"/>
+                  <a:chExt cx="1778477" cy="1853662"/>
+                </a:xfrm>
+              </p:grpSpPr>
+              <p:sp>
+                <p:nvSpPr>
+                  <p:cNvPr id="45" name="Retângulo de cantos arredondados 44"/>
+                  <p:cNvSpPr/>
+                  <p:nvPr/>
+                </p:nvSpPr>
+                <p:spPr>
+                  <a:xfrm>
+                    <a:off x="243531" y="4499153"/>
+                    <a:ext cx="1761155" cy="373861"/>
+                  </a:xfrm>
+                  <a:prstGeom prst="roundRect">
+                    <a:avLst/>
+                  </a:prstGeom>
+                  <a:solidFill>
+                    <a:schemeClr val="accent2">
+                      <a:lumMod val="75000"/>
+                    </a:schemeClr>
+                  </a:solidFill>
+                  <a:ln>
+                    <a:noFill/>
+                  </a:ln>
+                </p:spPr>
+                <p:style>
+                  <a:lnRef idx="2">
+                    <a:schemeClr val="accent1">
+                      <a:shade val="50000"/>
+                    </a:schemeClr>
+                  </a:lnRef>
+                  <a:fillRef idx="1">
+                    <a:schemeClr val="accent1"/>
+                  </a:fillRef>
+                  <a:effectRef idx="0">
+                    <a:schemeClr val="accent1"/>
+                  </a:effectRef>
+                  <a:fontRef idx="minor">
+                    <a:schemeClr val="lt1"/>
+                  </a:fontRef>
+                </p:style>
+                <p:txBody>
+                  <a:bodyPr rtlCol="0" anchor="ctr"/>
+                  <a:lstStyle/>
+                  <a:p>
+                    <a:pPr algn="ctr"/>
+                    <a:r>
+                      <a:rPr lang="pt-BR" sz="1400" dirty="0" smtClean="0"/>
+                      <a:t>Tipos de VM</a:t>
+                    </a:r>
+                    <a:endParaRPr lang="pt-BR" sz="1400" dirty="0"/>
+                  </a:p>
+                </p:txBody>
+              </p:sp>
+              <p:sp>
+                <p:nvSpPr>
+                  <p:cNvPr id="46" name="Retângulo de cantos arredondados 45"/>
+                  <p:cNvSpPr/>
+                  <p:nvPr/>
+                </p:nvSpPr>
+                <p:spPr>
+                  <a:xfrm>
+                    <a:off x="234198" y="4063251"/>
+                    <a:ext cx="1770057" cy="373861"/>
+                  </a:xfrm>
+                  <a:prstGeom prst="roundRect">
+                    <a:avLst/>
+                  </a:prstGeom>
+                  <a:solidFill>
+                    <a:schemeClr val="accent2">
+                      <a:lumMod val="75000"/>
+                    </a:schemeClr>
+                  </a:solidFill>
+                  <a:ln>
+                    <a:noFill/>
+                  </a:ln>
+                </p:spPr>
+                <p:style>
+                  <a:lnRef idx="2">
+                    <a:schemeClr val="accent1">
+                      <a:shade val="50000"/>
+                    </a:schemeClr>
+                  </a:lnRef>
+                  <a:fillRef idx="1">
+                    <a:schemeClr val="accent1"/>
+                  </a:fillRef>
+                  <a:effectRef idx="0">
+                    <a:schemeClr val="accent1"/>
+                  </a:effectRef>
+                  <a:fontRef idx="minor">
+                    <a:schemeClr val="lt1"/>
+                  </a:fontRef>
+                </p:style>
+                <p:txBody>
+                  <a:bodyPr rtlCol="0" anchor="ctr"/>
+                  <a:lstStyle/>
+                  <a:p>
+                    <a:pPr algn="ctr"/>
+                    <a:r>
+                      <a:rPr lang="pt-BR" sz="1400" dirty="0" smtClean="0"/>
+                      <a:t>Cargas de Trabalho</a:t>
+                    </a:r>
+                    <a:endParaRPr lang="pt-BR" sz="1400" dirty="0"/>
+                  </a:p>
+                </p:txBody>
+              </p:sp>
+              <p:sp>
+                <p:nvSpPr>
+                  <p:cNvPr id="47" name="Retângulo de cantos arredondados 46"/>
+                  <p:cNvSpPr/>
+                  <p:nvPr/>
+                </p:nvSpPr>
+                <p:spPr>
+                  <a:xfrm>
+                    <a:off x="234198" y="3573016"/>
+                    <a:ext cx="1770057" cy="418519"/>
+                  </a:xfrm>
+                  <a:prstGeom prst="roundRect">
+                    <a:avLst/>
+                  </a:prstGeom>
+                  <a:solidFill>
+                    <a:schemeClr val="accent2">
+                      <a:lumMod val="75000"/>
+                    </a:schemeClr>
+                  </a:solidFill>
+                  <a:ln>
+                    <a:noFill/>
+                  </a:ln>
+                </p:spPr>
+                <p:style>
+                  <a:lnRef idx="2">
+                    <a:schemeClr val="accent1">
+                      <a:shade val="50000"/>
+                    </a:schemeClr>
+                  </a:lnRef>
+                  <a:fillRef idx="1">
+                    <a:schemeClr val="accent1"/>
+                  </a:fillRef>
+                  <a:effectRef idx="0">
+                    <a:schemeClr val="accent1"/>
+                  </a:effectRef>
+                  <a:fontRef idx="minor">
+                    <a:schemeClr val="lt1"/>
+                  </a:fontRef>
+                </p:style>
+                <p:txBody>
+                  <a:bodyPr rtlCol="0" anchor="ctr"/>
+                  <a:lstStyle/>
+                  <a:p>
+                    <a:pPr algn="ctr"/>
+                    <a:r>
+                      <a:rPr lang="pt-BR" sz="1400" dirty="0" smtClean="0"/>
+                      <a:t>Valor de Referência (SLA)</a:t>
+                    </a:r>
+                    <a:endParaRPr lang="pt-BR" sz="1400" dirty="0"/>
+                  </a:p>
+                </p:txBody>
+              </p:sp>
+              <p:sp>
+                <p:nvSpPr>
+                  <p:cNvPr id="48" name="Retângulo de cantos arredondados 47"/>
+                  <p:cNvSpPr/>
+                  <p:nvPr/>
+                </p:nvSpPr>
+                <p:spPr>
+                  <a:xfrm>
+                    <a:off x="251520" y="4941168"/>
+                    <a:ext cx="1761155" cy="485510"/>
+                  </a:xfrm>
+                  <a:prstGeom prst="roundRect">
+                    <a:avLst/>
+                  </a:prstGeom>
+                  <a:solidFill>
+                    <a:schemeClr val="accent2">
+                      <a:lumMod val="75000"/>
+                    </a:schemeClr>
+                  </a:solidFill>
+                  <a:ln>
+                    <a:noFill/>
+                  </a:ln>
+                </p:spPr>
+                <p:style>
+                  <a:lnRef idx="2">
+                    <a:schemeClr val="accent1">
+                      <a:shade val="50000"/>
+                    </a:schemeClr>
+                  </a:lnRef>
+                  <a:fillRef idx="1">
+                    <a:schemeClr val="accent1"/>
+                  </a:fillRef>
+                  <a:effectRef idx="0">
+                    <a:schemeClr val="accent1"/>
+                  </a:effectRef>
+                  <a:fontRef idx="minor">
+                    <a:schemeClr val="lt1"/>
+                  </a:fontRef>
+                </p:style>
+                <p:txBody>
+                  <a:bodyPr rtlCol="0" anchor="ctr"/>
+                  <a:lstStyle/>
+                  <a:p>
+                    <a:pPr algn="ctr"/>
+                    <a:r>
+                      <a:rPr lang="pt-BR" sz="1400" dirty="0" smtClean="0"/>
+                      <a:t>Número Máximo de Instâncias</a:t>
+                    </a:r>
+                    <a:endParaRPr lang="pt-BR" sz="1400" dirty="0"/>
+                  </a:p>
+                </p:txBody>
+              </p:sp>
+            </p:grpSp>
+          </p:grpSp>
+        </p:grpSp>
+        <p:grpSp>
+          <p:nvGrpSpPr>
+            <p:cNvPr id="28" name="Grupo 27"/>
+            <p:cNvGrpSpPr/>
+            <p:nvPr/>
+          </p:nvGrpSpPr>
+          <p:grpSpPr>
+            <a:xfrm>
+              <a:off x="2962720" y="4824408"/>
+              <a:ext cx="1204948" cy="548808"/>
+              <a:chOff x="3372" y="1200887"/>
+              <a:chExt cx="1204948" cy="548808"/>
+            </a:xfrm>
+          </p:grpSpPr>
+          <p:sp>
+            <p:nvSpPr>
+              <p:cNvPr id="35" name="Retângulo de cantos arredondados 34"/>
+              <p:cNvSpPr/>
+              <p:nvPr/>
+            </p:nvSpPr>
+            <p:spPr>
+              <a:xfrm>
+                <a:off x="3372" y="1200887"/>
+                <a:ext cx="1204948" cy="548808"/>
+              </a:xfrm>
+              <a:prstGeom prst="roundRect">
+                <a:avLst>
+                  <a:gd name="adj" fmla="val 10000"/>
+                </a:avLst>
+              </a:prstGeom>
+            </p:spPr>
+            <p:style>
+              <a:lnRef idx="2">
+                <a:schemeClr val="lt1">
+                  <a:hueOff val="0"/>
+                  <a:satOff val="0"/>
+                  <a:lumOff val="0"/>
+                  <a:alphaOff val="0"/>
+                </a:schemeClr>
+              </a:lnRef>
+              <a:fillRef idx="1">
+                <a:schemeClr val="accent3">
+                  <a:hueOff val="0"/>
+                  <a:satOff val="0"/>
+                  <a:lumOff val="0"/>
+                  <a:alphaOff val="0"/>
+                </a:schemeClr>
+              </a:fillRef>
+              <a:effectRef idx="0">
+                <a:schemeClr val="accent3">
+                  <a:hueOff val="0"/>
+                  <a:satOff val="0"/>
+                  <a:lumOff val="0"/>
+                  <a:alphaOff val="0"/>
+                </a:schemeClr>
+              </a:effectRef>
+              <a:fontRef idx="minor">
+                <a:schemeClr val="lt1"/>
+              </a:fontRef>
+            </p:style>
+          </p:sp>
+          <p:sp>
+            <p:nvSpPr>
+              <p:cNvPr id="38" name="Retângulo 37"/>
+              <p:cNvSpPr/>
+              <p:nvPr/>
+            </p:nvSpPr>
+            <p:spPr>
+              <a:xfrm>
+                <a:off x="19446" y="1216961"/>
+                <a:ext cx="1172800" cy="516660"/>
+              </a:xfrm>
+              <a:prstGeom prst="rect">
+                <a:avLst/>
+              </a:prstGeom>
+            </p:spPr>
+            <p:style>
+              <a:lnRef idx="0">
+                <a:scrgbClr r="0" g="0" b="0"/>
+              </a:lnRef>
+              <a:fillRef idx="0">
+                <a:scrgbClr r="0" g="0" b="0"/>
+              </a:fillRef>
+              <a:effectRef idx="0">
+                <a:scrgbClr r="0" g="0" b="0"/>
+              </a:effectRef>
+              <a:fontRef idx="minor">
+                <a:schemeClr val="lt1"/>
+              </a:fontRef>
+            </p:style>
+            <p:txBody>
+              <a:bodyPr spcFirstLastPara="0" vert="horz" wrap="square" lIns="68580" tIns="68580" rIns="68580" bIns="68580" numCol="1" spcCol="1270" anchor="ctr" anchorCtr="0">
+                <a:noAutofit/>
+              </a:bodyPr>
+              <a:lstStyle/>
+              <a:p>
+                <a:pPr lvl="0" algn="ctr" defTabSz="800100">
+                  <a:lnSpc>
+                    <a:spcPct val="90000"/>
+                  </a:lnSpc>
+                  <a:spcBef>
+                    <a:spcPct val="0"/>
+                  </a:spcBef>
+                  <a:spcAft>
+                    <a:spcPct val="35000"/>
+                  </a:spcAft>
+                </a:pPr>
+                <a:r>
+                  <a:rPr lang="pt-BR" sz="1800" kern="1200" dirty="0" smtClean="0"/>
+                  <a:t>Heurística 01</a:t>
+                </a:r>
+                <a:endParaRPr lang="pt-BR" sz="1800" kern="1200" dirty="0"/>
+              </a:p>
+            </p:txBody>
+          </p:sp>
+        </p:grpSp>
+        <p:grpSp>
+          <p:nvGrpSpPr>
+            <p:cNvPr id="29" name="Grupo 28"/>
+            <p:cNvGrpSpPr/>
+            <p:nvPr/>
+          </p:nvGrpSpPr>
+          <p:grpSpPr>
+            <a:xfrm>
+              <a:off x="4218277" y="4991339"/>
+              <a:ext cx="394464" cy="214946"/>
+              <a:chOff x="1258929" y="1367818"/>
+              <a:chExt cx="394464" cy="214946"/>
+            </a:xfrm>
+          </p:grpSpPr>
+          <p:sp>
+            <p:nvSpPr>
+              <p:cNvPr id="33" name="Retângulo de cantos arredondados 32"/>
+              <p:cNvSpPr/>
+              <p:nvPr/>
+            </p:nvSpPr>
+            <p:spPr>
+              <a:xfrm>
+                <a:off x="1258929" y="1367818"/>
+                <a:ext cx="394464" cy="214946"/>
+              </a:xfrm>
+              <a:prstGeom prst="roundRect">
+                <a:avLst>
+                  <a:gd name="adj" fmla="val 10000"/>
+                </a:avLst>
+              </a:prstGeom>
+            </p:spPr>
+            <p:style>
+              <a:lnRef idx="2">
+                <a:schemeClr val="lt1">
+                  <a:hueOff val="0"/>
+                  <a:satOff val="0"/>
+                  <a:lumOff val="0"/>
+                  <a:alphaOff val="0"/>
+                </a:schemeClr>
+              </a:lnRef>
+              <a:fillRef idx="1">
+                <a:schemeClr val="accent3">
+                  <a:hueOff val="0"/>
+                  <a:satOff val="0"/>
+                  <a:lumOff val="0"/>
+                  <a:alphaOff val="0"/>
+                </a:schemeClr>
+              </a:fillRef>
+              <a:effectRef idx="0">
+                <a:schemeClr val="accent3">
+                  <a:hueOff val="0"/>
+                  <a:satOff val="0"/>
+                  <a:lumOff val="0"/>
+                  <a:alphaOff val="0"/>
+                </a:schemeClr>
+              </a:effectRef>
+              <a:fontRef idx="minor">
+                <a:schemeClr val="lt1"/>
+              </a:fontRef>
+            </p:style>
+          </p:sp>
+          <p:sp>
+            <p:nvSpPr>
+              <p:cNvPr id="34" name="Retângulo 33"/>
+              <p:cNvSpPr/>
+              <p:nvPr/>
+            </p:nvSpPr>
+            <p:spPr>
+              <a:xfrm>
+                <a:off x="1265225" y="1374114"/>
+                <a:ext cx="381872" cy="202354"/>
+              </a:xfrm>
+              <a:prstGeom prst="rect">
+                <a:avLst/>
+              </a:prstGeom>
+            </p:spPr>
+            <p:style>
+              <a:lnRef idx="0">
+                <a:scrgbClr r="0" g="0" b="0"/>
+              </a:lnRef>
+              <a:fillRef idx="0">
+                <a:scrgbClr r="0" g="0" b="0"/>
+              </a:fillRef>
+              <a:effectRef idx="0">
+                <a:scrgbClr r="0" g="0" b="0"/>
+              </a:effectRef>
+              <a:fontRef idx="minor">
+                <a:schemeClr val="lt1"/>
+              </a:fontRef>
+            </p:style>
+            <p:txBody>
+              <a:bodyPr spcFirstLastPara="0" vert="horz" wrap="square" lIns="76200" tIns="76200" rIns="76200" bIns="76200" numCol="1" spcCol="1270" anchor="ctr" anchorCtr="0">
+                <a:noAutofit/>
+              </a:bodyPr>
+              <a:lstStyle/>
+              <a:p>
+                <a:pPr lvl="0" algn="ctr" defTabSz="889000">
+                  <a:lnSpc>
+                    <a:spcPct val="90000"/>
+                  </a:lnSpc>
+                  <a:spcBef>
+                    <a:spcPct val="0"/>
+                  </a:spcBef>
+                  <a:spcAft>
+                    <a:spcPct val="35000"/>
+                  </a:spcAft>
+                </a:pPr>
+                <a:r>
+                  <a:rPr lang="pt-BR" sz="2000" kern="1200" dirty="0" smtClean="0"/>
+                  <a:t>...</a:t>
+                </a:r>
+                <a:endParaRPr lang="pt-BR" sz="2000" kern="1200" dirty="0"/>
+              </a:p>
+            </p:txBody>
+          </p:sp>
+        </p:grpSp>
+        <p:grpSp>
+          <p:nvGrpSpPr>
+            <p:cNvPr id="30" name="Grupo 29"/>
+            <p:cNvGrpSpPr/>
+            <p:nvPr/>
+          </p:nvGrpSpPr>
+          <p:grpSpPr>
+            <a:xfrm>
+              <a:off x="4663349" y="4824408"/>
+              <a:ext cx="1204948" cy="548808"/>
+              <a:chOff x="1704001" y="1200887"/>
+              <a:chExt cx="1204948" cy="548808"/>
+            </a:xfrm>
+          </p:grpSpPr>
+          <p:sp>
+            <p:nvSpPr>
+              <p:cNvPr id="31" name="Retângulo de cantos arredondados 30"/>
+              <p:cNvSpPr/>
+              <p:nvPr/>
+            </p:nvSpPr>
+            <p:spPr>
+              <a:xfrm>
+                <a:off x="1704001" y="1200887"/>
+                <a:ext cx="1204948" cy="548808"/>
+              </a:xfrm>
+              <a:prstGeom prst="roundRect">
+                <a:avLst>
+                  <a:gd name="adj" fmla="val 10000"/>
+                </a:avLst>
+              </a:prstGeom>
+            </p:spPr>
+            <p:style>
+              <a:lnRef idx="2">
+                <a:schemeClr val="lt1">
+                  <a:hueOff val="0"/>
+                  <a:satOff val="0"/>
+                  <a:lumOff val="0"/>
+                  <a:alphaOff val="0"/>
+                </a:schemeClr>
+              </a:lnRef>
+              <a:fillRef idx="1">
+                <a:schemeClr val="accent3">
+                  <a:hueOff val="0"/>
+                  <a:satOff val="0"/>
+                  <a:lumOff val="0"/>
+                  <a:alphaOff val="0"/>
+                </a:schemeClr>
+              </a:fillRef>
+              <a:effectRef idx="0">
+                <a:schemeClr val="accent3">
+                  <a:hueOff val="0"/>
+                  <a:satOff val="0"/>
+                  <a:lumOff val="0"/>
+                  <a:alphaOff val="0"/>
+                </a:schemeClr>
+              </a:effectRef>
+              <a:fontRef idx="minor">
+                <a:schemeClr val="lt1"/>
+              </a:fontRef>
+            </p:style>
+          </p:sp>
+          <p:sp>
+            <p:nvSpPr>
+              <p:cNvPr id="32" name="Retângulo 31"/>
+              <p:cNvSpPr/>
+              <p:nvPr/>
+            </p:nvSpPr>
+            <p:spPr>
+              <a:xfrm>
+                <a:off x="1720075" y="1216961"/>
+                <a:ext cx="1172800" cy="516660"/>
+              </a:xfrm>
+              <a:prstGeom prst="rect">
+                <a:avLst/>
+              </a:prstGeom>
+            </p:spPr>
+            <p:style>
+              <a:lnRef idx="0">
+                <a:scrgbClr r="0" g="0" b="0"/>
+              </a:lnRef>
+              <a:fillRef idx="0">
+                <a:scrgbClr r="0" g="0" b="0"/>
+              </a:fillRef>
+              <a:effectRef idx="0">
+                <a:scrgbClr r="0" g="0" b="0"/>
+              </a:effectRef>
+              <a:fontRef idx="minor">
+                <a:schemeClr val="lt1"/>
+              </a:fontRef>
+            </p:style>
+            <p:txBody>
+              <a:bodyPr spcFirstLastPara="0" vert="horz" wrap="square" lIns="68580" tIns="68580" rIns="68580" bIns="68580" numCol="1" spcCol="1270" anchor="ctr" anchorCtr="0">
+                <a:noAutofit/>
+              </a:bodyPr>
+              <a:lstStyle/>
+              <a:p>
+                <a:pPr lvl="0" algn="ctr" defTabSz="800100">
+                  <a:lnSpc>
+                    <a:spcPct val="90000"/>
+                  </a:lnSpc>
+                  <a:spcBef>
+                    <a:spcPct val="0"/>
+                  </a:spcBef>
+                  <a:spcAft>
+                    <a:spcPct val="35000"/>
+                  </a:spcAft>
+                </a:pPr>
+                <a:r>
+                  <a:rPr lang="pt-BR" sz="1800" kern="1200" dirty="0" smtClean="0"/>
+                  <a:t>Heurística N</a:t>
+                </a:r>
+                <a:endParaRPr lang="pt-BR" sz="1800" kern="1200" dirty="0"/>
+              </a:p>
+            </p:txBody>
+          </p:sp>
         </p:grpSp>
       </p:grpSp>
     </p:spTree>

</xml_diff>

<commit_message>
Ilustracao das Classes do CloudCapacitor
</commit_message>
<xml_diff>
--- a/Ilustracoes Dissertacao.pptx
+++ b/Ilustracoes Dissertacao.pptx
@@ -9,6 +9,7 @@
     <p:sldId id="258" r:id="rId3"/>
     <p:sldId id="259" r:id="rId4"/>
     <p:sldId id="257" r:id="rId5"/>
+    <p:sldId id="260" r:id="rId6"/>
   </p:sldIdLst>
   <p:sldSz cx="9144000" cy="6858000" type="screen4x3"/>
   <p:notesSz cx="6858000" cy="9144000"/>
@@ -9525,7 +9526,7 @@
           <a:p>
             <a:fld id="{F6EDC76F-EB2F-4A40-9717-D29568F0D7D1}" type="datetimeFigureOut">
               <a:rPr lang="pt-BR" smtClean="0"/>
-              <a:t>09/11/2014</a:t>
+              <a:t>16/11/2014</a:t>
             </a:fld>
             <a:endParaRPr lang="pt-BR"/>
           </a:p>
@@ -9695,7 +9696,7 @@
           <a:p>
             <a:fld id="{F6EDC76F-EB2F-4A40-9717-D29568F0D7D1}" type="datetimeFigureOut">
               <a:rPr lang="pt-BR" smtClean="0"/>
-              <a:t>09/11/2014</a:t>
+              <a:t>16/11/2014</a:t>
             </a:fld>
             <a:endParaRPr lang="pt-BR"/>
           </a:p>
@@ -9875,7 +9876,7 @@
           <a:p>
             <a:fld id="{F6EDC76F-EB2F-4A40-9717-D29568F0D7D1}" type="datetimeFigureOut">
               <a:rPr lang="pt-BR" smtClean="0"/>
-              <a:t>09/11/2014</a:t>
+              <a:t>16/11/2014</a:t>
             </a:fld>
             <a:endParaRPr lang="pt-BR"/>
           </a:p>
@@ -10045,7 +10046,7 @@
           <a:p>
             <a:fld id="{F6EDC76F-EB2F-4A40-9717-D29568F0D7D1}" type="datetimeFigureOut">
               <a:rPr lang="pt-BR" smtClean="0"/>
-              <a:t>09/11/2014</a:t>
+              <a:t>16/11/2014</a:t>
             </a:fld>
             <a:endParaRPr lang="pt-BR"/>
           </a:p>
@@ -10291,7 +10292,7 @@
           <a:p>
             <a:fld id="{F6EDC76F-EB2F-4A40-9717-D29568F0D7D1}" type="datetimeFigureOut">
               <a:rPr lang="pt-BR" smtClean="0"/>
-              <a:t>09/11/2014</a:t>
+              <a:t>16/11/2014</a:t>
             </a:fld>
             <a:endParaRPr lang="pt-BR"/>
           </a:p>
@@ -10579,7 +10580,7 @@
           <a:p>
             <a:fld id="{F6EDC76F-EB2F-4A40-9717-D29568F0D7D1}" type="datetimeFigureOut">
               <a:rPr lang="pt-BR" smtClean="0"/>
-              <a:t>09/11/2014</a:t>
+              <a:t>16/11/2014</a:t>
             </a:fld>
             <a:endParaRPr lang="pt-BR"/>
           </a:p>
@@ -11001,7 +11002,7 @@
           <a:p>
             <a:fld id="{F6EDC76F-EB2F-4A40-9717-D29568F0D7D1}" type="datetimeFigureOut">
               <a:rPr lang="pt-BR" smtClean="0"/>
-              <a:t>09/11/2014</a:t>
+              <a:t>16/11/2014</a:t>
             </a:fld>
             <a:endParaRPr lang="pt-BR"/>
           </a:p>
@@ -11119,7 +11120,7 @@
           <a:p>
             <a:fld id="{F6EDC76F-EB2F-4A40-9717-D29568F0D7D1}" type="datetimeFigureOut">
               <a:rPr lang="pt-BR" smtClean="0"/>
-              <a:t>09/11/2014</a:t>
+              <a:t>16/11/2014</a:t>
             </a:fld>
             <a:endParaRPr lang="pt-BR"/>
           </a:p>
@@ -11214,7 +11215,7 @@
           <a:p>
             <a:fld id="{F6EDC76F-EB2F-4A40-9717-D29568F0D7D1}" type="datetimeFigureOut">
               <a:rPr lang="pt-BR" smtClean="0"/>
-              <a:t>09/11/2014</a:t>
+              <a:t>16/11/2014</a:t>
             </a:fld>
             <a:endParaRPr lang="pt-BR"/>
           </a:p>
@@ -11491,7 +11492,7 @@
           <a:p>
             <a:fld id="{F6EDC76F-EB2F-4A40-9717-D29568F0D7D1}" type="datetimeFigureOut">
               <a:rPr lang="pt-BR" smtClean="0"/>
-              <a:t>09/11/2014</a:t>
+              <a:t>16/11/2014</a:t>
             </a:fld>
             <a:endParaRPr lang="pt-BR"/>
           </a:p>
@@ -11744,7 +11745,7 @@
           <a:p>
             <a:fld id="{F6EDC76F-EB2F-4A40-9717-D29568F0D7D1}" type="datetimeFigureOut">
               <a:rPr lang="pt-BR" smtClean="0"/>
-              <a:t>09/11/2014</a:t>
+              <a:t>16/11/2014</a:t>
             </a:fld>
             <a:endParaRPr lang="pt-BR"/>
           </a:p>
@@ -11957,7 +11958,7 @@
           <a:p>
             <a:fld id="{F6EDC76F-EB2F-4A40-9717-D29568F0D7D1}" type="datetimeFigureOut">
               <a:rPr lang="pt-BR" smtClean="0"/>
-              <a:t>09/11/2014</a:t>
+              <a:t>16/11/2014</a:t>
             </a:fld>
             <a:endParaRPr lang="pt-BR"/>
           </a:p>
@@ -16989,6 +16990,822 @@
 </p:sld>
 </file>
 
+<file path=ppt/slides/slide5.xml><?xml version="1.0" encoding="utf-8"?>
+<p:sld xmlns:a="http://schemas.openxmlformats.org/drawingml/2006/main" xmlns:r="http://schemas.openxmlformats.org/officeDocument/2006/relationships" xmlns:p="http://schemas.openxmlformats.org/presentationml/2006/main">
+  <p:cSld>
+    <p:spTree>
+      <p:nvGrpSpPr>
+        <p:cNvPr id="1" name=""/>
+        <p:cNvGrpSpPr/>
+        <p:nvPr/>
+      </p:nvGrpSpPr>
+      <p:grpSpPr>
+        <a:xfrm>
+          <a:off x="0" y="0"/>
+          <a:ext cx="0" cy="0"/>
+          <a:chOff x="0" y="0"/>
+          <a:chExt cx="0" cy="0"/>
+        </a:xfrm>
+      </p:grpSpPr>
+      <p:grpSp>
+        <p:nvGrpSpPr>
+          <p:cNvPr id="49" name="Grupo 48"/>
+          <p:cNvGrpSpPr/>
+          <p:nvPr/>
+        </p:nvGrpSpPr>
+        <p:grpSpPr>
+          <a:xfrm>
+            <a:off x="920800" y="1700808"/>
+            <a:ext cx="7302400" cy="2993608"/>
+            <a:chOff x="378272" y="1700808"/>
+            <a:chExt cx="7302400" cy="2993608"/>
+          </a:xfrm>
+        </p:grpSpPr>
+        <p:grpSp>
+          <p:nvGrpSpPr>
+            <p:cNvPr id="44" name="Grupo 43"/>
+            <p:cNvGrpSpPr/>
+            <p:nvPr/>
+          </p:nvGrpSpPr>
+          <p:grpSpPr>
+            <a:xfrm>
+              <a:off x="2051720" y="4325084"/>
+              <a:ext cx="4968552" cy="369332"/>
+              <a:chOff x="2051720" y="4325084"/>
+              <a:chExt cx="4968552" cy="369332"/>
+            </a:xfrm>
+          </p:grpSpPr>
+          <p:sp>
+            <p:nvSpPr>
+              <p:cNvPr id="10" name="CaixaDeTexto 9"/>
+              <p:cNvSpPr txBox="1"/>
+              <p:nvPr/>
+            </p:nvSpPr>
+            <p:spPr>
+              <a:xfrm>
+                <a:off x="2051720" y="4325084"/>
+                <a:ext cx="1656184" cy="369332"/>
+              </a:xfrm>
+              <a:prstGeom prst="rect">
+                <a:avLst/>
+              </a:prstGeom>
+              <a:noFill/>
+              <a:ln>
+                <a:solidFill>
+                  <a:schemeClr val="tx1"/>
+                </a:solidFill>
+                <a:prstDash val="dashDot"/>
+              </a:ln>
+            </p:spPr>
+            <p:txBody>
+              <a:bodyPr wrap="square" rtlCol="0">
+                <a:spAutoFit/>
+              </a:bodyPr>
+              <a:lstStyle/>
+              <a:p>
+                <a:pPr algn="ctr"/>
+                <a:r>
+                  <a:rPr lang="pt-BR" dirty="0" smtClean="0"/>
+                  <a:t>Strategy_1</a:t>
+                </a:r>
+                <a:endParaRPr lang="pt-BR" dirty="0"/>
+              </a:p>
+            </p:txBody>
+          </p:sp>
+          <p:sp>
+            <p:nvSpPr>
+              <p:cNvPr id="11" name="CaixaDeTexto 10"/>
+              <p:cNvSpPr txBox="1"/>
+              <p:nvPr/>
+            </p:nvSpPr>
+            <p:spPr>
+              <a:xfrm>
+                <a:off x="5364088" y="4325084"/>
+                <a:ext cx="1656184" cy="369332"/>
+              </a:xfrm>
+              <a:prstGeom prst="rect">
+                <a:avLst/>
+              </a:prstGeom>
+              <a:noFill/>
+              <a:ln>
+                <a:solidFill>
+                  <a:schemeClr val="tx1"/>
+                </a:solidFill>
+                <a:prstDash val="dashDot"/>
+              </a:ln>
+            </p:spPr>
+            <p:txBody>
+              <a:bodyPr wrap="square" rtlCol="0">
+                <a:spAutoFit/>
+              </a:bodyPr>
+              <a:lstStyle/>
+              <a:p>
+                <a:pPr algn="ctr"/>
+                <a:r>
+                  <a:rPr lang="pt-BR" dirty="0" smtClean="0"/>
+                  <a:t>Strategy_2</a:t>
+                </a:r>
+                <a:endParaRPr lang="pt-BR" dirty="0"/>
+              </a:p>
+            </p:txBody>
+          </p:sp>
+        </p:grpSp>
+        <p:grpSp>
+          <p:nvGrpSpPr>
+            <p:cNvPr id="43" name="Grupo 42"/>
+            <p:cNvGrpSpPr/>
+            <p:nvPr/>
+          </p:nvGrpSpPr>
+          <p:grpSpPr>
+            <a:xfrm>
+              <a:off x="2879812" y="3143280"/>
+              <a:ext cx="3312368" cy="1181804"/>
+              <a:chOff x="2879812" y="3143280"/>
+              <a:chExt cx="3312368" cy="1181804"/>
+            </a:xfrm>
+          </p:grpSpPr>
+          <p:sp>
+            <p:nvSpPr>
+              <p:cNvPr id="36" name="Triângulo isósceles 35"/>
+              <p:cNvSpPr/>
+              <p:nvPr/>
+            </p:nvSpPr>
+            <p:spPr>
+              <a:xfrm>
+                <a:off x="4418614" y="3143280"/>
+                <a:ext cx="234764" cy="198224"/>
+              </a:xfrm>
+              <a:prstGeom prst="triangle">
+                <a:avLst/>
+              </a:prstGeom>
+              <a:noFill/>
+              <a:ln>
+                <a:solidFill>
+                  <a:schemeClr val="tx1"/>
+                </a:solidFill>
+                <a:prstDash val="sysDot"/>
+              </a:ln>
+            </p:spPr>
+            <p:style>
+              <a:lnRef idx="2">
+                <a:schemeClr val="accent1">
+                  <a:shade val="50000"/>
+                </a:schemeClr>
+              </a:lnRef>
+              <a:fillRef idx="1">
+                <a:schemeClr val="accent1"/>
+              </a:fillRef>
+              <a:effectRef idx="0">
+                <a:schemeClr val="accent1"/>
+              </a:effectRef>
+              <a:fontRef idx="minor">
+                <a:schemeClr val="lt1"/>
+              </a:fontRef>
+            </p:style>
+            <p:txBody>
+              <a:bodyPr rtlCol="0" anchor="ctr"/>
+              <a:lstStyle/>
+              <a:p>
+                <a:pPr algn="ctr"/>
+                <a:endParaRPr lang="pt-BR"/>
+              </a:p>
+            </p:txBody>
+          </p:sp>
+          <p:cxnSp>
+            <p:nvCxnSpPr>
+              <p:cNvPr id="38" name="Conector angulado 37"/>
+              <p:cNvCxnSpPr>
+                <a:stCxn id="10" idx="0"/>
+                <a:endCxn id="36" idx="3"/>
+              </p:cNvCxnSpPr>
+              <p:nvPr/>
+            </p:nvCxnSpPr>
+            <p:spPr>
+              <a:xfrm rot="5400000" flipH="1" flipV="1">
+                <a:off x="3216114" y="3005202"/>
+                <a:ext cx="983580" cy="1656184"/>
+              </a:xfrm>
+              <a:prstGeom prst="bentConnector3">
+                <a:avLst/>
+              </a:prstGeom>
+              <a:ln>
+                <a:solidFill>
+                  <a:schemeClr val="tx1"/>
+                </a:solidFill>
+                <a:prstDash val="dashDot"/>
+              </a:ln>
+            </p:spPr>
+            <p:style>
+              <a:lnRef idx="1">
+                <a:schemeClr val="accent1"/>
+              </a:lnRef>
+              <a:fillRef idx="0">
+                <a:schemeClr val="accent1"/>
+              </a:fillRef>
+              <a:effectRef idx="0">
+                <a:schemeClr val="accent1"/>
+              </a:effectRef>
+              <a:fontRef idx="minor">
+                <a:schemeClr val="tx1"/>
+              </a:fontRef>
+            </p:style>
+          </p:cxnSp>
+          <p:cxnSp>
+            <p:nvCxnSpPr>
+              <p:cNvPr id="40" name="Conector angulado 39"/>
+              <p:cNvCxnSpPr>
+                <a:stCxn id="11" idx="0"/>
+                <a:endCxn id="36" idx="3"/>
+              </p:cNvCxnSpPr>
+              <p:nvPr/>
+            </p:nvCxnSpPr>
+            <p:spPr>
+              <a:xfrm rot="16200000" flipV="1">
+                <a:off x="4872298" y="3005202"/>
+                <a:ext cx="983580" cy="1656184"/>
+              </a:xfrm>
+              <a:prstGeom prst="bentConnector3">
+                <a:avLst/>
+              </a:prstGeom>
+              <a:ln>
+                <a:solidFill>
+                  <a:schemeClr val="tx1"/>
+                </a:solidFill>
+                <a:prstDash val="dashDot"/>
+              </a:ln>
+            </p:spPr>
+            <p:style>
+              <a:lnRef idx="1">
+                <a:schemeClr val="accent1"/>
+              </a:lnRef>
+              <a:fillRef idx="0">
+                <a:schemeClr val="accent1"/>
+              </a:fillRef>
+              <a:effectRef idx="0">
+                <a:schemeClr val="accent1"/>
+              </a:effectRef>
+              <a:fontRef idx="minor">
+                <a:schemeClr val="tx1"/>
+              </a:fontRef>
+            </p:style>
+          </p:cxnSp>
+        </p:grpSp>
+        <p:grpSp>
+          <p:nvGrpSpPr>
+            <p:cNvPr id="48" name="Grupo 47"/>
+            <p:cNvGrpSpPr/>
+            <p:nvPr/>
+          </p:nvGrpSpPr>
+          <p:grpSpPr>
+            <a:xfrm>
+              <a:off x="378272" y="1700808"/>
+              <a:ext cx="7302400" cy="1442472"/>
+              <a:chOff x="378272" y="1700808"/>
+              <a:chExt cx="7302400" cy="1442472"/>
+            </a:xfrm>
+          </p:grpSpPr>
+          <p:cxnSp>
+            <p:nvCxnSpPr>
+              <p:cNvPr id="13" name="Conector reto 12"/>
+              <p:cNvCxnSpPr>
+                <a:stCxn id="4" idx="3"/>
+                <a:endCxn id="5" idx="1"/>
+              </p:cNvCxnSpPr>
+              <p:nvPr/>
+            </p:nvCxnSpPr>
+            <p:spPr>
+              <a:xfrm flipV="1">
+                <a:off x="5364088" y="1885474"/>
+                <a:ext cx="660400" cy="10676"/>
+              </a:xfrm>
+              <a:prstGeom prst="line">
+                <a:avLst/>
+              </a:prstGeom>
+              <a:ln>
+                <a:solidFill>
+                  <a:schemeClr val="tx1"/>
+                </a:solidFill>
+              </a:ln>
+            </p:spPr>
+            <p:style>
+              <a:lnRef idx="1">
+                <a:schemeClr val="accent1"/>
+              </a:lnRef>
+              <a:fillRef idx="0">
+                <a:schemeClr val="accent1"/>
+              </a:fillRef>
+              <a:effectRef idx="0">
+                <a:schemeClr val="accent1"/>
+              </a:effectRef>
+              <a:fontRef idx="minor">
+                <a:schemeClr val="tx1"/>
+              </a:fontRef>
+            </p:style>
+          </p:cxnSp>
+          <p:cxnSp>
+            <p:nvCxnSpPr>
+              <p:cNvPr id="15" name="Conector reto 14"/>
+              <p:cNvCxnSpPr>
+                <a:stCxn id="4" idx="1"/>
+                <a:endCxn id="7" idx="3"/>
+              </p:cNvCxnSpPr>
+              <p:nvPr/>
+            </p:nvCxnSpPr>
+            <p:spPr>
+              <a:xfrm flipH="1" flipV="1">
+                <a:off x="2794918" y="1885474"/>
+                <a:ext cx="912986" cy="10676"/>
+              </a:xfrm>
+              <a:prstGeom prst="line">
+                <a:avLst/>
+              </a:prstGeom>
+              <a:ln>
+                <a:solidFill>
+                  <a:schemeClr val="tx1"/>
+                </a:solidFill>
+              </a:ln>
+            </p:spPr>
+            <p:style>
+              <a:lnRef idx="1">
+                <a:schemeClr val="accent1"/>
+              </a:lnRef>
+              <a:fillRef idx="0">
+                <a:schemeClr val="accent1"/>
+              </a:fillRef>
+              <a:effectRef idx="0">
+                <a:schemeClr val="accent1"/>
+              </a:effectRef>
+              <a:fontRef idx="minor">
+                <a:schemeClr val="tx1"/>
+              </a:fontRef>
+            </p:style>
+          </p:cxnSp>
+          <p:grpSp>
+            <p:nvGrpSpPr>
+              <p:cNvPr id="47" name="Grupo 46"/>
+              <p:cNvGrpSpPr/>
+              <p:nvPr/>
+            </p:nvGrpSpPr>
+            <p:grpSpPr>
+              <a:xfrm>
+                <a:off x="3707904" y="1711484"/>
+                <a:ext cx="1656184" cy="1431796"/>
+                <a:chOff x="3707904" y="1711484"/>
+                <a:chExt cx="1656184" cy="1431796"/>
+              </a:xfrm>
+            </p:grpSpPr>
+            <p:sp>
+              <p:nvSpPr>
+                <p:cNvPr id="4" name="CaixaDeTexto 3"/>
+                <p:cNvSpPr txBox="1"/>
+                <p:nvPr/>
+              </p:nvSpPr>
+              <p:spPr>
+                <a:xfrm>
+                  <a:off x="3707904" y="1711484"/>
+                  <a:ext cx="1656184" cy="369332"/>
+                </a:xfrm>
+                <a:prstGeom prst="rect">
+                  <a:avLst/>
+                </a:prstGeom>
+                <a:noFill/>
+                <a:ln>
+                  <a:solidFill>
+                    <a:schemeClr val="tx1"/>
+                  </a:solidFill>
+                </a:ln>
+              </p:spPr>
+              <p:txBody>
+                <a:bodyPr wrap="square" rtlCol="0">
+                  <a:spAutoFit/>
+                </a:bodyPr>
+                <a:lstStyle/>
+                <a:p>
+                  <a:pPr algn="ctr"/>
+                  <a:r>
+                    <a:rPr lang="pt-BR" dirty="0" smtClean="0"/>
+                    <a:t>Capacitor</a:t>
+                  </a:r>
+                  <a:endParaRPr lang="pt-BR" dirty="0"/>
+                </a:p>
+              </p:txBody>
+            </p:sp>
+            <p:sp>
+              <p:nvSpPr>
+                <p:cNvPr id="9" name="CaixaDeTexto 8"/>
+                <p:cNvSpPr txBox="1"/>
+                <p:nvPr/>
+              </p:nvSpPr>
+              <p:spPr>
+                <a:xfrm>
+                  <a:off x="3707904" y="2773948"/>
+                  <a:ext cx="1656184" cy="369332"/>
+                </a:xfrm>
+                <a:prstGeom prst="rect">
+                  <a:avLst/>
+                </a:prstGeom>
+                <a:noFill/>
+                <a:ln>
+                  <a:solidFill>
+                    <a:schemeClr val="tx1"/>
+                  </a:solidFill>
+                </a:ln>
+              </p:spPr>
+              <p:txBody>
+                <a:bodyPr wrap="square" rtlCol="0">
+                  <a:spAutoFit/>
+                </a:bodyPr>
+                <a:lstStyle/>
+                <a:p>
+                  <a:pPr algn="ctr"/>
+                  <a:r>
+                    <a:rPr lang="pt-BR" dirty="0" err="1" smtClean="0"/>
+                    <a:t>Strategy</a:t>
+                  </a:r>
+                  <a:endParaRPr lang="pt-BR" dirty="0"/>
+                </a:p>
+              </p:txBody>
+            </p:sp>
+            <p:cxnSp>
+              <p:nvCxnSpPr>
+                <p:cNvPr id="17" name="Conector reto 16"/>
+                <p:cNvCxnSpPr>
+                  <a:stCxn id="4" idx="2"/>
+                  <a:endCxn id="9" idx="0"/>
+                </p:cNvCxnSpPr>
+                <p:nvPr/>
+              </p:nvCxnSpPr>
+              <p:spPr>
+                <a:xfrm>
+                  <a:off x="4535996" y="2080816"/>
+                  <a:ext cx="0" cy="693132"/>
+                </a:xfrm>
+                <a:prstGeom prst="line">
+                  <a:avLst/>
+                </a:prstGeom>
+                <a:ln>
+                  <a:solidFill>
+                    <a:schemeClr val="tx1"/>
+                  </a:solidFill>
+                </a:ln>
+              </p:spPr>
+              <p:style>
+                <a:lnRef idx="1">
+                  <a:schemeClr val="accent1"/>
+                </a:lnRef>
+                <a:fillRef idx="0">
+                  <a:schemeClr val="accent1"/>
+                </a:fillRef>
+                <a:effectRef idx="0">
+                  <a:schemeClr val="accent1"/>
+                </a:effectRef>
+                <a:fontRef idx="minor">
+                  <a:schemeClr val="tx1"/>
+                </a:fontRef>
+              </p:style>
+            </p:cxnSp>
+          </p:grpSp>
+          <p:cxnSp>
+            <p:nvCxnSpPr>
+              <p:cNvPr id="19" name="Conector reto 18"/>
+              <p:cNvCxnSpPr>
+                <a:stCxn id="4" idx="3"/>
+                <a:endCxn id="6" idx="1"/>
+              </p:cNvCxnSpPr>
+              <p:nvPr/>
+            </p:nvCxnSpPr>
+            <p:spPr>
+              <a:xfrm>
+                <a:off x="5364088" y="1896150"/>
+                <a:ext cx="660400" cy="1062464"/>
+              </a:xfrm>
+              <a:prstGeom prst="line">
+                <a:avLst/>
+              </a:prstGeom>
+              <a:ln>
+                <a:solidFill>
+                  <a:schemeClr val="tx1"/>
+                </a:solidFill>
+              </a:ln>
+            </p:spPr>
+            <p:style>
+              <a:lnRef idx="1">
+                <a:schemeClr val="accent1"/>
+              </a:lnRef>
+              <a:fillRef idx="0">
+                <a:schemeClr val="accent1"/>
+              </a:fillRef>
+              <a:effectRef idx="0">
+                <a:schemeClr val="accent1"/>
+              </a:effectRef>
+              <a:fontRef idx="minor">
+                <a:schemeClr val="tx1"/>
+              </a:fontRef>
+            </p:style>
+          </p:cxnSp>
+          <p:cxnSp>
+            <p:nvCxnSpPr>
+              <p:cNvPr id="21" name="Conector reto 20"/>
+              <p:cNvCxnSpPr>
+                <a:stCxn id="7" idx="3"/>
+                <a:endCxn id="9" idx="1"/>
+              </p:cNvCxnSpPr>
+              <p:nvPr/>
+            </p:nvCxnSpPr>
+            <p:spPr>
+              <a:xfrm>
+                <a:off x="2794918" y="1885474"/>
+                <a:ext cx="912986" cy="1073140"/>
+              </a:xfrm>
+              <a:prstGeom prst="line">
+                <a:avLst/>
+              </a:prstGeom>
+              <a:ln>
+                <a:solidFill>
+                  <a:schemeClr val="tx1"/>
+                </a:solidFill>
+              </a:ln>
+            </p:spPr>
+            <p:style>
+              <a:lnRef idx="1">
+                <a:schemeClr val="accent1"/>
+              </a:lnRef>
+              <a:fillRef idx="0">
+                <a:schemeClr val="accent1"/>
+              </a:fillRef>
+              <a:effectRef idx="0">
+                <a:schemeClr val="accent1"/>
+              </a:effectRef>
+              <a:fontRef idx="minor">
+                <a:schemeClr val="tx1"/>
+              </a:fontRef>
+            </p:style>
+          </p:cxnSp>
+          <p:grpSp>
+            <p:nvGrpSpPr>
+              <p:cNvPr id="45" name="Grupo 44"/>
+              <p:cNvGrpSpPr/>
+              <p:nvPr/>
+            </p:nvGrpSpPr>
+            <p:grpSpPr>
+              <a:xfrm>
+                <a:off x="378272" y="1700808"/>
+                <a:ext cx="2808312" cy="1442472"/>
+                <a:chOff x="378272" y="1700808"/>
+                <a:chExt cx="2808312" cy="1442472"/>
+              </a:xfrm>
+            </p:grpSpPr>
+            <p:sp>
+              <p:nvSpPr>
+                <p:cNvPr id="7" name="CaixaDeTexto 6"/>
+                <p:cNvSpPr txBox="1"/>
+                <p:nvPr/>
+              </p:nvSpPr>
+              <p:spPr>
+                <a:xfrm>
+                  <a:off x="769938" y="1700808"/>
+                  <a:ext cx="2024980" cy="369332"/>
+                </a:xfrm>
+                <a:prstGeom prst="rect">
+                  <a:avLst/>
+                </a:prstGeom>
+                <a:noFill/>
+                <a:ln>
+                  <a:solidFill>
+                    <a:schemeClr val="tx1"/>
+                  </a:solidFill>
+                </a:ln>
+              </p:spPr>
+              <p:txBody>
+                <a:bodyPr wrap="square" rtlCol="0">
+                  <a:spAutoFit/>
+                </a:bodyPr>
+                <a:lstStyle/>
+                <a:p>
+                  <a:pPr algn="ctr"/>
+                  <a:r>
+                    <a:rPr lang="pt-BR" dirty="0" err="1" smtClean="0"/>
+                    <a:t>DeploymentSpace</a:t>
+                  </a:r>
+                  <a:endParaRPr lang="pt-BR" dirty="0"/>
+                </a:p>
+              </p:txBody>
+            </p:sp>
+            <p:sp>
+              <p:nvSpPr>
+                <p:cNvPr id="8" name="CaixaDeTexto 7"/>
+                <p:cNvSpPr txBox="1"/>
+                <p:nvPr/>
+              </p:nvSpPr>
+              <p:spPr>
+                <a:xfrm>
+                  <a:off x="378272" y="2773948"/>
+                  <a:ext cx="2808312" cy="369332"/>
+                </a:xfrm>
+                <a:prstGeom prst="rect">
+                  <a:avLst/>
+                </a:prstGeom>
+                <a:noFill/>
+                <a:ln>
+                  <a:solidFill>
+                    <a:schemeClr val="tx1"/>
+                  </a:solidFill>
+                </a:ln>
+              </p:spPr>
+              <p:txBody>
+                <a:bodyPr wrap="square" rtlCol="0">
+                  <a:spAutoFit/>
+                </a:bodyPr>
+                <a:lstStyle/>
+                <a:p>
+                  <a:pPr algn="ctr"/>
+                  <a:r>
+                    <a:rPr lang="pt-BR" dirty="0" err="1" smtClean="0"/>
+                    <a:t>DeploymentSpaceBuilder</a:t>
+                  </a:r>
+                  <a:endParaRPr lang="pt-BR" dirty="0"/>
+                </a:p>
+              </p:txBody>
+            </p:sp>
+            <p:cxnSp>
+              <p:nvCxnSpPr>
+                <p:cNvPr id="25" name="Conector reto 24"/>
+                <p:cNvCxnSpPr>
+                  <a:stCxn id="7" idx="2"/>
+                  <a:endCxn id="8" idx="0"/>
+                </p:cNvCxnSpPr>
+                <p:nvPr/>
+              </p:nvCxnSpPr>
+              <p:spPr>
+                <a:xfrm>
+                  <a:off x="1782428" y="2070140"/>
+                  <a:ext cx="0" cy="703808"/>
+                </a:xfrm>
+                <a:prstGeom prst="line">
+                  <a:avLst/>
+                </a:prstGeom>
+                <a:ln>
+                  <a:solidFill>
+                    <a:schemeClr val="tx1"/>
+                  </a:solidFill>
+                </a:ln>
+              </p:spPr>
+              <p:style>
+                <a:lnRef idx="1">
+                  <a:schemeClr val="accent1"/>
+                </a:lnRef>
+                <a:fillRef idx="0">
+                  <a:schemeClr val="accent1"/>
+                </a:fillRef>
+                <a:effectRef idx="0">
+                  <a:schemeClr val="accent1"/>
+                </a:effectRef>
+                <a:fontRef idx="minor">
+                  <a:schemeClr val="tx1"/>
+                </a:fontRef>
+              </p:style>
+            </p:cxnSp>
+          </p:grpSp>
+          <p:grpSp>
+            <p:nvGrpSpPr>
+              <p:cNvPr id="46" name="Grupo 45"/>
+              <p:cNvGrpSpPr/>
+              <p:nvPr/>
+            </p:nvGrpSpPr>
+            <p:grpSpPr>
+              <a:xfrm>
+                <a:off x="6024488" y="1700808"/>
+                <a:ext cx="1656184" cy="1442472"/>
+                <a:chOff x="6024488" y="1700808"/>
+                <a:chExt cx="1656184" cy="1442472"/>
+              </a:xfrm>
+            </p:grpSpPr>
+            <p:sp>
+              <p:nvSpPr>
+                <p:cNvPr id="5" name="CaixaDeTexto 4"/>
+                <p:cNvSpPr txBox="1"/>
+                <p:nvPr/>
+              </p:nvSpPr>
+              <p:spPr>
+                <a:xfrm>
+                  <a:off x="6024488" y="1700808"/>
+                  <a:ext cx="1656184" cy="369332"/>
+                </a:xfrm>
+                <a:prstGeom prst="rect">
+                  <a:avLst/>
+                </a:prstGeom>
+                <a:noFill/>
+                <a:ln>
+                  <a:solidFill>
+                    <a:schemeClr val="tx1"/>
+                  </a:solidFill>
+                </a:ln>
+              </p:spPr>
+              <p:txBody>
+                <a:bodyPr wrap="square" rtlCol="0">
+                  <a:spAutoFit/>
+                </a:bodyPr>
+                <a:lstStyle/>
+                <a:p>
+                  <a:pPr algn="ctr"/>
+                  <a:r>
+                    <a:rPr lang="pt-BR" dirty="0" smtClean="0"/>
+                    <a:t>Executor</a:t>
+                  </a:r>
+                  <a:endParaRPr lang="pt-BR" dirty="0"/>
+                </a:p>
+              </p:txBody>
+            </p:sp>
+            <p:sp>
+              <p:nvSpPr>
+                <p:cNvPr id="6" name="CaixaDeTexto 5"/>
+                <p:cNvSpPr txBox="1"/>
+                <p:nvPr/>
+              </p:nvSpPr>
+              <p:spPr>
+                <a:xfrm>
+                  <a:off x="6024488" y="2773948"/>
+                  <a:ext cx="1656184" cy="369332"/>
+                </a:xfrm>
+                <a:prstGeom prst="rect">
+                  <a:avLst/>
+                </a:prstGeom>
+                <a:noFill/>
+                <a:ln>
+                  <a:solidFill>
+                    <a:schemeClr val="tx1"/>
+                  </a:solidFill>
+                </a:ln>
+              </p:spPr>
+              <p:txBody>
+                <a:bodyPr wrap="square" rtlCol="0">
+                  <a:spAutoFit/>
+                </a:bodyPr>
+                <a:lstStyle/>
+                <a:p>
+                  <a:pPr algn="ctr"/>
+                  <a:r>
+                    <a:rPr lang="pt-BR" dirty="0" err="1" smtClean="0"/>
+                    <a:t>Result</a:t>
+                  </a:r>
+                  <a:endParaRPr lang="pt-BR" dirty="0"/>
+                </a:p>
+              </p:txBody>
+            </p:sp>
+            <p:cxnSp>
+              <p:nvCxnSpPr>
+                <p:cNvPr id="42" name="Conector reto 41"/>
+                <p:cNvCxnSpPr>
+                  <a:stCxn id="5" idx="2"/>
+                  <a:endCxn id="6" idx="0"/>
+                </p:cNvCxnSpPr>
+                <p:nvPr/>
+              </p:nvCxnSpPr>
+              <p:spPr>
+                <a:xfrm>
+                  <a:off x="6852580" y="2070140"/>
+                  <a:ext cx="0" cy="703808"/>
+                </a:xfrm>
+                <a:prstGeom prst="line">
+                  <a:avLst/>
+                </a:prstGeom>
+                <a:ln>
+                  <a:solidFill>
+                    <a:schemeClr val="tx1"/>
+                  </a:solidFill>
+                </a:ln>
+              </p:spPr>
+              <p:style>
+                <a:lnRef idx="1">
+                  <a:schemeClr val="accent1"/>
+                </a:lnRef>
+                <a:fillRef idx="0">
+                  <a:schemeClr val="accent1"/>
+                </a:fillRef>
+                <a:effectRef idx="0">
+                  <a:schemeClr val="accent1"/>
+                </a:effectRef>
+                <a:fontRef idx="minor">
+                  <a:schemeClr val="tx1"/>
+                </a:fontRef>
+              </p:style>
+            </p:cxnSp>
+          </p:grpSp>
+        </p:grpSp>
+      </p:grpSp>
+    </p:spTree>
+    <p:extLst>
+      <p:ext uri="{BB962C8B-B14F-4D97-AF65-F5344CB8AC3E}">
+        <p14:creationId xmlns:p14="http://schemas.microsoft.com/office/powerpoint/2010/main" val="793296521"/>
+      </p:ext>
+    </p:extLst>
+  </p:cSld>
+  <p:clrMapOvr>
+    <a:masterClrMapping/>
+  </p:clrMapOvr>
+</p:sld>
+</file>
+
 <file path=ppt/theme/theme1.xml><?xml version="1.0" encoding="utf-8"?>
 <a:theme xmlns:a="http://schemas.openxmlformats.org/drawingml/2006/main" name="Tema do Office">
   <a:themeElements>

</xml_diff>

<commit_message>
Arquivos de apoio a apresentacao da defesa
</commit_message>
<xml_diff>
--- a/Ilustracoes Dissertacao.pptx
+++ b/Ilustracoes Dissertacao.pptx
@@ -8,9 +8,10 @@
     <p:sldId id="256" r:id="rId2"/>
     <p:sldId id="258" r:id="rId3"/>
     <p:sldId id="259" r:id="rId4"/>
-    <p:sldId id="257" r:id="rId5"/>
-    <p:sldId id="260" r:id="rId6"/>
-    <p:sldId id="261" r:id="rId7"/>
+    <p:sldId id="262" r:id="rId5"/>
+    <p:sldId id="257" r:id="rId6"/>
+    <p:sldId id="260" r:id="rId7"/>
+    <p:sldId id="261" r:id="rId8"/>
   </p:sldIdLst>
   <p:sldSz cx="9144000" cy="6858000" type="screen4x3"/>
   <p:notesSz cx="6858000" cy="9144000"/>
@@ -1951,6 +1952,925 @@
 </file>
 
 <file path=ppt/diagrams/colors3.xml><?xml version="1.0" encoding="utf-8"?>
+<dgm:colorsDef xmlns:dgm="http://schemas.openxmlformats.org/drawingml/2006/diagram" xmlns:a="http://schemas.openxmlformats.org/drawingml/2006/main" uniqueId="urn:microsoft.com/office/officeart/2005/8/colors/colorful1">
+  <dgm:title val=""/>
+  <dgm:desc val=""/>
+  <dgm:catLst>
+    <dgm:cat type="colorful" pri="10100"/>
+  </dgm:catLst>
+  <dgm:styleLbl name="node0">
+    <dgm:fillClrLst meth="repeat">
+      <a:schemeClr val="accent1"/>
+    </dgm:fillClrLst>
+    <dgm:linClrLst meth="repeat">
+      <a:schemeClr val="lt1"/>
+    </dgm:linClrLst>
+    <dgm:effectClrLst/>
+    <dgm:txLinClrLst/>
+    <dgm:txFillClrLst/>
+    <dgm:txEffectClrLst/>
+  </dgm:styleLbl>
+  <dgm:styleLbl name="node1">
+    <dgm:fillClrLst meth="repeat">
+      <a:schemeClr val="accent2"/>
+      <a:schemeClr val="accent3"/>
+      <a:schemeClr val="accent4"/>
+      <a:schemeClr val="accent5"/>
+      <a:schemeClr val="accent6"/>
+    </dgm:fillClrLst>
+    <dgm:linClrLst meth="repeat">
+      <a:schemeClr val="lt1"/>
+    </dgm:linClrLst>
+    <dgm:effectClrLst/>
+    <dgm:txLinClrLst/>
+    <dgm:txFillClrLst/>
+    <dgm:txEffectClrLst/>
+  </dgm:styleLbl>
+  <dgm:styleLbl name="alignNode1">
+    <dgm:fillClrLst meth="repeat">
+      <a:schemeClr val="accent2"/>
+      <a:schemeClr val="accent3"/>
+      <a:schemeClr val="accent4"/>
+      <a:schemeClr val="accent5"/>
+      <a:schemeClr val="accent6"/>
+    </dgm:fillClrLst>
+    <dgm:linClrLst meth="repeat">
+      <a:schemeClr val="accent2"/>
+      <a:schemeClr val="accent3"/>
+      <a:schemeClr val="accent4"/>
+      <a:schemeClr val="accent5"/>
+      <a:schemeClr val="accent6"/>
+    </dgm:linClrLst>
+    <dgm:effectClrLst/>
+    <dgm:txLinClrLst/>
+    <dgm:txFillClrLst/>
+    <dgm:txEffectClrLst/>
+  </dgm:styleLbl>
+  <dgm:styleLbl name="lnNode1">
+    <dgm:fillClrLst meth="repeat">
+      <a:schemeClr val="accent2"/>
+      <a:schemeClr val="accent3"/>
+      <a:schemeClr val="accent4"/>
+      <a:schemeClr val="accent5"/>
+      <a:schemeClr val="accent6"/>
+    </dgm:fillClrLst>
+    <dgm:linClrLst meth="repeat">
+      <a:schemeClr val="lt1"/>
+    </dgm:linClrLst>
+    <dgm:effectClrLst/>
+    <dgm:txLinClrLst/>
+    <dgm:txFillClrLst/>
+    <dgm:txEffectClrLst/>
+  </dgm:styleLbl>
+  <dgm:styleLbl name="vennNode1">
+    <dgm:fillClrLst meth="repeat">
+      <a:schemeClr val="accent2">
+        <a:alpha val="50000"/>
+      </a:schemeClr>
+      <a:schemeClr val="accent3">
+        <a:alpha val="50000"/>
+      </a:schemeClr>
+      <a:schemeClr val="accent4">
+        <a:alpha val="50000"/>
+      </a:schemeClr>
+      <a:schemeClr val="accent5">
+        <a:alpha val="50000"/>
+      </a:schemeClr>
+      <a:schemeClr val="accent6">
+        <a:alpha val="50000"/>
+      </a:schemeClr>
+    </dgm:fillClrLst>
+    <dgm:linClrLst meth="repeat">
+      <a:schemeClr val="lt1"/>
+    </dgm:linClrLst>
+    <dgm:effectClrLst/>
+    <dgm:txLinClrLst/>
+    <dgm:txFillClrLst/>
+    <dgm:txEffectClrLst/>
+  </dgm:styleLbl>
+  <dgm:styleLbl name="node2">
+    <dgm:fillClrLst>
+      <a:schemeClr val="accent2"/>
+    </dgm:fillClrLst>
+    <dgm:linClrLst meth="repeat">
+      <a:schemeClr val="lt1"/>
+    </dgm:linClrLst>
+    <dgm:effectClrLst/>
+    <dgm:txLinClrLst/>
+    <dgm:txFillClrLst/>
+    <dgm:txEffectClrLst/>
+  </dgm:styleLbl>
+  <dgm:styleLbl name="node3">
+    <dgm:fillClrLst>
+      <a:schemeClr val="accent3"/>
+    </dgm:fillClrLst>
+    <dgm:linClrLst meth="repeat">
+      <a:schemeClr val="lt1"/>
+    </dgm:linClrLst>
+    <dgm:effectClrLst/>
+    <dgm:txLinClrLst/>
+    <dgm:txFillClrLst/>
+    <dgm:txEffectClrLst/>
+  </dgm:styleLbl>
+  <dgm:styleLbl name="node4">
+    <dgm:fillClrLst>
+      <a:schemeClr val="accent4"/>
+    </dgm:fillClrLst>
+    <dgm:linClrLst meth="repeat">
+      <a:schemeClr val="lt1"/>
+    </dgm:linClrLst>
+    <dgm:effectClrLst/>
+    <dgm:txLinClrLst/>
+    <dgm:txFillClrLst/>
+    <dgm:txEffectClrLst/>
+  </dgm:styleLbl>
+  <dgm:styleLbl name="fgImgPlace1">
+    <dgm:fillClrLst meth="repeat">
+      <a:schemeClr val="accent2">
+        <a:tint val="50000"/>
+      </a:schemeClr>
+      <a:schemeClr val="accent3">
+        <a:tint val="50000"/>
+      </a:schemeClr>
+      <a:schemeClr val="accent4">
+        <a:tint val="50000"/>
+      </a:schemeClr>
+      <a:schemeClr val="accent5">
+        <a:tint val="50000"/>
+      </a:schemeClr>
+      <a:schemeClr val="accent6">
+        <a:tint val="50000"/>
+      </a:schemeClr>
+    </dgm:fillClrLst>
+    <dgm:linClrLst meth="repeat">
+      <a:schemeClr val="lt1"/>
+    </dgm:linClrLst>
+    <dgm:effectClrLst/>
+    <dgm:txLinClrLst/>
+    <dgm:txFillClrLst meth="repeat">
+      <a:schemeClr val="lt1"/>
+    </dgm:txFillClrLst>
+    <dgm:txEffectClrLst/>
+  </dgm:styleLbl>
+  <dgm:styleLbl name="alignImgPlace1">
+    <dgm:fillClrLst>
+      <a:schemeClr val="accent1">
+        <a:tint val="50000"/>
+      </a:schemeClr>
+      <a:schemeClr val="accent2">
+        <a:tint val="20000"/>
+      </a:schemeClr>
+    </dgm:fillClrLst>
+    <dgm:linClrLst meth="repeat">
+      <a:schemeClr val="lt1"/>
+    </dgm:linClrLst>
+    <dgm:effectClrLst/>
+    <dgm:txLinClrLst/>
+    <dgm:txFillClrLst meth="repeat">
+      <a:schemeClr val="lt1"/>
+    </dgm:txFillClrLst>
+    <dgm:txEffectClrLst/>
+  </dgm:styleLbl>
+  <dgm:styleLbl name="bgImgPlace1">
+    <dgm:fillClrLst>
+      <a:schemeClr val="accent1">
+        <a:tint val="50000"/>
+      </a:schemeClr>
+      <a:schemeClr val="accent2">
+        <a:tint val="20000"/>
+      </a:schemeClr>
+    </dgm:fillClrLst>
+    <dgm:linClrLst meth="repeat">
+      <a:schemeClr val="lt1"/>
+    </dgm:linClrLst>
+    <dgm:effectClrLst/>
+    <dgm:txLinClrLst/>
+    <dgm:txFillClrLst meth="repeat">
+      <a:schemeClr val="lt1"/>
+    </dgm:txFillClrLst>
+    <dgm:txEffectClrLst/>
+  </dgm:styleLbl>
+  <dgm:styleLbl name="sibTrans2D1">
+    <dgm:fillClrLst meth="repeat">
+      <a:schemeClr val="accent2"/>
+      <a:schemeClr val="accent3"/>
+      <a:schemeClr val="accent4"/>
+      <a:schemeClr val="accent5"/>
+      <a:schemeClr val="accent6"/>
+    </dgm:fillClrLst>
+    <dgm:linClrLst meth="cycle">
+      <a:schemeClr val="lt1"/>
+    </dgm:linClrLst>
+    <dgm:effectClrLst/>
+    <dgm:txLinClrLst/>
+    <dgm:txFillClrLst/>
+    <dgm:txEffectClrLst/>
+  </dgm:styleLbl>
+  <dgm:styleLbl name="fgSibTrans2D1">
+    <dgm:fillClrLst meth="repeat">
+      <a:schemeClr val="accent2"/>
+      <a:schemeClr val="accent3"/>
+      <a:schemeClr val="accent4"/>
+      <a:schemeClr val="accent5"/>
+      <a:schemeClr val="accent6"/>
+    </dgm:fillClrLst>
+    <dgm:linClrLst meth="cycle">
+      <a:schemeClr val="lt1"/>
+    </dgm:linClrLst>
+    <dgm:effectClrLst/>
+    <dgm:txLinClrLst/>
+    <dgm:txFillClrLst meth="repeat">
+      <a:schemeClr val="lt1"/>
+    </dgm:txFillClrLst>
+    <dgm:txEffectClrLst/>
+  </dgm:styleLbl>
+  <dgm:styleLbl name="bgSibTrans2D1">
+    <dgm:fillClrLst meth="repeat">
+      <a:schemeClr val="accent2"/>
+      <a:schemeClr val="accent3"/>
+      <a:schemeClr val="accent4"/>
+      <a:schemeClr val="accent5"/>
+      <a:schemeClr val="accent6"/>
+    </dgm:fillClrLst>
+    <dgm:linClrLst meth="cycle">
+      <a:schemeClr val="lt1"/>
+    </dgm:linClrLst>
+    <dgm:effectClrLst/>
+    <dgm:txLinClrLst/>
+    <dgm:txFillClrLst meth="repeat">
+      <a:schemeClr val="lt1"/>
+    </dgm:txFillClrLst>
+    <dgm:txEffectClrLst/>
+  </dgm:styleLbl>
+  <dgm:styleLbl name="sibTrans1D1">
+    <dgm:fillClrLst meth="repeat">
+      <a:schemeClr val="accent2"/>
+      <a:schemeClr val="accent3"/>
+      <a:schemeClr val="accent4"/>
+      <a:schemeClr val="accent5"/>
+      <a:schemeClr val="accent6"/>
+    </dgm:fillClrLst>
+    <dgm:linClrLst meth="repeat">
+      <a:schemeClr val="accent2"/>
+      <a:schemeClr val="accent3"/>
+      <a:schemeClr val="accent4"/>
+      <a:schemeClr val="accent5"/>
+      <a:schemeClr val="accent6"/>
+    </dgm:linClrLst>
+    <dgm:effectClrLst/>
+    <dgm:txLinClrLst/>
+    <dgm:txFillClrLst meth="repeat">
+      <a:schemeClr val="tx1"/>
+    </dgm:txFillClrLst>
+    <dgm:txEffectClrLst/>
+  </dgm:styleLbl>
+  <dgm:styleLbl name="callout">
+    <dgm:fillClrLst meth="repeat">
+      <a:schemeClr val="accent2"/>
+    </dgm:fillClrLst>
+    <dgm:linClrLst meth="repeat">
+      <a:schemeClr val="accent2">
+        <a:tint val="50000"/>
+      </a:schemeClr>
+    </dgm:linClrLst>
+    <dgm:effectClrLst/>
+    <dgm:txLinClrLst/>
+    <dgm:txFillClrLst meth="repeat">
+      <a:schemeClr val="tx1"/>
+    </dgm:txFillClrLst>
+    <dgm:txEffectClrLst/>
+  </dgm:styleLbl>
+  <dgm:styleLbl name="asst0">
+    <dgm:fillClrLst meth="repeat">
+      <a:schemeClr val="accent1"/>
+    </dgm:fillClrLst>
+    <dgm:linClrLst meth="repeat">
+      <a:schemeClr val="lt1"/>
+    </dgm:linClrLst>
+    <dgm:effectClrLst/>
+    <dgm:txLinClrLst/>
+    <dgm:txFillClrLst/>
+    <dgm:txEffectClrLst/>
+  </dgm:styleLbl>
+  <dgm:styleLbl name="asst1">
+    <dgm:fillClrLst meth="repeat">
+      <a:schemeClr val="accent2"/>
+    </dgm:fillClrLst>
+    <dgm:linClrLst meth="repeat">
+      <a:schemeClr val="lt1"/>
+    </dgm:linClrLst>
+    <dgm:effectClrLst/>
+    <dgm:txLinClrLst/>
+    <dgm:txFillClrLst/>
+    <dgm:txEffectClrLst/>
+  </dgm:styleLbl>
+  <dgm:styleLbl name="asst2">
+    <dgm:fillClrLst>
+      <a:schemeClr val="accent3"/>
+    </dgm:fillClrLst>
+    <dgm:linClrLst meth="repeat">
+      <a:schemeClr val="lt1"/>
+    </dgm:linClrLst>
+    <dgm:effectClrLst/>
+    <dgm:txLinClrLst/>
+    <dgm:txFillClrLst/>
+    <dgm:txEffectClrLst/>
+  </dgm:styleLbl>
+  <dgm:styleLbl name="asst3">
+    <dgm:fillClrLst>
+      <a:schemeClr val="accent4"/>
+    </dgm:fillClrLst>
+    <dgm:linClrLst meth="repeat">
+      <a:schemeClr val="lt1"/>
+    </dgm:linClrLst>
+    <dgm:effectClrLst/>
+    <dgm:txLinClrLst/>
+    <dgm:txFillClrLst/>
+    <dgm:txEffectClrLst/>
+  </dgm:styleLbl>
+  <dgm:styleLbl name="asst4">
+    <dgm:fillClrLst>
+      <a:schemeClr val="accent5"/>
+    </dgm:fillClrLst>
+    <dgm:linClrLst meth="repeat">
+      <a:schemeClr val="lt1"/>
+    </dgm:linClrLst>
+    <dgm:effectClrLst/>
+    <dgm:txLinClrLst/>
+    <dgm:txFillClrLst/>
+    <dgm:txEffectClrLst/>
+  </dgm:styleLbl>
+  <dgm:styleLbl name="parChTrans2D1">
+    <dgm:fillClrLst meth="repeat">
+      <a:schemeClr val="accent2"/>
+    </dgm:fillClrLst>
+    <dgm:linClrLst meth="repeat">
+      <a:schemeClr val="lt1"/>
+    </dgm:linClrLst>
+    <dgm:effectClrLst/>
+    <dgm:txLinClrLst/>
+    <dgm:txFillClrLst meth="repeat">
+      <a:schemeClr val="lt1"/>
+    </dgm:txFillClrLst>
+    <dgm:txEffectClrLst/>
+  </dgm:styleLbl>
+  <dgm:styleLbl name="parChTrans2D2">
+    <dgm:fillClrLst meth="repeat">
+      <a:schemeClr val="accent3"/>
+    </dgm:fillClrLst>
+    <dgm:linClrLst meth="repeat">
+      <a:schemeClr val="lt1"/>
+    </dgm:linClrLst>
+    <dgm:effectClrLst/>
+    <dgm:txLinClrLst/>
+    <dgm:txFillClrLst/>
+    <dgm:txEffectClrLst/>
+  </dgm:styleLbl>
+  <dgm:styleLbl name="parChTrans2D3">
+    <dgm:fillClrLst meth="repeat">
+      <a:schemeClr val="accent4"/>
+    </dgm:fillClrLst>
+    <dgm:linClrLst meth="repeat">
+      <a:schemeClr val="lt1"/>
+    </dgm:linClrLst>
+    <dgm:effectClrLst/>
+    <dgm:txLinClrLst/>
+    <dgm:txFillClrLst/>
+    <dgm:txEffectClrLst/>
+  </dgm:styleLbl>
+  <dgm:styleLbl name="parChTrans2D4">
+    <dgm:fillClrLst meth="repeat">
+      <a:schemeClr val="accent5"/>
+    </dgm:fillClrLst>
+    <dgm:linClrLst meth="repeat">
+      <a:schemeClr val="lt1"/>
+    </dgm:linClrLst>
+    <dgm:effectClrLst/>
+    <dgm:txLinClrLst/>
+    <dgm:txFillClrLst meth="repeat">
+      <a:schemeClr val="lt1"/>
+    </dgm:txFillClrLst>
+    <dgm:txEffectClrLst/>
+  </dgm:styleLbl>
+  <dgm:styleLbl name="parChTrans1D1">
+    <dgm:fillClrLst meth="repeat">
+      <a:schemeClr val="accent2"/>
+    </dgm:fillClrLst>
+    <dgm:linClrLst meth="repeat">
+      <a:schemeClr val="accent1"/>
+    </dgm:linClrLst>
+    <dgm:effectClrLst/>
+    <dgm:txLinClrLst/>
+    <dgm:txFillClrLst meth="repeat">
+      <a:schemeClr val="tx1"/>
+    </dgm:txFillClrLst>
+    <dgm:txEffectClrLst/>
+  </dgm:styleLbl>
+  <dgm:styleLbl name="parChTrans1D2">
+    <dgm:fillClrLst meth="repeat">
+      <a:schemeClr val="accent3">
+        <a:tint val="90000"/>
+      </a:schemeClr>
+    </dgm:fillClrLst>
+    <dgm:linClrLst meth="repeat">
+      <a:schemeClr val="accent2"/>
+    </dgm:linClrLst>
+    <dgm:effectClrLst/>
+    <dgm:txLinClrLst/>
+    <dgm:txFillClrLst meth="repeat">
+      <a:schemeClr val="tx1"/>
+    </dgm:txFillClrLst>
+    <dgm:txEffectClrLst/>
+  </dgm:styleLbl>
+  <dgm:styleLbl name="parChTrans1D3">
+    <dgm:fillClrLst meth="repeat">
+      <a:schemeClr val="accent4">
+        <a:tint val="70000"/>
+      </a:schemeClr>
+    </dgm:fillClrLst>
+    <dgm:linClrLst meth="repeat">
+      <a:schemeClr val="accent3"/>
+    </dgm:linClrLst>
+    <dgm:effectClrLst/>
+    <dgm:txLinClrLst/>
+    <dgm:txFillClrLst meth="repeat">
+      <a:schemeClr val="tx1"/>
+    </dgm:txFillClrLst>
+    <dgm:txEffectClrLst/>
+  </dgm:styleLbl>
+  <dgm:styleLbl name="parChTrans1D4">
+    <dgm:fillClrLst meth="repeat">
+      <a:schemeClr val="accent5">
+        <a:tint val="50000"/>
+      </a:schemeClr>
+    </dgm:fillClrLst>
+    <dgm:linClrLst meth="repeat">
+      <a:schemeClr val="accent4"/>
+    </dgm:linClrLst>
+    <dgm:effectClrLst/>
+    <dgm:txLinClrLst/>
+    <dgm:txFillClrLst meth="repeat">
+      <a:schemeClr val="tx1"/>
+    </dgm:txFillClrLst>
+    <dgm:txEffectClrLst/>
+  </dgm:styleLbl>
+  <dgm:styleLbl name="fgAcc1">
+    <dgm:fillClrLst meth="repeat">
+      <a:schemeClr val="lt1">
+        <a:alpha val="90000"/>
+      </a:schemeClr>
+    </dgm:fillClrLst>
+    <dgm:linClrLst meth="repeat">
+      <a:schemeClr val="accent2"/>
+      <a:schemeClr val="accent3"/>
+      <a:schemeClr val="accent4"/>
+      <a:schemeClr val="accent5"/>
+      <a:schemeClr val="accent6"/>
+    </dgm:linClrLst>
+    <dgm:effectClrLst/>
+    <dgm:txLinClrLst/>
+    <dgm:txFillClrLst meth="repeat">
+      <a:schemeClr val="dk1"/>
+    </dgm:txFillClrLst>
+    <dgm:txEffectClrLst/>
+  </dgm:styleLbl>
+  <dgm:styleLbl name="conFgAcc1">
+    <dgm:fillClrLst meth="repeat">
+      <a:schemeClr val="lt1">
+        <a:alpha val="90000"/>
+      </a:schemeClr>
+    </dgm:fillClrLst>
+    <dgm:linClrLst meth="repeat">
+      <a:schemeClr val="accent2"/>
+      <a:schemeClr val="accent3"/>
+      <a:schemeClr val="accent4"/>
+      <a:schemeClr val="accent5"/>
+      <a:schemeClr val="accent6"/>
+    </dgm:linClrLst>
+    <dgm:effectClrLst/>
+    <dgm:txLinClrLst/>
+    <dgm:txFillClrLst meth="repeat">
+      <a:schemeClr val="dk1"/>
+    </dgm:txFillClrLst>
+    <dgm:txEffectClrLst/>
+  </dgm:styleLbl>
+  <dgm:styleLbl name="alignAcc1">
+    <dgm:fillClrLst meth="repeat">
+      <a:schemeClr val="lt1">
+        <a:alpha val="90000"/>
+      </a:schemeClr>
+    </dgm:fillClrLst>
+    <dgm:linClrLst meth="repeat">
+      <a:schemeClr val="accent2"/>
+      <a:schemeClr val="accent3"/>
+      <a:schemeClr val="accent4"/>
+      <a:schemeClr val="accent5"/>
+      <a:schemeClr val="accent6"/>
+    </dgm:linClrLst>
+    <dgm:effectClrLst/>
+    <dgm:txLinClrLst/>
+    <dgm:txFillClrLst meth="repeat">
+      <a:schemeClr val="dk1"/>
+    </dgm:txFillClrLst>
+    <dgm:txEffectClrLst/>
+  </dgm:styleLbl>
+  <dgm:styleLbl name="trAlignAcc1">
+    <dgm:fillClrLst meth="repeat">
+      <a:schemeClr val="lt1">
+        <a:alpha val="40000"/>
+      </a:schemeClr>
+    </dgm:fillClrLst>
+    <dgm:linClrLst meth="repeat">
+      <a:schemeClr val="accent1"/>
+    </dgm:linClrLst>
+    <dgm:effectClrLst/>
+    <dgm:txLinClrLst/>
+    <dgm:txFillClrLst meth="repeat">
+      <a:schemeClr val="dk1"/>
+    </dgm:txFillClrLst>
+    <dgm:txEffectClrLst/>
+  </dgm:styleLbl>
+  <dgm:styleLbl name="bgAcc1">
+    <dgm:fillClrLst meth="repeat">
+      <a:schemeClr val="lt1">
+        <a:alpha val="90000"/>
+      </a:schemeClr>
+    </dgm:fillClrLst>
+    <dgm:linClrLst meth="repeat">
+      <a:schemeClr val="accent2"/>
+      <a:schemeClr val="accent3"/>
+      <a:schemeClr val="accent4"/>
+      <a:schemeClr val="accent5"/>
+      <a:schemeClr val="accent6"/>
+    </dgm:linClrLst>
+    <dgm:effectClrLst/>
+    <dgm:txLinClrLst/>
+    <dgm:txFillClrLst meth="repeat">
+      <a:schemeClr val="dk1"/>
+    </dgm:txFillClrLst>
+    <dgm:txEffectClrLst/>
+  </dgm:styleLbl>
+  <dgm:styleLbl name="solidFgAcc1">
+    <dgm:fillClrLst meth="repeat">
+      <a:schemeClr val="lt1"/>
+    </dgm:fillClrLst>
+    <dgm:linClrLst meth="repeat">
+      <a:schemeClr val="accent2"/>
+      <a:schemeClr val="accent3"/>
+      <a:schemeClr val="accent4"/>
+      <a:schemeClr val="accent5"/>
+      <a:schemeClr val="accent6"/>
+    </dgm:linClrLst>
+    <dgm:effectClrLst/>
+    <dgm:txLinClrLst/>
+    <dgm:txFillClrLst meth="repeat">
+      <a:schemeClr val="dk1"/>
+    </dgm:txFillClrLst>
+    <dgm:txEffectClrLst/>
+  </dgm:styleLbl>
+  <dgm:styleLbl name="solidAlignAcc1">
+    <dgm:fillClrLst meth="repeat">
+      <a:schemeClr val="lt1"/>
+    </dgm:fillClrLst>
+    <dgm:linClrLst meth="repeat">
+      <a:schemeClr val="accent2"/>
+      <a:schemeClr val="accent3"/>
+      <a:schemeClr val="accent4"/>
+      <a:schemeClr val="accent5"/>
+      <a:schemeClr val="accent6"/>
+    </dgm:linClrLst>
+    <dgm:effectClrLst/>
+    <dgm:txLinClrLst/>
+    <dgm:txFillClrLst meth="repeat">
+      <a:schemeClr val="dk1"/>
+    </dgm:txFillClrLst>
+    <dgm:txEffectClrLst/>
+  </dgm:styleLbl>
+  <dgm:styleLbl name="solidBgAcc1">
+    <dgm:fillClrLst meth="repeat">
+      <a:schemeClr val="lt1"/>
+    </dgm:fillClrLst>
+    <dgm:linClrLst meth="repeat">
+      <a:schemeClr val="accent2"/>
+      <a:schemeClr val="accent3"/>
+      <a:schemeClr val="accent4"/>
+      <a:schemeClr val="accent5"/>
+      <a:schemeClr val="accent6"/>
+    </dgm:linClrLst>
+    <dgm:effectClrLst/>
+    <dgm:txLinClrLst/>
+    <dgm:txFillClrLst meth="repeat">
+      <a:schemeClr val="dk1"/>
+    </dgm:txFillClrLst>
+    <dgm:txEffectClrLst/>
+  </dgm:styleLbl>
+  <dgm:styleLbl name="fgAccFollowNode1">
+    <dgm:fillClrLst meth="repeat">
+      <a:schemeClr val="accent2">
+        <a:tint val="40000"/>
+        <a:alpha val="90000"/>
+      </a:schemeClr>
+      <a:schemeClr val="accent3">
+        <a:tint val="40000"/>
+        <a:alpha val="90000"/>
+      </a:schemeClr>
+      <a:schemeClr val="accent4">
+        <a:tint val="40000"/>
+        <a:alpha val="90000"/>
+      </a:schemeClr>
+      <a:schemeClr val="accent5">
+        <a:tint val="40000"/>
+        <a:alpha val="90000"/>
+      </a:schemeClr>
+      <a:schemeClr val="accent6">
+        <a:tint val="40000"/>
+        <a:alpha val="90000"/>
+      </a:schemeClr>
+    </dgm:fillClrLst>
+    <dgm:linClrLst meth="repeat">
+      <a:schemeClr val="accent2">
+        <a:tint val="40000"/>
+        <a:alpha val="90000"/>
+      </a:schemeClr>
+      <a:schemeClr val="accent3">
+        <a:tint val="40000"/>
+        <a:alpha val="90000"/>
+      </a:schemeClr>
+      <a:schemeClr val="accent4">
+        <a:tint val="40000"/>
+        <a:alpha val="90000"/>
+      </a:schemeClr>
+      <a:schemeClr val="accent5">
+        <a:tint val="40000"/>
+        <a:alpha val="90000"/>
+      </a:schemeClr>
+      <a:schemeClr val="accent6">
+        <a:tint val="40000"/>
+        <a:alpha val="90000"/>
+      </a:schemeClr>
+    </dgm:linClrLst>
+    <dgm:effectClrLst/>
+    <dgm:txLinClrLst/>
+    <dgm:txFillClrLst meth="repeat">
+      <a:schemeClr val="dk1"/>
+    </dgm:txFillClrLst>
+    <dgm:txEffectClrLst/>
+  </dgm:styleLbl>
+  <dgm:styleLbl name="alignAccFollowNode1">
+    <dgm:fillClrLst meth="repeat">
+      <a:schemeClr val="accent2">
+        <a:tint val="40000"/>
+        <a:alpha val="90000"/>
+      </a:schemeClr>
+      <a:schemeClr val="accent3">
+        <a:tint val="40000"/>
+        <a:alpha val="90000"/>
+      </a:schemeClr>
+      <a:schemeClr val="accent4">
+        <a:tint val="40000"/>
+        <a:alpha val="90000"/>
+      </a:schemeClr>
+      <a:schemeClr val="accent5">
+        <a:tint val="40000"/>
+        <a:alpha val="90000"/>
+      </a:schemeClr>
+      <a:schemeClr val="accent6">
+        <a:tint val="40000"/>
+        <a:alpha val="90000"/>
+      </a:schemeClr>
+    </dgm:fillClrLst>
+    <dgm:linClrLst meth="repeat">
+      <a:schemeClr val="accent2">
+        <a:tint val="40000"/>
+        <a:alpha val="90000"/>
+      </a:schemeClr>
+      <a:schemeClr val="accent3">
+        <a:tint val="40000"/>
+        <a:alpha val="90000"/>
+      </a:schemeClr>
+      <a:schemeClr val="accent4">
+        <a:tint val="40000"/>
+        <a:alpha val="90000"/>
+      </a:schemeClr>
+      <a:schemeClr val="accent5">
+        <a:tint val="40000"/>
+        <a:alpha val="90000"/>
+      </a:schemeClr>
+      <a:schemeClr val="accent6">
+        <a:tint val="40000"/>
+        <a:alpha val="90000"/>
+      </a:schemeClr>
+    </dgm:linClrLst>
+    <dgm:effectClrLst/>
+    <dgm:txLinClrLst/>
+    <dgm:txFillClrLst meth="repeat">
+      <a:schemeClr val="dk1"/>
+    </dgm:txFillClrLst>
+    <dgm:txEffectClrLst/>
+  </dgm:styleLbl>
+  <dgm:styleLbl name="bgAccFollowNode1">
+    <dgm:fillClrLst meth="repeat">
+      <a:schemeClr val="accent2">
+        <a:tint val="40000"/>
+        <a:alpha val="90000"/>
+      </a:schemeClr>
+      <a:schemeClr val="accent3">
+        <a:tint val="40000"/>
+        <a:alpha val="90000"/>
+      </a:schemeClr>
+      <a:schemeClr val="accent4">
+        <a:tint val="40000"/>
+        <a:alpha val="90000"/>
+      </a:schemeClr>
+      <a:schemeClr val="accent5">
+        <a:tint val="40000"/>
+        <a:alpha val="90000"/>
+      </a:schemeClr>
+      <a:schemeClr val="accent6">
+        <a:tint val="40000"/>
+        <a:alpha val="90000"/>
+      </a:schemeClr>
+    </dgm:fillClrLst>
+    <dgm:linClrLst meth="repeat">
+      <a:schemeClr val="accent2">
+        <a:tint val="40000"/>
+        <a:alpha val="90000"/>
+      </a:schemeClr>
+      <a:schemeClr val="accent3">
+        <a:tint val="40000"/>
+        <a:alpha val="90000"/>
+      </a:schemeClr>
+      <a:schemeClr val="accent4">
+        <a:tint val="40000"/>
+        <a:alpha val="90000"/>
+      </a:schemeClr>
+      <a:schemeClr val="accent5">
+        <a:tint val="40000"/>
+        <a:alpha val="90000"/>
+      </a:schemeClr>
+      <a:schemeClr val="accent6">
+        <a:tint val="40000"/>
+        <a:alpha val="90000"/>
+      </a:schemeClr>
+    </dgm:linClrLst>
+    <dgm:effectClrLst/>
+    <dgm:txLinClrLst/>
+    <dgm:txFillClrLst meth="repeat">
+      <a:schemeClr val="dk1"/>
+    </dgm:txFillClrLst>
+    <dgm:txEffectClrLst/>
+  </dgm:styleLbl>
+  <dgm:styleLbl name="fgAcc0">
+    <dgm:fillClrLst meth="repeat">
+      <a:schemeClr val="lt1">
+        <a:alpha val="90000"/>
+      </a:schemeClr>
+    </dgm:fillClrLst>
+    <dgm:linClrLst>
+      <a:schemeClr val="accent1"/>
+    </dgm:linClrLst>
+    <dgm:effectClrLst/>
+    <dgm:txLinClrLst/>
+    <dgm:txFillClrLst meth="repeat">
+      <a:schemeClr val="dk1"/>
+    </dgm:txFillClrLst>
+    <dgm:txEffectClrLst/>
+  </dgm:styleLbl>
+  <dgm:styleLbl name="fgAcc2">
+    <dgm:fillClrLst meth="repeat">
+      <a:schemeClr val="lt1">
+        <a:alpha val="90000"/>
+      </a:schemeClr>
+    </dgm:fillClrLst>
+    <dgm:linClrLst>
+      <a:schemeClr val="accent2"/>
+    </dgm:linClrLst>
+    <dgm:effectClrLst/>
+    <dgm:txLinClrLst/>
+    <dgm:txFillClrLst meth="repeat">
+      <a:schemeClr val="dk1"/>
+    </dgm:txFillClrLst>
+    <dgm:txEffectClrLst/>
+  </dgm:styleLbl>
+  <dgm:styleLbl name="fgAcc3">
+    <dgm:fillClrLst meth="repeat">
+      <a:schemeClr val="lt1">
+        <a:alpha val="90000"/>
+      </a:schemeClr>
+    </dgm:fillClrLst>
+    <dgm:linClrLst>
+      <a:schemeClr val="accent3"/>
+    </dgm:linClrLst>
+    <dgm:effectClrLst/>
+    <dgm:txLinClrLst/>
+    <dgm:txFillClrLst meth="repeat">
+      <a:schemeClr val="dk1"/>
+    </dgm:txFillClrLst>
+    <dgm:txEffectClrLst/>
+  </dgm:styleLbl>
+  <dgm:styleLbl name="fgAcc4">
+    <dgm:fillClrLst meth="repeat">
+      <a:schemeClr val="lt1">
+        <a:alpha val="90000"/>
+      </a:schemeClr>
+    </dgm:fillClrLst>
+    <dgm:linClrLst>
+      <a:schemeClr val="accent4"/>
+    </dgm:linClrLst>
+    <dgm:effectClrLst/>
+    <dgm:txLinClrLst/>
+    <dgm:txFillClrLst meth="repeat">
+      <a:schemeClr val="dk1"/>
+    </dgm:txFillClrLst>
+    <dgm:txEffectClrLst/>
+  </dgm:styleLbl>
+  <dgm:styleLbl name="bgShp">
+    <dgm:fillClrLst meth="repeat">
+      <a:schemeClr val="accent2">
+        <a:tint val="40000"/>
+      </a:schemeClr>
+    </dgm:fillClrLst>
+    <dgm:linClrLst meth="repeat">
+      <a:schemeClr val="dk1"/>
+    </dgm:linClrLst>
+    <dgm:effectClrLst/>
+    <dgm:txLinClrLst/>
+    <dgm:txFillClrLst meth="repeat">
+      <a:schemeClr val="dk1"/>
+    </dgm:txFillClrLst>
+    <dgm:txEffectClrLst/>
+  </dgm:styleLbl>
+  <dgm:styleLbl name="dkBgShp">
+    <dgm:fillClrLst meth="repeat">
+      <a:schemeClr val="accent2">
+        <a:shade val="90000"/>
+      </a:schemeClr>
+    </dgm:fillClrLst>
+    <dgm:linClrLst meth="repeat">
+      <a:schemeClr val="dk1"/>
+    </dgm:linClrLst>
+    <dgm:effectClrLst/>
+    <dgm:txLinClrLst/>
+    <dgm:txFillClrLst meth="repeat">
+      <a:schemeClr val="lt1"/>
+    </dgm:txFillClrLst>
+    <dgm:txEffectClrLst/>
+  </dgm:styleLbl>
+  <dgm:styleLbl name="trBgShp">
+    <dgm:fillClrLst meth="repeat">
+      <a:schemeClr val="accent1">
+        <a:tint val="50000"/>
+        <a:alpha val="40000"/>
+      </a:schemeClr>
+    </dgm:fillClrLst>
+    <dgm:linClrLst meth="repeat">
+      <a:schemeClr val="accent2"/>
+    </dgm:linClrLst>
+    <dgm:effectClrLst/>
+    <dgm:txLinClrLst/>
+    <dgm:txFillClrLst meth="repeat">
+      <a:schemeClr val="lt1"/>
+    </dgm:txFillClrLst>
+    <dgm:txEffectClrLst/>
+  </dgm:styleLbl>
+  <dgm:styleLbl name="fgShp">
+    <dgm:fillClrLst meth="repeat">
+      <a:schemeClr val="accent2">
+        <a:tint val="40000"/>
+      </a:schemeClr>
+    </dgm:fillClrLst>
+    <dgm:linClrLst meth="repeat">
+      <a:schemeClr val="lt1"/>
+    </dgm:linClrLst>
+    <dgm:effectClrLst/>
+    <dgm:txLinClrLst/>
+    <dgm:txFillClrLst meth="repeat">
+      <a:schemeClr val="dk1"/>
+    </dgm:txFillClrLst>
+    <dgm:txEffectClrLst/>
+  </dgm:styleLbl>
+  <dgm:styleLbl name="revTx">
+    <dgm:fillClrLst meth="repeat">
+      <a:schemeClr val="lt1">
+        <a:alpha val="0"/>
+      </a:schemeClr>
+    </dgm:fillClrLst>
+    <dgm:linClrLst meth="repeat">
+      <a:schemeClr val="dk1">
+        <a:alpha val="0"/>
+      </a:schemeClr>
+    </dgm:linClrLst>
+    <dgm:effectClrLst/>
+    <dgm:txLinClrLst/>
+    <dgm:txFillClrLst meth="repeat">
+      <a:schemeClr val="tx1"/>
+    </dgm:txFillClrLst>
+    <dgm:txEffectClrLst/>
+  </dgm:styleLbl>
+</dgm:colorsDef>
+</file>
+
+<file path=ppt/diagrams/colors4.xml><?xml version="1.0" encoding="utf-8"?>
 <dgm:colorsDef xmlns:dgm="http://schemas.openxmlformats.org/drawingml/2006/diagram" xmlns:a="http://schemas.openxmlformats.org/drawingml/2006/main" uniqueId="urn:microsoft.com/office/officeart/2005/8/colors/colorful1">
   <dgm:title val=""/>
   <dgm:desc val=""/>
@@ -3758,6 +4678,134 @@
     <dgm:cxn modelId="{722B09FE-05C0-41C1-937C-C743314A7057}" type="presParOf" srcId="{F2C5C55E-AAD5-46C7-B490-9EDB0EC9665F}" destId="{05BAE430-0C74-4AEB-80BE-49230D249B63}" srcOrd="0" destOrd="0" presId="urn:microsoft.com/office/officeart/2005/8/layout/hierarchy4"/>
     <dgm:cxn modelId="{DD585EAD-9083-4FDA-A75B-AD0D158D43FB}" type="presParOf" srcId="{05BAE430-0C74-4AEB-80BE-49230D249B63}" destId="{9445868C-F4A0-4876-B5D7-03CBA1E73487}" srcOrd="0" destOrd="0" presId="urn:microsoft.com/office/officeart/2005/8/layout/hierarchy4"/>
     <dgm:cxn modelId="{E2A4DE37-4979-4A01-9987-8A1375588729}" type="presParOf" srcId="{05BAE430-0C74-4AEB-80BE-49230D249B63}" destId="{04BBFD12-F9A5-4E81-9B57-A1AAB292B04F}" srcOrd="1" destOrd="0" presId="urn:microsoft.com/office/officeart/2005/8/layout/hierarchy4"/>
+  </dgm:cxnLst>
+  <dgm:bg/>
+  <dgm:whole/>
+  <dgm:extLst>
+    <a:ext uri="http://schemas.microsoft.com/office/drawing/2008/diagram">
+      <dsp:dataModelExt xmlns:dsp="http://schemas.microsoft.com/office/drawing/2008/diagram" relId="rId6" minVer="http://schemas.openxmlformats.org/drawingml/2006/diagram"/>
+    </a:ext>
+  </dgm:extLst>
+</dgm:dataModel>
+</file>
+
+<file path=ppt/diagrams/data4.xml><?xml version="1.0" encoding="utf-8"?>
+<dgm:dataModel xmlns:dgm="http://schemas.openxmlformats.org/drawingml/2006/diagram" xmlns:a="http://schemas.openxmlformats.org/drawingml/2006/main">
+  <dgm:ptLst>
+    <dgm:pt modelId="{4B7AFAA9-C2C4-4511-9A77-486BA7AE86A9}" type="doc">
+      <dgm:prSet loTypeId="urn:microsoft.com/office/officeart/2005/8/layout/hierarchy4" loCatId="relationship" qsTypeId="urn:microsoft.com/office/officeart/2005/8/quickstyle/simple1" qsCatId="simple" csTypeId="urn:microsoft.com/office/officeart/2005/8/colors/colorful1" csCatId="colorful" phldr="1"/>
+      <dgm:spPr/>
+      <dgm:t>
+        <a:bodyPr/>
+        <a:lstStyle/>
+        <a:p>
+          <a:endParaRPr lang="pt-BR"/>
+        </a:p>
+      </dgm:t>
+    </dgm:pt>
+    <dgm:pt modelId="{E68BCF31-7D5B-4B36-8C51-76BFE4A67ECA}">
+      <dgm:prSet phldrT="[Texto]" custT="1"/>
+      <dgm:spPr/>
+      <dgm:t>
+        <a:bodyPr/>
+        <a:lstStyle/>
+        <a:p>
+          <a:r>
+            <a:rPr lang="pt-BR" sz="2400" dirty="0" err="1" smtClean="0"/>
+            <a:t>Capacity</a:t>
+          </a:r>
+          <a:r>
+            <a:rPr lang="pt-BR" sz="2400" dirty="0" smtClean="0"/>
+            <a:t> </a:t>
+          </a:r>
+          <a:r>
+            <a:rPr lang="pt-BR" sz="2400" dirty="0" err="1" smtClean="0"/>
+            <a:t>Assesment</a:t>
+          </a:r>
+          <a:r>
+            <a:rPr lang="pt-BR" sz="2400" dirty="0" smtClean="0"/>
+            <a:t> </a:t>
+          </a:r>
+          <a:r>
+            <a:rPr lang="pt-BR" sz="2400" dirty="0" err="1" smtClean="0"/>
+            <a:t>Process</a:t>
+          </a:r>
+          <a:endParaRPr lang="pt-BR" sz="2400" dirty="0"/>
+        </a:p>
+      </dgm:t>
+    </dgm:pt>
+    <dgm:pt modelId="{7C734590-2885-4B87-B303-596DD11CC32B}" type="parTrans" cxnId="{54C7459B-5F3F-4C26-9535-249BAEFCD66D}">
+      <dgm:prSet/>
+      <dgm:spPr/>
+      <dgm:t>
+        <a:bodyPr/>
+        <a:lstStyle/>
+        <a:p>
+          <a:endParaRPr lang="pt-BR"/>
+        </a:p>
+      </dgm:t>
+    </dgm:pt>
+    <dgm:pt modelId="{C45F70BB-C99B-4B24-AE07-CACAAE6D36B1}" type="sibTrans" cxnId="{54C7459B-5F3F-4C26-9535-249BAEFCD66D}">
+      <dgm:prSet/>
+      <dgm:spPr/>
+      <dgm:t>
+        <a:bodyPr/>
+        <a:lstStyle/>
+        <a:p>
+          <a:endParaRPr lang="pt-BR"/>
+        </a:p>
+      </dgm:t>
+    </dgm:pt>
+    <dgm:pt modelId="{F2C5C55E-AAD5-46C7-B490-9EDB0EC9665F}" type="pres">
+      <dgm:prSet presAssocID="{4B7AFAA9-C2C4-4511-9A77-486BA7AE86A9}" presName="Name0" presStyleCnt="0">
+        <dgm:presLayoutVars>
+          <dgm:chPref val="1"/>
+          <dgm:dir/>
+          <dgm:animOne val="branch"/>
+          <dgm:animLvl val="lvl"/>
+          <dgm:resizeHandles/>
+        </dgm:presLayoutVars>
+      </dgm:prSet>
+      <dgm:spPr/>
+      <dgm:t>
+        <a:bodyPr/>
+        <a:lstStyle/>
+        <a:p>
+          <a:endParaRPr lang="pt-BR"/>
+        </a:p>
+      </dgm:t>
+    </dgm:pt>
+    <dgm:pt modelId="{05BAE430-0C74-4AEB-80BE-49230D249B63}" type="pres">
+      <dgm:prSet presAssocID="{E68BCF31-7D5B-4B36-8C51-76BFE4A67ECA}" presName="vertOne" presStyleCnt="0"/>
+      <dgm:spPr/>
+    </dgm:pt>
+    <dgm:pt modelId="{9445868C-F4A0-4876-B5D7-03CBA1E73487}" type="pres">
+      <dgm:prSet presAssocID="{E68BCF31-7D5B-4B36-8C51-76BFE4A67ECA}" presName="txOne" presStyleLbl="node0" presStyleIdx="0" presStyleCnt="1" custLinFactNeighborX="0" custLinFactNeighborY="-8216">
+        <dgm:presLayoutVars>
+          <dgm:chPref val="3"/>
+        </dgm:presLayoutVars>
+      </dgm:prSet>
+      <dgm:spPr/>
+      <dgm:t>
+        <a:bodyPr/>
+        <a:lstStyle/>
+        <a:p>
+          <a:endParaRPr lang="pt-BR"/>
+        </a:p>
+      </dgm:t>
+    </dgm:pt>
+    <dgm:pt modelId="{04BBFD12-F9A5-4E81-9B57-A1AAB292B04F}" type="pres">
+      <dgm:prSet presAssocID="{E68BCF31-7D5B-4B36-8C51-76BFE4A67ECA}" presName="horzOne" presStyleCnt="0"/>
+      <dgm:spPr/>
+    </dgm:pt>
+  </dgm:ptLst>
+  <dgm:cxnLst>
+    <dgm:cxn modelId="{54C7459B-5F3F-4C26-9535-249BAEFCD66D}" srcId="{4B7AFAA9-C2C4-4511-9A77-486BA7AE86A9}" destId="{E68BCF31-7D5B-4B36-8C51-76BFE4A67ECA}" srcOrd="0" destOrd="0" parTransId="{7C734590-2885-4B87-B303-596DD11CC32B}" sibTransId="{C45F70BB-C99B-4B24-AE07-CACAAE6D36B1}"/>
+    <dgm:cxn modelId="{A9AED515-B15F-4D4B-988A-78BB9CB436AF}" type="presOf" srcId="{E68BCF31-7D5B-4B36-8C51-76BFE4A67ECA}" destId="{9445868C-F4A0-4876-B5D7-03CBA1E73487}" srcOrd="0" destOrd="0" presId="urn:microsoft.com/office/officeart/2005/8/layout/hierarchy4"/>
+    <dgm:cxn modelId="{F399B020-070D-423A-9794-6F8F788E7F5A}" type="presOf" srcId="{4B7AFAA9-C2C4-4511-9A77-486BA7AE86A9}" destId="{F2C5C55E-AAD5-46C7-B490-9EDB0EC9665F}" srcOrd="0" destOrd="0" presId="urn:microsoft.com/office/officeart/2005/8/layout/hierarchy4"/>
+    <dgm:cxn modelId="{432B818E-F90C-4B78-A33A-D956FC047FBE}" type="presParOf" srcId="{F2C5C55E-AAD5-46C7-B490-9EDB0EC9665F}" destId="{05BAE430-0C74-4AEB-80BE-49230D249B63}" srcOrd="0" destOrd="0" presId="urn:microsoft.com/office/officeart/2005/8/layout/hierarchy4"/>
+    <dgm:cxn modelId="{61E9C86A-9840-4E1B-8F6C-A341C430F9E5}" type="presParOf" srcId="{05BAE430-0C74-4AEB-80BE-49230D249B63}" destId="{9445868C-F4A0-4876-B5D7-03CBA1E73487}" srcOrd="0" destOrd="0" presId="urn:microsoft.com/office/officeart/2005/8/layout/hierarchy4"/>
+    <dgm:cxn modelId="{02166CF2-3753-4602-AB07-6D4E9A8A7057}" type="presParOf" srcId="{05BAE430-0C74-4AEB-80BE-49230D249B63}" destId="{04BBFD12-F9A5-4E81-9B57-A1AAB292B04F}" srcOrd="1" destOrd="0" presId="urn:microsoft.com/office/officeart/2005/8/layout/hierarchy4"/>
   </dgm:cxnLst>
   <dgm:bg/>
   <dgm:whole/>
@@ -4672,6 +5720,113 @@
       <dsp:txXfrm>
         <a:off x="32169" y="30747"/>
         <a:ext cx="2847984" cy="988270"/>
+      </dsp:txXfrm>
+    </dsp:sp>
+  </dsp:spTree>
+</dsp:drawing>
+</file>
+
+<file path=ppt/diagrams/drawing4.xml><?xml version="1.0" encoding="utf-8"?>
+<dsp:drawing xmlns:dgm="http://schemas.openxmlformats.org/drawingml/2006/diagram" xmlns:dsp="http://schemas.microsoft.com/office/drawing/2008/diagram" xmlns:a="http://schemas.openxmlformats.org/drawingml/2006/main">
+  <dsp:spTree>
+    <dsp:nvGrpSpPr>
+      <dsp:cNvPr id="0" name=""/>
+      <dsp:cNvGrpSpPr/>
+    </dsp:nvGrpSpPr>
+    <dsp:grpSpPr/>
+    <dsp:sp modelId="{9445868C-F4A0-4876-B5D7-03CBA1E73487}">
+      <dsp:nvSpPr>
+        <dsp:cNvPr id="0" name=""/>
+        <dsp:cNvSpPr/>
+      </dsp:nvSpPr>
+      <dsp:spPr>
+        <a:xfrm>
+          <a:off x="0" y="0"/>
+          <a:ext cx="2912323" cy="1049764"/>
+        </a:xfrm>
+        <a:prstGeom prst="roundRect">
+          <a:avLst>
+            <a:gd name="adj" fmla="val 10000"/>
+          </a:avLst>
+        </a:prstGeom>
+        <a:solidFill>
+          <a:schemeClr val="accent1">
+            <a:hueOff val="0"/>
+            <a:satOff val="0"/>
+            <a:lumOff val="0"/>
+            <a:alphaOff val="0"/>
+          </a:schemeClr>
+        </a:solidFill>
+        <a:ln w="25400" cap="flat" cmpd="sng" algn="ctr">
+          <a:solidFill>
+            <a:schemeClr val="lt1">
+              <a:hueOff val="0"/>
+              <a:satOff val="0"/>
+              <a:lumOff val="0"/>
+              <a:alphaOff val="0"/>
+            </a:schemeClr>
+          </a:solidFill>
+          <a:prstDash val="solid"/>
+        </a:ln>
+        <a:effectLst/>
+      </dsp:spPr>
+      <dsp:style>
+        <a:lnRef idx="2">
+          <a:scrgbClr r="0" g="0" b="0"/>
+        </a:lnRef>
+        <a:fillRef idx="1">
+          <a:scrgbClr r="0" g="0" b="0"/>
+        </a:fillRef>
+        <a:effectRef idx="0">
+          <a:scrgbClr r="0" g="0" b="0"/>
+        </a:effectRef>
+        <a:fontRef idx="minor">
+          <a:schemeClr val="lt1"/>
+        </a:fontRef>
+      </dsp:style>
+      <dsp:txBody>
+        <a:bodyPr spcFirstLastPara="0" vert="horz" wrap="square" lIns="91440" tIns="91440" rIns="91440" bIns="91440" numCol="1" spcCol="1270" anchor="ctr" anchorCtr="0">
+          <a:noAutofit/>
+        </a:bodyPr>
+        <a:lstStyle/>
+        <a:p>
+          <a:pPr lvl="0" algn="ctr" defTabSz="1066800">
+            <a:lnSpc>
+              <a:spcPct val="90000"/>
+            </a:lnSpc>
+            <a:spcBef>
+              <a:spcPct val="0"/>
+            </a:spcBef>
+            <a:spcAft>
+              <a:spcPct val="35000"/>
+            </a:spcAft>
+          </a:pPr>
+          <a:r>
+            <a:rPr lang="pt-BR" sz="2400" kern="1200" dirty="0" err="1" smtClean="0"/>
+            <a:t>Capacity</a:t>
+          </a:r>
+          <a:r>
+            <a:rPr lang="pt-BR" sz="2400" kern="1200" dirty="0" smtClean="0"/>
+            <a:t> </a:t>
+          </a:r>
+          <a:r>
+            <a:rPr lang="pt-BR" sz="2400" kern="1200" dirty="0" err="1" smtClean="0"/>
+            <a:t>Assesment</a:t>
+          </a:r>
+          <a:r>
+            <a:rPr lang="pt-BR" sz="2400" kern="1200" dirty="0" smtClean="0"/>
+            <a:t> </a:t>
+          </a:r>
+          <a:r>
+            <a:rPr lang="pt-BR" sz="2400" kern="1200" dirty="0" err="1" smtClean="0"/>
+            <a:t>Process</a:t>
+          </a:r>
+          <a:endParaRPr lang="pt-BR" sz="2400" kern="1200" dirty="0"/>
+        </a:p>
+      </dsp:txBody>
+      <dsp:txXfrm>
+        <a:off x="30747" y="30747"/>
+        <a:ext cx="2850829" cy="988270"/>
       </dsp:txXfrm>
     </dsp:sp>
   </dsp:spTree>
@@ -6244,6 +7399,528 @@
 </dgm:layoutDef>
 </file>
 
+<file path=ppt/diagrams/layout4.xml><?xml version="1.0" encoding="utf-8"?>
+<dgm:layoutDef xmlns:dgm="http://schemas.openxmlformats.org/drawingml/2006/diagram" xmlns:a="http://schemas.openxmlformats.org/drawingml/2006/main" uniqueId="urn:microsoft.com/office/officeart/2005/8/layout/hierarchy4">
+  <dgm:title val=""/>
+  <dgm:desc val=""/>
+  <dgm:catLst>
+    <dgm:cat type="hierarchy" pri="4000"/>
+    <dgm:cat type="list" pri="24000"/>
+    <dgm:cat type="relationship" pri="10000"/>
+  </dgm:catLst>
+  <dgm:sampData>
+    <dgm:dataModel>
+      <dgm:ptLst>
+        <dgm:pt modelId="0" type="doc"/>
+        <dgm:pt modelId="1">
+          <dgm:prSet phldr="1"/>
+        </dgm:pt>
+        <dgm:pt modelId="2">
+          <dgm:prSet phldr="1"/>
+        </dgm:pt>
+        <dgm:pt modelId="21">
+          <dgm:prSet phldr="1"/>
+        </dgm:pt>
+        <dgm:pt modelId="22">
+          <dgm:prSet phldr="1"/>
+        </dgm:pt>
+        <dgm:pt modelId="3">
+          <dgm:prSet phldr="1"/>
+        </dgm:pt>
+        <dgm:pt modelId="31">
+          <dgm:prSet phldr="1"/>
+        </dgm:pt>
+      </dgm:ptLst>
+      <dgm:cxnLst>
+        <dgm:cxn modelId="4" srcId="0" destId="1" srcOrd="0" destOrd="0"/>
+        <dgm:cxn modelId="5" srcId="1" destId="2" srcOrd="0" destOrd="0"/>
+        <dgm:cxn modelId="6" srcId="1" destId="3" srcOrd="1" destOrd="0"/>
+        <dgm:cxn modelId="23" srcId="2" destId="21" srcOrd="0" destOrd="0"/>
+        <dgm:cxn modelId="24" srcId="2" destId="22" srcOrd="1" destOrd="0"/>
+        <dgm:cxn modelId="33" srcId="3" destId="31" srcOrd="0" destOrd="0"/>
+      </dgm:cxnLst>
+      <dgm:bg/>
+      <dgm:whole/>
+    </dgm:dataModel>
+  </dgm:sampData>
+  <dgm:styleData>
+    <dgm:dataModel>
+      <dgm:ptLst>
+        <dgm:pt modelId="0" type="doc"/>
+        <dgm:pt modelId="1"/>
+        <dgm:pt modelId="11"/>
+        <dgm:pt modelId="12"/>
+      </dgm:ptLst>
+      <dgm:cxnLst>
+        <dgm:cxn modelId="2" srcId="0" destId="1" srcOrd="0" destOrd="0"/>
+        <dgm:cxn modelId="13" srcId="1" destId="11" srcOrd="0" destOrd="0"/>
+        <dgm:cxn modelId="14" srcId="1" destId="12" srcOrd="1" destOrd="0"/>
+      </dgm:cxnLst>
+      <dgm:bg/>
+      <dgm:whole/>
+    </dgm:dataModel>
+  </dgm:styleData>
+  <dgm:clrData>
+    <dgm:dataModel>
+      <dgm:ptLst>
+        <dgm:pt modelId="0" type="doc"/>
+        <dgm:pt modelId="1"/>
+        <dgm:pt modelId="2"/>
+        <dgm:pt modelId="21"/>
+        <dgm:pt modelId="211"/>
+        <dgm:pt modelId="3"/>
+        <dgm:pt modelId="31"/>
+        <dgm:pt modelId="311"/>
+      </dgm:ptLst>
+      <dgm:cxnLst>
+        <dgm:cxn modelId="4" srcId="0" destId="1" srcOrd="0" destOrd="0"/>
+        <dgm:cxn modelId="5" srcId="1" destId="2" srcOrd="0" destOrd="0"/>
+        <dgm:cxn modelId="6" srcId="1" destId="3" srcOrd="1" destOrd="0"/>
+        <dgm:cxn modelId="23" srcId="2" destId="21" srcOrd="0" destOrd="0"/>
+        <dgm:cxn modelId="24" srcId="21" destId="211" srcOrd="0" destOrd="0"/>
+        <dgm:cxn modelId="33" srcId="3" destId="31" srcOrd="0" destOrd="0"/>
+        <dgm:cxn modelId="34" srcId="31" destId="311" srcOrd="0" destOrd="0"/>
+      </dgm:cxnLst>
+      <dgm:bg/>
+      <dgm:whole/>
+    </dgm:dataModel>
+  </dgm:clrData>
+  <dgm:layoutNode name="Name0">
+    <dgm:varLst>
+      <dgm:chPref val="1"/>
+      <dgm:dir/>
+      <dgm:animOne val="branch"/>
+      <dgm:animLvl val="lvl"/>
+      <dgm:resizeHandles/>
+    </dgm:varLst>
+    <dgm:choose name="Name1">
+      <dgm:if name="Name2" func="var" arg="dir" op="equ" val="norm">
+        <dgm:alg type="lin">
+          <dgm:param type="linDir" val="fromL"/>
+          <dgm:param type="nodeVertAlign" val="t"/>
+        </dgm:alg>
+      </dgm:if>
+      <dgm:else name="Name3">
+        <dgm:alg type="lin">
+          <dgm:param type="linDir" val="fromR"/>
+          <dgm:param type="nodeVertAlign" val="t"/>
+        </dgm:alg>
+      </dgm:else>
+    </dgm:choose>
+    <dgm:shape xmlns:r="http://schemas.openxmlformats.org/officeDocument/2006/relationships" r:blip="">
+      <dgm:adjLst/>
+    </dgm:shape>
+    <dgm:presOf/>
+    <dgm:constrLst>
+      <dgm:constr type="w" for="ch" forName="vertOne" refType="w"/>
+      <dgm:constr type="w" for="des" forName="horzOne" refType="w"/>
+      <dgm:constr type="w" for="des" forName="txOne" refType="w"/>
+      <dgm:constr type="w" for="des" forName="vertTwo" refType="w"/>
+      <dgm:constr type="w" for="des" forName="horzTwo" refType="w"/>
+      <dgm:constr type="w" for="des" forName="txTwo" refType="w"/>
+      <dgm:constr type="w" for="des" forName="vertThree" refType="w"/>
+      <dgm:constr type="w" for="des" forName="horzThree" refType="w"/>
+      <dgm:constr type="w" for="des" forName="txThree" refType="w"/>
+      <dgm:constr type="w" for="des" forName="vertFour" refType="w"/>
+      <dgm:constr type="w" for="des" forName="horzFour" refType="w"/>
+      <dgm:constr type="w" for="des" forName="txFour" refType="w"/>
+      <dgm:constr type="h" for="des" ptType="node" op="equ"/>
+      <dgm:constr type="h" for="des" forName="txOne" refType="h"/>
+      <dgm:constr type="userH" for="des" ptType="node" refType="h" refFor="des" refForName="txOne"/>
+      <dgm:constr type="primFontSz" for="des" forName="txOne" val="65"/>
+      <dgm:constr type="primFontSz" for="des" forName="txTwo" val="65"/>
+      <dgm:constr type="primFontSz" for="des" forName="txTwo" refType="primFontSz" refFor="des" refForName="txOne" op="lte"/>
+      <dgm:constr type="primFontSz" for="des" forName="txThree" val="65"/>
+      <dgm:constr type="primFontSz" for="des" forName="txThree" refType="primFontSz" refFor="des" refForName="txOne" op="lte"/>
+      <dgm:constr type="primFontSz" for="des" forName="txThree" refType="primFontSz" refFor="des" refForName="txTwo" op="lte"/>
+      <dgm:constr type="primFontSz" for="des" forName="txFour" val="65"/>
+      <dgm:constr type="primFontSz" for="des" forName="txFour" refType="primFontSz" refFor="des" refForName="txOne" op="lte"/>
+      <dgm:constr type="primFontSz" for="des" forName="txFour" refType="primFontSz" refFor="des" refForName="txTwo" op="lte"/>
+      <dgm:constr type="primFontSz" for="des" forName="txFour" refType="primFontSz" refFor="des" refForName="txThree" op="lte"/>
+      <dgm:constr type="w" for="des" forName="sibSpaceOne" refType="w" fact="0.168"/>
+      <dgm:constr type="w" for="des" forName="sibSpaceTwo" refType="w" refFor="des" refForName="sibSpaceOne" op="equ" fact="0.5"/>
+      <dgm:constr type="w" for="des" forName="sibSpaceThree" refType="w" refFor="des" refForName="sibSpaceTwo" op="equ" fact="0.5"/>
+      <dgm:constr type="w" for="des" forName="sibSpaceFour" refType="w" refFor="des" refForName="sibSpaceThree" op="equ" fact="0.5"/>
+      <dgm:constr type="h" for="des" forName="parTransOne" refType="w" fact="0.056"/>
+      <dgm:constr type="h" for="des" forName="parTransTwo" refType="h" refFor="des" refForName="parTransOne" op="equ"/>
+      <dgm:constr type="h" for="des" forName="parTransThree" refType="h" refFor="des" refForName="parTransTwo" op="equ"/>
+      <dgm:constr type="h" for="des" forName="parTransFour" refType="h" refFor="des" refForName="parTransThree" op="equ"/>
+    </dgm:constrLst>
+    <dgm:ruleLst/>
+    <dgm:forEach name="Name4" axis="ch" ptType="node">
+      <dgm:layoutNode name="vertOne">
+        <dgm:alg type="lin">
+          <dgm:param type="linDir" val="fromT"/>
+        </dgm:alg>
+        <dgm:shape xmlns:r="http://schemas.openxmlformats.org/officeDocument/2006/relationships" r:blip="">
+          <dgm:adjLst/>
+        </dgm:shape>
+        <dgm:presOf/>
+        <dgm:constrLst>
+          <dgm:constr type="w" for="ch" forName="txOne" refType="w" refFor="ch" refForName="horzOne" op="gte"/>
+        </dgm:constrLst>
+        <dgm:ruleLst/>
+        <dgm:layoutNode name="txOne" styleLbl="node0">
+          <dgm:varLst>
+            <dgm:chPref val="3"/>
+          </dgm:varLst>
+          <dgm:alg type="tx"/>
+          <dgm:shape xmlns:r="http://schemas.openxmlformats.org/officeDocument/2006/relationships" type="roundRect" r:blip="">
+            <dgm:adjLst>
+              <dgm:adj idx="1" val="0.1"/>
+            </dgm:adjLst>
+          </dgm:shape>
+          <dgm:presOf axis="self"/>
+          <dgm:constrLst>
+            <dgm:constr type="tMarg" refType="primFontSz" fact="0.3"/>
+            <dgm:constr type="bMarg" refType="primFontSz" fact="0.3"/>
+            <dgm:constr type="lMarg" refType="primFontSz" fact="0.3"/>
+            <dgm:constr type="rMarg" refType="primFontSz" fact="0.3"/>
+          </dgm:constrLst>
+          <dgm:ruleLst>
+            <dgm:rule type="primFontSz" val="5" fact="NaN" max="NaN"/>
+          </dgm:ruleLst>
+        </dgm:layoutNode>
+        <dgm:choose name="Name5">
+          <dgm:if name="Name6" axis="des" ptType="node" func="cnt" op="gt" val="0">
+            <dgm:layoutNode name="parTransOne">
+              <dgm:alg type="sp"/>
+              <dgm:shape xmlns:r="http://schemas.openxmlformats.org/officeDocument/2006/relationships" r:blip="">
+                <dgm:adjLst/>
+              </dgm:shape>
+              <dgm:presOf/>
+              <dgm:constrLst/>
+              <dgm:ruleLst/>
+            </dgm:layoutNode>
+          </dgm:if>
+          <dgm:else name="Name7"/>
+        </dgm:choose>
+        <dgm:layoutNode name="horzOne">
+          <dgm:choose name="Name8">
+            <dgm:if name="Name9" func="var" arg="dir" op="equ" val="norm">
+              <dgm:alg type="lin">
+                <dgm:param type="linDir" val="fromL"/>
+                <dgm:param type="nodeVertAlign" val="t"/>
+              </dgm:alg>
+            </dgm:if>
+            <dgm:else name="Name10">
+              <dgm:alg type="lin">
+                <dgm:param type="linDir" val="fromR"/>
+                <dgm:param type="nodeVertAlign" val="t"/>
+              </dgm:alg>
+            </dgm:else>
+          </dgm:choose>
+          <dgm:shape xmlns:r="http://schemas.openxmlformats.org/officeDocument/2006/relationships" r:blip="">
+            <dgm:adjLst/>
+          </dgm:shape>
+          <dgm:presOf/>
+          <dgm:constrLst/>
+          <dgm:ruleLst>
+            <dgm:rule type="w" val="INF" fact="NaN" max="NaN"/>
+          </dgm:ruleLst>
+          <dgm:forEach name="Name11" axis="ch" ptType="node">
+            <dgm:layoutNode name="vertTwo">
+              <dgm:alg type="lin">
+                <dgm:param type="linDir" val="fromT"/>
+              </dgm:alg>
+              <dgm:shape xmlns:r="http://schemas.openxmlformats.org/officeDocument/2006/relationships" r:blip="">
+                <dgm:adjLst/>
+              </dgm:shape>
+              <dgm:presOf/>
+              <dgm:constrLst>
+                <dgm:constr type="w" for="ch" forName="txTwo" refType="w" refFor="ch" refForName="horzTwo" op="gte"/>
+              </dgm:constrLst>
+              <dgm:ruleLst/>
+              <dgm:layoutNode name="txTwo">
+                <dgm:varLst>
+                  <dgm:chPref val="3"/>
+                </dgm:varLst>
+                <dgm:alg type="tx"/>
+                <dgm:shape xmlns:r="http://schemas.openxmlformats.org/officeDocument/2006/relationships" type="roundRect" r:blip="">
+                  <dgm:adjLst>
+                    <dgm:adj idx="1" val="0.1"/>
+                  </dgm:adjLst>
+                </dgm:shape>
+                <dgm:presOf axis="self"/>
+                <dgm:constrLst>
+                  <dgm:constr type="userH"/>
+                  <dgm:constr type="h" refType="userH"/>
+                  <dgm:constr type="tMarg" refType="primFontSz" fact="0.3"/>
+                  <dgm:constr type="bMarg" refType="primFontSz" fact="0.3"/>
+                  <dgm:constr type="lMarg" refType="primFontSz" fact="0.3"/>
+                  <dgm:constr type="rMarg" refType="primFontSz" fact="0.3"/>
+                </dgm:constrLst>
+                <dgm:ruleLst>
+                  <dgm:rule type="primFontSz" val="5" fact="NaN" max="NaN"/>
+                </dgm:ruleLst>
+              </dgm:layoutNode>
+              <dgm:choose name="Name12">
+                <dgm:if name="Name13" axis="des" ptType="node" func="cnt" op="gt" val="0">
+                  <dgm:layoutNode name="parTransTwo">
+                    <dgm:alg type="sp"/>
+                    <dgm:shape xmlns:r="http://schemas.openxmlformats.org/officeDocument/2006/relationships" r:blip="">
+                      <dgm:adjLst/>
+                    </dgm:shape>
+                    <dgm:presOf/>
+                    <dgm:constrLst/>
+                    <dgm:ruleLst/>
+                  </dgm:layoutNode>
+                </dgm:if>
+                <dgm:else name="Name14"/>
+              </dgm:choose>
+              <dgm:layoutNode name="horzTwo">
+                <dgm:choose name="Name15">
+                  <dgm:if name="Name16" func="var" arg="dir" op="equ" val="norm">
+                    <dgm:alg type="lin">
+                      <dgm:param type="linDir" val="fromL"/>
+                      <dgm:param type="nodeVertAlign" val="t"/>
+                    </dgm:alg>
+                  </dgm:if>
+                  <dgm:else name="Name17">
+                    <dgm:alg type="lin">
+                      <dgm:param type="linDir" val="fromR"/>
+                      <dgm:param type="nodeVertAlign" val="t"/>
+                    </dgm:alg>
+                  </dgm:else>
+                </dgm:choose>
+                <dgm:shape xmlns:r="http://schemas.openxmlformats.org/officeDocument/2006/relationships" r:blip="">
+                  <dgm:adjLst/>
+                </dgm:shape>
+                <dgm:presOf/>
+                <dgm:constrLst/>
+                <dgm:ruleLst>
+                  <dgm:rule type="w" val="INF" fact="NaN" max="NaN"/>
+                </dgm:ruleLst>
+                <dgm:forEach name="Name18" axis="ch" ptType="node">
+                  <dgm:layoutNode name="vertThree">
+                    <dgm:alg type="lin">
+                      <dgm:param type="linDir" val="fromT"/>
+                    </dgm:alg>
+                    <dgm:shape xmlns:r="http://schemas.openxmlformats.org/officeDocument/2006/relationships" r:blip="">
+                      <dgm:adjLst/>
+                    </dgm:shape>
+                    <dgm:presOf/>
+                    <dgm:constrLst>
+                      <dgm:constr type="w" for="ch" forName="txThree" refType="w" refFor="ch" refForName="horzThree" op="gte"/>
+                    </dgm:constrLst>
+                    <dgm:ruleLst/>
+                    <dgm:layoutNode name="txThree">
+                      <dgm:varLst>
+                        <dgm:chPref val="3"/>
+                      </dgm:varLst>
+                      <dgm:alg type="tx"/>
+                      <dgm:shape xmlns:r="http://schemas.openxmlformats.org/officeDocument/2006/relationships" type="roundRect" r:blip="">
+                        <dgm:adjLst>
+                          <dgm:adj idx="1" val="0.1"/>
+                        </dgm:adjLst>
+                      </dgm:shape>
+                      <dgm:presOf axis="self"/>
+                      <dgm:constrLst>
+                        <dgm:constr type="userH"/>
+                        <dgm:constr type="h" refType="userH"/>
+                        <dgm:constr type="tMarg" refType="primFontSz" fact="0.3"/>
+                        <dgm:constr type="bMarg" refType="primFontSz" fact="0.3"/>
+                        <dgm:constr type="lMarg" refType="primFontSz" fact="0.3"/>
+                        <dgm:constr type="rMarg" refType="primFontSz" fact="0.3"/>
+                      </dgm:constrLst>
+                      <dgm:ruleLst>
+                        <dgm:rule type="primFontSz" val="5" fact="NaN" max="NaN"/>
+                      </dgm:ruleLst>
+                    </dgm:layoutNode>
+                    <dgm:choose name="Name19">
+                      <dgm:if name="Name20" axis="des" ptType="node" func="cnt" op="gt" val="0">
+                        <dgm:layoutNode name="parTransThree">
+                          <dgm:alg type="sp"/>
+                          <dgm:shape xmlns:r="http://schemas.openxmlformats.org/officeDocument/2006/relationships" r:blip="">
+                            <dgm:adjLst/>
+                          </dgm:shape>
+                          <dgm:presOf/>
+                          <dgm:constrLst/>
+                          <dgm:ruleLst/>
+                        </dgm:layoutNode>
+                      </dgm:if>
+                      <dgm:else name="Name21"/>
+                    </dgm:choose>
+                    <dgm:layoutNode name="horzThree">
+                      <dgm:choose name="Name22">
+                        <dgm:if name="Name23" func="var" arg="dir" op="equ" val="norm">
+                          <dgm:alg type="lin">
+                            <dgm:param type="linDir" val="fromL"/>
+                            <dgm:param type="nodeVertAlign" val="t"/>
+                          </dgm:alg>
+                        </dgm:if>
+                        <dgm:else name="Name24">
+                          <dgm:alg type="lin">
+                            <dgm:param type="linDir" val="fromR"/>
+                            <dgm:param type="nodeVertAlign" val="t"/>
+                          </dgm:alg>
+                        </dgm:else>
+                      </dgm:choose>
+                      <dgm:shape xmlns:r="http://schemas.openxmlformats.org/officeDocument/2006/relationships" r:blip="">
+                        <dgm:adjLst/>
+                      </dgm:shape>
+                      <dgm:presOf/>
+                      <dgm:constrLst/>
+                      <dgm:ruleLst>
+                        <dgm:rule type="w" val="INF" fact="NaN" max="NaN"/>
+                      </dgm:ruleLst>
+                      <dgm:forEach name="repeat" axis="ch" ptType="node">
+                        <dgm:layoutNode name="vertFour">
+                          <dgm:varLst>
+                            <dgm:chPref val="3"/>
+                          </dgm:varLst>
+                          <dgm:alg type="lin">
+                            <dgm:param type="linDir" val="fromT"/>
+                          </dgm:alg>
+                          <dgm:shape xmlns:r="http://schemas.openxmlformats.org/officeDocument/2006/relationships" r:blip="">
+                            <dgm:adjLst/>
+                          </dgm:shape>
+                          <dgm:presOf/>
+                          <dgm:constrLst>
+                            <dgm:constr type="w" for="ch" forName="txFour" refType="w" refFor="ch" refForName="horzFour" op="gte"/>
+                          </dgm:constrLst>
+                          <dgm:ruleLst/>
+                          <dgm:layoutNode name="txFour">
+                            <dgm:varLst>
+                              <dgm:chPref val="3"/>
+                            </dgm:varLst>
+                            <dgm:alg type="tx"/>
+                            <dgm:shape xmlns:r="http://schemas.openxmlformats.org/officeDocument/2006/relationships" type="roundRect" r:blip="">
+                              <dgm:adjLst>
+                                <dgm:adj idx="1" val="0.1"/>
+                              </dgm:adjLst>
+                            </dgm:shape>
+                            <dgm:presOf axis="self"/>
+                            <dgm:constrLst>
+                              <dgm:constr type="userH"/>
+                              <dgm:constr type="h" refType="userH"/>
+                              <dgm:constr type="tMarg" refType="primFontSz" fact="0.3"/>
+                              <dgm:constr type="bMarg" refType="primFontSz" fact="0.3"/>
+                              <dgm:constr type="lMarg" refType="primFontSz" fact="0.3"/>
+                              <dgm:constr type="rMarg" refType="primFontSz" fact="0.3"/>
+                            </dgm:constrLst>
+                            <dgm:ruleLst>
+                              <dgm:rule type="primFontSz" val="5" fact="NaN" max="NaN"/>
+                            </dgm:ruleLst>
+                          </dgm:layoutNode>
+                          <dgm:choose name="Name25">
+                            <dgm:if name="Name26" axis="des" ptType="node" func="cnt" op="gt" val="0">
+                              <dgm:layoutNode name="parTransFour">
+                                <dgm:alg type="sp"/>
+                                <dgm:shape xmlns:r="http://schemas.openxmlformats.org/officeDocument/2006/relationships" r:blip="">
+                                  <dgm:adjLst/>
+                                </dgm:shape>
+                                <dgm:presOf/>
+                                <dgm:constrLst/>
+                                <dgm:ruleLst/>
+                              </dgm:layoutNode>
+                            </dgm:if>
+                            <dgm:else name="Name27"/>
+                          </dgm:choose>
+                          <dgm:layoutNode name="horzFour">
+                            <dgm:choose name="Name28">
+                              <dgm:if name="Name29" func="var" arg="dir" op="equ" val="norm">
+                                <dgm:alg type="lin">
+                                  <dgm:param type="linDir" val="fromL"/>
+                                  <dgm:param type="nodeVertAlign" val="t"/>
+                                </dgm:alg>
+                              </dgm:if>
+                              <dgm:else name="Name30">
+                                <dgm:alg type="lin">
+                                  <dgm:param type="linDir" val="fromR"/>
+                                  <dgm:param type="nodeVertAlign" val="t"/>
+                                </dgm:alg>
+                              </dgm:else>
+                            </dgm:choose>
+                            <dgm:shape xmlns:r="http://schemas.openxmlformats.org/officeDocument/2006/relationships" r:blip="">
+                              <dgm:adjLst/>
+                            </dgm:shape>
+                            <dgm:presOf/>
+                            <dgm:constrLst/>
+                            <dgm:ruleLst>
+                              <dgm:rule type="w" val="INF" fact="NaN" max="NaN"/>
+                            </dgm:ruleLst>
+                            <dgm:forEach name="Name31" ref="repeat"/>
+                          </dgm:layoutNode>
+                        </dgm:layoutNode>
+                        <dgm:choose name="Name32">
+                          <dgm:if name="Name33" axis="self" ptType="node" func="revPos" op="gte" val="2">
+                            <dgm:forEach name="Name34" axis="followSib" ptType="sibTrans" cnt="1">
+                              <dgm:layoutNode name="sibSpaceFour">
+                                <dgm:alg type="sp"/>
+                                <dgm:shape xmlns:r="http://schemas.openxmlformats.org/officeDocument/2006/relationships" r:blip="">
+                                  <dgm:adjLst/>
+                                </dgm:shape>
+                                <dgm:presOf/>
+                                <dgm:constrLst/>
+                                <dgm:ruleLst/>
+                              </dgm:layoutNode>
+                            </dgm:forEach>
+                          </dgm:if>
+                          <dgm:else name="Name35"/>
+                        </dgm:choose>
+                      </dgm:forEach>
+                    </dgm:layoutNode>
+                  </dgm:layoutNode>
+                  <dgm:choose name="Name36">
+                    <dgm:if name="Name37" axis="self" ptType="node" func="revPos" op="gte" val="2">
+                      <dgm:forEach name="Name38" axis="followSib" ptType="sibTrans" cnt="1">
+                        <dgm:layoutNode name="sibSpaceThree">
+                          <dgm:alg type="sp"/>
+                          <dgm:shape xmlns:r="http://schemas.openxmlformats.org/officeDocument/2006/relationships" r:blip="">
+                            <dgm:adjLst/>
+                          </dgm:shape>
+                          <dgm:presOf/>
+                          <dgm:constrLst/>
+                          <dgm:ruleLst/>
+                        </dgm:layoutNode>
+                      </dgm:forEach>
+                    </dgm:if>
+                    <dgm:else name="Name39"/>
+                  </dgm:choose>
+                </dgm:forEach>
+              </dgm:layoutNode>
+            </dgm:layoutNode>
+            <dgm:choose name="Name40">
+              <dgm:if name="Name41" axis="self" ptType="node" func="revPos" op="gte" val="2">
+                <dgm:forEach name="Name42" axis="followSib" ptType="sibTrans" cnt="1">
+                  <dgm:layoutNode name="sibSpaceTwo">
+                    <dgm:alg type="sp"/>
+                    <dgm:shape xmlns:r="http://schemas.openxmlformats.org/officeDocument/2006/relationships" r:blip="">
+                      <dgm:adjLst/>
+                    </dgm:shape>
+                    <dgm:presOf/>
+                    <dgm:constrLst/>
+                    <dgm:ruleLst/>
+                  </dgm:layoutNode>
+                </dgm:forEach>
+              </dgm:if>
+              <dgm:else name="Name43"/>
+            </dgm:choose>
+          </dgm:forEach>
+        </dgm:layoutNode>
+      </dgm:layoutNode>
+      <dgm:choose name="Name44">
+        <dgm:if name="Name45" axis="self" ptType="node" func="revPos" op="gte" val="2">
+          <dgm:forEach name="Name46" axis="followSib" ptType="sibTrans" cnt="1">
+            <dgm:layoutNode name="sibSpaceOne">
+              <dgm:alg type="sp"/>
+              <dgm:shape xmlns:r="http://schemas.openxmlformats.org/officeDocument/2006/relationships" r:blip="">
+                <dgm:adjLst/>
+              </dgm:shape>
+              <dgm:presOf/>
+              <dgm:constrLst/>
+              <dgm:ruleLst/>
+            </dgm:layoutNode>
+          </dgm:forEach>
+        </dgm:if>
+        <dgm:else name="Name47"/>
+      </dgm:choose>
+    </dgm:forEach>
+  </dgm:layoutNode>
+</dgm:layoutDef>
+</file>
+
 <file path=ppt/diagrams/quickStyle1.xml><?xml version="1.0" encoding="utf-8"?>
 <dgm:styleDef xmlns:dgm="http://schemas.openxmlformats.org/drawingml/2006/diagram" xmlns:a="http://schemas.openxmlformats.org/drawingml/2006/main" uniqueId="urn:microsoft.com/office/officeart/2005/8/quickstyle/simple1">
   <dgm:title val=""/>
@@ -8313,6 +9990,1040 @@
 </file>
 
 <file path=ppt/diagrams/quickStyle3.xml><?xml version="1.0" encoding="utf-8"?>
+<dgm:styleDef xmlns:dgm="http://schemas.openxmlformats.org/drawingml/2006/diagram" xmlns:a="http://schemas.openxmlformats.org/drawingml/2006/main" uniqueId="urn:microsoft.com/office/officeart/2005/8/quickstyle/simple1">
+  <dgm:title val=""/>
+  <dgm:desc val=""/>
+  <dgm:catLst>
+    <dgm:cat type="simple" pri="10100"/>
+  </dgm:catLst>
+  <dgm:scene3d>
+    <a:camera prst="orthographicFront"/>
+    <a:lightRig rig="threePt" dir="t"/>
+  </dgm:scene3d>
+  <dgm:styleLbl name="node0">
+    <dgm:scene3d>
+      <a:camera prst="orthographicFront"/>
+      <a:lightRig rig="threePt" dir="t"/>
+    </dgm:scene3d>
+    <dgm:sp3d/>
+    <dgm:txPr/>
+    <dgm:style>
+      <a:lnRef idx="2">
+        <a:scrgbClr r="0" g="0" b="0"/>
+      </a:lnRef>
+      <a:fillRef idx="1">
+        <a:scrgbClr r="0" g="0" b="0"/>
+      </a:fillRef>
+      <a:effectRef idx="0">
+        <a:scrgbClr r="0" g="0" b="0"/>
+      </a:effectRef>
+      <a:fontRef idx="minor">
+        <a:schemeClr val="lt1"/>
+      </a:fontRef>
+    </dgm:style>
+  </dgm:styleLbl>
+  <dgm:styleLbl name="lnNode1">
+    <dgm:scene3d>
+      <a:camera prst="orthographicFront"/>
+      <a:lightRig rig="threePt" dir="t"/>
+    </dgm:scene3d>
+    <dgm:sp3d/>
+    <dgm:txPr/>
+    <dgm:style>
+      <a:lnRef idx="2">
+        <a:scrgbClr r="0" g="0" b="0"/>
+      </a:lnRef>
+      <a:fillRef idx="1">
+        <a:scrgbClr r="0" g="0" b="0"/>
+      </a:fillRef>
+      <a:effectRef idx="0">
+        <a:scrgbClr r="0" g="0" b="0"/>
+      </a:effectRef>
+      <a:fontRef idx="minor">
+        <a:schemeClr val="lt1"/>
+      </a:fontRef>
+    </dgm:style>
+  </dgm:styleLbl>
+  <dgm:styleLbl name="vennNode1">
+    <dgm:scene3d>
+      <a:camera prst="orthographicFront"/>
+      <a:lightRig rig="threePt" dir="t"/>
+    </dgm:scene3d>
+    <dgm:sp3d/>
+    <dgm:txPr/>
+    <dgm:style>
+      <a:lnRef idx="2">
+        <a:scrgbClr r="0" g="0" b="0"/>
+      </a:lnRef>
+      <a:fillRef idx="1">
+        <a:scrgbClr r="0" g="0" b="0"/>
+      </a:fillRef>
+      <a:effectRef idx="0">
+        <a:scrgbClr r="0" g="0" b="0"/>
+      </a:effectRef>
+      <a:fontRef idx="minor">
+        <a:schemeClr val="tx1"/>
+      </a:fontRef>
+    </dgm:style>
+  </dgm:styleLbl>
+  <dgm:styleLbl name="alignNode1">
+    <dgm:scene3d>
+      <a:camera prst="orthographicFront"/>
+      <a:lightRig rig="threePt" dir="t"/>
+    </dgm:scene3d>
+    <dgm:sp3d/>
+    <dgm:txPr/>
+    <dgm:style>
+      <a:lnRef idx="2">
+        <a:scrgbClr r="0" g="0" b="0"/>
+      </a:lnRef>
+      <a:fillRef idx="1">
+        <a:scrgbClr r="0" g="0" b="0"/>
+      </a:fillRef>
+      <a:effectRef idx="0">
+        <a:scrgbClr r="0" g="0" b="0"/>
+      </a:effectRef>
+      <a:fontRef idx="minor">
+        <a:schemeClr val="lt1"/>
+      </a:fontRef>
+    </dgm:style>
+  </dgm:styleLbl>
+  <dgm:styleLbl name="node1">
+    <dgm:scene3d>
+      <a:camera prst="orthographicFront"/>
+      <a:lightRig rig="threePt" dir="t"/>
+    </dgm:scene3d>
+    <dgm:sp3d/>
+    <dgm:txPr/>
+    <dgm:style>
+      <a:lnRef idx="2">
+        <a:scrgbClr r="0" g="0" b="0"/>
+      </a:lnRef>
+      <a:fillRef idx="1">
+        <a:scrgbClr r="0" g="0" b="0"/>
+      </a:fillRef>
+      <a:effectRef idx="0">
+        <a:scrgbClr r="0" g="0" b="0"/>
+      </a:effectRef>
+      <a:fontRef idx="minor">
+        <a:schemeClr val="lt1"/>
+      </a:fontRef>
+    </dgm:style>
+  </dgm:styleLbl>
+  <dgm:styleLbl name="node2">
+    <dgm:scene3d>
+      <a:camera prst="orthographicFront"/>
+      <a:lightRig rig="threePt" dir="t"/>
+    </dgm:scene3d>
+    <dgm:sp3d/>
+    <dgm:txPr/>
+    <dgm:style>
+      <a:lnRef idx="2">
+        <a:scrgbClr r="0" g="0" b="0"/>
+      </a:lnRef>
+      <a:fillRef idx="1">
+        <a:scrgbClr r="0" g="0" b="0"/>
+      </a:fillRef>
+      <a:effectRef idx="0">
+        <a:scrgbClr r="0" g="0" b="0"/>
+      </a:effectRef>
+      <a:fontRef idx="minor">
+        <a:schemeClr val="lt1"/>
+      </a:fontRef>
+    </dgm:style>
+  </dgm:styleLbl>
+  <dgm:styleLbl name="node3">
+    <dgm:scene3d>
+      <a:camera prst="orthographicFront"/>
+      <a:lightRig rig="threePt" dir="t"/>
+    </dgm:scene3d>
+    <dgm:sp3d/>
+    <dgm:txPr/>
+    <dgm:style>
+      <a:lnRef idx="2">
+        <a:scrgbClr r="0" g="0" b="0"/>
+      </a:lnRef>
+      <a:fillRef idx="1">
+        <a:scrgbClr r="0" g="0" b="0"/>
+      </a:fillRef>
+      <a:effectRef idx="0">
+        <a:scrgbClr r="0" g="0" b="0"/>
+      </a:effectRef>
+      <a:fontRef idx="minor">
+        <a:schemeClr val="lt1"/>
+      </a:fontRef>
+    </dgm:style>
+  </dgm:styleLbl>
+  <dgm:styleLbl name="node4">
+    <dgm:scene3d>
+      <a:camera prst="orthographicFront"/>
+      <a:lightRig rig="threePt" dir="t"/>
+    </dgm:scene3d>
+    <dgm:sp3d/>
+    <dgm:txPr/>
+    <dgm:style>
+      <a:lnRef idx="2">
+        <a:scrgbClr r="0" g="0" b="0"/>
+      </a:lnRef>
+      <a:fillRef idx="1">
+        <a:scrgbClr r="0" g="0" b="0"/>
+      </a:fillRef>
+      <a:effectRef idx="0">
+        <a:scrgbClr r="0" g="0" b="0"/>
+      </a:effectRef>
+      <a:fontRef idx="minor">
+        <a:schemeClr val="lt1"/>
+      </a:fontRef>
+    </dgm:style>
+  </dgm:styleLbl>
+  <dgm:styleLbl name="fgImgPlace1">
+    <dgm:scene3d>
+      <a:camera prst="orthographicFront"/>
+      <a:lightRig rig="threePt" dir="t"/>
+    </dgm:scene3d>
+    <dgm:sp3d/>
+    <dgm:txPr/>
+    <dgm:style>
+      <a:lnRef idx="2">
+        <a:scrgbClr r="0" g="0" b="0"/>
+      </a:lnRef>
+      <a:fillRef idx="1">
+        <a:scrgbClr r="0" g="0" b="0"/>
+      </a:fillRef>
+      <a:effectRef idx="0">
+        <a:scrgbClr r="0" g="0" b="0"/>
+      </a:effectRef>
+      <a:fontRef idx="minor"/>
+    </dgm:style>
+  </dgm:styleLbl>
+  <dgm:styleLbl name="alignImgPlace1">
+    <dgm:scene3d>
+      <a:camera prst="orthographicFront"/>
+      <a:lightRig rig="threePt" dir="t"/>
+    </dgm:scene3d>
+    <dgm:sp3d/>
+    <dgm:txPr/>
+    <dgm:style>
+      <a:lnRef idx="2">
+        <a:scrgbClr r="0" g="0" b="0"/>
+      </a:lnRef>
+      <a:fillRef idx="1">
+        <a:scrgbClr r="0" g="0" b="0"/>
+      </a:fillRef>
+      <a:effectRef idx="0">
+        <a:scrgbClr r="0" g="0" b="0"/>
+      </a:effectRef>
+      <a:fontRef idx="minor"/>
+    </dgm:style>
+  </dgm:styleLbl>
+  <dgm:styleLbl name="bgImgPlace1">
+    <dgm:scene3d>
+      <a:camera prst="orthographicFront"/>
+      <a:lightRig rig="threePt" dir="t"/>
+    </dgm:scene3d>
+    <dgm:sp3d/>
+    <dgm:txPr/>
+    <dgm:style>
+      <a:lnRef idx="2">
+        <a:scrgbClr r="0" g="0" b="0"/>
+      </a:lnRef>
+      <a:fillRef idx="1">
+        <a:scrgbClr r="0" g="0" b="0"/>
+      </a:fillRef>
+      <a:effectRef idx="0">
+        <a:scrgbClr r="0" g="0" b="0"/>
+      </a:effectRef>
+      <a:fontRef idx="minor"/>
+    </dgm:style>
+  </dgm:styleLbl>
+  <dgm:styleLbl name="sibTrans2D1">
+    <dgm:scene3d>
+      <a:camera prst="orthographicFront"/>
+      <a:lightRig rig="threePt" dir="t"/>
+    </dgm:scene3d>
+    <dgm:sp3d/>
+    <dgm:txPr/>
+    <dgm:style>
+      <a:lnRef idx="0">
+        <a:scrgbClr r="0" g="0" b="0"/>
+      </a:lnRef>
+      <a:fillRef idx="1">
+        <a:scrgbClr r="0" g="0" b="0"/>
+      </a:fillRef>
+      <a:effectRef idx="0">
+        <a:scrgbClr r="0" g="0" b="0"/>
+      </a:effectRef>
+      <a:fontRef idx="minor">
+        <a:schemeClr val="lt1"/>
+      </a:fontRef>
+    </dgm:style>
+  </dgm:styleLbl>
+  <dgm:styleLbl name="fgSibTrans2D1">
+    <dgm:scene3d>
+      <a:camera prst="orthographicFront"/>
+      <a:lightRig rig="threePt" dir="t"/>
+    </dgm:scene3d>
+    <dgm:sp3d/>
+    <dgm:txPr/>
+    <dgm:style>
+      <a:lnRef idx="0">
+        <a:scrgbClr r="0" g="0" b="0"/>
+      </a:lnRef>
+      <a:fillRef idx="1">
+        <a:scrgbClr r="0" g="0" b="0"/>
+      </a:fillRef>
+      <a:effectRef idx="0">
+        <a:scrgbClr r="0" g="0" b="0"/>
+      </a:effectRef>
+      <a:fontRef idx="minor">
+        <a:schemeClr val="lt1"/>
+      </a:fontRef>
+    </dgm:style>
+  </dgm:styleLbl>
+  <dgm:styleLbl name="bgSibTrans2D1">
+    <dgm:scene3d>
+      <a:camera prst="orthographicFront"/>
+      <a:lightRig rig="threePt" dir="t"/>
+    </dgm:scene3d>
+    <dgm:sp3d/>
+    <dgm:txPr/>
+    <dgm:style>
+      <a:lnRef idx="0">
+        <a:scrgbClr r="0" g="0" b="0"/>
+      </a:lnRef>
+      <a:fillRef idx="1">
+        <a:scrgbClr r="0" g="0" b="0"/>
+      </a:fillRef>
+      <a:effectRef idx="0">
+        <a:scrgbClr r="0" g="0" b="0"/>
+      </a:effectRef>
+      <a:fontRef idx="minor">
+        <a:schemeClr val="lt1"/>
+      </a:fontRef>
+    </dgm:style>
+  </dgm:styleLbl>
+  <dgm:styleLbl name="sibTrans1D1">
+    <dgm:scene3d>
+      <a:camera prst="orthographicFront"/>
+      <a:lightRig rig="threePt" dir="t"/>
+    </dgm:scene3d>
+    <dgm:sp3d/>
+    <dgm:txPr/>
+    <dgm:style>
+      <a:lnRef idx="1">
+        <a:scrgbClr r="0" g="0" b="0"/>
+      </a:lnRef>
+      <a:fillRef idx="0">
+        <a:scrgbClr r="0" g="0" b="0"/>
+      </a:fillRef>
+      <a:effectRef idx="0">
+        <a:scrgbClr r="0" g="0" b="0"/>
+      </a:effectRef>
+      <a:fontRef idx="minor"/>
+    </dgm:style>
+  </dgm:styleLbl>
+  <dgm:styleLbl name="callout">
+    <dgm:scene3d>
+      <a:camera prst="orthographicFront"/>
+      <a:lightRig rig="threePt" dir="t"/>
+    </dgm:scene3d>
+    <dgm:sp3d/>
+    <dgm:txPr/>
+    <dgm:style>
+      <a:lnRef idx="2">
+        <a:scrgbClr r="0" g="0" b="0"/>
+      </a:lnRef>
+      <a:fillRef idx="1">
+        <a:scrgbClr r="0" g="0" b="0"/>
+      </a:fillRef>
+      <a:effectRef idx="0">
+        <a:scrgbClr r="0" g="0" b="0"/>
+      </a:effectRef>
+      <a:fontRef idx="minor"/>
+    </dgm:style>
+  </dgm:styleLbl>
+  <dgm:styleLbl name="asst0">
+    <dgm:scene3d>
+      <a:camera prst="orthographicFront"/>
+      <a:lightRig rig="threePt" dir="t"/>
+    </dgm:scene3d>
+    <dgm:sp3d/>
+    <dgm:txPr/>
+    <dgm:style>
+      <a:lnRef idx="2">
+        <a:scrgbClr r="0" g="0" b="0"/>
+      </a:lnRef>
+      <a:fillRef idx="1">
+        <a:scrgbClr r="0" g="0" b="0"/>
+      </a:fillRef>
+      <a:effectRef idx="0">
+        <a:scrgbClr r="0" g="0" b="0"/>
+      </a:effectRef>
+      <a:fontRef idx="minor">
+        <a:schemeClr val="lt1"/>
+      </a:fontRef>
+    </dgm:style>
+  </dgm:styleLbl>
+  <dgm:styleLbl name="asst1">
+    <dgm:scene3d>
+      <a:camera prst="orthographicFront"/>
+      <a:lightRig rig="threePt" dir="t"/>
+    </dgm:scene3d>
+    <dgm:sp3d/>
+    <dgm:txPr/>
+    <dgm:style>
+      <a:lnRef idx="2">
+        <a:scrgbClr r="0" g="0" b="0"/>
+      </a:lnRef>
+      <a:fillRef idx="1">
+        <a:scrgbClr r="0" g="0" b="0"/>
+      </a:fillRef>
+      <a:effectRef idx="0">
+        <a:scrgbClr r="0" g="0" b="0"/>
+      </a:effectRef>
+      <a:fontRef idx="minor">
+        <a:schemeClr val="lt1"/>
+      </a:fontRef>
+    </dgm:style>
+  </dgm:styleLbl>
+  <dgm:styleLbl name="asst2">
+    <dgm:scene3d>
+      <a:camera prst="orthographicFront"/>
+      <a:lightRig rig="threePt" dir="t"/>
+    </dgm:scene3d>
+    <dgm:sp3d/>
+    <dgm:txPr/>
+    <dgm:style>
+      <a:lnRef idx="2">
+        <a:scrgbClr r="0" g="0" b="0"/>
+      </a:lnRef>
+      <a:fillRef idx="1">
+        <a:scrgbClr r="0" g="0" b="0"/>
+      </a:fillRef>
+      <a:effectRef idx="0">
+        <a:scrgbClr r="0" g="0" b="0"/>
+      </a:effectRef>
+      <a:fontRef idx="minor">
+        <a:schemeClr val="lt1"/>
+      </a:fontRef>
+    </dgm:style>
+  </dgm:styleLbl>
+  <dgm:styleLbl name="asst3">
+    <dgm:scene3d>
+      <a:camera prst="orthographicFront"/>
+      <a:lightRig rig="threePt" dir="t"/>
+    </dgm:scene3d>
+    <dgm:sp3d/>
+    <dgm:txPr/>
+    <dgm:style>
+      <a:lnRef idx="2">
+        <a:scrgbClr r="0" g="0" b="0"/>
+      </a:lnRef>
+      <a:fillRef idx="1">
+        <a:scrgbClr r="0" g="0" b="0"/>
+      </a:fillRef>
+      <a:effectRef idx="0">
+        <a:scrgbClr r="0" g="0" b="0"/>
+      </a:effectRef>
+      <a:fontRef idx="minor">
+        <a:schemeClr val="lt1"/>
+      </a:fontRef>
+    </dgm:style>
+  </dgm:styleLbl>
+  <dgm:styleLbl name="asst4">
+    <dgm:scene3d>
+      <a:camera prst="orthographicFront"/>
+      <a:lightRig rig="threePt" dir="t"/>
+    </dgm:scene3d>
+    <dgm:sp3d/>
+    <dgm:txPr/>
+    <dgm:style>
+      <a:lnRef idx="2">
+        <a:scrgbClr r="0" g="0" b="0"/>
+      </a:lnRef>
+      <a:fillRef idx="1">
+        <a:scrgbClr r="0" g="0" b="0"/>
+      </a:fillRef>
+      <a:effectRef idx="0">
+        <a:scrgbClr r="0" g="0" b="0"/>
+      </a:effectRef>
+      <a:fontRef idx="minor">
+        <a:schemeClr val="lt1"/>
+      </a:fontRef>
+    </dgm:style>
+  </dgm:styleLbl>
+  <dgm:styleLbl name="parChTrans2D1">
+    <dgm:scene3d>
+      <a:camera prst="orthographicFront"/>
+      <a:lightRig rig="threePt" dir="t"/>
+    </dgm:scene3d>
+    <dgm:sp3d/>
+    <dgm:txPr/>
+    <dgm:style>
+      <a:lnRef idx="2">
+        <a:scrgbClr r="0" g="0" b="0"/>
+      </a:lnRef>
+      <a:fillRef idx="1">
+        <a:scrgbClr r="0" g="0" b="0"/>
+      </a:fillRef>
+      <a:effectRef idx="0">
+        <a:scrgbClr r="0" g="0" b="0"/>
+      </a:effectRef>
+      <a:fontRef idx="minor">
+        <a:schemeClr val="lt1"/>
+      </a:fontRef>
+    </dgm:style>
+  </dgm:styleLbl>
+  <dgm:styleLbl name="parChTrans2D2">
+    <dgm:scene3d>
+      <a:camera prst="orthographicFront"/>
+      <a:lightRig rig="threePt" dir="t"/>
+    </dgm:scene3d>
+    <dgm:sp3d/>
+    <dgm:txPr/>
+    <dgm:style>
+      <a:lnRef idx="2">
+        <a:scrgbClr r="0" g="0" b="0"/>
+      </a:lnRef>
+      <a:fillRef idx="1">
+        <a:scrgbClr r="0" g="0" b="0"/>
+      </a:fillRef>
+      <a:effectRef idx="0">
+        <a:scrgbClr r="0" g="0" b="0"/>
+      </a:effectRef>
+      <a:fontRef idx="minor">
+        <a:schemeClr val="lt1"/>
+      </a:fontRef>
+    </dgm:style>
+  </dgm:styleLbl>
+  <dgm:styleLbl name="parChTrans2D3">
+    <dgm:scene3d>
+      <a:camera prst="orthographicFront"/>
+      <a:lightRig rig="threePt" dir="t"/>
+    </dgm:scene3d>
+    <dgm:sp3d/>
+    <dgm:txPr/>
+    <dgm:style>
+      <a:lnRef idx="2">
+        <a:scrgbClr r="0" g="0" b="0"/>
+      </a:lnRef>
+      <a:fillRef idx="1">
+        <a:scrgbClr r="0" g="0" b="0"/>
+      </a:fillRef>
+      <a:effectRef idx="0">
+        <a:scrgbClr r="0" g="0" b="0"/>
+      </a:effectRef>
+      <a:fontRef idx="minor">
+        <a:schemeClr val="lt1"/>
+      </a:fontRef>
+    </dgm:style>
+  </dgm:styleLbl>
+  <dgm:styleLbl name="parChTrans2D4">
+    <dgm:scene3d>
+      <a:camera prst="orthographicFront"/>
+      <a:lightRig rig="threePt" dir="t"/>
+    </dgm:scene3d>
+    <dgm:sp3d/>
+    <dgm:txPr/>
+    <dgm:style>
+      <a:lnRef idx="2">
+        <a:scrgbClr r="0" g="0" b="0"/>
+      </a:lnRef>
+      <a:fillRef idx="1">
+        <a:scrgbClr r="0" g="0" b="0"/>
+      </a:fillRef>
+      <a:effectRef idx="0">
+        <a:scrgbClr r="0" g="0" b="0"/>
+      </a:effectRef>
+      <a:fontRef idx="minor">
+        <a:schemeClr val="lt1"/>
+      </a:fontRef>
+    </dgm:style>
+  </dgm:styleLbl>
+  <dgm:styleLbl name="parChTrans1D1">
+    <dgm:scene3d>
+      <a:camera prst="orthographicFront"/>
+      <a:lightRig rig="threePt" dir="t"/>
+    </dgm:scene3d>
+    <dgm:sp3d/>
+    <dgm:txPr/>
+    <dgm:style>
+      <a:lnRef idx="2">
+        <a:scrgbClr r="0" g="0" b="0"/>
+      </a:lnRef>
+      <a:fillRef idx="0">
+        <a:scrgbClr r="0" g="0" b="0"/>
+      </a:fillRef>
+      <a:effectRef idx="0">
+        <a:scrgbClr r="0" g="0" b="0"/>
+      </a:effectRef>
+      <a:fontRef idx="minor"/>
+    </dgm:style>
+  </dgm:styleLbl>
+  <dgm:styleLbl name="parChTrans1D2">
+    <dgm:scene3d>
+      <a:camera prst="orthographicFront"/>
+      <a:lightRig rig="threePt" dir="t"/>
+    </dgm:scene3d>
+    <dgm:sp3d/>
+    <dgm:txPr/>
+    <dgm:style>
+      <a:lnRef idx="2">
+        <a:scrgbClr r="0" g="0" b="0"/>
+      </a:lnRef>
+      <a:fillRef idx="0">
+        <a:scrgbClr r="0" g="0" b="0"/>
+      </a:fillRef>
+      <a:effectRef idx="0">
+        <a:scrgbClr r="0" g="0" b="0"/>
+      </a:effectRef>
+      <a:fontRef idx="minor"/>
+    </dgm:style>
+  </dgm:styleLbl>
+  <dgm:styleLbl name="parChTrans1D3">
+    <dgm:scene3d>
+      <a:camera prst="orthographicFront"/>
+      <a:lightRig rig="threePt" dir="t"/>
+    </dgm:scene3d>
+    <dgm:sp3d/>
+    <dgm:txPr/>
+    <dgm:style>
+      <a:lnRef idx="2">
+        <a:scrgbClr r="0" g="0" b="0"/>
+      </a:lnRef>
+      <a:fillRef idx="0">
+        <a:scrgbClr r="0" g="0" b="0"/>
+      </a:fillRef>
+      <a:effectRef idx="0">
+        <a:scrgbClr r="0" g="0" b="0"/>
+      </a:effectRef>
+      <a:fontRef idx="minor"/>
+    </dgm:style>
+  </dgm:styleLbl>
+  <dgm:styleLbl name="parChTrans1D4">
+    <dgm:scene3d>
+      <a:camera prst="orthographicFront"/>
+      <a:lightRig rig="threePt" dir="t"/>
+    </dgm:scene3d>
+    <dgm:sp3d/>
+    <dgm:txPr/>
+    <dgm:style>
+      <a:lnRef idx="2">
+        <a:scrgbClr r="0" g="0" b="0"/>
+      </a:lnRef>
+      <a:fillRef idx="0">
+        <a:scrgbClr r="0" g="0" b="0"/>
+      </a:fillRef>
+      <a:effectRef idx="0">
+        <a:scrgbClr r="0" g="0" b="0"/>
+      </a:effectRef>
+      <a:fontRef idx="minor"/>
+    </dgm:style>
+  </dgm:styleLbl>
+  <dgm:styleLbl name="fgAcc1">
+    <dgm:scene3d>
+      <a:camera prst="orthographicFront"/>
+      <a:lightRig rig="threePt" dir="t"/>
+    </dgm:scene3d>
+    <dgm:sp3d/>
+    <dgm:txPr/>
+    <dgm:style>
+      <a:lnRef idx="2">
+        <a:scrgbClr r="0" g="0" b="0"/>
+      </a:lnRef>
+      <a:fillRef idx="1">
+        <a:scrgbClr r="0" g="0" b="0"/>
+      </a:fillRef>
+      <a:effectRef idx="0">
+        <a:scrgbClr r="0" g="0" b="0"/>
+      </a:effectRef>
+      <a:fontRef idx="minor"/>
+    </dgm:style>
+  </dgm:styleLbl>
+  <dgm:styleLbl name="conFgAcc1">
+    <dgm:scene3d>
+      <a:camera prst="orthographicFront"/>
+      <a:lightRig rig="threePt" dir="t"/>
+    </dgm:scene3d>
+    <dgm:sp3d/>
+    <dgm:txPr/>
+    <dgm:style>
+      <a:lnRef idx="2">
+        <a:scrgbClr r="0" g="0" b="0"/>
+      </a:lnRef>
+      <a:fillRef idx="1">
+        <a:scrgbClr r="0" g="0" b="0"/>
+      </a:fillRef>
+      <a:effectRef idx="0">
+        <a:scrgbClr r="0" g="0" b="0"/>
+      </a:effectRef>
+      <a:fontRef idx="minor"/>
+    </dgm:style>
+  </dgm:styleLbl>
+  <dgm:styleLbl name="alignAcc1">
+    <dgm:scene3d>
+      <a:camera prst="orthographicFront"/>
+      <a:lightRig rig="threePt" dir="t"/>
+    </dgm:scene3d>
+    <dgm:sp3d/>
+    <dgm:txPr/>
+    <dgm:style>
+      <a:lnRef idx="2">
+        <a:scrgbClr r="0" g="0" b="0"/>
+      </a:lnRef>
+      <a:fillRef idx="1">
+        <a:scrgbClr r="0" g="0" b="0"/>
+      </a:fillRef>
+      <a:effectRef idx="0">
+        <a:scrgbClr r="0" g="0" b="0"/>
+      </a:effectRef>
+      <a:fontRef idx="minor"/>
+    </dgm:style>
+  </dgm:styleLbl>
+  <dgm:styleLbl name="trAlignAcc1">
+    <dgm:scene3d>
+      <a:camera prst="orthographicFront"/>
+      <a:lightRig rig="threePt" dir="t"/>
+    </dgm:scene3d>
+    <dgm:sp3d/>
+    <dgm:txPr/>
+    <dgm:style>
+      <a:lnRef idx="1">
+        <a:scrgbClr r="0" g="0" b="0"/>
+      </a:lnRef>
+      <a:fillRef idx="1">
+        <a:scrgbClr r="0" g="0" b="0"/>
+      </a:fillRef>
+      <a:effectRef idx="0">
+        <a:scrgbClr r="0" g="0" b="0"/>
+      </a:effectRef>
+      <a:fontRef idx="minor"/>
+    </dgm:style>
+  </dgm:styleLbl>
+  <dgm:styleLbl name="bgAcc1">
+    <dgm:scene3d>
+      <a:camera prst="orthographicFront"/>
+      <a:lightRig rig="threePt" dir="t"/>
+    </dgm:scene3d>
+    <dgm:sp3d/>
+    <dgm:txPr/>
+    <dgm:style>
+      <a:lnRef idx="2">
+        <a:scrgbClr r="0" g="0" b="0"/>
+      </a:lnRef>
+      <a:fillRef idx="1">
+        <a:scrgbClr r="0" g="0" b="0"/>
+      </a:fillRef>
+      <a:effectRef idx="0">
+        <a:scrgbClr r="0" g="0" b="0"/>
+      </a:effectRef>
+      <a:fontRef idx="minor"/>
+    </dgm:style>
+  </dgm:styleLbl>
+  <dgm:styleLbl name="solidFgAcc1">
+    <dgm:scene3d>
+      <a:camera prst="orthographicFront"/>
+      <a:lightRig rig="threePt" dir="t"/>
+    </dgm:scene3d>
+    <dgm:sp3d/>
+    <dgm:txPr/>
+    <dgm:style>
+      <a:lnRef idx="2">
+        <a:scrgbClr r="0" g="0" b="0"/>
+      </a:lnRef>
+      <a:fillRef idx="1">
+        <a:scrgbClr r="0" g="0" b="0"/>
+      </a:fillRef>
+      <a:effectRef idx="0">
+        <a:scrgbClr r="0" g="0" b="0"/>
+      </a:effectRef>
+      <a:fontRef idx="minor"/>
+    </dgm:style>
+  </dgm:styleLbl>
+  <dgm:styleLbl name="solidAlignAcc1">
+    <dgm:scene3d>
+      <a:camera prst="orthographicFront"/>
+      <a:lightRig rig="threePt" dir="t"/>
+    </dgm:scene3d>
+    <dgm:sp3d/>
+    <dgm:txPr/>
+    <dgm:style>
+      <a:lnRef idx="2">
+        <a:scrgbClr r="0" g="0" b="0"/>
+      </a:lnRef>
+      <a:fillRef idx="1">
+        <a:scrgbClr r="0" g="0" b="0"/>
+      </a:fillRef>
+      <a:effectRef idx="0">
+        <a:scrgbClr r="0" g="0" b="0"/>
+      </a:effectRef>
+      <a:fontRef idx="minor"/>
+    </dgm:style>
+  </dgm:styleLbl>
+  <dgm:styleLbl name="solidBgAcc1">
+    <dgm:scene3d>
+      <a:camera prst="orthographicFront"/>
+      <a:lightRig rig="threePt" dir="t"/>
+    </dgm:scene3d>
+    <dgm:sp3d/>
+    <dgm:txPr/>
+    <dgm:style>
+      <a:lnRef idx="2">
+        <a:scrgbClr r="0" g="0" b="0"/>
+      </a:lnRef>
+      <a:fillRef idx="1">
+        <a:scrgbClr r="0" g="0" b="0"/>
+      </a:fillRef>
+      <a:effectRef idx="0">
+        <a:scrgbClr r="0" g="0" b="0"/>
+      </a:effectRef>
+      <a:fontRef idx="minor"/>
+    </dgm:style>
+  </dgm:styleLbl>
+  <dgm:styleLbl name="fgAccFollowNode1">
+    <dgm:scene3d>
+      <a:camera prst="orthographicFront"/>
+      <a:lightRig rig="threePt" dir="t"/>
+    </dgm:scene3d>
+    <dgm:sp3d/>
+    <dgm:txPr/>
+    <dgm:style>
+      <a:lnRef idx="2">
+        <a:scrgbClr r="0" g="0" b="0"/>
+      </a:lnRef>
+      <a:fillRef idx="1">
+        <a:scrgbClr r="0" g="0" b="0"/>
+      </a:fillRef>
+      <a:effectRef idx="0">
+        <a:scrgbClr r="0" g="0" b="0"/>
+      </a:effectRef>
+      <a:fontRef idx="minor"/>
+    </dgm:style>
+  </dgm:styleLbl>
+  <dgm:styleLbl name="alignAccFollowNode1">
+    <dgm:scene3d>
+      <a:camera prst="orthographicFront"/>
+      <a:lightRig rig="threePt" dir="t"/>
+    </dgm:scene3d>
+    <dgm:sp3d/>
+    <dgm:txPr/>
+    <dgm:style>
+      <a:lnRef idx="2">
+        <a:scrgbClr r="0" g="0" b="0"/>
+      </a:lnRef>
+      <a:fillRef idx="1">
+        <a:scrgbClr r="0" g="0" b="0"/>
+      </a:fillRef>
+      <a:effectRef idx="0">
+        <a:scrgbClr r="0" g="0" b="0"/>
+      </a:effectRef>
+      <a:fontRef idx="minor"/>
+    </dgm:style>
+  </dgm:styleLbl>
+  <dgm:styleLbl name="bgAccFollowNode1">
+    <dgm:scene3d>
+      <a:camera prst="orthographicFront"/>
+      <a:lightRig rig="threePt" dir="t"/>
+    </dgm:scene3d>
+    <dgm:sp3d/>
+    <dgm:txPr/>
+    <dgm:style>
+      <a:lnRef idx="2">
+        <a:scrgbClr r="0" g="0" b="0"/>
+      </a:lnRef>
+      <a:fillRef idx="1">
+        <a:scrgbClr r="0" g="0" b="0"/>
+      </a:fillRef>
+      <a:effectRef idx="0">
+        <a:scrgbClr r="0" g="0" b="0"/>
+      </a:effectRef>
+      <a:fontRef idx="minor"/>
+    </dgm:style>
+  </dgm:styleLbl>
+  <dgm:styleLbl name="fgAcc0">
+    <dgm:scene3d>
+      <a:camera prst="orthographicFront"/>
+      <a:lightRig rig="threePt" dir="t"/>
+    </dgm:scene3d>
+    <dgm:sp3d/>
+    <dgm:txPr/>
+    <dgm:style>
+      <a:lnRef idx="2">
+        <a:scrgbClr r="0" g="0" b="0"/>
+      </a:lnRef>
+      <a:fillRef idx="1">
+        <a:scrgbClr r="0" g="0" b="0"/>
+      </a:fillRef>
+      <a:effectRef idx="0">
+        <a:scrgbClr r="0" g="0" b="0"/>
+      </a:effectRef>
+      <a:fontRef idx="minor"/>
+    </dgm:style>
+  </dgm:styleLbl>
+  <dgm:styleLbl name="fgAcc2">
+    <dgm:scene3d>
+      <a:camera prst="orthographicFront"/>
+      <a:lightRig rig="threePt" dir="t"/>
+    </dgm:scene3d>
+    <dgm:sp3d/>
+    <dgm:txPr/>
+    <dgm:style>
+      <a:lnRef idx="2">
+        <a:scrgbClr r="0" g="0" b="0"/>
+      </a:lnRef>
+      <a:fillRef idx="1">
+        <a:scrgbClr r="0" g="0" b="0"/>
+      </a:fillRef>
+      <a:effectRef idx="0">
+        <a:scrgbClr r="0" g="0" b="0"/>
+      </a:effectRef>
+      <a:fontRef idx="minor"/>
+    </dgm:style>
+  </dgm:styleLbl>
+  <dgm:styleLbl name="fgAcc3">
+    <dgm:scene3d>
+      <a:camera prst="orthographicFront"/>
+      <a:lightRig rig="threePt" dir="t"/>
+    </dgm:scene3d>
+    <dgm:sp3d/>
+    <dgm:txPr/>
+    <dgm:style>
+      <a:lnRef idx="2">
+        <a:scrgbClr r="0" g="0" b="0"/>
+      </a:lnRef>
+      <a:fillRef idx="1">
+        <a:scrgbClr r="0" g="0" b="0"/>
+      </a:fillRef>
+      <a:effectRef idx="0">
+        <a:scrgbClr r="0" g="0" b="0"/>
+      </a:effectRef>
+      <a:fontRef idx="minor"/>
+    </dgm:style>
+  </dgm:styleLbl>
+  <dgm:styleLbl name="fgAcc4">
+    <dgm:scene3d>
+      <a:camera prst="orthographicFront"/>
+      <a:lightRig rig="threePt" dir="t"/>
+    </dgm:scene3d>
+    <dgm:sp3d/>
+    <dgm:txPr/>
+    <dgm:style>
+      <a:lnRef idx="2">
+        <a:scrgbClr r="0" g="0" b="0"/>
+      </a:lnRef>
+      <a:fillRef idx="1">
+        <a:scrgbClr r="0" g="0" b="0"/>
+      </a:fillRef>
+      <a:effectRef idx="0">
+        <a:scrgbClr r="0" g="0" b="0"/>
+      </a:effectRef>
+      <a:fontRef idx="minor"/>
+    </dgm:style>
+  </dgm:styleLbl>
+  <dgm:styleLbl name="bgShp">
+    <dgm:scene3d>
+      <a:camera prst="orthographicFront"/>
+      <a:lightRig rig="threePt" dir="t"/>
+    </dgm:scene3d>
+    <dgm:sp3d/>
+    <dgm:txPr/>
+    <dgm:style>
+      <a:lnRef idx="0">
+        <a:scrgbClr r="0" g="0" b="0"/>
+      </a:lnRef>
+      <a:fillRef idx="1">
+        <a:scrgbClr r="0" g="0" b="0"/>
+      </a:fillRef>
+      <a:effectRef idx="0">
+        <a:scrgbClr r="0" g="0" b="0"/>
+      </a:effectRef>
+      <a:fontRef idx="minor"/>
+    </dgm:style>
+  </dgm:styleLbl>
+  <dgm:styleLbl name="dkBgShp">
+    <dgm:scene3d>
+      <a:camera prst="orthographicFront"/>
+      <a:lightRig rig="threePt" dir="t"/>
+    </dgm:scene3d>
+    <dgm:sp3d/>
+    <dgm:txPr/>
+    <dgm:style>
+      <a:lnRef idx="0">
+        <a:scrgbClr r="0" g="0" b="0"/>
+      </a:lnRef>
+      <a:fillRef idx="1">
+        <a:scrgbClr r="0" g="0" b="0"/>
+      </a:fillRef>
+      <a:effectRef idx="0">
+        <a:scrgbClr r="0" g="0" b="0"/>
+      </a:effectRef>
+      <a:fontRef idx="minor"/>
+    </dgm:style>
+  </dgm:styleLbl>
+  <dgm:styleLbl name="trBgShp">
+    <dgm:scene3d>
+      <a:camera prst="orthographicFront"/>
+      <a:lightRig rig="threePt" dir="t"/>
+    </dgm:scene3d>
+    <dgm:sp3d/>
+    <dgm:txPr/>
+    <dgm:style>
+      <a:lnRef idx="0">
+        <a:scrgbClr r="0" g="0" b="0"/>
+      </a:lnRef>
+      <a:fillRef idx="1">
+        <a:scrgbClr r="0" g="0" b="0"/>
+      </a:fillRef>
+      <a:effectRef idx="0">
+        <a:scrgbClr r="0" g="0" b="0"/>
+      </a:effectRef>
+      <a:fontRef idx="minor"/>
+    </dgm:style>
+  </dgm:styleLbl>
+  <dgm:styleLbl name="fgShp">
+    <dgm:scene3d>
+      <a:camera prst="orthographicFront"/>
+      <a:lightRig rig="threePt" dir="t"/>
+    </dgm:scene3d>
+    <dgm:sp3d/>
+    <dgm:txPr/>
+    <dgm:style>
+      <a:lnRef idx="2">
+        <a:scrgbClr r="0" g="0" b="0"/>
+      </a:lnRef>
+      <a:fillRef idx="1">
+        <a:scrgbClr r="0" g="0" b="0"/>
+      </a:fillRef>
+      <a:effectRef idx="0">
+        <a:scrgbClr r="0" g="0" b="0"/>
+      </a:effectRef>
+      <a:fontRef idx="minor"/>
+    </dgm:style>
+  </dgm:styleLbl>
+  <dgm:styleLbl name="revTx">
+    <dgm:scene3d>
+      <a:camera prst="orthographicFront"/>
+      <a:lightRig rig="threePt" dir="t"/>
+    </dgm:scene3d>
+    <dgm:sp3d/>
+    <dgm:txPr/>
+    <dgm:style>
+      <a:lnRef idx="0">
+        <a:scrgbClr r="0" g="0" b="0"/>
+      </a:lnRef>
+      <a:fillRef idx="0">
+        <a:scrgbClr r="0" g="0" b="0"/>
+      </a:fillRef>
+      <a:effectRef idx="0">
+        <a:scrgbClr r="0" g="0" b="0"/>
+      </a:effectRef>
+      <a:fontRef idx="minor"/>
+    </dgm:style>
+  </dgm:styleLbl>
+</dgm:styleDef>
+</file>
+
+<file path=ppt/diagrams/quickStyle4.xml><?xml version="1.0" encoding="utf-8"?>
 <dgm:styleDef xmlns:dgm="http://schemas.openxmlformats.org/drawingml/2006/diagram" xmlns:a="http://schemas.openxmlformats.org/drawingml/2006/main" uniqueId="urn:microsoft.com/office/officeart/2005/8/quickstyle/simple1">
   <dgm:title val=""/>
   <dgm:desc val=""/>
@@ -9527,7 +12238,7 @@
           <a:p>
             <a:fld id="{F6EDC76F-EB2F-4A40-9717-D29568F0D7D1}" type="datetimeFigureOut">
               <a:rPr lang="pt-BR" smtClean="0"/>
-              <a:t>16/11/2014</a:t>
+              <a:t>13/01/2015</a:t>
             </a:fld>
             <a:endParaRPr lang="pt-BR"/>
           </a:p>
@@ -9697,7 +12408,7 @@
           <a:p>
             <a:fld id="{F6EDC76F-EB2F-4A40-9717-D29568F0D7D1}" type="datetimeFigureOut">
               <a:rPr lang="pt-BR" smtClean="0"/>
-              <a:t>16/11/2014</a:t>
+              <a:t>13/01/2015</a:t>
             </a:fld>
             <a:endParaRPr lang="pt-BR"/>
           </a:p>
@@ -9877,7 +12588,7 @@
           <a:p>
             <a:fld id="{F6EDC76F-EB2F-4A40-9717-D29568F0D7D1}" type="datetimeFigureOut">
               <a:rPr lang="pt-BR" smtClean="0"/>
-              <a:t>16/11/2014</a:t>
+              <a:t>13/01/2015</a:t>
             </a:fld>
             <a:endParaRPr lang="pt-BR"/>
           </a:p>
@@ -10047,7 +12758,7 @@
           <a:p>
             <a:fld id="{F6EDC76F-EB2F-4A40-9717-D29568F0D7D1}" type="datetimeFigureOut">
               <a:rPr lang="pt-BR" smtClean="0"/>
-              <a:t>16/11/2014</a:t>
+              <a:t>13/01/2015</a:t>
             </a:fld>
             <a:endParaRPr lang="pt-BR"/>
           </a:p>
@@ -10293,7 +13004,7 @@
           <a:p>
             <a:fld id="{F6EDC76F-EB2F-4A40-9717-D29568F0D7D1}" type="datetimeFigureOut">
               <a:rPr lang="pt-BR" smtClean="0"/>
-              <a:t>16/11/2014</a:t>
+              <a:t>13/01/2015</a:t>
             </a:fld>
             <a:endParaRPr lang="pt-BR"/>
           </a:p>
@@ -10581,7 +13292,7 @@
           <a:p>
             <a:fld id="{F6EDC76F-EB2F-4A40-9717-D29568F0D7D1}" type="datetimeFigureOut">
               <a:rPr lang="pt-BR" smtClean="0"/>
-              <a:t>16/11/2014</a:t>
+              <a:t>13/01/2015</a:t>
             </a:fld>
             <a:endParaRPr lang="pt-BR"/>
           </a:p>
@@ -11003,7 +13714,7 @@
           <a:p>
             <a:fld id="{F6EDC76F-EB2F-4A40-9717-D29568F0D7D1}" type="datetimeFigureOut">
               <a:rPr lang="pt-BR" smtClean="0"/>
-              <a:t>16/11/2014</a:t>
+              <a:t>13/01/2015</a:t>
             </a:fld>
             <a:endParaRPr lang="pt-BR"/>
           </a:p>
@@ -11121,7 +13832,7 @@
           <a:p>
             <a:fld id="{F6EDC76F-EB2F-4A40-9717-D29568F0D7D1}" type="datetimeFigureOut">
               <a:rPr lang="pt-BR" smtClean="0"/>
-              <a:t>16/11/2014</a:t>
+              <a:t>13/01/2015</a:t>
             </a:fld>
             <a:endParaRPr lang="pt-BR"/>
           </a:p>
@@ -11216,7 +13927,7 @@
           <a:p>
             <a:fld id="{F6EDC76F-EB2F-4A40-9717-D29568F0D7D1}" type="datetimeFigureOut">
               <a:rPr lang="pt-BR" smtClean="0"/>
-              <a:t>16/11/2014</a:t>
+              <a:t>13/01/2015</a:t>
             </a:fld>
             <a:endParaRPr lang="pt-BR"/>
           </a:p>
@@ -11493,7 +14204,7 @@
           <a:p>
             <a:fld id="{F6EDC76F-EB2F-4A40-9717-D29568F0D7D1}" type="datetimeFigureOut">
               <a:rPr lang="pt-BR" smtClean="0"/>
-              <a:t>16/11/2014</a:t>
+              <a:t>13/01/2015</a:t>
             </a:fld>
             <a:endParaRPr lang="pt-BR"/>
           </a:p>
@@ -11746,7 +14457,7 @@
           <a:p>
             <a:fld id="{F6EDC76F-EB2F-4A40-9717-D29568F0D7D1}" type="datetimeFigureOut">
               <a:rPr lang="pt-BR" smtClean="0"/>
-              <a:t>16/11/2014</a:t>
+              <a:t>13/01/2015</a:t>
             </a:fld>
             <a:endParaRPr lang="pt-BR"/>
           </a:p>
@@ -11959,7 +14670,7 @@
           <a:p>
             <a:fld id="{F6EDC76F-EB2F-4A40-9717-D29568F0D7D1}" type="datetimeFigureOut">
               <a:rPr lang="pt-BR" smtClean="0"/>
-              <a:t>16/11/2014</a:t>
+              <a:t>13/01/2015</a:t>
             </a:fld>
             <a:endParaRPr lang="pt-BR"/>
           </a:p>
@@ -16695,6 +19406,1677 @@
       </p:grpSpPr>
       <p:grpSp>
         <p:nvGrpSpPr>
+          <p:cNvPr id="7" name="Grupo 6"/>
+          <p:cNvGrpSpPr/>
+          <p:nvPr/>
+        </p:nvGrpSpPr>
+        <p:grpSpPr>
+          <a:xfrm>
+            <a:off x="141412" y="1052736"/>
+            <a:ext cx="8856984" cy="4433649"/>
+            <a:chOff x="141412" y="1052736"/>
+            <a:chExt cx="8856984" cy="4433649"/>
+          </a:xfrm>
+        </p:grpSpPr>
+        <p:grpSp>
+          <p:nvGrpSpPr>
+            <p:cNvPr id="2" name="Grupo 1"/>
+            <p:cNvGrpSpPr/>
+            <p:nvPr/>
+          </p:nvGrpSpPr>
+          <p:grpSpPr>
+            <a:xfrm>
+              <a:off x="141412" y="1052736"/>
+              <a:ext cx="8856984" cy="4433649"/>
+              <a:chOff x="141412" y="1052736"/>
+              <a:chExt cx="8856984" cy="4433649"/>
+            </a:xfrm>
+          </p:grpSpPr>
+          <p:sp>
+            <p:nvSpPr>
+              <p:cNvPr id="5" name="Retângulo de cantos arredondados 4"/>
+              <p:cNvSpPr/>
+              <p:nvPr/>
+            </p:nvSpPr>
+            <p:spPr>
+              <a:xfrm>
+                <a:off x="2820567" y="3475635"/>
+                <a:ext cx="3194161" cy="2009230"/>
+              </a:xfrm>
+              <a:prstGeom prst="roundRect">
+                <a:avLst>
+                  <a:gd name="adj" fmla="val 5424"/>
+                </a:avLst>
+              </a:prstGeom>
+              <a:solidFill>
+                <a:schemeClr val="accent1">
+                  <a:lumMod val="75000"/>
+                </a:schemeClr>
+              </a:solidFill>
+            </p:spPr>
+            <p:style>
+              <a:lnRef idx="2">
+                <a:schemeClr val="accent1">
+                  <a:shade val="50000"/>
+                </a:schemeClr>
+              </a:lnRef>
+              <a:fillRef idx="1">
+                <a:schemeClr val="accent1"/>
+              </a:fillRef>
+              <a:effectRef idx="0">
+                <a:schemeClr val="accent1"/>
+              </a:effectRef>
+              <a:fontRef idx="minor">
+                <a:schemeClr val="lt1"/>
+              </a:fontRef>
+            </p:style>
+            <p:txBody>
+              <a:bodyPr rtlCol="0" anchor="ctr"/>
+              <a:lstStyle/>
+              <a:p>
+                <a:pPr algn="ctr"/>
+                <a:endParaRPr lang="pt-BR" sz="1200" dirty="0"/>
+              </a:p>
+            </p:txBody>
+          </p:sp>
+          <p:graphicFrame>
+            <p:nvGraphicFramePr>
+              <p:cNvPr id="4" name="Diagrama 3"/>
+              <p:cNvGraphicFramePr/>
+              <p:nvPr>
+                <p:extLst>
+                  <p:ext uri="{D42A27DB-BD31-4B8C-83A1-F6EECF244321}">
+                    <p14:modId xmlns:p14="http://schemas.microsoft.com/office/powerpoint/2010/main" val="91123683"/>
+                  </p:ext>
+                </p:extLst>
+              </p:nvPr>
+            </p:nvGraphicFramePr>
+            <p:xfrm>
+              <a:off x="2961486" y="3603373"/>
+              <a:ext cx="2912323" cy="1049764"/>
+            </p:xfrm>
+            <a:graphic>
+              <a:graphicData uri="http://schemas.openxmlformats.org/drawingml/2006/diagram">
+                <dgm:relIds xmlns:dgm="http://schemas.openxmlformats.org/drawingml/2006/diagram" xmlns:r="http://schemas.openxmlformats.org/officeDocument/2006/relationships" r:dm="rId2" r:lo="rId3" r:qs="rId4" r:cs="rId5"/>
+              </a:graphicData>
+            </a:graphic>
+          </p:graphicFrame>
+          <p:sp>
+            <p:nvSpPr>
+              <p:cNvPr id="23" name="Seta para a direita 22"/>
+              <p:cNvSpPr/>
+              <p:nvPr/>
+            </p:nvSpPr>
+            <p:spPr>
+              <a:xfrm>
+                <a:off x="2408418" y="4304327"/>
+                <a:ext cx="360631" cy="348810"/>
+              </a:xfrm>
+              <a:prstGeom prst="rightArrow">
+                <a:avLst/>
+              </a:prstGeom>
+              <a:solidFill>
+                <a:schemeClr val="tx2">
+                  <a:lumMod val="60000"/>
+                  <a:lumOff val="40000"/>
+                </a:schemeClr>
+              </a:solidFill>
+              <a:ln w="12700">
+                <a:solidFill>
+                  <a:schemeClr val="tx1"/>
+                </a:solidFill>
+              </a:ln>
+            </p:spPr>
+            <p:style>
+              <a:lnRef idx="2">
+                <a:schemeClr val="accent1">
+                  <a:shade val="50000"/>
+                </a:schemeClr>
+              </a:lnRef>
+              <a:fillRef idx="1">
+                <a:schemeClr val="accent1"/>
+              </a:fillRef>
+              <a:effectRef idx="0">
+                <a:schemeClr val="accent1"/>
+              </a:effectRef>
+              <a:fontRef idx="minor">
+                <a:schemeClr val="lt1"/>
+              </a:fontRef>
+            </p:style>
+            <p:txBody>
+              <a:bodyPr rtlCol="0" anchor="ctr"/>
+              <a:lstStyle/>
+              <a:p>
+                <a:pPr algn="ctr"/>
+                <a:endParaRPr lang="pt-BR" sz="1200"/>
+              </a:p>
+            </p:txBody>
+          </p:sp>
+          <p:sp>
+            <p:nvSpPr>
+              <p:cNvPr id="25" name="Retângulo de cantos arredondados 24"/>
+              <p:cNvSpPr/>
+              <p:nvPr/>
+            </p:nvSpPr>
+            <p:spPr>
+              <a:xfrm>
+                <a:off x="2820567" y="1052736"/>
+                <a:ext cx="3194161" cy="515187"/>
+              </a:xfrm>
+              <a:prstGeom prst="roundRect">
+                <a:avLst/>
+              </a:prstGeom>
+              <a:solidFill>
+                <a:schemeClr val="tx2">
+                  <a:lumMod val="20000"/>
+                  <a:lumOff val="80000"/>
+                </a:schemeClr>
+              </a:solidFill>
+              <a:ln>
+                <a:prstDash val="lgDash"/>
+              </a:ln>
+            </p:spPr>
+            <p:style>
+              <a:lnRef idx="2">
+                <a:schemeClr val="accent1">
+                  <a:shade val="50000"/>
+                </a:schemeClr>
+              </a:lnRef>
+              <a:fillRef idx="1">
+                <a:schemeClr val="accent1"/>
+              </a:fillRef>
+              <a:effectRef idx="0">
+                <a:schemeClr val="accent1"/>
+              </a:effectRef>
+              <a:fontRef idx="minor">
+                <a:schemeClr val="lt1"/>
+              </a:fontRef>
+            </p:style>
+            <p:txBody>
+              <a:bodyPr rtlCol="0" anchor="ctr"/>
+              <a:lstStyle/>
+              <a:p>
+                <a:pPr algn="ctr"/>
+                <a:r>
+                  <a:rPr lang="pt-BR" sz="1600" dirty="0" err="1" smtClean="0">
+                    <a:solidFill>
+                      <a:schemeClr val="tx2"/>
+                    </a:solidFill>
+                  </a:rPr>
+                  <a:t>Automated</a:t>
+                </a:r>
+                <a:r>
+                  <a:rPr lang="pt-BR" sz="1600" dirty="0" smtClean="0">
+                    <a:solidFill>
+                      <a:schemeClr val="tx2"/>
+                    </a:solidFill>
+                  </a:rPr>
+                  <a:t> </a:t>
+                </a:r>
+                <a:r>
+                  <a:rPr lang="pt-BR" sz="1600" dirty="0" err="1" smtClean="0">
+                    <a:solidFill>
+                      <a:schemeClr val="tx2"/>
+                    </a:solidFill>
+                  </a:rPr>
+                  <a:t>Tests</a:t>
+                </a:r>
+                <a:r>
+                  <a:rPr lang="pt-BR" sz="1600" dirty="0" smtClean="0">
+                    <a:solidFill>
+                      <a:schemeClr val="tx2"/>
+                    </a:solidFill>
+                  </a:rPr>
+                  <a:t> </a:t>
+                </a:r>
+                <a:r>
+                  <a:rPr lang="pt-BR" sz="1600" dirty="0" err="1" smtClean="0">
+                    <a:solidFill>
+                      <a:schemeClr val="tx2"/>
+                    </a:solidFill>
+                  </a:rPr>
+                  <a:t>Execution</a:t>
+                </a:r>
+                <a:endParaRPr lang="pt-BR" sz="1600" dirty="0">
+                  <a:solidFill>
+                    <a:schemeClr val="tx2"/>
+                  </a:solidFill>
+                </a:endParaRPr>
+              </a:p>
+            </p:txBody>
+          </p:sp>
+          <p:sp>
+            <p:nvSpPr>
+              <p:cNvPr id="26" name="Seta para a direita 25"/>
+              <p:cNvSpPr/>
+              <p:nvPr/>
+            </p:nvSpPr>
+            <p:spPr>
+              <a:xfrm rot="16200000">
+                <a:off x="2026567" y="2387376"/>
+                <a:ext cx="1814363" cy="256078"/>
+              </a:xfrm>
+              <a:prstGeom prst="rightArrow">
+                <a:avLst/>
+              </a:prstGeom>
+              <a:solidFill>
+                <a:schemeClr val="tx2">
+                  <a:lumMod val="60000"/>
+                  <a:lumOff val="40000"/>
+                </a:schemeClr>
+              </a:solidFill>
+              <a:ln w="12700">
+                <a:solidFill>
+                  <a:schemeClr val="tx1"/>
+                </a:solidFill>
+              </a:ln>
+            </p:spPr>
+            <p:style>
+              <a:lnRef idx="2">
+                <a:schemeClr val="accent1">
+                  <a:shade val="50000"/>
+                </a:schemeClr>
+              </a:lnRef>
+              <a:fillRef idx="1">
+                <a:schemeClr val="accent1"/>
+              </a:fillRef>
+              <a:effectRef idx="0">
+                <a:schemeClr val="accent1"/>
+              </a:effectRef>
+              <a:fontRef idx="minor">
+                <a:schemeClr val="lt1"/>
+              </a:fontRef>
+            </p:style>
+            <p:txBody>
+              <a:bodyPr rtlCol="0" anchor="ctr"/>
+              <a:lstStyle/>
+              <a:p>
+                <a:pPr algn="ctr"/>
+                <a:endParaRPr lang="pt-BR" sz="1200"/>
+              </a:p>
+            </p:txBody>
+          </p:sp>
+          <p:sp>
+            <p:nvSpPr>
+              <p:cNvPr id="27" name="Seta para baixo 26"/>
+              <p:cNvSpPr/>
+              <p:nvPr/>
+            </p:nvSpPr>
+            <p:spPr>
+              <a:xfrm>
+                <a:off x="4278704" y="1636852"/>
+                <a:ext cx="543230" cy="423358"/>
+              </a:xfrm>
+              <a:prstGeom prst="downArrow">
+                <a:avLst/>
+              </a:prstGeom>
+              <a:solidFill>
+                <a:srgbClr val="FFC000"/>
+              </a:solidFill>
+            </p:spPr>
+            <p:style>
+              <a:lnRef idx="2">
+                <a:schemeClr val="accent1">
+                  <a:shade val="50000"/>
+                </a:schemeClr>
+              </a:lnRef>
+              <a:fillRef idx="1">
+                <a:schemeClr val="accent1"/>
+              </a:fillRef>
+              <a:effectRef idx="0">
+                <a:schemeClr val="accent1"/>
+              </a:effectRef>
+              <a:fontRef idx="minor">
+                <a:schemeClr val="lt1"/>
+              </a:fontRef>
+            </p:style>
+            <p:txBody>
+              <a:bodyPr rtlCol="0" anchor="ctr"/>
+              <a:lstStyle/>
+              <a:p>
+                <a:pPr algn="ctr"/>
+                <a:endParaRPr lang="pt-BR" sz="1200"/>
+              </a:p>
+            </p:txBody>
+          </p:sp>
+          <p:grpSp>
+            <p:nvGrpSpPr>
+              <p:cNvPr id="14" name="Grupo 13"/>
+              <p:cNvGrpSpPr/>
+              <p:nvPr/>
+            </p:nvGrpSpPr>
+            <p:grpSpPr>
+              <a:xfrm>
+                <a:off x="3085911" y="2109804"/>
+                <a:ext cx="2928817" cy="824299"/>
+                <a:chOff x="3085911" y="2109804"/>
+                <a:chExt cx="2928817" cy="824299"/>
+              </a:xfrm>
+            </p:grpSpPr>
+            <p:sp>
+              <p:nvSpPr>
+                <p:cNvPr id="65" name="Retângulo de cantos arredondados 64"/>
+                <p:cNvSpPr/>
+                <p:nvPr/>
+              </p:nvSpPr>
+              <p:spPr>
+                <a:xfrm rot="5400000">
+                  <a:off x="4138170" y="1057545"/>
+                  <a:ext cx="824299" cy="2928817"/>
+                </a:xfrm>
+                <a:prstGeom prst="roundRect">
+                  <a:avLst>
+                    <a:gd name="adj" fmla="val 10075"/>
+                  </a:avLst>
+                </a:prstGeom>
+                <a:solidFill>
+                  <a:schemeClr val="accent6">
+                    <a:lumMod val="75000"/>
+                  </a:schemeClr>
+                </a:solidFill>
+                <a:ln>
+                  <a:solidFill>
+                    <a:schemeClr val="accent6">
+                      <a:lumMod val="60000"/>
+                      <a:lumOff val="40000"/>
+                    </a:schemeClr>
+                  </a:solidFill>
+                </a:ln>
+              </p:spPr>
+              <p:style>
+                <a:lnRef idx="2">
+                  <a:schemeClr val="accent1">
+                    <a:shade val="50000"/>
+                  </a:schemeClr>
+                </a:lnRef>
+                <a:fillRef idx="1">
+                  <a:schemeClr val="accent1"/>
+                </a:fillRef>
+                <a:effectRef idx="0">
+                  <a:schemeClr val="accent1"/>
+                </a:effectRef>
+                <a:fontRef idx="minor">
+                  <a:schemeClr val="lt1"/>
+                </a:fontRef>
+              </p:style>
+              <p:txBody>
+                <a:bodyPr vert="vert270" rtlCol="0" anchor="ctr"/>
+                <a:lstStyle/>
+                <a:p>
+                  <a:pPr algn="ctr"/>
+                  <a:endParaRPr lang="pt-BR" sz="1200" dirty="0"/>
+                </a:p>
+              </p:txBody>
+            </p:sp>
+            <p:sp>
+              <p:nvSpPr>
+                <p:cNvPr id="66" name="Retângulo de cantos arredondados 65"/>
+                <p:cNvSpPr/>
+                <p:nvPr/>
+              </p:nvSpPr>
+              <p:spPr>
+                <a:xfrm>
+                  <a:off x="3128537" y="2175969"/>
+                  <a:ext cx="2822247" cy="430334"/>
+                </a:xfrm>
+                <a:prstGeom prst="roundRect">
+                  <a:avLst/>
+                </a:prstGeom>
+                <a:solidFill>
+                  <a:schemeClr val="accent2">
+                    <a:lumMod val="75000"/>
+                  </a:schemeClr>
+                </a:solidFill>
+                <a:ln>
+                  <a:noFill/>
+                </a:ln>
+              </p:spPr>
+              <p:style>
+                <a:lnRef idx="2">
+                  <a:schemeClr val="accent1">
+                    <a:shade val="50000"/>
+                  </a:schemeClr>
+                </a:lnRef>
+                <a:fillRef idx="1">
+                  <a:schemeClr val="accent1"/>
+                </a:fillRef>
+                <a:effectRef idx="0">
+                  <a:schemeClr val="accent1"/>
+                </a:effectRef>
+                <a:fontRef idx="minor">
+                  <a:schemeClr val="lt1"/>
+                </a:fontRef>
+              </p:style>
+              <p:txBody>
+                <a:bodyPr rtlCol="0" anchor="ctr"/>
+                <a:lstStyle/>
+                <a:p>
+                  <a:pPr algn="ctr"/>
+                  <a:r>
+                    <a:rPr lang="pt-BR" sz="1400" dirty="0" err="1" smtClean="0"/>
+                    <a:t>Returned</a:t>
+                  </a:r>
+                  <a:r>
+                    <a:rPr lang="pt-BR" sz="1400" dirty="0"/>
+                    <a:t> </a:t>
+                  </a:r>
+                  <a:r>
+                    <a:rPr lang="pt-BR" sz="1400" dirty="0" err="1" smtClean="0"/>
+                    <a:t>Value</a:t>
+                  </a:r>
+                  <a:r>
+                    <a:rPr lang="pt-BR" sz="1400" dirty="0" smtClean="0"/>
+                    <a:t> for </a:t>
+                  </a:r>
+                  <a:r>
+                    <a:rPr lang="pt-BR" sz="1400" dirty="0" err="1" smtClean="0"/>
+                    <a:t>the</a:t>
+                  </a:r>
+                  <a:r>
+                    <a:rPr lang="pt-BR" sz="1400" dirty="0" smtClean="0"/>
+                    <a:t> </a:t>
+                  </a:r>
+                  <a:r>
+                    <a:rPr lang="pt-BR" sz="1400" dirty="0" err="1" smtClean="0"/>
+                    <a:t>specified</a:t>
+                  </a:r>
+                  <a:r>
+                    <a:rPr lang="pt-BR" sz="1400" dirty="0" smtClean="0"/>
+                    <a:t> Performance </a:t>
+                  </a:r>
+                  <a:r>
+                    <a:rPr lang="pt-BR" sz="1400" dirty="0" err="1" smtClean="0"/>
+                    <a:t>Metric</a:t>
+                  </a:r>
+                  <a:endParaRPr lang="pt-BR" sz="1400" dirty="0"/>
+                </a:p>
+              </p:txBody>
+            </p:sp>
+            <p:sp>
+              <p:nvSpPr>
+                <p:cNvPr id="69" name="Retângulo de cantos arredondados 68"/>
+                <p:cNvSpPr/>
+                <p:nvPr/>
+              </p:nvSpPr>
+              <p:spPr>
+                <a:xfrm rot="5400000">
+                  <a:off x="4390507" y="1373827"/>
+                  <a:ext cx="309111" cy="2811442"/>
+                </a:xfrm>
+                <a:prstGeom prst="roundRect">
+                  <a:avLst/>
+                </a:prstGeom>
+                <a:solidFill>
+                  <a:schemeClr val="accent6">
+                    <a:lumMod val="75000"/>
+                  </a:schemeClr>
+                </a:solidFill>
+                <a:ln>
+                  <a:noFill/>
+                </a:ln>
+              </p:spPr>
+              <p:style>
+                <a:lnRef idx="2">
+                  <a:schemeClr val="accent1">
+                    <a:shade val="50000"/>
+                  </a:schemeClr>
+                </a:lnRef>
+                <a:fillRef idx="1">
+                  <a:schemeClr val="accent1"/>
+                </a:fillRef>
+                <a:effectRef idx="0">
+                  <a:schemeClr val="accent1"/>
+                </a:effectRef>
+                <a:fontRef idx="minor">
+                  <a:schemeClr val="lt1"/>
+                </a:fontRef>
+              </p:style>
+              <p:txBody>
+                <a:bodyPr vert="vert270" rtlCol="0" anchor="ctr"/>
+                <a:lstStyle/>
+                <a:p>
+                  <a:pPr algn="ctr"/>
+                  <a:r>
+                    <a:rPr lang="pt-BR" dirty="0" err="1" smtClean="0"/>
+                    <a:t>Execution</a:t>
+                  </a:r>
+                  <a:r>
+                    <a:rPr lang="pt-BR" dirty="0" smtClean="0"/>
+                    <a:t> Data</a:t>
+                  </a:r>
+                  <a:endParaRPr lang="pt-BR" dirty="0"/>
+                </a:p>
+              </p:txBody>
+            </p:sp>
+          </p:grpSp>
+          <p:sp>
+            <p:nvSpPr>
+              <p:cNvPr id="71" name="Seta para baixo 70"/>
+              <p:cNvSpPr/>
+              <p:nvPr/>
+            </p:nvSpPr>
+            <p:spPr>
+              <a:xfrm>
+                <a:off x="4281005" y="2983697"/>
+                <a:ext cx="543230" cy="423358"/>
+              </a:xfrm>
+              <a:prstGeom prst="downArrow">
+                <a:avLst/>
+              </a:prstGeom>
+              <a:solidFill>
+                <a:srgbClr val="FFC000"/>
+              </a:solidFill>
+            </p:spPr>
+            <p:style>
+              <a:lnRef idx="2">
+                <a:schemeClr val="accent1">
+                  <a:shade val="50000"/>
+                </a:schemeClr>
+              </a:lnRef>
+              <a:fillRef idx="1">
+                <a:schemeClr val="accent1"/>
+              </a:fillRef>
+              <a:effectRef idx="0">
+                <a:schemeClr val="accent1"/>
+              </a:effectRef>
+              <a:fontRef idx="minor">
+                <a:schemeClr val="lt1"/>
+              </a:fontRef>
+            </p:style>
+            <p:txBody>
+              <a:bodyPr rtlCol="0" anchor="ctr"/>
+              <a:lstStyle/>
+              <a:p>
+                <a:pPr algn="ctr"/>
+                <a:endParaRPr lang="pt-BR" sz="1200"/>
+              </a:p>
+            </p:txBody>
+          </p:sp>
+          <p:grpSp>
+            <p:nvGrpSpPr>
+              <p:cNvPr id="6" name="Grupo 5"/>
+              <p:cNvGrpSpPr/>
+              <p:nvPr/>
+            </p:nvGrpSpPr>
+            <p:grpSpPr>
+              <a:xfrm>
+                <a:off x="6779719" y="3475635"/>
+                <a:ext cx="2218677" cy="2009230"/>
+                <a:chOff x="6745811" y="2829083"/>
+                <a:chExt cx="2218677" cy="2009230"/>
+              </a:xfrm>
+            </p:grpSpPr>
+            <p:sp>
+              <p:nvSpPr>
+                <p:cNvPr id="36" name="Retângulo de cantos arredondados 35"/>
+                <p:cNvSpPr/>
+                <p:nvPr/>
+              </p:nvSpPr>
+              <p:spPr>
+                <a:xfrm>
+                  <a:off x="6745811" y="2829083"/>
+                  <a:ext cx="2218677" cy="2009230"/>
+                </a:xfrm>
+                <a:prstGeom prst="roundRect">
+                  <a:avLst>
+                    <a:gd name="adj" fmla="val 4399"/>
+                  </a:avLst>
+                </a:prstGeom>
+                <a:solidFill>
+                  <a:schemeClr val="accent6">
+                    <a:lumMod val="75000"/>
+                  </a:schemeClr>
+                </a:solidFill>
+                <a:ln>
+                  <a:solidFill>
+                    <a:schemeClr val="accent6">
+                      <a:lumMod val="60000"/>
+                      <a:lumOff val="40000"/>
+                    </a:schemeClr>
+                  </a:solidFill>
+                </a:ln>
+              </p:spPr>
+              <p:style>
+                <a:lnRef idx="2">
+                  <a:schemeClr val="accent1">
+                    <a:shade val="50000"/>
+                  </a:schemeClr>
+                </a:lnRef>
+                <a:fillRef idx="1">
+                  <a:schemeClr val="accent1"/>
+                </a:fillRef>
+                <a:effectRef idx="0">
+                  <a:schemeClr val="accent1"/>
+                </a:effectRef>
+                <a:fontRef idx="minor">
+                  <a:schemeClr val="lt1"/>
+                </a:fontRef>
+              </p:style>
+              <p:txBody>
+                <a:bodyPr vert="vert270" rtlCol="0" anchor="ctr"/>
+                <a:lstStyle/>
+                <a:p>
+                  <a:pPr algn="ctr"/>
+                  <a:endParaRPr lang="pt-BR" dirty="0"/>
+                </a:p>
+              </p:txBody>
+            </p:sp>
+            <p:sp>
+              <p:nvSpPr>
+                <p:cNvPr id="37" name="Retângulo de cantos arredondados 36"/>
+                <p:cNvSpPr/>
+                <p:nvPr/>
+              </p:nvSpPr>
+              <p:spPr>
+                <a:xfrm>
+                  <a:off x="6790867" y="2978507"/>
+                  <a:ext cx="301413" cy="1710383"/>
+                </a:xfrm>
+                <a:prstGeom prst="roundRect">
+                  <a:avLst/>
+                </a:prstGeom>
+                <a:solidFill>
+                  <a:schemeClr val="accent6">
+                    <a:lumMod val="75000"/>
+                  </a:schemeClr>
+                </a:solidFill>
+                <a:ln>
+                  <a:noFill/>
+                </a:ln>
+              </p:spPr>
+              <p:style>
+                <a:lnRef idx="2">
+                  <a:schemeClr val="accent1">
+                    <a:shade val="50000"/>
+                  </a:schemeClr>
+                </a:lnRef>
+                <a:fillRef idx="1">
+                  <a:schemeClr val="accent1"/>
+                </a:fillRef>
+                <a:effectRef idx="0">
+                  <a:schemeClr val="accent1"/>
+                </a:effectRef>
+                <a:fontRef idx="minor">
+                  <a:schemeClr val="lt1"/>
+                </a:fontRef>
+              </p:style>
+              <p:txBody>
+                <a:bodyPr vert="vert270" rtlCol="0" anchor="ctr"/>
+                <a:lstStyle/>
+                <a:p>
+                  <a:pPr algn="ctr"/>
+                  <a:r>
+                    <a:rPr lang="pt-BR" sz="2000" dirty="0" smtClean="0"/>
+                    <a:t>Output Data</a:t>
+                  </a:r>
+                  <a:endParaRPr lang="pt-BR" sz="2000" dirty="0"/>
+                </a:p>
+              </p:txBody>
+            </p:sp>
+            <p:sp>
+              <p:nvSpPr>
+                <p:cNvPr id="39" name="Retângulo de cantos arredondados 38"/>
+                <p:cNvSpPr/>
+                <p:nvPr/>
+              </p:nvSpPr>
+              <p:spPr>
+                <a:xfrm>
+                  <a:off x="7122423" y="2926464"/>
+                  <a:ext cx="1770057" cy="1800200"/>
+                </a:xfrm>
+                <a:prstGeom prst="roundRect">
+                  <a:avLst/>
+                </a:prstGeom>
+                <a:solidFill>
+                  <a:schemeClr val="accent2">
+                    <a:lumMod val="75000"/>
+                  </a:schemeClr>
+                </a:solidFill>
+                <a:ln>
+                  <a:noFill/>
+                </a:ln>
+              </p:spPr>
+              <p:style>
+                <a:lnRef idx="2">
+                  <a:schemeClr val="accent1">
+                    <a:shade val="50000"/>
+                  </a:schemeClr>
+                </a:lnRef>
+                <a:fillRef idx="1">
+                  <a:schemeClr val="accent1"/>
+                </a:fillRef>
+                <a:effectRef idx="0">
+                  <a:schemeClr val="accent1"/>
+                </a:effectRef>
+                <a:fontRef idx="minor">
+                  <a:schemeClr val="lt1"/>
+                </a:fontRef>
+              </p:style>
+              <p:txBody>
+                <a:bodyPr rtlCol="0" anchor="ctr"/>
+                <a:lstStyle/>
+                <a:p>
+                  <a:pPr algn="ctr"/>
+                  <a:r>
+                    <a:rPr lang="pt-BR" dirty="0" err="1" smtClean="0"/>
+                    <a:t>List</a:t>
+                  </a:r>
+                  <a:r>
+                    <a:rPr lang="pt-BR" dirty="0" smtClean="0"/>
+                    <a:t> </a:t>
+                  </a:r>
+                  <a:r>
+                    <a:rPr lang="pt-BR" dirty="0" err="1" smtClean="0"/>
+                    <a:t>of</a:t>
+                  </a:r>
+                  <a:r>
+                    <a:rPr lang="pt-BR" dirty="0" smtClean="0"/>
+                    <a:t> </a:t>
+                  </a:r>
+                  <a:r>
+                    <a:rPr lang="pt-BR" dirty="0" err="1" smtClean="0"/>
+                    <a:t>Configurations</a:t>
+                  </a:r>
+                  <a:r>
+                    <a:rPr lang="pt-BR" dirty="0" smtClean="0"/>
+                    <a:t> </a:t>
+                  </a:r>
+                  <a:r>
+                    <a:rPr lang="pt-BR" dirty="0" err="1" smtClean="0"/>
+                    <a:t>able</a:t>
+                  </a:r>
+                  <a:r>
+                    <a:rPr lang="pt-BR" dirty="0" smtClean="0"/>
+                    <a:t> </a:t>
+                  </a:r>
+                  <a:r>
+                    <a:rPr lang="pt-BR" dirty="0" err="1" smtClean="0"/>
+                    <a:t>to</a:t>
+                  </a:r>
+                  <a:r>
+                    <a:rPr lang="pt-BR" dirty="0" smtClean="0"/>
+                    <a:t> </a:t>
+                  </a:r>
+                  <a:r>
+                    <a:rPr lang="pt-BR" dirty="0" err="1" smtClean="0"/>
+                    <a:t>run</a:t>
+                  </a:r>
+                  <a:r>
+                    <a:rPr lang="pt-BR" dirty="0" smtClean="0"/>
+                    <a:t> </a:t>
+                  </a:r>
+                  <a:r>
+                    <a:rPr lang="pt-BR" dirty="0" err="1" smtClean="0"/>
+                    <a:t>the</a:t>
+                  </a:r>
+                  <a:r>
+                    <a:rPr lang="pt-BR" dirty="0" smtClean="0"/>
+                    <a:t> </a:t>
+                  </a:r>
+                  <a:r>
+                    <a:rPr lang="pt-BR" dirty="0" err="1" smtClean="0"/>
+                    <a:t>Application</a:t>
+                  </a:r>
+                  <a:endParaRPr lang="pt-BR" dirty="0"/>
+                </a:p>
+              </p:txBody>
+            </p:sp>
+          </p:grpSp>
+          <p:sp>
+            <p:nvSpPr>
+              <p:cNvPr id="3" name="Seta para a direita 2"/>
+              <p:cNvSpPr/>
+              <p:nvPr/>
+            </p:nvSpPr>
+            <p:spPr>
+              <a:xfrm>
+                <a:off x="6071468" y="4040565"/>
+                <a:ext cx="661643" cy="879370"/>
+              </a:xfrm>
+              <a:prstGeom prst="rightArrow">
+                <a:avLst/>
+              </a:prstGeom>
+              <a:solidFill>
+                <a:srgbClr val="92D050"/>
+              </a:solidFill>
+              <a:ln>
+                <a:solidFill>
+                  <a:schemeClr val="accent3">
+                    <a:lumMod val="50000"/>
+                  </a:schemeClr>
+                </a:solidFill>
+              </a:ln>
+            </p:spPr>
+            <p:style>
+              <a:lnRef idx="2">
+                <a:schemeClr val="accent1">
+                  <a:shade val="50000"/>
+                </a:schemeClr>
+              </a:lnRef>
+              <a:fillRef idx="1">
+                <a:schemeClr val="accent1"/>
+              </a:fillRef>
+              <a:effectRef idx="0">
+                <a:schemeClr val="accent1"/>
+              </a:effectRef>
+              <a:fontRef idx="minor">
+                <a:schemeClr val="lt1"/>
+              </a:fontRef>
+            </p:style>
+            <p:txBody>
+              <a:bodyPr rtlCol="0" anchor="ctr"/>
+              <a:lstStyle/>
+              <a:p>
+                <a:pPr algn="ctr"/>
+                <a:endParaRPr lang="pt-BR"/>
+              </a:p>
+            </p:txBody>
+          </p:sp>
+          <p:grpSp>
+            <p:nvGrpSpPr>
+              <p:cNvPr id="19" name="Grupo 18"/>
+              <p:cNvGrpSpPr/>
+              <p:nvPr/>
+            </p:nvGrpSpPr>
+            <p:grpSpPr>
+              <a:xfrm>
+                <a:off x="141412" y="3477155"/>
+                <a:ext cx="2218677" cy="2009230"/>
+                <a:chOff x="141412" y="3477155"/>
+                <a:chExt cx="2218677" cy="2009230"/>
+              </a:xfrm>
+            </p:grpSpPr>
+            <p:grpSp>
+              <p:nvGrpSpPr>
+                <p:cNvPr id="15" name="Grupo 14"/>
+                <p:cNvGrpSpPr/>
+                <p:nvPr/>
+              </p:nvGrpSpPr>
+              <p:grpSpPr>
+                <a:xfrm>
+                  <a:off x="141412" y="3477155"/>
+                  <a:ext cx="2218677" cy="2009230"/>
+                  <a:chOff x="141412" y="3477155"/>
+                  <a:chExt cx="2218677" cy="2009230"/>
+                </a:xfrm>
+              </p:grpSpPr>
+              <p:sp>
+                <p:nvSpPr>
+                  <p:cNvPr id="76" name="Retângulo de cantos arredondados 75"/>
+                  <p:cNvSpPr/>
+                  <p:nvPr/>
+                </p:nvSpPr>
+                <p:spPr>
+                  <a:xfrm>
+                    <a:off x="141412" y="3477155"/>
+                    <a:ext cx="2218677" cy="2009230"/>
+                  </a:xfrm>
+                  <a:prstGeom prst="roundRect">
+                    <a:avLst>
+                      <a:gd name="adj" fmla="val 4399"/>
+                    </a:avLst>
+                  </a:prstGeom>
+                  <a:solidFill>
+                    <a:schemeClr val="accent6">
+                      <a:lumMod val="75000"/>
+                    </a:schemeClr>
+                  </a:solidFill>
+                  <a:ln>
+                    <a:solidFill>
+                      <a:schemeClr val="accent6">
+                        <a:lumMod val="60000"/>
+                        <a:lumOff val="40000"/>
+                      </a:schemeClr>
+                    </a:solidFill>
+                  </a:ln>
+                </p:spPr>
+                <p:style>
+                  <a:lnRef idx="2">
+                    <a:schemeClr val="accent1">
+                      <a:shade val="50000"/>
+                    </a:schemeClr>
+                  </a:lnRef>
+                  <a:fillRef idx="1">
+                    <a:schemeClr val="accent1"/>
+                  </a:fillRef>
+                  <a:effectRef idx="0">
+                    <a:schemeClr val="accent1"/>
+                  </a:effectRef>
+                  <a:fontRef idx="minor">
+                    <a:schemeClr val="lt1"/>
+                  </a:fontRef>
+                </p:style>
+                <p:txBody>
+                  <a:bodyPr vert="vert270" rtlCol="0" anchor="ctr"/>
+                  <a:lstStyle/>
+                  <a:p>
+                    <a:pPr algn="ctr"/>
+                    <a:endParaRPr lang="pt-BR" dirty="0"/>
+                  </a:p>
+                </p:txBody>
+              </p:sp>
+              <p:sp>
+                <p:nvSpPr>
+                  <p:cNvPr id="8" name="Retângulo de cantos arredondados 7"/>
+                  <p:cNvSpPr/>
+                  <p:nvPr/>
+                </p:nvSpPr>
+                <p:spPr>
+                  <a:xfrm>
+                    <a:off x="2061327" y="3573016"/>
+                    <a:ext cx="271270" cy="1800200"/>
+                  </a:xfrm>
+                  <a:prstGeom prst="roundRect">
+                    <a:avLst/>
+                  </a:prstGeom>
+                  <a:solidFill>
+                    <a:schemeClr val="accent6">
+                      <a:lumMod val="75000"/>
+                    </a:schemeClr>
+                  </a:solidFill>
+                  <a:ln>
+                    <a:noFill/>
+                  </a:ln>
+                </p:spPr>
+                <p:style>
+                  <a:lnRef idx="2">
+                    <a:schemeClr val="accent1">
+                      <a:shade val="50000"/>
+                    </a:schemeClr>
+                  </a:lnRef>
+                  <a:fillRef idx="1">
+                    <a:schemeClr val="accent1"/>
+                  </a:fillRef>
+                  <a:effectRef idx="0">
+                    <a:schemeClr val="accent1"/>
+                  </a:effectRef>
+                  <a:fontRef idx="minor">
+                    <a:schemeClr val="lt1"/>
+                  </a:fontRef>
+                </p:style>
+                <p:txBody>
+                  <a:bodyPr vert="vert270" rtlCol="0" anchor="ctr"/>
+                  <a:lstStyle/>
+                  <a:p>
+                    <a:pPr algn="ctr"/>
+                    <a:r>
+                      <a:rPr lang="pt-BR" dirty="0" smtClean="0"/>
+                      <a:t>Input Data</a:t>
+                    </a:r>
+                    <a:endParaRPr lang="pt-BR" dirty="0"/>
+                  </a:p>
+                </p:txBody>
+              </p:sp>
+            </p:grpSp>
+            <p:grpSp>
+              <p:nvGrpSpPr>
+                <p:cNvPr id="18" name="Grupo 17"/>
+                <p:cNvGrpSpPr/>
+                <p:nvPr/>
+              </p:nvGrpSpPr>
+              <p:grpSpPr>
+                <a:xfrm>
+                  <a:off x="234198" y="3573016"/>
+                  <a:ext cx="1778477" cy="1853662"/>
+                  <a:chOff x="234198" y="3573016"/>
+                  <a:chExt cx="1778477" cy="1853662"/>
+                </a:xfrm>
+              </p:grpSpPr>
+              <p:sp>
+                <p:nvSpPr>
+                  <p:cNvPr id="45" name="Retângulo de cantos arredondados 44"/>
+                  <p:cNvSpPr/>
+                  <p:nvPr/>
+                </p:nvSpPr>
+                <p:spPr>
+                  <a:xfrm>
+                    <a:off x="243531" y="4499153"/>
+                    <a:ext cx="1761155" cy="373861"/>
+                  </a:xfrm>
+                  <a:prstGeom prst="roundRect">
+                    <a:avLst/>
+                  </a:prstGeom>
+                  <a:solidFill>
+                    <a:schemeClr val="accent2">
+                      <a:lumMod val="75000"/>
+                    </a:schemeClr>
+                  </a:solidFill>
+                  <a:ln>
+                    <a:noFill/>
+                  </a:ln>
+                </p:spPr>
+                <p:style>
+                  <a:lnRef idx="2">
+                    <a:schemeClr val="accent1">
+                      <a:shade val="50000"/>
+                    </a:schemeClr>
+                  </a:lnRef>
+                  <a:fillRef idx="1">
+                    <a:schemeClr val="accent1"/>
+                  </a:fillRef>
+                  <a:effectRef idx="0">
+                    <a:schemeClr val="accent1"/>
+                  </a:effectRef>
+                  <a:fontRef idx="minor">
+                    <a:schemeClr val="lt1"/>
+                  </a:fontRef>
+                </p:style>
+                <p:txBody>
+                  <a:bodyPr rtlCol="0" anchor="ctr"/>
+                  <a:lstStyle/>
+                  <a:p>
+                    <a:pPr algn="ctr"/>
+                    <a:r>
+                      <a:rPr lang="pt-BR" sz="1400" dirty="0" smtClean="0"/>
+                      <a:t>VM </a:t>
+                    </a:r>
+                    <a:r>
+                      <a:rPr lang="pt-BR" sz="1400" dirty="0" err="1" smtClean="0"/>
+                      <a:t>Types</a:t>
+                    </a:r>
+                    <a:endParaRPr lang="pt-BR" sz="1400" dirty="0"/>
+                  </a:p>
+                </p:txBody>
+              </p:sp>
+              <p:sp>
+                <p:nvSpPr>
+                  <p:cNvPr id="46" name="Retângulo de cantos arredondados 45"/>
+                  <p:cNvSpPr/>
+                  <p:nvPr/>
+                </p:nvSpPr>
+                <p:spPr>
+                  <a:xfrm>
+                    <a:off x="234198" y="4063251"/>
+                    <a:ext cx="1770057" cy="373861"/>
+                  </a:xfrm>
+                  <a:prstGeom prst="roundRect">
+                    <a:avLst/>
+                  </a:prstGeom>
+                  <a:solidFill>
+                    <a:schemeClr val="accent2">
+                      <a:lumMod val="75000"/>
+                    </a:schemeClr>
+                  </a:solidFill>
+                  <a:ln>
+                    <a:noFill/>
+                  </a:ln>
+                </p:spPr>
+                <p:style>
+                  <a:lnRef idx="2">
+                    <a:schemeClr val="accent1">
+                      <a:shade val="50000"/>
+                    </a:schemeClr>
+                  </a:lnRef>
+                  <a:fillRef idx="1">
+                    <a:schemeClr val="accent1"/>
+                  </a:fillRef>
+                  <a:effectRef idx="0">
+                    <a:schemeClr val="accent1"/>
+                  </a:effectRef>
+                  <a:fontRef idx="minor">
+                    <a:schemeClr val="lt1"/>
+                  </a:fontRef>
+                </p:style>
+                <p:txBody>
+                  <a:bodyPr rtlCol="0" anchor="ctr"/>
+                  <a:lstStyle/>
+                  <a:p>
+                    <a:pPr algn="ctr"/>
+                    <a:r>
+                      <a:rPr lang="pt-BR" sz="1400" dirty="0" err="1" smtClean="0"/>
+                      <a:t>Workloads</a:t>
+                    </a:r>
+                    <a:endParaRPr lang="pt-BR" sz="1400" dirty="0"/>
+                  </a:p>
+                </p:txBody>
+              </p:sp>
+              <p:sp>
+                <p:nvSpPr>
+                  <p:cNvPr id="47" name="Retângulo de cantos arredondados 46"/>
+                  <p:cNvSpPr/>
+                  <p:nvPr/>
+                </p:nvSpPr>
+                <p:spPr>
+                  <a:xfrm>
+                    <a:off x="234198" y="3573016"/>
+                    <a:ext cx="1770057" cy="418519"/>
+                  </a:xfrm>
+                  <a:prstGeom prst="roundRect">
+                    <a:avLst/>
+                  </a:prstGeom>
+                  <a:solidFill>
+                    <a:schemeClr val="accent2">
+                      <a:lumMod val="75000"/>
+                    </a:schemeClr>
+                  </a:solidFill>
+                  <a:ln>
+                    <a:noFill/>
+                  </a:ln>
+                </p:spPr>
+                <p:style>
+                  <a:lnRef idx="2">
+                    <a:schemeClr val="accent1">
+                      <a:shade val="50000"/>
+                    </a:schemeClr>
+                  </a:lnRef>
+                  <a:fillRef idx="1">
+                    <a:schemeClr val="accent1"/>
+                  </a:fillRef>
+                  <a:effectRef idx="0">
+                    <a:schemeClr val="accent1"/>
+                  </a:effectRef>
+                  <a:fontRef idx="minor">
+                    <a:schemeClr val="lt1"/>
+                  </a:fontRef>
+                </p:style>
+                <p:txBody>
+                  <a:bodyPr rtlCol="0" anchor="ctr"/>
+                  <a:lstStyle/>
+                  <a:p>
+                    <a:pPr algn="ctr"/>
+                    <a:r>
+                      <a:rPr lang="pt-BR" sz="1400" dirty="0" err="1" smtClean="0"/>
+                      <a:t>Reference</a:t>
+                    </a:r>
+                    <a:r>
+                      <a:rPr lang="pt-BR" sz="1400" dirty="0" smtClean="0"/>
+                      <a:t> </a:t>
+                    </a:r>
+                    <a:r>
+                      <a:rPr lang="pt-BR" sz="1400" dirty="0" err="1" smtClean="0"/>
+                      <a:t>Value</a:t>
+                    </a:r>
+                    <a:r>
+                      <a:rPr lang="pt-BR" sz="1400" dirty="0" smtClean="0"/>
+                      <a:t> (SLA</a:t>
+                    </a:r>
+                    <a:r>
+                      <a:rPr lang="pt-BR" sz="1400" dirty="0" smtClean="0"/>
+                      <a:t>)</a:t>
+                    </a:r>
+                    <a:endParaRPr lang="pt-BR" sz="1400" dirty="0"/>
+                  </a:p>
+                </p:txBody>
+              </p:sp>
+              <p:sp>
+                <p:nvSpPr>
+                  <p:cNvPr id="48" name="Retângulo de cantos arredondados 47"/>
+                  <p:cNvSpPr/>
+                  <p:nvPr/>
+                </p:nvSpPr>
+                <p:spPr>
+                  <a:xfrm>
+                    <a:off x="251520" y="4941168"/>
+                    <a:ext cx="1761155" cy="485510"/>
+                  </a:xfrm>
+                  <a:prstGeom prst="roundRect">
+                    <a:avLst/>
+                  </a:prstGeom>
+                  <a:solidFill>
+                    <a:schemeClr val="accent2">
+                      <a:lumMod val="75000"/>
+                    </a:schemeClr>
+                  </a:solidFill>
+                  <a:ln>
+                    <a:noFill/>
+                  </a:ln>
+                </p:spPr>
+                <p:style>
+                  <a:lnRef idx="2">
+                    <a:schemeClr val="accent1">
+                      <a:shade val="50000"/>
+                    </a:schemeClr>
+                  </a:lnRef>
+                  <a:fillRef idx="1">
+                    <a:schemeClr val="accent1"/>
+                  </a:fillRef>
+                  <a:effectRef idx="0">
+                    <a:schemeClr val="accent1"/>
+                  </a:effectRef>
+                  <a:fontRef idx="minor">
+                    <a:schemeClr val="lt1"/>
+                  </a:fontRef>
+                </p:style>
+                <p:txBody>
+                  <a:bodyPr rtlCol="0" anchor="ctr"/>
+                  <a:lstStyle/>
+                  <a:p>
+                    <a:pPr algn="ctr"/>
+                    <a:r>
+                      <a:rPr lang="pt-BR" sz="1400" dirty="0" err="1" smtClean="0"/>
+                      <a:t>Maximum</a:t>
+                    </a:r>
+                    <a:r>
+                      <a:rPr lang="pt-BR" sz="1400" dirty="0" smtClean="0"/>
+                      <a:t> </a:t>
+                    </a:r>
+                    <a:r>
+                      <a:rPr lang="pt-BR" sz="1400" dirty="0" err="1" smtClean="0"/>
+                      <a:t>Number</a:t>
+                    </a:r>
+                    <a:r>
+                      <a:rPr lang="pt-BR" sz="1400" dirty="0" smtClean="0"/>
+                      <a:t> </a:t>
+                    </a:r>
+                    <a:r>
+                      <a:rPr lang="pt-BR" sz="1400" dirty="0" err="1" smtClean="0"/>
+                      <a:t>of</a:t>
+                    </a:r>
+                    <a:r>
+                      <a:rPr lang="pt-BR" sz="1400" dirty="0" smtClean="0"/>
+                      <a:t> </a:t>
+                    </a:r>
+                    <a:r>
+                      <a:rPr lang="pt-BR" sz="1400" dirty="0" err="1" smtClean="0"/>
+                      <a:t>Instances</a:t>
+                    </a:r>
+                    <a:endParaRPr lang="pt-BR" sz="1400" dirty="0"/>
+                  </a:p>
+                </p:txBody>
+              </p:sp>
+            </p:grpSp>
+          </p:grpSp>
+        </p:grpSp>
+        <p:grpSp>
+          <p:nvGrpSpPr>
+            <p:cNvPr id="28" name="Grupo 27"/>
+            <p:cNvGrpSpPr/>
+            <p:nvPr/>
+          </p:nvGrpSpPr>
+          <p:grpSpPr>
+            <a:xfrm>
+              <a:off x="2962720" y="4824408"/>
+              <a:ext cx="1204948" cy="548808"/>
+              <a:chOff x="3372" y="1200887"/>
+              <a:chExt cx="1204948" cy="548808"/>
+            </a:xfrm>
+          </p:grpSpPr>
+          <p:sp>
+            <p:nvSpPr>
+              <p:cNvPr id="35" name="Retângulo de cantos arredondados 34"/>
+              <p:cNvSpPr/>
+              <p:nvPr/>
+            </p:nvSpPr>
+            <p:spPr>
+              <a:xfrm>
+                <a:off x="3372" y="1200887"/>
+                <a:ext cx="1204948" cy="548808"/>
+              </a:xfrm>
+              <a:prstGeom prst="roundRect">
+                <a:avLst>
+                  <a:gd name="adj" fmla="val 10000"/>
+                </a:avLst>
+              </a:prstGeom>
+            </p:spPr>
+            <p:style>
+              <a:lnRef idx="2">
+                <a:schemeClr val="lt1">
+                  <a:hueOff val="0"/>
+                  <a:satOff val="0"/>
+                  <a:lumOff val="0"/>
+                  <a:alphaOff val="0"/>
+                </a:schemeClr>
+              </a:lnRef>
+              <a:fillRef idx="1">
+                <a:schemeClr val="accent3">
+                  <a:hueOff val="0"/>
+                  <a:satOff val="0"/>
+                  <a:lumOff val="0"/>
+                  <a:alphaOff val="0"/>
+                </a:schemeClr>
+              </a:fillRef>
+              <a:effectRef idx="0">
+                <a:schemeClr val="accent3">
+                  <a:hueOff val="0"/>
+                  <a:satOff val="0"/>
+                  <a:lumOff val="0"/>
+                  <a:alphaOff val="0"/>
+                </a:schemeClr>
+              </a:effectRef>
+              <a:fontRef idx="minor">
+                <a:schemeClr val="lt1"/>
+              </a:fontRef>
+            </p:style>
+          </p:sp>
+          <p:sp>
+            <p:nvSpPr>
+              <p:cNvPr id="38" name="Retângulo 37"/>
+              <p:cNvSpPr/>
+              <p:nvPr/>
+            </p:nvSpPr>
+            <p:spPr>
+              <a:xfrm>
+                <a:off x="19446" y="1216961"/>
+                <a:ext cx="1172800" cy="516660"/>
+              </a:xfrm>
+              <a:prstGeom prst="rect">
+                <a:avLst/>
+              </a:prstGeom>
+            </p:spPr>
+            <p:style>
+              <a:lnRef idx="0">
+                <a:scrgbClr r="0" g="0" b="0"/>
+              </a:lnRef>
+              <a:fillRef idx="0">
+                <a:scrgbClr r="0" g="0" b="0"/>
+              </a:fillRef>
+              <a:effectRef idx="0">
+                <a:scrgbClr r="0" g="0" b="0"/>
+              </a:effectRef>
+              <a:fontRef idx="minor">
+                <a:schemeClr val="lt1"/>
+              </a:fontRef>
+            </p:style>
+            <p:txBody>
+              <a:bodyPr spcFirstLastPara="0" vert="horz" wrap="square" lIns="68580" tIns="68580" rIns="68580" bIns="68580" numCol="1" spcCol="1270" anchor="ctr" anchorCtr="0">
+                <a:noAutofit/>
+              </a:bodyPr>
+              <a:lstStyle/>
+              <a:p>
+                <a:pPr lvl="0" algn="ctr" defTabSz="800100">
+                  <a:lnSpc>
+                    <a:spcPct val="90000"/>
+                  </a:lnSpc>
+                  <a:spcBef>
+                    <a:spcPct val="0"/>
+                  </a:spcBef>
+                  <a:spcAft>
+                    <a:spcPct val="35000"/>
+                  </a:spcAft>
+                </a:pPr>
+                <a:r>
+                  <a:rPr lang="pt-BR" sz="1800" kern="1200" dirty="0" err="1" smtClean="0"/>
+                  <a:t>Heuristics</a:t>
+                </a:r>
+                <a:r>
+                  <a:rPr lang="pt-BR" sz="1800" kern="1200" dirty="0" smtClean="0"/>
+                  <a:t> 01</a:t>
+                </a:r>
+                <a:endParaRPr lang="pt-BR" sz="1800" kern="1200" dirty="0"/>
+              </a:p>
+            </p:txBody>
+          </p:sp>
+        </p:grpSp>
+        <p:grpSp>
+          <p:nvGrpSpPr>
+            <p:cNvPr id="29" name="Grupo 28"/>
+            <p:cNvGrpSpPr/>
+            <p:nvPr/>
+          </p:nvGrpSpPr>
+          <p:grpSpPr>
+            <a:xfrm>
+              <a:off x="4218277" y="4991339"/>
+              <a:ext cx="394464" cy="214946"/>
+              <a:chOff x="1258929" y="1367818"/>
+              <a:chExt cx="394464" cy="214946"/>
+            </a:xfrm>
+          </p:grpSpPr>
+          <p:sp>
+            <p:nvSpPr>
+              <p:cNvPr id="33" name="Retângulo de cantos arredondados 32"/>
+              <p:cNvSpPr/>
+              <p:nvPr/>
+            </p:nvSpPr>
+            <p:spPr>
+              <a:xfrm>
+                <a:off x="1258929" y="1367818"/>
+                <a:ext cx="394464" cy="214946"/>
+              </a:xfrm>
+              <a:prstGeom prst="roundRect">
+                <a:avLst>
+                  <a:gd name="adj" fmla="val 10000"/>
+                </a:avLst>
+              </a:prstGeom>
+            </p:spPr>
+            <p:style>
+              <a:lnRef idx="2">
+                <a:schemeClr val="lt1">
+                  <a:hueOff val="0"/>
+                  <a:satOff val="0"/>
+                  <a:lumOff val="0"/>
+                  <a:alphaOff val="0"/>
+                </a:schemeClr>
+              </a:lnRef>
+              <a:fillRef idx="1">
+                <a:schemeClr val="accent3">
+                  <a:hueOff val="0"/>
+                  <a:satOff val="0"/>
+                  <a:lumOff val="0"/>
+                  <a:alphaOff val="0"/>
+                </a:schemeClr>
+              </a:fillRef>
+              <a:effectRef idx="0">
+                <a:schemeClr val="accent3">
+                  <a:hueOff val="0"/>
+                  <a:satOff val="0"/>
+                  <a:lumOff val="0"/>
+                  <a:alphaOff val="0"/>
+                </a:schemeClr>
+              </a:effectRef>
+              <a:fontRef idx="minor">
+                <a:schemeClr val="lt1"/>
+              </a:fontRef>
+            </p:style>
+          </p:sp>
+          <p:sp>
+            <p:nvSpPr>
+              <p:cNvPr id="34" name="Retângulo 33"/>
+              <p:cNvSpPr/>
+              <p:nvPr/>
+            </p:nvSpPr>
+            <p:spPr>
+              <a:xfrm>
+                <a:off x="1265225" y="1374114"/>
+                <a:ext cx="381872" cy="202354"/>
+              </a:xfrm>
+              <a:prstGeom prst="rect">
+                <a:avLst/>
+              </a:prstGeom>
+            </p:spPr>
+            <p:style>
+              <a:lnRef idx="0">
+                <a:scrgbClr r="0" g="0" b="0"/>
+              </a:lnRef>
+              <a:fillRef idx="0">
+                <a:scrgbClr r="0" g="0" b="0"/>
+              </a:fillRef>
+              <a:effectRef idx="0">
+                <a:scrgbClr r="0" g="0" b="0"/>
+              </a:effectRef>
+              <a:fontRef idx="minor">
+                <a:schemeClr val="lt1"/>
+              </a:fontRef>
+            </p:style>
+            <p:txBody>
+              <a:bodyPr spcFirstLastPara="0" vert="horz" wrap="square" lIns="76200" tIns="76200" rIns="76200" bIns="76200" numCol="1" spcCol="1270" anchor="ctr" anchorCtr="0">
+                <a:noAutofit/>
+              </a:bodyPr>
+              <a:lstStyle/>
+              <a:p>
+                <a:pPr lvl="0" algn="ctr" defTabSz="889000">
+                  <a:lnSpc>
+                    <a:spcPct val="90000"/>
+                  </a:lnSpc>
+                  <a:spcBef>
+                    <a:spcPct val="0"/>
+                  </a:spcBef>
+                  <a:spcAft>
+                    <a:spcPct val="35000"/>
+                  </a:spcAft>
+                </a:pPr>
+                <a:r>
+                  <a:rPr lang="pt-BR" sz="2000" kern="1200" dirty="0" smtClean="0"/>
+                  <a:t>...</a:t>
+                </a:r>
+                <a:endParaRPr lang="pt-BR" sz="2000" kern="1200" dirty="0"/>
+              </a:p>
+            </p:txBody>
+          </p:sp>
+        </p:grpSp>
+        <p:grpSp>
+          <p:nvGrpSpPr>
+            <p:cNvPr id="30" name="Grupo 29"/>
+            <p:cNvGrpSpPr/>
+            <p:nvPr/>
+          </p:nvGrpSpPr>
+          <p:grpSpPr>
+            <a:xfrm>
+              <a:off x="4663349" y="4824408"/>
+              <a:ext cx="1204948" cy="548808"/>
+              <a:chOff x="1704001" y="1200887"/>
+              <a:chExt cx="1204948" cy="548808"/>
+            </a:xfrm>
+          </p:grpSpPr>
+          <p:sp>
+            <p:nvSpPr>
+              <p:cNvPr id="31" name="Retângulo de cantos arredondados 30"/>
+              <p:cNvSpPr/>
+              <p:nvPr/>
+            </p:nvSpPr>
+            <p:spPr>
+              <a:xfrm>
+                <a:off x="1704001" y="1200887"/>
+                <a:ext cx="1204948" cy="548808"/>
+              </a:xfrm>
+              <a:prstGeom prst="roundRect">
+                <a:avLst>
+                  <a:gd name="adj" fmla="val 10000"/>
+                </a:avLst>
+              </a:prstGeom>
+            </p:spPr>
+            <p:style>
+              <a:lnRef idx="2">
+                <a:schemeClr val="lt1">
+                  <a:hueOff val="0"/>
+                  <a:satOff val="0"/>
+                  <a:lumOff val="0"/>
+                  <a:alphaOff val="0"/>
+                </a:schemeClr>
+              </a:lnRef>
+              <a:fillRef idx="1">
+                <a:schemeClr val="accent3">
+                  <a:hueOff val="0"/>
+                  <a:satOff val="0"/>
+                  <a:lumOff val="0"/>
+                  <a:alphaOff val="0"/>
+                </a:schemeClr>
+              </a:fillRef>
+              <a:effectRef idx="0">
+                <a:schemeClr val="accent3">
+                  <a:hueOff val="0"/>
+                  <a:satOff val="0"/>
+                  <a:lumOff val="0"/>
+                  <a:alphaOff val="0"/>
+                </a:schemeClr>
+              </a:effectRef>
+              <a:fontRef idx="minor">
+                <a:schemeClr val="lt1"/>
+              </a:fontRef>
+            </p:style>
+          </p:sp>
+          <p:sp>
+            <p:nvSpPr>
+              <p:cNvPr id="32" name="Retângulo 31"/>
+              <p:cNvSpPr/>
+              <p:nvPr/>
+            </p:nvSpPr>
+            <p:spPr>
+              <a:xfrm>
+                <a:off x="1720075" y="1216961"/>
+                <a:ext cx="1172800" cy="516660"/>
+              </a:xfrm>
+              <a:prstGeom prst="rect">
+                <a:avLst/>
+              </a:prstGeom>
+            </p:spPr>
+            <p:style>
+              <a:lnRef idx="0">
+                <a:scrgbClr r="0" g="0" b="0"/>
+              </a:lnRef>
+              <a:fillRef idx="0">
+                <a:scrgbClr r="0" g="0" b="0"/>
+              </a:fillRef>
+              <a:effectRef idx="0">
+                <a:scrgbClr r="0" g="0" b="0"/>
+              </a:effectRef>
+              <a:fontRef idx="minor">
+                <a:schemeClr val="lt1"/>
+              </a:fontRef>
+            </p:style>
+            <p:txBody>
+              <a:bodyPr spcFirstLastPara="0" vert="horz" wrap="square" lIns="68580" tIns="68580" rIns="68580" bIns="68580" numCol="1" spcCol="1270" anchor="ctr" anchorCtr="0">
+                <a:noAutofit/>
+              </a:bodyPr>
+              <a:lstStyle/>
+              <a:p>
+                <a:pPr lvl="0" algn="ctr" defTabSz="800100">
+                  <a:lnSpc>
+                    <a:spcPct val="90000"/>
+                  </a:lnSpc>
+                  <a:spcBef>
+                    <a:spcPct val="0"/>
+                  </a:spcBef>
+                  <a:spcAft>
+                    <a:spcPct val="35000"/>
+                  </a:spcAft>
+                </a:pPr>
+                <a:r>
+                  <a:rPr lang="pt-BR" sz="1800" kern="1200" dirty="0" err="1" smtClean="0"/>
+                  <a:t>Heuristics</a:t>
+                </a:r>
+                <a:r>
+                  <a:rPr lang="pt-BR" sz="1800" kern="1200" dirty="0" smtClean="0"/>
+                  <a:t> </a:t>
+                </a:r>
+                <a:r>
+                  <a:rPr lang="pt-BR" sz="1800" kern="1200" dirty="0" smtClean="0"/>
+                  <a:t>N</a:t>
+                </a:r>
+                <a:endParaRPr lang="pt-BR" sz="1800" kern="1200" dirty="0"/>
+              </a:p>
+            </p:txBody>
+          </p:sp>
+        </p:grpSp>
+      </p:grpSp>
+    </p:spTree>
+    <p:extLst>
+      <p:ext uri="{BB962C8B-B14F-4D97-AF65-F5344CB8AC3E}">
+        <p14:creationId xmlns:p14="http://schemas.microsoft.com/office/powerpoint/2010/main" val="2100667463"/>
+      </p:ext>
+    </p:extLst>
+  </p:cSld>
+  <p:clrMapOvr>
+    <a:masterClrMapping/>
+  </p:clrMapOvr>
+  <p:timing>
+    <p:tnLst>
+      <p:par>
+        <p:cTn id="1" dur="indefinite" restart="never" nodeType="tmRoot"/>
+      </p:par>
+    </p:tnLst>
+  </p:timing>
+</p:sld>
+</file>
+
+<file path=ppt/slides/slide5.xml><?xml version="1.0" encoding="utf-8"?>
+<p:sld xmlns:a="http://schemas.openxmlformats.org/drawingml/2006/main" xmlns:r="http://schemas.openxmlformats.org/officeDocument/2006/relationships" xmlns:p="http://schemas.openxmlformats.org/presentationml/2006/main">
+  <p:cSld>
+    <p:spTree>
+      <p:nvGrpSpPr>
+        <p:cNvPr id="1" name=""/>
+        <p:cNvGrpSpPr/>
+        <p:nvPr/>
+      </p:nvGrpSpPr>
+      <p:grpSpPr>
+        <a:xfrm>
+          <a:off x="0" y="0"/>
+          <a:ext cx="0" cy="0"/>
+          <a:chOff x="0" y="0"/>
+          <a:chExt cx="0" cy="0"/>
+        </a:xfrm>
+      </p:grpSpPr>
+      <p:grpSp>
+        <p:nvGrpSpPr>
           <p:cNvPr id="82" name="Grupo 81"/>
           <p:cNvGrpSpPr/>
           <p:nvPr/>
@@ -16991,7 +21373,7 @@
 </p:sld>
 </file>
 
-<file path=ppt/slides/slide5.xml><?xml version="1.0" encoding="utf-8"?>
+<file path=ppt/slides/slide6.xml><?xml version="1.0" encoding="utf-8"?>
 <p:sld xmlns:a="http://schemas.openxmlformats.org/drawingml/2006/main" xmlns:r="http://schemas.openxmlformats.org/officeDocument/2006/relationships" xmlns:p="http://schemas.openxmlformats.org/presentationml/2006/main">
   <p:cSld>
     <p:spTree>
@@ -17807,7 +22189,7 @@
 </p:sld>
 </file>
 
-<file path=ppt/slides/slide6.xml><?xml version="1.0" encoding="utf-8"?>
+<file path=ppt/slides/slide7.xml><?xml version="1.0" encoding="utf-8"?>
 <p:sld xmlns:a="http://schemas.openxmlformats.org/drawingml/2006/main" xmlns:r="http://schemas.openxmlformats.org/officeDocument/2006/relationships" xmlns:p="http://schemas.openxmlformats.org/presentationml/2006/main">
   <p:cSld>
     <p:spTree>

</xml_diff>